<commit_message>
ich hoffe ich hab nichts kaputt gemacht
</commit_message>
<xml_diff>
--- a/RiboZwo.pptx
+++ b/RiboZwo.pptx
@@ -363,7 +363,7 @@
           <a:p>
             <a:fld id="{12610477-6C94-4391-BBDC-B8E9BB33E658}" type="datetimeFigureOut">
               <a:rPr lang="de-DE" smtClean="0"/>
-              <a:t>02.07.25</a:t>
+              <a:t>02.07.2025</a:t>
             </a:fld>
             <a:endParaRPr lang="de-DE"/>
           </a:p>
@@ -521,7 +521,7 @@
           <a:p>
             <a:fld id="{B23F8280-8283-495D-A659-9194DB8B63EA}" type="slidenum">
               <a:rPr lang="de-DE" smtClean="0"/>
-              <a:t>‹Nr.›</a:t>
+              <a:t>‹#›</a:t>
             </a:fld>
             <a:endParaRPr lang="de-DE"/>
           </a:p>
@@ -953,7 +953,7 @@
           <a:p>
             <a:fld id="{F9ACF1CB-8064-4AFF-8DFB-49A00122A1FD}" type="datetimeFigureOut">
               <a:rPr lang="de-DE" smtClean="0"/>
-              <a:t>02.07.25</a:t>
+              <a:t>02.07.2025</a:t>
             </a:fld>
             <a:endParaRPr lang="de-DE"/>
           </a:p>
@@ -995,7 +995,7 @@
           <a:p>
             <a:fld id="{79580C82-F813-4CCE-B4AC-52ACFAE55A43}" type="slidenum">
               <a:rPr lang="de-DE" smtClean="0"/>
-              <a:t>‹Nr.›</a:t>
+              <a:t>‹#›</a:t>
             </a:fld>
             <a:endParaRPr lang="de-DE"/>
           </a:p>
@@ -1123,7 +1123,7 @@
           <a:p>
             <a:fld id="{F9ACF1CB-8064-4AFF-8DFB-49A00122A1FD}" type="datetimeFigureOut">
               <a:rPr lang="de-DE" smtClean="0"/>
-              <a:t>02.07.25</a:t>
+              <a:t>02.07.2025</a:t>
             </a:fld>
             <a:endParaRPr lang="de-DE"/>
           </a:p>
@@ -1165,7 +1165,7 @@
           <a:p>
             <a:fld id="{79580C82-F813-4CCE-B4AC-52ACFAE55A43}" type="slidenum">
               <a:rPr lang="de-DE" smtClean="0"/>
-              <a:t>‹Nr.›</a:t>
+              <a:t>‹#›</a:t>
             </a:fld>
             <a:endParaRPr lang="de-DE"/>
           </a:p>
@@ -1303,7 +1303,7 @@
           <a:p>
             <a:fld id="{F9ACF1CB-8064-4AFF-8DFB-49A00122A1FD}" type="datetimeFigureOut">
               <a:rPr lang="de-DE" smtClean="0"/>
-              <a:t>02.07.25</a:t>
+              <a:t>02.07.2025</a:t>
             </a:fld>
             <a:endParaRPr lang="de-DE"/>
           </a:p>
@@ -1345,7 +1345,7 @@
           <a:p>
             <a:fld id="{79580C82-F813-4CCE-B4AC-52ACFAE55A43}" type="slidenum">
               <a:rPr lang="de-DE" smtClean="0"/>
-              <a:t>‹Nr.›</a:t>
+              <a:t>‹#›</a:t>
             </a:fld>
             <a:endParaRPr lang="de-DE"/>
           </a:p>
@@ -1473,7 +1473,7 @@
           <a:p>
             <a:fld id="{F9ACF1CB-8064-4AFF-8DFB-49A00122A1FD}" type="datetimeFigureOut">
               <a:rPr lang="de-DE" smtClean="0"/>
-              <a:t>02.07.25</a:t>
+              <a:t>02.07.2025</a:t>
             </a:fld>
             <a:endParaRPr lang="de-DE"/>
           </a:p>
@@ -1515,7 +1515,7 @@
           <a:p>
             <a:fld id="{79580C82-F813-4CCE-B4AC-52ACFAE55A43}" type="slidenum">
               <a:rPr lang="de-DE" smtClean="0"/>
-              <a:t>‹Nr.›</a:t>
+              <a:t>‹#›</a:t>
             </a:fld>
             <a:endParaRPr lang="de-DE"/>
           </a:p>
@@ -1719,7 +1719,7 @@
           <a:p>
             <a:fld id="{F9ACF1CB-8064-4AFF-8DFB-49A00122A1FD}" type="datetimeFigureOut">
               <a:rPr lang="de-DE" smtClean="0"/>
-              <a:t>02.07.25</a:t>
+              <a:t>02.07.2025</a:t>
             </a:fld>
             <a:endParaRPr lang="de-DE"/>
           </a:p>
@@ -1761,7 +1761,7 @@
           <a:p>
             <a:fld id="{79580C82-F813-4CCE-B4AC-52ACFAE55A43}" type="slidenum">
               <a:rPr lang="de-DE" smtClean="0"/>
-              <a:t>‹Nr.›</a:t>
+              <a:t>‹#›</a:t>
             </a:fld>
             <a:endParaRPr lang="de-DE"/>
           </a:p>
@@ -1951,7 +1951,7 @@
           <a:p>
             <a:fld id="{F9ACF1CB-8064-4AFF-8DFB-49A00122A1FD}" type="datetimeFigureOut">
               <a:rPr lang="de-DE" smtClean="0"/>
-              <a:t>02.07.25</a:t>
+              <a:t>02.07.2025</a:t>
             </a:fld>
             <a:endParaRPr lang="de-DE"/>
           </a:p>
@@ -1993,7 +1993,7 @@
           <a:p>
             <a:fld id="{79580C82-F813-4CCE-B4AC-52ACFAE55A43}" type="slidenum">
               <a:rPr lang="de-DE" smtClean="0"/>
-              <a:t>‹Nr.›</a:t>
+              <a:t>‹#›</a:t>
             </a:fld>
             <a:endParaRPr lang="de-DE"/>
           </a:p>
@@ -2318,7 +2318,7 @@
           <a:p>
             <a:fld id="{F9ACF1CB-8064-4AFF-8DFB-49A00122A1FD}" type="datetimeFigureOut">
               <a:rPr lang="de-DE" smtClean="0"/>
-              <a:t>02.07.25</a:t>
+              <a:t>02.07.2025</a:t>
             </a:fld>
             <a:endParaRPr lang="de-DE"/>
           </a:p>
@@ -2360,7 +2360,7 @@
           <a:p>
             <a:fld id="{79580C82-F813-4CCE-B4AC-52ACFAE55A43}" type="slidenum">
               <a:rPr lang="de-DE" smtClean="0"/>
-              <a:t>‹Nr.›</a:t>
+              <a:t>‹#›</a:t>
             </a:fld>
             <a:endParaRPr lang="de-DE"/>
           </a:p>
@@ -2436,7 +2436,7 @@
           <a:p>
             <a:fld id="{F9ACF1CB-8064-4AFF-8DFB-49A00122A1FD}" type="datetimeFigureOut">
               <a:rPr lang="de-DE" smtClean="0"/>
-              <a:t>02.07.25</a:t>
+              <a:t>02.07.2025</a:t>
             </a:fld>
             <a:endParaRPr lang="de-DE"/>
           </a:p>
@@ -2478,7 +2478,7 @@
           <a:p>
             <a:fld id="{79580C82-F813-4CCE-B4AC-52ACFAE55A43}" type="slidenum">
               <a:rPr lang="de-DE" smtClean="0"/>
-              <a:t>‹Nr.›</a:t>
+              <a:t>‹#›</a:t>
             </a:fld>
             <a:endParaRPr lang="de-DE"/>
           </a:p>
@@ -2531,7 +2531,7 @@
           <a:p>
             <a:fld id="{F9ACF1CB-8064-4AFF-8DFB-49A00122A1FD}" type="datetimeFigureOut">
               <a:rPr lang="de-DE" smtClean="0"/>
-              <a:t>02.07.25</a:t>
+              <a:t>02.07.2025</a:t>
             </a:fld>
             <a:endParaRPr lang="de-DE"/>
           </a:p>
@@ -2573,7 +2573,7 @@
           <a:p>
             <a:fld id="{79580C82-F813-4CCE-B4AC-52ACFAE55A43}" type="slidenum">
               <a:rPr lang="de-DE" smtClean="0"/>
-              <a:t>‹Nr.›</a:t>
+              <a:t>‹#›</a:t>
             </a:fld>
             <a:endParaRPr lang="de-DE"/>
           </a:p>
@@ -2808,7 +2808,7 @@
           <a:p>
             <a:fld id="{F9ACF1CB-8064-4AFF-8DFB-49A00122A1FD}" type="datetimeFigureOut">
               <a:rPr lang="de-DE" smtClean="0"/>
-              <a:t>02.07.25</a:t>
+              <a:t>02.07.2025</a:t>
             </a:fld>
             <a:endParaRPr lang="de-DE"/>
           </a:p>
@@ -2850,7 +2850,7 @@
           <a:p>
             <a:fld id="{79580C82-F813-4CCE-B4AC-52ACFAE55A43}" type="slidenum">
               <a:rPr lang="de-DE" smtClean="0"/>
-              <a:t>‹Nr.›</a:t>
+              <a:t>‹#›</a:t>
             </a:fld>
             <a:endParaRPr lang="de-DE"/>
           </a:p>
@@ -3065,7 +3065,7 @@
           <a:p>
             <a:fld id="{F9ACF1CB-8064-4AFF-8DFB-49A00122A1FD}" type="datetimeFigureOut">
               <a:rPr lang="de-DE" smtClean="0"/>
-              <a:t>02.07.25</a:t>
+              <a:t>02.07.2025</a:t>
             </a:fld>
             <a:endParaRPr lang="de-DE"/>
           </a:p>
@@ -3107,7 +3107,7 @@
           <a:p>
             <a:fld id="{79580C82-F813-4CCE-B4AC-52ACFAE55A43}" type="slidenum">
               <a:rPr lang="de-DE" smtClean="0"/>
-              <a:t>‹Nr.›</a:t>
+              <a:t>‹#›</a:t>
             </a:fld>
             <a:endParaRPr lang="de-DE"/>
           </a:p>
@@ -3278,7 +3278,7 @@
           <a:p>
             <a:fld id="{F9ACF1CB-8064-4AFF-8DFB-49A00122A1FD}" type="datetimeFigureOut">
               <a:rPr lang="de-DE" smtClean="0"/>
-              <a:t>02.07.25</a:t>
+              <a:t>02.07.2025</a:t>
             </a:fld>
             <a:endParaRPr lang="de-DE"/>
           </a:p>
@@ -3356,7 +3356,7 @@
           <a:p>
             <a:fld id="{79580C82-F813-4CCE-B4AC-52ACFAE55A43}" type="slidenum">
               <a:rPr lang="de-DE" smtClean="0"/>
-              <a:t>‹Nr.›</a:t>
+              <a:t>‹#›</a:t>
             </a:fld>
             <a:endParaRPr lang="de-DE"/>
           </a:p>
@@ -5128,7 +5128,7 @@
         <p:spPr>
           <a:xfrm>
             <a:off x="15848412" y="9507867"/>
-            <a:ext cx="13572174" cy="3963964"/>
+            <a:ext cx="12574188" cy="2197105"/>
           </a:xfrm>
           <a:prstGeom prst="rect">
             <a:avLst/>
@@ -5179,6 +5179,10 @@
             </a:endParaRPr>
           </a:p>
           <a:p>
+            <a:pPr marL="571500" indent="-571500">
+              <a:buFontTx/>
+              <a:buChar char="-"/>
+            </a:pPr>
             <a:r>
               <a:rPr lang="en-US" sz="4000" noProof="0" dirty="0">
                 <a:solidFill>
@@ -5187,8 +5191,21 @@
                 <a:latin typeface="Source Sans Pro" panose="020B0503030403020204" pitchFamily="34" charset="0"/>
                 <a:ea typeface="Source Sans Pro" panose="020B0503030403020204" pitchFamily="34" charset="0"/>
               </a:rPr>
-              <a:t>- SD + Mean</a:t>
-            </a:r>
+              <a:t>SD + Mean</a:t>
+            </a:r>
+          </a:p>
+          <a:p>
+            <a:pPr marL="571500" indent="-571500">
+              <a:buFontTx/>
+              <a:buChar char="-"/>
+            </a:pPr>
+            <a:endParaRPr lang="en-US" sz="4000" noProof="0" dirty="0">
+              <a:solidFill>
+                <a:schemeClr val="tx1"/>
+              </a:solidFill>
+              <a:latin typeface="Source Sans Pro" panose="020B0503030403020204" pitchFamily="34" charset="0"/>
+              <a:ea typeface="Source Sans Pro" panose="020B0503030403020204" pitchFamily="34" charset="0"/>
+            </a:endParaRPr>
           </a:p>
         </p:txBody>
       </p:sp>
@@ -5942,6 +5959,98 @@
           </a:p>
         </p:txBody>
       </p:sp>
+      <p:sp>
+        <p:nvSpPr>
+          <p:cNvPr id="12" name="Rectangle 11">
+            <a:extLst>
+              <a:ext uri="{FF2B5EF4-FFF2-40B4-BE49-F238E27FC236}">
+                <a16:creationId xmlns:a16="http://schemas.microsoft.com/office/drawing/2014/main" id="{B9A6FAFB-7C49-7213-7BD8-8E66DBEDBBBF}"/>
+              </a:ext>
+            </a:extLst>
+          </p:cNvPr>
+          <p:cNvSpPr/>
+          <p:nvPr/>
+        </p:nvSpPr>
+        <p:spPr>
+          <a:xfrm>
+            <a:off x="15848412" y="11927105"/>
+            <a:ext cx="5359001" cy="3924705"/>
+          </a:xfrm>
+          <a:prstGeom prst="rect">
+            <a:avLst/>
+          </a:prstGeom>
+          <a:solidFill>
+            <a:schemeClr val="bg1"/>
+          </a:solidFill>
+          <a:ln>
+            <a:noFill/>
+          </a:ln>
+        </p:spPr>
+        <p:style>
+          <a:lnRef idx="2">
+            <a:schemeClr val="accent1">
+              <a:shade val="15000"/>
+            </a:schemeClr>
+          </a:lnRef>
+          <a:fillRef idx="1">
+            <a:schemeClr val="accent1"/>
+          </a:fillRef>
+          <a:effectRef idx="0">
+            <a:schemeClr val="accent1"/>
+          </a:effectRef>
+          <a:fontRef idx="minor">
+            <a:schemeClr val="lt1"/>
+          </a:fontRef>
+        </p:style>
+        <p:txBody>
+          <a:bodyPr rtlCol="0" anchor="t"/>
+          <a:lstStyle/>
+          <a:p>
+            <a:pPr algn="r"/>
+            <a:endParaRPr lang="en-GB" sz="3600" dirty="0">
+              <a:solidFill>
+                <a:schemeClr val="tx1"/>
+              </a:solidFill>
+            </a:endParaRPr>
+          </a:p>
+        </p:txBody>
+      </p:sp>
+      <p:pic>
+        <p:nvPicPr>
+          <p:cNvPr id="8" name="Picture 7" descr="A graph with red dots&#10;&#10;AI-generated content may be incorrect.">
+            <a:extLst>
+              <a:ext uri="{FF2B5EF4-FFF2-40B4-BE49-F238E27FC236}">
+                <a16:creationId xmlns:a16="http://schemas.microsoft.com/office/drawing/2014/main" id="{58FC2CD0-6EDD-4966-192D-536096C3635D}"/>
+              </a:ext>
+            </a:extLst>
+          </p:cNvPr>
+          <p:cNvPicPr>
+            <a:picLocks noChangeAspect="1"/>
+          </p:cNvPicPr>
+          <p:nvPr/>
+        </p:nvPicPr>
+        <p:blipFill>
+          <a:blip r:embed="rId8">
+            <a:extLst>
+              <a:ext uri="{28A0092B-C50C-407E-A947-70E740481C1C}">
+                <a14:useLocalDpi xmlns:a14="http://schemas.microsoft.com/office/drawing/2010/main" val="0"/>
+              </a:ext>
+            </a:extLst>
+          </a:blip>
+          <a:stretch>
+            <a:fillRect/>
+          </a:stretch>
+        </p:blipFill>
+        <p:spPr>
+          <a:xfrm>
+            <a:off x="15902479" y="11965102"/>
+            <a:ext cx="5232939" cy="3924704"/>
+          </a:xfrm>
+          <a:prstGeom prst="rect">
+            <a:avLst/>
+          </a:prstGeom>
+        </p:spPr>
+      </p:pic>
     </p:spTree>
     <p:extLst>
       <p:ext uri="{BB962C8B-B14F-4D97-AF65-F5344CB8AC3E}">

</xml_diff>

<commit_message>
Repro Analysis on poster and moved one unused chunk
</commit_message>
<xml_diff>
--- a/RiboZwo.pptx
+++ b/RiboZwo.pptx
@@ -119,7 +119,7 @@
 <file path=ppt/revisionInfo.xml><?xml version="1.0" encoding="utf-8"?>
 <p1510:revInfo xmlns:a="http://schemas.openxmlformats.org/drawingml/2006/main" xmlns:r="http://schemas.openxmlformats.org/officeDocument/2006/relationships" xmlns:p1510="http://schemas.microsoft.com/office/powerpoint/2015/10/main">
   <p1510:revLst>
-    <p1510:client id="{E5A86D5C-552E-4995-AB32-5E49D96B1D3A}" v="12" dt="2025-07-02T09:58:00.100"/>
+    <p1510:client id="{E5A86D5C-552E-4995-AB32-5E49D96B1D3A}" v="24" dt="2025-07-03T14:16:08.782"/>
   </p1510:revLst>
 </p1510:revInfo>
 </file>
@@ -128,19 +128,19 @@
 <pc:chgInfo xmlns:a="http://schemas.openxmlformats.org/drawingml/2006/main" xmlns:r="http://schemas.openxmlformats.org/officeDocument/2006/relationships" xmlns:ac="http://schemas.microsoft.com/office/drawing/2013/main/command" xmlns:pc="http://schemas.microsoft.com/office/powerpoint/2013/main/command">
   <pc:docChgLst>
     <pc:chgData name="Cihan Zeyrek" userId="dd9724baaf2e43d1" providerId="LiveId" clId="{E5A86D5C-552E-4995-AB32-5E49D96B1D3A}"/>
-    <pc:docChg chg="undo custSel modSld">
-      <pc:chgData name="Cihan Zeyrek" userId="dd9724baaf2e43d1" providerId="LiveId" clId="{E5A86D5C-552E-4995-AB32-5E49D96B1D3A}" dt="2025-07-02T09:58:49.653" v="2867" actId="20577"/>
+    <pc:docChg chg="undo redo custSel modSld">
+      <pc:chgData name="Cihan Zeyrek" userId="dd9724baaf2e43d1" providerId="LiveId" clId="{E5A86D5C-552E-4995-AB32-5E49D96B1D3A}" dt="2025-07-03T14:16:27.570" v="3691" actId="113"/>
       <pc:docMkLst>
         <pc:docMk/>
       </pc:docMkLst>
       <pc:sldChg chg="addSp delSp modSp mod">
-        <pc:chgData name="Cihan Zeyrek" userId="dd9724baaf2e43d1" providerId="LiveId" clId="{E5A86D5C-552E-4995-AB32-5E49D96B1D3A}" dt="2025-07-02T09:58:49.653" v="2867" actId="20577"/>
+        <pc:chgData name="Cihan Zeyrek" userId="dd9724baaf2e43d1" providerId="LiveId" clId="{E5A86D5C-552E-4995-AB32-5E49D96B1D3A}" dt="2025-07-03T13:41:54.663" v="2908" actId="790"/>
         <pc:sldMkLst>
           <pc:docMk/>
           <pc:sldMk cId="4168340417" sldId="256"/>
         </pc:sldMkLst>
         <pc:spChg chg="add mod">
-          <ac:chgData name="Cihan Zeyrek" userId="dd9724baaf2e43d1" providerId="LiveId" clId="{E5A86D5C-552E-4995-AB32-5E49D96B1D3A}" dt="2025-07-02T09:40:18.023" v="1545" actId="790"/>
+          <ac:chgData name="Cihan Zeyrek" userId="dd9724baaf2e43d1" providerId="LiveId" clId="{E5A86D5C-552E-4995-AB32-5E49D96B1D3A}" dt="2025-07-03T13:41:54.663" v="2908" actId="790"/>
           <ac:spMkLst>
             <pc:docMk/>
             <pc:sldMk cId="4168340417" sldId="256"/>
@@ -148,23 +148,15 @@
           </ac:spMkLst>
         </pc:spChg>
         <pc:spChg chg="add mod">
-          <ac:chgData name="Cihan Zeyrek" userId="dd9724baaf2e43d1" providerId="LiveId" clId="{E5A86D5C-552E-4995-AB32-5E49D96B1D3A}" dt="2025-07-02T09:58:49.653" v="2867" actId="20577"/>
+          <ac:chgData name="Cihan Zeyrek" userId="dd9724baaf2e43d1" providerId="LiveId" clId="{E5A86D5C-552E-4995-AB32-5E49D96B1D3A}" dt="2025-07-03T13:41:54.663" v="2908" actId="790"/>
           <ac:spMkLst>
             <pc:docMk/>
             <pc:sldMk cId="4168340417" sldId="256"/>
             <ac:spMk id="3" creationId="{04624BEE-2D85-D971-6B0E-6AFB63D073B6}"/>
           </ac:spMkLst>
         </pc:spChg>
-        <pc:spChg chg="add del mod">
-          <ac:chgData name="Cihan Zeyrek" userId="dd9724baaf2e43d1" providerId="LiveId" clId="{E5A86D5C-552E-4995-AB32-5E49D96B1D3A}" dt="2025-07-01T11:46:09.549" v="504" actId="478"/>
-          <ac:spMkLst>
-            <pc:docMk/>
-            <pc:sldMk cId="4168340417" sldId="256"/>
-            <ac:spMk id="3" creationId="{D6502805-559F-9867-BD20-68A8AC9C3C19}"/>
-          </ac:spMkLst>
-        </pc:spChg>
         <pc:spChg chg="mod">
-          <ac:chgData name="Cihan Zeyrek" userId="dd9724baaf2e43d1" providerId="LiveId" clId="{E5A86D5C-552E-4995-AB32-5E49D96B1D3A}" dt="2025-07-02T09:58:13.466" v="2863" actId="20577"/>
+          <ac:chgData name="Cihan Zeyrek" userId="dd9724baaf2e43d1" providerId="LiveId" clId="{E5A86D5C-552E-4995-AB32-5E49D96B1D3A}" dt="2025-07-03T13:41:54.663" v="2908" actId="790"/>
           <ac:spMkLst>
             <pc:docMk/>
             <pc:sldMk cId="4168340417" sldId="256"/>
@@ -172,7 +164,7 @@
           </ac:spMkLst>
         </pc:spChg>
         <pc:spChg chg="mod">
-          <ac:chgData name="Cihan Zeyrek" userId="dd9724baaf2e43d1" providerId="LiveId" clId="{E5A86D5C-552E-4995-AB32-5E49D96B1D3A}" dt="2025-07-02T09:40:18.023" v="1545" actId="790"/>
+          <ac:chgData name="Cihan Zeyrek" userId="dd9724baaf2e43d1" providerId="LiveId" clId="{E5A86D5C-552E-4995-AB32-5E49D96B1D3A}" dt="2025-07-03T13:41:54.663" v="2908" actId="790"/>
           <ac:spMkLst>
             <pc:docMk/>
             <pc:sldMk cId="4168340417" sldId="256"/>
@@ -180,39 +172,23 @@
           </ac:spMkLst>
         </pc:spChg>
         <pc:spChg chg="mod">
-          <ac:chgData name="Cihan Zeyrek" userId="dd9724baaf2e43d1" providerId="LiveId" clId="{E5A86D5C-552E-4995-AB32-5E49D96B1D3A}" dt="2025-07-02T09:40:18.023" v="1545" actId="790"/>
+          <ac:chgData name="Cihan Zeyrek" userId="dd9724baaf2e43d1" providerId="LiveId" clId="{E5A86D5C-552E-4995-AB32-5E49D96B1D3A}" dt="2025-07-03T13:41:54.663" v="2908" actId="790"/>
           <ac:spMkLst>
             <pc:docMk/>
             <pc:sldMk cId="4168340417" sldId="256"/>
             <ac:spMk id="6" creationId="{C4639C69-68ED-0C86-8FE4-B1B8B32B2740}"/>
           </ac:spMkLst>
         </pc:spChg>
-        <pc:spChg chg="add del mod">
-          <ac:chgData name="Cihan Zeyrek" userId="dd9724baaf2e43d1" providerId="LiveId" clId="{E5A86D5C-552E-4995-AB32-5E49D96B1D3A}" dt="2025-07-01T11:46:07.747" v="503" actId="478"/>
-          <ac:spMkLst>
-            <pc:docMk/>
-            <pc:sldMk cId="4168340417" sldId="256"/>
-            <ac:spMk id="7" creationId="{800E7A44-961E-9783-3047-2F1FDEE010A7}"/>
-          </ac:spMkLst>
-        </pc:spChg>
         <pc:spChg chg="add mod">
-          <ac:chgData name="Cihan Zeyrek" userId="dd9724baaf2e43d1" providerId="LiveId" clId="{E5A86D5C-552E-4995-AB32-5E49D96B1D3A}" dt="2025-07-02T09:58:03.949" v="2860" actId="20577"/>
+          <ac:chgData name="Cihan Zeyrek" userId="dd9724baaf2e43d1" providerId="LiveId" clId="{E5A86D5C-552E-4995-AB32-5E49D96B1D3A}" dt="2025-07-03T13:41:54.663" v="2908" actId="790"/>
           <ac:spMkLst>
             <pc:docMk/>
             <pc:sldMk cId="4168340417" sldId="256"/>
             <ac:spMk id="7" creationId="{E825588A-E12C-8099-3FB3-5077EFD79267}"/>
           </ac:spMkLst>
         </pc:spChg>
-        <pc:spChg chg="add del mod">
-          <ac:chgData name="Cihan Zeyrek" userId="dd9724baaf2e43d1" providerId="LiveId" clId="{E5A86D5C-552E-4995-AB32-5E49D96B1D3A}" dt="2025-07-01T11:52:51.314" v="535"/>
-          <ac:spMkLst>
-            <pc:docMk/>
-            <pc:sldMk cId="4168340417" sldId="256"/>
-            <ac:spMk id="10" creationId="{0228EA42-7125-79B2-7104-98BB3B7B232E}"/>
-          </ac:spMkLst>
-        </pc:spChg>
         <pc:spChg chg="mod">
-          <ac:chgData name="Cihan Zeyrek" userId="dd9724baaf2e43d1" providerId="LiveId" clId="{E5A86D5C-552E-4995-AB32-5E49D96B1D3A}" dt="2025-07-02T09:40:18.023" v="1545" actId="790"/>
+          <ac:chgData name="Cihan Zeyrek" userId="dd9724baaf2e43d1" providerId="LiveId" clId="{E5A86D5C-552E-4995-AB32-5E49D96B1D3A}" dt="2025-07-03T13:41:54.663" v="2908" actId="790"/>
           <ac:spMkLst>
             <pc:docMk/>
             <pc:sldMk cId="4168340417" sldId="256"/>
@@ -220,7 +196,7 @@
           </ac:spMkLst>
         </pc:spChg>
         <pc:spChg chg="mod">
-          <ac:chgData name="Cihan Zeyrek" userId="dd9724baaf2e43d1" providerId="LiveId" clId="{E5A86D5C-552E-4995-AB32-5E49D96B1D3A}" dt="2025-07-02T09:40:18.023" v="1545" actId="790"/>
+          <ac:chgData name="Cihan Zeyrek" userId="dd9724baaf2e43d1" providerId="LiveId" clId="{E5A86D5C-552E-4995-AB32-5E49D96B1D3A}" dt="2025-07-03T13:41:54.663" v="2908" actId="790"/>
           <ac:spMkLst>
             <pc:docMk/>
             <pc:sldMk cId="4168340417" sldId="256"/>
@@ -236,7 +212,7 @@
           </ac:spMkLst>
         </pc:spChg>
         <pc:spChg chg="mod">
-          <ac:chgData name="Cihan Zeyrek" userId="dd9724baaf2e43d1" providerId="LiveId" clId="{E5A86D5C-552E-4995-AB32-5E49D96B1D3A}" dt="2025-07-02T09:40:18.023" v="1545" actId="790"/>
+          <ac:chgData name="Cihan Zeyrek" userId="dd9724baaf2e43d1" providerId="LiveId" clId="{E5A86D5C-552E-4995-AB32-5E49D96B1D3A}" dt="2025-07-03T13:41:54.663" v="2908" actId="790"/>
           <ac:spMkLst>
             <pc:docMk/>
             <pc:sldMk cId="4168340417" sldId="256"/>
@@ -244,7 +220,7 @@
           </ac:spMkLst>
         </pc:spChg>
         <pc:spChg chg="mod">
-          <ac:chgData name="Cihan Zeyrek" userId="dd9724baaf2e43d1" providerId="LiveId" clId="{E5A86D5C-552E-4995-AB32-5E49D96B1D3A}" dt="2025-07-02T09:40:18.023" v="1545" actId="790"/>
+          <ac:chgData name="Cihan Zeyrek" userId="dd9724baaf2e43d1" providerId="LiveId" clId="{E5A86D5C-552E-4995-AB32-5E49D96B1D3A}" dt="2025-07-03T13:41:54.663" v="2908" actId="790"/>
           <ac:spMkLst>
             <pc:docMk/>
             <pc:sldMk cId="4168340417" sldId="256"/>
@@ -267,14 +243,221 @@
             <ac:picMk id="20" creationId="{109B983B-C86E-49D0-A0E7-DCBDB9FF69F8}"/>
           </ac:picMkLst>
         </pc:picChg>
-        <pc:cxnChg chg="add del">
-          <ac:chgData name="Cihan Zeyrek" userId="dd9724baaf2e43d1" providerId="LiveId" clId="{E5A86D5C-552E-4995-AB32-5E49D96B1D3A}" dt="2025-07-01T11:46:42.275" v="506" actId="11529"/>
-          <ac:cxnSpMkLst>
+      </pc:sldChg>
+      <pc:sldChg chg="addSp delSp modSp mod">
+        <pc:chgData name="Cihan Zeyrek" userId="dd9724baaf2e43d1" providerId="LiveId" clId="{E5A86D5C-552E-4995-AB32-5E49D96B1D3A}" dt="2025-07-03T14:16:27.570" v="3691" actId="113"/>
+        <pc:sldMkLst>
+          <pc:docMk/>
+          <pc:sldMk cId="3613911005" sldId="258"/>
+        </pc:sldMkLst>
+        <pc:spChg chg="mod">
+          <ac:chgData name="Cihan Zeyrek" userId="dd9724baaf2e43d1" providerId="LiveId" clId="{E5A86D5C-552E-4995-AB32-5E49D96B1D3A}" dt="2025-07-03T13:41:54.663" v="2908" actId="790"/>
+          <ac:spMkLst>
             <pc:docMk/>
-            <pc:sldMk cId="4168340417" sldId="256"/>
-            <ac:cxnSpMk id="9" creationId="{A499BE1F-D91A-2436-1D1E-1A1A8376156C}"/>
-          </ac:cxnSpMkLst>
-        </pc:cxnChg>
+            <pc:sldMk cId="3613911005" sldId="258"/>
+            <ac:spMk id="2" creationId="{49A02D2B-FEBA-8240-4F80-1023D79A7ABD}"/>
+          </ac:spMkLst>
+        </pc:spChg>
+        <pc:spChg chg="mod">
+          <ac:chgData name="Cihan Zeyrek" userId="dd9724baaf2e43d1" providerId="LiveId" clId="{E5A86D5C-552E-4995-AB32-5E49D96B1D3A}" dt="2025-07-03T13:41:54.663" v="2908" actId="790"/>
+          <ac:spMkLst>
+            <pc:docMk/>
+            <pc:sldMk cId="3613911005" sldId="258"/>
+            <ac:spMk id="3" creationId="{0D810A4A-92B1-68EC-1B3D-A5167555FDE6}"/>
+          </ac:spMkLst>
+        </pc:spChg>
+        <pc:spChg chg="mod">
+          <ac:chgData name="Cihan Zeyrek" userId="dd9724baaf2e43d1" providerId="LiveId" clId="{E5A86D5C-552E-4995-AB32-5E49D96B1D3A}" dt="2025-07-03T14:03:36.632" v="3496" actId="1076"/>
+          <ac:spMkLst>
+            <pc:docMk/>
+            <pc:sldMk cId="3613911005" sldId="258"/>
+            <ac:spMk id="5" creationId="{D04637A8-2720-C09A-253F-D30767B31FFF}"/>
+          </ac:spMkLst>
+        </pc:spChg>
+        <pc:spChg chg="mod">
+          <ac:chgData name="Cihan Zeyrek" userId="dd9724baaf2e43d1" providerId="LiveId" clId="{E5A86D5C-552E-4995-AB32-5E49D96B1D3A}" dt="2025-07-03T13:41:54.663" v="2908" actId="790"/>
+          <ac:spMkLst>
+            <pc:docMk/>
+            <pc:sldMk cId="3613911005" sldId="258"/>
+            <ac:spMk id="7" creationId="{04DB3D5B-799E-DEB3-55A1-77E0B672A6B4}"/>
+          </ac:spMkLst>
+        </pc:spChg>
+        <pc:spChg chg="mod">
+          <ac:chgData name="Cihan Zeyrek" userId="dd9724baaf2e43d1" providerId="LiveId" clId="{E5A86D5C-552E-4995-AB32-5E49D96B1D3A}" dt="2025-07-03T14:06:21.345" v="3514" actId="1076"/>
+          <ac:spMkLst>
+            <pc:docMk/>
+            <pc:sldMk cId="3613911005" sldId="258"/>
+            <ac:spMk id="10" creationId="{E81C1AF9-B932-00D1-B316-FD13BCD22722}"/>
+          </ac:spMkLst>
+        </pc:spChg>
+        <pc:spChg chg="mod">
+          <ac:chgData name="Cihan Zeyrek" userId="dd9724baaf2e43d1" providerId="LiveId" clId="{E5A86D5C-552E-4995-AB32-5E49D96B1D3A}" dt="2025-07-03T13:41:54.663" v="2908" actId="790"/>
+          <ac:spMkLst>
+            <pc:docMk/>
+            <pc:sldMk cId="3613911005" sldId="258"/>
+            <ac:spMk id="11" creationId="{021CF195-2D3D-9BF1-3771-664A809C04FB}"/>
+          </ac:spMkLst>
+        </pc:spChg>
+        <pc:spChg chg="add mod">
+          <ac:chgData name="Cihan Zeyrek" userId="dd9724baaf2e43d1" providerId="LiveId" clId="{E5A86D5C-552E-4995-AB32-5E49D96B1D3A}" dt="2025-07-03T14:15:26.543" v="3686" actId="20577"/>
+          <ac:spMkLst>
+            <pc:docMk/>
+            <pc:sldMk cId="3613911005" sldId="258"/>
+            <ac:spMk id="13" creationId="{B1FDECB6-1FBA-D64A-249B-C2A37669EFAA}"/>
+          </ac:spMkLst>
+        </pc:spChg>
+        <pc:spChg chg="mod">
+          <ac:chgData name="Cihan Zeyrek" userId="dd9724baaf2e43d1" providerId="LiveId" clId="{E5A86D5C-552E-4995-AB32-5E49D96B1D3A}" dt="2025-07-03T13:41:54.663" v="2908" actId="790"/>
+          <ac:spMkLst>
+            <pc:docMk/>
+            <pc:sldMk cId="3613911005" sldId="258"/>
+            <ac:spMk id="15" creationId="{318D8B86-DFF0-9641-CEC3-3D48CFA515DB}"/>
+          </ac:spMkLst>
+        </pc:spChg>
+        <pc:spChg chg="mod">
+          <ac:chgData name="Cihan Zeyrek" userId="dd9724baaf2e43d1" providerId="LiveId" clId="{E5A86D5C-552E-4995-AB32-5E49D96B1D3A}" dt="2025-07-03T13:41:54.663" v="2908" actId="790"/>
+          <ac:spMkLst>
+            <pc:docMk/>
+            <pc:sldMk cId="3613911005" sldId="258"/>
+            <ac:spMk id="16" creationId="{0FCE50A5-8321-3A15-8F2E-E7A4119AE242}"/>
+          </ac:spMkLst>
+        </pc:spChg>
+        <pc:spChg chg="mod">
+          <ac:chgData name="Cihan Zeyrek" userId="dd9724baaf2e43d1" providerId="LiveId" clId="{E5A86D5C-552E-4995-AB32-5E49D96B1D3A}" dt="2025-07-03T13:41:54.663" v="2908" actId="790"/>
+          <ac:spMkLst>
+            <pc:docMk/>
+            <pc:sldMk cId="3613911005" sldId="258"/>
+            <ac:spMk id="22" creationId="{CADA5048-84E9-7610-1363-103CE5D313B8}"/>
+          </ac:spMkLst>
+        </pc:spChg>
+        <pc:spChg chg="mod">
+          <ac:chgData name="Cihan Zeyrek" userId="dd9724baaf2e43d1" providerId="LiveId" clId="{E5A86D5C-552E-4995-AB32-5E49D96B1D3A}" dt="2025-07-03T13:38:33.064" v="2870" actId="1076"/>
+          <ac:spMkLst>
+            <pc:docMk/>
+            <pc:sldMk cId="3613911005" sldId="258"/>
+            <ac:spMk id="26" creationId="{BE290EAF-1A4B-D335-43DA-78DE46D94BC7}"/>
+          </ac:spMkLst>
+        </pc:spChg>
+        <pc:spChg chg="mod">
+          <ac:chgData name="Cihan Zeyrek" userId="dd9724baaf2e43d1" providerId="LiveId" clId="{E5A86D5C-552E-4995-AB32-5E49D96B1D3A}" dt="2025-07-03T13:39:50.039" v="2883" actId="1076"/>
+          <ac:spMkLst>
+            <pc:docMk/>
+            <pc:sldMk cId="3613911005" sldId="258"/>
+            <ac:spMk id="39" creationId="{E6EF7BF0-8EEC-4498-FCA6-9E2123BFB423}"/>
+          </ac:spMkLst>
+        </pc:spChg>
+        <pc:spChg chg="mod">
+          <ac:chgData name="Cihan Zeyrek" userId="dd9724baaf2e43d1" providerId="LiveId" clId="{E5A86D5C-552E-4995-AB32-5E49D96B1D3A}" dt="2025-07-03T13:40:37.904" v="2889" actId="1076"/>
+          <ac:spMkLst>
+            <pc:docMk/>
+            <pc:sldMk cId="3613911005" sldId="258"/>
+            <ac:spMk id="40" creationId="{9E00ACD3-20DA-AFDB-EE91-F0B099D4597C}"/>
+          </ac:spMkLst>
+        </pc:spChg>
+        <pc:spChg chg="mod">
+          <ac:chgData name="Cihan Zeyrek" userId="dd9724baaf2e43d1" providerId="LiveId" clId="{E5A86D5C-552E-4995-AB32-5E49D96B1D3A}" dt="2025-07-03T13:41:54.663" v="2908" actId="790"/>
+          <ac:spMkLst>
+            <pc:docMk/>
+            <pc:sldMk cId="3613911005" sldId="258"/>
+            <ac:spMk id="45" creationId="{383CE23E-E30E-605A-7CAB-C3F82B7FB91A}"/>
+          </ac:spMkLst>
+        </pc:spChg>
+        <pc:spChg chg="mod">
+          <ac:chgData name="Cihan Zeyrek" userId="dd9724baaf2e43d1" providerId="LiveId" clId="{E5A86D5C-552E-4995-AB32-5E49D96B1D3A}" dt="2025-07-03T13:41:54.663" v="2908" actId="790"/>
+          <ac:spMkLst>
+            <pc:docMk/>
+            <pc:sldMk cId="3613911005" sldId="258"/>
+            <ac:spMk id="47" creationId="{C8697122-1F57-2A95-C751-74F7E5823F08}"/>
+          </ac:spMkLst>
+        </pc:spChg>
+        <pc:spChg chg="mod">
+          <ac:chgData name="Cihan Zeyrek" userId="dd9724baaf2e43d1" providerId="LiveId" clId="{E5A86D5C-552E-4995-AB32-5E49D96B1D3A}" dt="2025-07-03T13:40:14.839" v="2885" actId="1076"/>
+          <ac:spMkLst>
+            <pc:docMk/>
+            <pc:sldMk cId="3613911005" sldId="258"/>
+            <ac:spMk id="49" creationId="{06A51717-529C-69ED-4034-81B1351AD584}"/>
+          </ac:spMkLst>
+        </pc:spChg>
+        <pc:spChg chg="mod">
+          <ac:chgData name="Cihan Zeyrek" userId="dd9724baaf2e43d1" providerId="LiveId" clId="{E5A86D5C-552E-4995-AB32-5E49D96B1D3A}" dt="2025-07-03T14:14:28.529" v="3680" actId="20577"/>
+          <ac:spMkLst>
+            <pc:docMk/>
+            <pc:sldMk cId="3613911005" sldId="258"/>
+            <ac:spMk id="50" creationId="{71AC231F-D6F1-37AC-E477-4F200AD7EBA5}"/>
+          </ac:spMkLst>
+        </pc:spChg>
+        <pc:spChg chg="mod">
+          <ac:chgData name="Cihan Zeyrek" userId="dd9724baaf2e43d1" providerId="LiveId" clId="{E5A86D5C-552E-4995-AB32-5E49D96B1D3A}" dt="2025-07-03T14:14:20.122" v="3674" actId="20577"/>
+          <ac:spMkLst>
+            <pc:docMk/>
+            <pc:sldMk cId="3613911005" sldId="258"/>
+            <ac:spMk id="51" creationId="{1EFE5839-827F-4EE7-93B1-21F410F3AF68}"/>
+          </ac:spMkLst>
+        </pc:spChg>
+        <pc:spChg chg="add mod">
+          <ac:chgData name="Cihan Zeyrek" userId="dd9724baaf2e43d1" providerId="LiveId" clId="{E5A86D5C-552E-4995-AB32-5E49D96B1D3A}" dt="2025-07-03T14:16:27.570" v="3691" actId="113"/>
+          <ac:spMkLst>
+            <pc:docMk/>
+            <pc:sldMk cId="3613911005" sldId="258"/>
+            <ac:spMk id="56" creationId="{7866C7D8-BD84-2809-E6DA-3A7BCF109C79}"/>
+          </ac:spMkLst>
+        </pc:spChg>
+        <pc:grpChg chg="mod">
+          <ac:chgData name="Cihan Zeyrek" userId="dd9724baaf2e43d1" providerId="LiveId" clId="{E5A86D5C-552E-4995-AB32-5E49D96B1D3A}" dt="2025-07-03T13:40:34.252" v="2888" actId="1076"/>
+          <ac:grpSpMkLst>
+            <pc:docMk/>
+            <pc:sldMk cId="3613911005" sldId="258"/>
+            <ac:grpSpMk id="42" creationId="{AF808B17-6572-A307-B9E8-253821F89EE7}"/>
+          </ac:grpSpMkLst>
+        </pc:grpChg>
+        <pc:graphicFrameChg chg="mod">
+          <ac:chgData name="Cihan Zeyrek" userId="dd9724baaf2e43d1" providerId="LiveId" clId="{E5A86D5C-552E-4995-AB32-5E49D96B1D3A}" dt="2025-07-03T13:40:26.857" v="2887" actId="1076"/>
+          <ac:graphicFrameMkLst>
+            <pc:docMk/>
+            <pc:sldMk cId="3613911005" sldId="258"/>
+            <ac:graphicFrameMk id="48" creationId="{B4582048-10B5-61D2-9583-8E75A86FF2D5}"/>
+          </ac:graphicFrameMkLst>
+        </pc:graphicFrameChg>
+        <pc:picChg chg="mod">
+          <ac:chgData name="Cihan Zeyrek" userId="dd9724baaf2e43d1" providerId="LiveId" clId="{E5A86D5C-552E-4995-AB32-5E49D96B1D3A}" dt="2025-07-03T13:38:55.409" v="2872" actId="1076"/>
+          <ac:picMkLst>
+            <pc:docMk/>
+            <pc:sldMk cId="3613911005" sldId="258"/>
+            <ac:picMk id="31" creationId="{A0E5FA54-BA75-9B3C-0580-9B0ACD702D6B}"/>
+          </ac:picMkLst>
+        </pc:picChg>
+        <pc:picChg chg="mod">
+          <ac:chgData name="Cihan Zeyrek" userId="dd9724baaf2e43d1" providerId="LiveId" clId="{E5A86D5C-552E-4995-AB32-5E49D96B1D3A}" dt="2025-07-03T13:40:43.839" v="2891" actId="1076"/>
+          <ac:picMkLst>
+            <pc:docMk/>
+            <pc:sldMk cId="3613911005" sldId="258"/>
+            <ac:picMk id="41" creationId="{085B1AAD-70BC-D43F-DE61-2739306A23EC}"/>
+          </ac:picMkLst>
+        </pc:picChg>
+        <pc:picChg chg="add del mod">
+          <ac:chgData name="Cihan Zeyrek" userId="dd9724baaf2e43d1" providerId="LiveId" clId="{E5A86D5C-552E-4995-AB32-5E49D96B1D3A}" dt="2025-07-03T14:03:55.686" v="3500" actId="478"/>
+          <ac:picMkLst>
+            <pc:docMk/>
+            <pc:sldMk cId="3613911005" sldId="258"/>
+            <ac:picMk id="46" creationId="{0D302B69-227B-F98A-9C17-505C30F9EF34}"/>
+          </ac:picMkLst>
+        </pc:picChg>
+        <pc:picChg chg="add mod">
+          <ac:chgData name="Cihan Zeyrek" userId="dd9724baaf2e43d1" providerId="LiveId" clId="{E5A86D5C-552E-4995-AB32-5E49D96B1D3A}" dt="2025-07-03T14:10:34.175" v="3535" actId="1076"/>
+          <ac:picMkLst>
+            <pc:docMk/>
+            <pc:sldMk cId="3613911005" sldId="258"/>
+            <ac:picMk id="53" creationId="{BAAF9A28-A00D-D8F6-8487-F57CBEA64C0C}"/>
+          </ac:picMkLst>
+        </pc:picChg>
+        <pc:picChg chg="add del mod">
+          <ac:chgData name="Cihan Zeyrek" userId="dd9724baaf2e43d1" providerId="LiveId" clId="{E5A86D5C-552E-4995-AB32-5E49D96B1D3A}" dt="2025-07-03T14:10:27.546" v="3533" actId="478"/>
+          <ac:picMkLst>
+            <pc:docMk/>
+            <pc:sldMk cId="3613911005" sldId="258"/>
+            <ac:picMk id="55" creationId="{2850C1C9-B223-F7BE-1D76-2515B899DD6B}"/>
+          </ac:picMkLst>
+        </pc:picChg>
       </pc:sldChg>
     </pc:docChg>
   </pc:docChgLst>
@@ -315,7 +498,7 @@
               </a:defRPr>
             </a:pPr>
             <a:r>
-              <a:rPr lang="de-DE" sz="1200" b="0" i="0" u="none" strike="noStrike" baseline="0" dirty="0" err="1">
+              <a:rPr lang="en-US" sz="1200" b="0" i="0" u="none" strike="noStrike" baseline="0" noProof="0" dirty="0">
                 <a:solidFill>
                   <a:schemeClr val="tx1"/>
                 </a:solidFill>
@@ -323,97 +506,9 @@
                 <a:latin typeface="Source Sans Pro" panose="020B0503030403020204" pitchFamily="34" charset="0"/>
                 <a:ea typeface="Source Sans Pro" panose="020B0503030403020204" pitchFamily="34" charset="0"/>
               </a:rPr>
-              <a:t>Results</a:t>
-            </a:r>
-            <a:r>
-              <a:rPr lang="de-DE" sz="1200" b="0" i="0" u="none" strike="noStrike" baseline="0" dirty="0">
-                <a:solidFill>
-                  <a:schemeClr val="tx1"/>
-                </a:solidFill>
-                <a:effectLst/>
-                <a:latin typeface="Source Sans Pro" panose="020B0503030403020204" pitchFamily="34" charset="0"/>
-                <a:ea typeface="Source Sans Pro" panose="020B0503030403020204" pitchFamily="34" charset="0"/>
-              </a:rPr>
-              <a:t> and </a:t>
-            </a:r>
-            <a:r>
-              <a:rPr lang="de-DE" sz="1200" b="0" i="0" u="none" strike="noStrike" baseline="0" dirty="0" err="1">
-                <a:solidFill>
-                  <a:schemeClr val="tx1"/>
-                </a:solidFill>
-                <a:effectLst/>
-                <a:latin typeface="Source Sans Pro" panose="020B0503030403020204" pitchFamily="34" charset="0"/>
-                <a:ea typeface="Source Sans Pro" panose="020B0503030403020204" pitchFamily="34" charset="0"/>
-              </a:rPr>
-              <a:t>Limitations</a:t>
-            </a:r>
-            <a:r>
-              <a:rPr lang="de-DE" sz="1200" b="0" i="0" u="none" strike="noStrike" baseline="0" dirty="0">
-                <a:solidFill>
-                  <a:schemeClr val="tx1"/>
-                </a:solidFill>
-                <a:effectLst/>
-                <a:latin typeface="Source Sans Pro" panose="020B0503030403020204" pitchFamily="34" charset="0"/>
-                <a:ea typeface="Source Sans Pro" panose="020B0503030403020204" pitchFamily="34" charset="0"/>
-              </a:rPr>
-              <a:t> </a:t>
-            </a:r>
-            <a:r>
-              <a:rPr lang="de-DE" sz="1200" b="0" i="0" u="none" strike="noStrike" baseline="0" dirty="0" err="1">
-                <a:solidFill>
-                  <a:schemeClr val="tx1"/>
-                </a:solidFill>
-                <a:effectLst/>
-                <a:latin typeface="Source Sans Pro" panose="020B0503030403020204" pitchFamily="34" charset="0"/>
-                <a:ea typeface="Source Sans Pro" panose="020B0503030403020204" pitchFamily="34" charset="0"/>
-              </a:rPr>
-              <a:t>of</a:t>
-            </a:r>
-            <a:r>
-              <a:rPr lang="de-DE" sz="1200" b="0" i="0" u="none" strike="noStrike" baseline="0" dirty="0">
-                <a:solidFill>
-                  <a:schemeClr val="tx1"/>
-                </a:solidFill>
-                <a:effectLst/>
-                <a:latin typeface="Source Sans Pro" panose="020B0503030403020204" pitchFamily="34" charset="0"/>
-                <a:ea typeface="Source Sans Pro" panose="020B0503030403020204" pitchFamily="34" charset="0"/>
-              </a:rPr>
-              <a:t> Shift </a:t>
-            </a:r>
-            <a:r>
-              <a:rPr lang="de-DE" sz="1200" b="0" i="0" u="none" strike="noStrike" baseline="0" dirty="0" err="1">
-                <a:solidFill>
-                  <a:schemeClr val="tx1"/>
-                </a:solidFill>
-                <a:effectLst/>
-                <a:latin typeface="Source Sans Pro" panose="020B0503030403020204" pitchFamily="34" charset="0"/>
-                <a:ea typeface="Source Sans Pro" panose="020B0503030403020204" pitchFamily="34" charset="0"/>
-              </a:rPr>
-              <a:t>Significance</a:t>
-            </a:r>
-            <a:r>
-              <a:rPr lang="de-DE" sz="1200" b="0" i="0" u="none" strike="noStrike" baseline="0" dirty="0">
-                <a:solidFill>
-                  <a:schemeClr val="tx1"/>
-                </a:solidFill>
-                <a:effectLst/>
-                <a:latin typeface="Source Sans Pro" panose="020B0503030403020204" pitchFamily="34" charset="0"/>
-                <a:ea typeface="Source Sans Pro" panose="020B0503030403020204" pitchFamily="34" charset="0"/>
-              </a:rPr>
-              <a:t> </a:t>
-            </a:r>
-            <a:r>
-              <a:rPr lang="de-DE" sz="1200" b="0" i="0" u="none" strike="noStrike" baseline="0" dirty="0" err="1">
-                <a:solidFill>
-                  <a:schemeClr val="tx1"/>
-                </a:solidFill>
-                <a:effectLst/>
-                <a:latin typeface="Source Sans Pro" panose="020B0503030403020204" pitchFamily="34" charset="0"/>
-                <a:ea typeface="Source Sans Pro" panose="020B0503030403020204" pitchFamily="34" charset="0"/>
-              </a:rPr>
-              <a:t>Testing</a:t>
-            </a:r>
-            <a:endParaRPr lang="en-US" sz="1200" dirty="0">
+              <a:t>Results and Limitations of Shift Significance Testing</a:t>
+            </a:r>
+            <a:endParaRPr lang="en-US" sz="1200" noProof="0" dirty="0">
               <a:solidFill>
                 <a:schemeClr val="tx1"/>
               </a:solidFill>
@@ -427,8 +522,8 @@
         <c:manualLayout>
           <c:xMode val="edge"/>
           <c:yMode val="edge"/>
-          <c:x val="2.5979546149142486E-2"/>
-          <c:y val="3.0170725922711469E-2"/>
+          <c:x val="2.0111960011707456E-2"/>
+          <c:y val="5.5312997524971028E-2"/>
         </c:manualLayout>
       </c:layout>
       <c:overlay val="0"/>
@@ -1382,7 +1477,7 @@
           <a:p>
             <a:fld id="{12610477-6C94-4391-BBDC-B8E9BB33E658}" type="datetimeFigureOut">
               <a:rPr lang="de-DE" smtClean="0"/>
-              <a:t>03.07.25</a:t>
+              <a:t>03.07.2025</a:t>
             </a:fld>
             <a:endParaRPr lang="de-DE"/>
           </a:p>
@@ -1972,7 +2067,7 @@
           <a:p>
             <a:fld id="{F9ACF1CB-8064-4AFF-8DFB-49A00122A1FD}" type="datetimeFigureOut">
               <a:rPr lang="de-DE" smtClean="0"/>
-              <a:t>03.07.25</a:t>
+              <a:t>03.07.2025</a:t>
             </a:fld>
             <a:endParaRPr lang="de-DE"/>
           </a:p>
@@ -2142,7 +2237,7 @@
           <a:p>
             <a:fld id="{F9ACF1CB-8064-4AFF-8DFB-49A00122A1FD}" type="datetimeFigureOut">
               <a:rPr lang="de-DE" smtClean="0"/>
-              <a:t>03.07.25</a:t>
+              <a:t>03.07.2025</a:t>
             </a:fld>
             <a:endParaRPr lang="de-DE"/>
           </a:p>
@@ -2322,7 +2417,7 @@
           <a:p>
             <a:fld id="{F9ACF1CB-8064-4AFF-8DFB-49A00122A1FD}" type="datetimeFigureOut">
               <a:rPr lang="de-DE" smtClean="0"/>
-              <a:t>03.07.25</a:t>
+              <a:t>03.07.2025</a:t>
             </a:fld>
             <a:endParaRPr lang="de-DE"/>
           </a:p>
@@ -2492,7 +2587,7 @@
           <a:p>
             <a:fld id="{F9ACF1CB-8064-4AFF-8DFB-49A00122A1FD}" type="datetimeFigureOut">
               <a:rPr lang="de-DE" smtClean="0"/>
-              <a:t>03.07.25</a:t>
+              <a:t>03.07.2025</a:t>
             </a:fld>
             <a:endParaRPr lang="de-DE"/>
           </a:p>
@@ -2738,7 +2833,7 @@
           <a:p>
             <a:fld id="{F9ACF1CB-8064-4AFF-8DFB-49A00122A1FD}" type="datetimeFigureOut">
               <a:rPr lang="de-DE" smtClean="0"/>
-              <a:t>03.07.25</a:t>
+              <a:t>03.07.2025</a:t>
             </a:fld>
             <a:endParaRPr lang="de-DE"/>
           </a:p>
@@ -2970,7 +3065,7 @@
           <a:p>
             <a:fld id="{F9ACF1CB-8064-4AFF-8DFB-49A00122A1FD}" type="datetimeFigureOut">
               <a:rPr lang="de-DE" smtClean="0"/>
-              <a:t>03.07.25</a:t>
+              <a:t>03.07.2025</a:t>
             </a:fld>
             <a:endParaRPr lang="de-DE"/>
           </a:p>
@@ -3337,7 +3432,7 @@
           <a:p>
             <a:fld id="{F9ACF1CB-8064-4AFF-8DFB-49A00122A1FD}" type="datetimeFigureOut">
               <a:rPr lang="de-DE" smtClean="0"/>
-              <a:t>03.07.25</a:t>
+              <a:t>03.07.2025</a:t>
             </a:fld>
             <a:endParaRPr lang="de-DE"/>
           </a:p>
@@ -3455,7 +3550,7 @@
           <a:p>
             <a:fld id="{F9ACF1CB-8064-4AFF-8DFB-49A00122A1FD}" type="datetimeFigureOut">
               <a:rPr lang="de-DE" smtClean="0"/>
-              <a:t>03.07.25</a:t>
+              <a:t>03.07.2025</a:t>
             </a:fld>
             <a:endParaRPr lang="de-DE"/>
           </a:p>
@@ -3550,7 +3645,7 @@
           <a:p>
             <a:fld id="{F9ACF1CB-8064-4AFF-8DFB-49A00122A1FD}" type="datetimeFigureOut">
               <a:rPr lang="de-DE" smtClean="0"/>
-              <a:t>03.07.25</a:t>
+              <a:t>03.07.2025</a:t>
             </a:fld>
             <a:endParaRPr lang="de-DE"/>
           </a:p>
@@ -3827,7 +3922,7 @@
           <a:p>
             <a:fld id="{F9ACF1CB-8064-4AFF-8DFB-49A00122A1FD}" type="datetimeFigureOut">
               <a:rPr lang="de-DE" smtClean="0"/>
-              <a:t>03.07.25</a:t>
+              <a:t>03.07.2025</a:t>
             </a:fld>
             <a:endParaRPr lang="de-DE"/>
           </a:p>
@@ -4084,7 +4179,7 @@
           <a:p>
             <a:fld id="{F9ACF1CB-8064-4AFF-8DFB-49A00122A1FD}" type="datetimeFigureOut">
               <a:rPr lang="de-DE" smtClean="0"/>
-              <a:t>03.07.25</a:t>
+              <a:t>03.07.2025</a:t>
             </a:fld>
             <a:endParaRPr lang="de-DE"/>
           </a:p>
@@ -4207,7 +4302,13 @@
                   <p:embed/>
                   <p:pic>
                     <p:nvPicPr>
-                      <p:cNvPr id="0" name=""/>
+                      <p:cNvPr id="10" name="think-cell data - do not delete" hidden="1">
+                        <a:extLst>
+                          <a:ext uri="{FF2B5EF4-FFF2-40B4-BE49-F238E27FC236}">
+                            <a16:creationId xmlns:a16="http://schemas.microsoft.com/office/drawing/2014/main" id="{0FF58641-B676-E7BF-E159-1466E7EADC17}"/>
+                          </a:ext>
+                        </a:extLst>
+                      </p:cNvPr>
                       <p:cNvPicPr/>
                       <p:nvPr/>
                     </p:nvPicPr>
@@ -4363,7 +4464,7 @@
           <a:p>
             <a:fld id="{F9ACF1CB-8064-4AFF-8DFB-49A00122A1FD}" type="datetimeFigureOut">
               <a:rPr lang="de-DE" smtClean="0"/>
-              <a:t>03.07.25</a:t>
+              <a:t>03.07.2025</a:t>
             </a:fld>
             <a:endParaRPr lang="de-DE"/>
           </a:p>
@@ -4819,15 +4920,7 @@
             </a:r>
             <a:r>
               <a:rPr lang="en-US" sz="5400" noProof="0" dirty="0"/>
-              <a:t> – A</a:t>
-            </a:r>
-            <a:r>
-              <a:rPr lang="en-US" sz="5400" dirty="0"/>
-              <a:t>N </a:t>
-            </a:r>
-            <a:r>
-              <a:rPr lang="en-US" sz="5400" noProof="0" dirty="0"/>
-              <a:t>RNA-BINDING PROTEIN STORY </a:t>
+              <a:t> – AN RNA-BINDING PROTEIN STORY </a:t>
             </a:r>
           </a:p>
         </p:txBody>
@@ -5431,15 +5524,7 @@
           <a:p>
             <a:r>
               <a:rPr lang="en-US" sz="2400" noProof="0" dirty="0"/>
-              <a:t>So, jo</a:t>
-            </a:r>
-            <a:r>
-              <a:rPr lang="en-US" sz="2400" dirty="0"/>
-              <a:t>i</a:t>
-            </a:r>
-            <a:r>
-              <a:rPr lang="en-US" sz="2400" noProof="0" dirty="0"/>
-              <a:t>n us on his journey to discover the village of HeLa. </a:t>
+              <a:t>So, join us on his journey to discover the village of HeLa. </a:t>
             </a:r>
             <a:endParaRPr lang="en-US" sz="3600" noProof="0" dirty="0"/>
           </a:p>
@@ -5478,31 +5563,19 @@
           <a:p>
             <a:r>
               <a:rPr lang="en-US" sz="4000" noProof="0" dirty="0"/>
-              <a:t>Our Goal: </a:t>
-            </a:r>
-            <a:r>
-              <a:rPr lang="en-US" sz="4000" dirty="0"/>
-              <a:t>Hunting RNA-Binding Proteins in the Deep</a:t>
+              <a:t>Our Goal: Hunting RNA-Binding Proteins in the Deep</a:t>
             </a:r>
           </a:p>
           <a:p>
             <a:r>
               <a:rPr lang="en-US" sz="2400" noProof="0" dirty="0"/>
-              <a:t>During our project, our main goal was to identify all the RBPs </a:t>
-            </a:r>
-            <a:r>
-              <a:rPr lang="en-US" sz="2400" dirty="0"/>
-              <a:t>in mitotic HeLa cells. For this, all proteins were fractioned once with RNase treatment and once without. The intensity of each proteins in 25 fraction was then analyzed by mass spectrometry in triplicates. </a:t>
+              <a:t>During our project, our main goal was to identify all the RBPs in mitotic HeLa cells. For this, all proteins were fractioned once with RNase treatment and once without. The intensity of each proteins in 25 fraction was then analyzed by mass spectrometry in triplicates. </a:t>
             </a:r>
           </a:p>
           <a:p>
             <a:r>
               <a:rPr lang="en-US" sz="2400" noProof="0" dirty="0"/>
-              <a:t>The gathered data was </a:t>
-            </a:r>
-            <a:r>
-              <a:rPr lang="en-US" sz="2400" dirty="0"/>
-              <a:t>tested for reproducibility, cleaned up and characterized by their peak pattern. What was now the criteria we used to characterize a protein as an RBP? </a:t>
+              <a:t>The gathered data was tested for reproducibility, cleaned up and characterized by their peak pattern. What was now the criteria we used to characterize a protein as an RBP? </a:t>
             </a:r>
           </a:p>
           <a:p>
@@ -5529,10 +5602,9 @@
           </a:p>
           <a:p>
             <a:r>
-              <a:rPr lang="en-US" sz="2400" dirty="0"/>
+              <a:rPr lang="en-US" sz="2400" noProof="0" dirty="0"/>
               <a:t>Additionally, the identified RBPs were compared to RBPs of non-synchronized cells to identify the RBPs only active in mitosis. Furthermore, complexes of these RBPs were determined by clustering and a linear regression analysis was performed to predict molecular weight of the RBPs. </a:t>
             </a:r>
-            <a:endParaRPr lang="en-US" sz="2400" noProof="0" dirty="0"/>
           </a:p>
         </p:txBody>
       </p:sp>
@@ -5692,7 +5764,7 @@
           <a:lstStyle/>
           <a:p>
             <a:pPr algn="r"/>
-            <a:endParaRPr lang="en-US" sz="3600" dirty="0">
+            <a:endParaRPr lang="en-US" sz="3600" noProof="0" dirty="0">
               <a:solidFill>
                 <a:schemeClr val="tx1"/>
               </a:solidFill>
@@ -5714,7 +5786,7 @@
         </p:nvSpPr>
         <p:spPr>
           <a:xfrm>
-            <a:off x="609598" y="6537760"/>
+            <a:off x="603395" y="6393054"/>
             <a:ext cx="14295120" cy="6208656"/>
           </a:xfrm>
           <a:prstGeom prst="roundRect">
@@ -5754,7 +5826,7 @@
           <a:lstStyle/>
           <a:p>
             <a:pPr algn="r"/>
-            <a:endParaRPr lang="en-US" sz="3600" dirty="0">
+            <a:endParaRPr lang="en-US" sz="3600" noProof="0" dirty="0">
               <a:solidFill>
                 <a:schemeClr val="tx1"/>
               </a:solidFill>
@@ -5816,7 +5888,7 @@
           <a:lstStyle/>
           <a:p>
             <a:pPr algn="r"/>
-            <a:endParaRPr lang="en-US" sz="3600" dirty="0">
+            <a:endParaRPr lang="en-US" sz="3600" noProof="0" dirty="0">
               <a:solidFill>
                 <a:schemeClr val="tx1"/>
               </a:solidFill>
@@ -5878,7 +5950,7 @@
           <a:lstStyle/>
           <a:p>
             <a:pPr algn="r"/>
-            <a:endParaRPr lang="en-US" sz="3600" dirty="0">
+            <a:endParaRPr lang="en-US" sz="3600" noProof="0" dirty="0">
               <a:solidFill>
                 <a:schemeClr val="tx1"/>
               </a:solidFill>
@@ -5940,7 +6012,7 @@
           <a:lstStyle/>
           <a:p>
             <a:pPr algn="r"/>
-            <a:endParaRPr lang="en-US" sz="3600" dirty="0">
+            <a:endParaRPr lang="en-US" sz="3600" noProof="0" dirty="0">
               <a:solidFill>
                 <a:schemeClr val="tx1"/>
               </a:solidFill>
@@ -6002,7 +6074,7 @@
           <a:lstStyle/>
           <a:p>
             <a:pPr algn="r"/>
-            <a:endParaRPr lang="en-US" sz="3600" dirty="0">
+            <a:endParaRPr lang="en-US" sz="3600" noProof="0" dirty="0">
               <a:solidFill>
                 <a:schemeClr val="tx1"/>
               </a:solidFill>
@@ -6067,19 +6139,8 @@
                 <a:latin typeface="Source Sans Pro" panose="020B0503030403020204" pitchFamily="34" charset="0"/>
                 <a:ea typeface="Source Sans Pro" panose="020B0503030403020204" pitchFamily="34" charset="0"/>
               </a:rPr>
-              <a:t> </a:t>
-            </a:r>
-            <a:r>
-              <a:rPr lang="en-US" sz="8000" dirty="0">
-                <a:latin typeface="Source Sans Pro" panose="020B0503030403020204" pitchFamily="34" charset="0"/>
-                <a:ea typeface="Source Sans Pro" panose="020B0503030403020204" pitchFamily="34" charset="0"/>
-              </a:rPr>
-              <a:t>–Story of an RNA-Binding Protein </a:t>
-            </a:r>
-            <a:endParaRPr lang="en-US" sz="8000" noProof="0" dirty="0">
-              <a:latin typeface="Source Sans Pro" panose="020B0503030403020204" pitchFamily="34" charset="0"/>
-              <a:ea typeface="Source Sans Pro" panose="020B0503030403020204" pitchFamily="34" charset="0"/>
-            </a:endParaRPr>
+              <a:t> –Story of an RNA-Binding Protein </a:t>
+            </a:r>
           </a:p>
         </p:txBody>
       </p:sp>
@@ -6097,7 +6158,7 @@
         </p:nvSpPr>
         <p:spPr>
           <a:xfrm>
-            <a:off x="854627" y="6925033"/>
+            <a:off x="808316" y="6503870"/>
             <a:ext cx="14050091" cy="4796366"/>
           </a:xfrm>
           <a:prstGeom prst="rect">
@@ -6607,21 +6668,7 @@
                 <a:latin typeface="Source Sans Pro" panose="020B0503030403020204" pitchFamily="34" charset="0"/>
                 <a:ea typeface="Source Sans Pro" panose="020B0503030403020204" pitchFamily="34" charset="0"/>
               </a:rPr>
-              <a:t>So, jo</a:t>
-            </a:r>
-            <a:r>
-              <a:rPr lang="en-US" sz="2400" dirty="0">
-                <a:latin typeface="Source Sans Pro" panose="020B0503030403020204" pitchFamily="34" charset="0"/>
-                <a:ea typeface="Source Sans Pro" panose="020B0503030403020204" pitchFamily="34" charset="0"/>
-              </a:rPr>
-              <a:t>i</a:t>
-            </a:r>
-            <a:r>
-              <a:rPr lang="en-US" sz="2400" noProof="0" dirty="0">
-                <a:latin typeface="Source Sans Pro" panose="020B0503030403020204" pitchFamily="34" charset="0"/>
-                <a:ea typeface="Source Sans Pro" panose="020B0503030403020204" pitchFamily="34" charset="0"/>
-              </a:rPr>
-              <a:t>n us on his journey to discover the village of HeLa. </a:t>
+              <a:t>So, join us on his journey to discover the village of HeLa. </a:t>
             </a:r>
             <a:endParaRPr lang="en-US" sz="3600" noProof="0" dirty="0">
               <a:latin typeface="Source Sans Pro" panose="020B0503030403020204" pitchFamily="34" charset="0"/>
@@ -6666,11 +6713,7 @@
           <a:p>
             <a:r>
               <a:rPr lang="en-US" sz="4000" noProof="0" dirty="0"/>
-              <a:t>Our Goal: </a:t>
-            </a:r>
-            <a:r>
-              <a:rPr lang="en-US" sz="4000" dirty="0"/>
-              <a:t>Hunting RNA-Binding Proteins in the Deep</a:t>
+              <a:t>Our Goal: Hunting RNA-Binding Proteins in the Deep</a:t>
             </a:r>
           </a:p>
           <a:p>
@@ -6687,21 +6730,13 @@
             </a:r>
             <a:r>
               <a:rPr lang="en-US" sz="2400" noProof="0" dirty="0"/>
-              <a:t>, our main goal was to identify all the RBPs </a:t>
-            </a:r>
-            <a:r>
-              <a:rPr lang="en-US" sz="2400" dirty="0"/>
-              <a:t>in mitotic HeLa cells. For this, all proteins were fractioned once with RNase treatment and once without. The intensity of each proteins in 25 fraction was then analyzed by mass spectrometry in triplicates. </a:t>
+              <a:t>, our main goal was to identify all the RBPs in mitotic HeLa cells. For this, all proteins were fractioned once with RNase treatment and once without. The intensity of each proteins in 25 fraction was then analyzed by mass spectrometry in triplicates. </a:t>
             </a:r>
           </a:p>
           <a:p>
             <a:r>
               <a:rPr lang="en-US" sz="2400" noProof="0" dirty="0"/>
-              <a:t>The gathered data was </a:t>
-            </a:r>
-            <a:r>
-              <a:rPr lang="en-US" sz="2400" dirty="0"/>
-              <a:t>tested for reproducibility, cleaned up and characterized by their peak pattern. What was now the criteria we used to characterize a protein as an RBP? </a:t>
+              <a:t>The gathered data was tested for reproducibility, cleaned up and characterized by their peak pattern. What was now the criteria we used to characterize a protein as an RBP? </a:t>
             </a:r>
           </a:p>
           <a:p>
@@ -6728,10 +6763,9 @@
           </a:p>
           <a:p>
             <a:r>
-              <a:rPr lang="en-US" sz="2400" dirty="0"/>
+              <a:rPr lang="en-US" sz="2400" noProof="0" dirty="0"/>
               <a:t>Additionally, the identified RBPs were compared to RBPs of non-synchronized cells to identify the RBPs only active in mitosis. Furthermore, complexes of these RBPs were determined by clustering and a linear regression analysis was performed to predict molecular weight of the RBPs. </a:t>
             </a:r>
-            <a:endParaRPr lang="en-US" sz="2400" noProof="0" dirty="0"/>
           </a:p>
         </p:txBody>
       </p:sp>
@@ -6824,7 +6858,7 @@
           <a:lstStyle/>
           <a:p>
             <a:pPr algn="r"/>
-            <a:endParaRPr lang="en-US" sz="3600" dirty="0">
+            <a:endParaRPr lang="en-US" sz="3600" noProof="0" dirty="0">
               <a:solidFill>
                 <a:schemeClr val="tx1"/>
               </a:solidFill>
@@ -6861,7 +6895,7 @@
           <a:lstStyle/>
           <a:p>
             <a:r>
-              <a:rPr lang="en-US" sz="4000" dirty="0">
+              <a:rPr lang="en-US" sz="4000" noProof="0" dirty="0">
                 <a:solidFill>
                   <a:schemeClr val="bg1"/>
                 </a:solidFill>
@@ -6900,7 +6934,7 @@
           <a:lstStyle/>
           <a:p>
             <a:r>
-              <a:rPr lang="en-US" sz="4000" dirty="0">
+              <a:rPr lang="en-US" sz="4000" noProof="0" dirty="0">
                 <a:solidFill>
                   <a:schemeClr val="bg1"/>
                 </a:solidFill>
@@ -6910,7 +6944,7 @@
               <a:t>Main </a:t>
             </a:r>
             <a:r>
-              <a:rPr lang="en-US" sz="4000" dirty="0" err="1">
+              <a:rPr lang="en-US" sz="4000" noProof="0" dirty="0" err="1">
                 <a:solidFill>
                   <a:schemeClr val="bg1"/>
                 </a:solidFill>
@@ -6919,7 +6953,7 @@
               </a:rPr>
               <a:t>FIndings</a:t>
             </a:r>
-            <a:endParaRPr lang="en-US" sz="4000" dirty="0">
+            <a:endParaRPr lang="en-US" sz="4000" noProof="0" dirty="0">
               <a:solidFill>
                 <a:schemeClr val="bg1"/>
               </a:solidFill>
@@ -6977,7 +7011,7 @@
           <a:lstStyle/>
           <a:p>
             <a:pPr algn="r"/>
-            <a:endParaRPr lang="en-GB" sz="3600" dirty="0">
+            <a:endParaRPr lang="en-US" sz="3600" noProof="0" dirty="0">
               <a:solidFill>
                 <a:schemeClr val="tx1"/>
               </a:solidFill>
@@ -7119,7 +7153,7 @@
             <a:lstStyle/>
             <a:p>
               <a:pPr algn="r"/>
-              <a:endParaRPr lang="en-US" sz="3600" dirty="0">
+              <a:endParaRPr lang="en-US" sz="3600" noProof="0" dirty="0">
                 <a:solidFill>
                   <a:schemeClr val="tx1"/>
                 </a:solidFill>
@@ -7172,8 +7206,8 @@
         </p:nvSpPr>
         <p:spPr>
           <a:xfrm>
-            <a:off x="589400" y="11894744"/>
-            <a:ext cx="14295120" cy="15704596"/>
+            <a:off x="560466" y="12905499"/>
+            <a:ext cx="14295120" cy="14982315"/>
           </a:xfrm>
           <a:prstGeom prst="roundRect">
             <a:avLst>
@@ -7212,7 +7246,7 @@
           <a:lstStyle/>
           <a:p>
             <a:pPr algn="r"/>
-            <a:endParaRPr lang="en-US" sz="3600" dirty="0">
+            <a:endParaRPr lang="en-US" sz="3600" noProof="0" dirty="0">
               <a:solidFill>
                 <a:schemeClr val="tx1"/>
               </a:solidFill>
@@ -7234,7 +7268,7 @@
         </p:nvSpPr>
         <p:spPr>
           <a:xfrm>
-            <a:off x="854627" y="12451776"/>
+            <a:off x="898676" y="12970966"/>
             <a:ext cx="14050091" cy="10506589"/>
           </a:xfrm>
           <a:prstGeom prst="rect">
@@ -7342,7 +7376,7 @@
         </p:blipFill>
         <p:spPr>
           <a:xfrm>
-            <a:off x="893345" y="21160075"/>
+            <a:off x="925023" y="22707292"/>
             <a:ext cx="5033382" cy="3483594"/>
           </a:xfrm>
           <a:prstGeom prst="rect">
@@ -7430,14 +7464,14 @@
             <a:p>
               <a:pPr algn="ctr"/>
               <a:r>
-                <a:rPr lang="en-US" sz="2400" dirty="0"/>
+                <a:rPr lang="en-US" sz="2400" noProof="0" dirty="0"/>
                 <a:t>Identified </a:t>
               </a:r>
             </a:p>
             <a:p>
               <a:pPr algn="ctr"/>
               <a:r>
-                <a:rPr lang="en-US" sz="2400" dirty="0"/>
+                <a:rPr lang="en-US" sz="2400" noProof="0" dirty="0"/>
                 <a:t>RBPs</a:t>
               </a:r>
             </a:p>
@@ -7473,22 +7507,22 @@
             <a:p>
               <a:pPr algn="ctr"/>
               <a:r>
-                <a:rPr lang="en-US" sz="2400" dirty="0" err="1"/>
+                <a:rPr lang="en-US" sz="2400" noProof="0" dirty="0" err="1"/>
                 <a:t>Analysed</a:t>
               </a:r>
               <a:r>
-                <a:rPr lang="en-US" sz="2400" dirty="0"/>
+                <a:rPr lang="en-US" sz="2400" noProof="0" dirty="0"/>
                 <a:t> </a:t>
               </a:r>
             </a:p>
             <a:p>
               <a:pPr algn="ctr"/>
               <a:r>
-                <a:rPr lang="en-US" sz="2400" dirty="0" err="1"/>
+                <a:rPr lang="en-US" sz="2400" noProof="0" dirty="0" err="1"/>
                 <a:t>UniProt</a:t>
               </a:r>
               <a:r>
-                <a:rPr lang="en-US" sz="2400" dirty="0"/>
+                <a:rPr lang="en-US" sz="2400" noProof="0" dirty="0"/>
                 <a:t> RBPs</a:t>
               </a:r>
             </a:p>
@@ -7524,31 +7558,31 @@
           <a:lstStyle/>
           <a:p>
             <a:pPr algn="just"/>
-            <a:endParaRPr lang="de-DE" sz="2400" b="1" dirty="0"/>
+            <a:endParaRPr lang="en-US" sz="2400" b="1" noProof="0" dirty="0"/>
           </a:p>
           <a:p>
             <a:pPr algn="just"/>
-            <a:endParaRPr lang="de-DE" sz="2400" b="1" dirty="0"/>
+            <a:endParaRPr lang="en-US" sz="2400" b="1" noProof="0" dirty="0"/>
           </a:p>
           <a:p>
             <a:pPr algn="just"/>
-            <a:endParaRPr lang="de-DE" sz="2400" b="1" dirty="0"/>
+            <a:endParaRPr lang="en-US" sz="2400" b="1" noProof="0" dirty="0"/>
           </a:p>
           <a:p>
             <a:pPr algn="just"/>
-            <a:endParaRPr lang="de-DE" sz="2400" b="1" dirty="0"/>
+            <a:endParaRPr lang="en-US" sz="2400" b="1" noProof="0" dirty="0"/>
           </a:p>
           <a:p>
             <a:pPr algn="just"/>
-            <a:endParaRPr lang="de-DE" sz="2400" b="1" dirty="0"/>
+            <a:endParaRPr lang="en-US" sz="2400" b="1" noProof="0" dirty="0"/>
           </a:p>
           <a:p>
             <a:pPr algn="just"/>
-            <a:endParaRPr lang="de-DE" sz="2400" b="1" dirty="0"/>
+            <a:endParaRPr lang="en-US" sz="2400" b="1" noProof="0" dirty="0"/>
           </a:p>
           <a:p>
             <a:pPr algn="just"/>
-            <a:endParaRPr lang="de-DE" sz="2400" b="1" dirty="0"/>
+            <a:endParaRPr lang="en-US" sz="2400" b="1" noProof="0" dirty="0"/>
           </a:p>
         </p:txBody>
       </p:sp>
@@ -7566,7 +7600,7 @@
         </p:nvSpPr>
         <p:spPr>
           <a:xfrm>
-            <a:off x="829098" y="13304483"/>
+            <a:off x="802825" y="13825667"/>
             <a:ext cx="7385975" cy="2739211"/>
           </a:xfrm>
           <a:prstGeom prst="rect">
@@ -7582,252 +7616,38 @@
           <a:p>
             <a:pPr algn="just"/>
             <a:r>
-              <a:rPr lang="de-DE" sz="2400" b="1" dirty="0" err="1">
+              <a:rPr lang="en-US" sz="2400" b="1" noProof="0" dirty="0">
                 <a:latin typeface="Source Sans Pro" panose="020B0503030403020204" pitchFamily="34" charset="0"/>
                 <a:ea typeface="Source Sans Pro" panose="020B0503030403020204" pitchFamily="34" charset="0"/>
               </a:rPr>
-              <a:t>Descriptive</a:t>
-            </a:r>
-            <a:r>
-              <a:rPr lang="de-DE" sz="2400" b="1" dirty="0">
-                <a:latin typeface="Source Sans Pro" panose="020B0503030403020204" pitchFamily="34" charset="0"/>
-                <a:ea typeface="Source Sans Pro" panose="020B0503030403020204" pitchFamily="34" charset="0"/>
-              </a:rPr>
-              <a:t> </a:t>
-            </a:r>
-            <a:r>
-              <a:rPr lang="de-DE" sz="2400" b="1" dirty="0" err="1">
-                <a:latin typeface="Source Sans Pro" panose="020B0503030403020204" pitchFamily="34" charset="0"/>
-                <a:ea typeface="Source Sans Pro" panose="020B0503030403020204" pitchFamily="34" charset="0"/>
-              </a:rPr>
-              <a:t>Analyses</a:t>
-            </a:r>
-            <a:endParaRPr lang="de-DE" sz="2400" b="1" dirty="0">
-              <a:latin typeface="Source Sans Pro" panose="020B0503030403020204" pitchFamily="34" charset="0"/>
-              <a:ea typeface="Source Sans Pro" panose="020B0503030403020204" pitchFamily="34" charset="0"/>
-            </a:endParaRPr>
+              <a:t>Descriptive Analyses</a:t>
+            </a:r>
           </a:p>
           <a:p>
             <a:pPr algn="just"/>
-            <a:endParaRPr lang="de-DE" sz="1000" dirty="0"/>
+            <a:endParaRPr lang="en-US" sz="1000" noProof="0" dirty="0"/>
           </a:p>
           <a:p>
             <a:pPr algn="just"/>
             <a:r>
-              <a:rPr lang="de-DE" sz="2400" b="1" dirty="0"/>
+              <a:rPr lang="en-US" sz="2400" b="1" noProof="0" dirty="0"/>
               <a:t>Peak Analysis: </a:t>
             </a:r>
             <a:r>
-              <a:rPr lang="de-DE" sz="2400" dirty="0" err="1"/>
-              <a:t>For</a:t>
-            </a:r>
-            <a:r>
-              <a:rPr lang="de-DE" sz="2400" dirty="0"/>
-              <a:t> </a:t>
-            </a:r>
-            <a:r>
-              <a:rPr lang="de-DE" sz="2400" dirty="0" err="1"/>
-              <a:t>each</a:t>
-            </a:r>
-            <a:r>
-              <a:rPr lang="de-DE" sz="2400" dirty="0"/>
-              <a:t> </a:t>
-            </a:r>
-            <a:r>
-              <a:rPr lang="de-DE" sz="2400" dirty="0" err="1"/>
-              <a:t>protein</a:t>
-            </a:r>
-            <a:r>
-              <a:rPr lang="de-DE" sz="2400" dirty="0"/>
-              <a:t> </a:t>
-            </a:r>
-            <a:r>
-              <a:rPr lang="de-DE" sz="2400" dirty="0" err="1"/>
-              <a:t>profile</a:t>
-            </a:r>
-            <a:r>
-              <a:rPr lang="de-DE" sz="2400" dirty="0"/>
-              <a:t>, </a:t>
-            </a:r>
-            <a:r>
-              <a:rPr lang="de-DE" sz="2400" dirty="0" err="1"/>
-              <a:t>up</a:t>
-            </a:r>
-            <a:r>
-              <a:rPr lang="de-DE" sz="2400" dirty="0"/>
-              <a:t> </a:t>
-            </a:r>
-            <a:r>
-              <a:rPr lang="de-DE" sz="2400" dirty="0" err="1"/>
-              <a:t>to</a:t>
-            </a:r>
-            <a:r>
-              <a:rPr lang="de-DE" sz="2400" dirty="0"/>
-              <a:t> 6 </a:t>
-            </a:r>
-            <a:r>
-              <a:rPr lang="de-DE" sz="2400" dirty="0" err="1"/>
-              <a:t>peaks</a:t>
-            </a:r>
-            <a:r>
-              <a:rPr lang="de-DE" sz="2400" dirty="0"/>
-              <a:t> </a:t>
-            </a:r>
-            <a:r>
-              <a:rPr lang="de-DE" sz="2400" dirty="0" err="1"/>
-              <a:t>were</a:t>
-            </a:r>
-            <a:r>
-              <a:rPr lang="de-DE" sz="2400" dirty="0"/>
-              <a:t> </a:t>
-            </a:r>
-            <a:r>
-              <a:rPr lang="de-DE" sz="2400" dirty="0" err="1"/>
-              <a:t>identified</a:t>
-            </a:r>
-            <a:r>
-              <a:rPr lang="de-DE" sz="2400" dirty="0"/>
-              <a:t> </a:t>
-            </a:r>
-            <a:r>
-              <a:rPr lang="de-DE" sz="2400" dirty="0" err="1"/>
-              <a:t>using</a:t>
-            </a:r>
-            <a:r>
-              <a:rPr lang="de-DE" sz="2400" dirty="0"/>
-              <a:t> a </a:t>
-            </a:r>
-            <a:r>
-              <a:rPr lang="de-DE" sz="2400" dirty="0" err="1"/>
-              <a:t>slope-based</a:t>
-            </a:r>
-            <a:r>
-              <a:rPr lang="de-DE" sz="2400" dirty="0"/>
-              <a:t> </a:t>
-            </a:r>
-            <a:r>
-              <a:rPr lang="de-DE" sz="2400" dirty="0" err="1"/>
-              <a:t>function</a:t>
-            </a:r>
-            <a:r>
-              <a:rPr lang="de-DE" sz="2400" dirty="0"/>
-              <a:t>. </a:t>
-            </a:r>
-            <a:r>
-              <a:rPr lang="de-DE" sz="2400" dirty="0" err="1"/>
+              <a:rPr lang="en-US" sz="2400" noProof="0" dirty="0"/>
+              <a:t>For each protein profile, up to 6 peaks were identified using a slope-based function. </a:t>
+            </a:r>
+            <a:r>
+              <a:rPr lang="en-US" sz="2400" noProof="0" dirty="0" err="1"/>
               <a:t>Treshold</a:t>
             </a:r>
             <a:r>
-              <a:rPr lang="de-DE" sz="2400" dirty="0"/>
-              <a:t> </a:t>
-            </a:r>
-            <a:r>
-              <a:rPr lang="de-DE" sz="2400" dirty="0" err="1"/>
-              <a:t>for</a:t>
-            </a:r>
-            <a:r>
-              <a:rPr lang="de-DE" sz="2400" dirty="0"/>
-              <a:t> </a:t>
-            </a:r>
-            <a:r>
-              <a:rPr lang="de-DE" sz="2400" dirty="0" err="1"/>
-              <a:t>peak</a:t>
-            </a:r>
-            <a:r>
-              <a:rPr lang="de-DE" sz="2400" dirty="0"/>
-              <a:t> </a:t>
-            </a:r>
-            <a:r>
-              <a:rPr lang="de-DE" sz="2400" dirty="0" err="1"/>
-              <a:t>detection</a:t>
-            </a:r>
-            <a:r>
-              <a:rPr lang="de-DE" sz="2400" dirty="0"/>
-              <a:t> was </a:t>
-            </a:r>
-            <a:r>
-              <a:rPr lang="de-DE" sz="2400" dirty="0" err="1"/>
-              <a:t>set</a:t>
-            </a:r>
-            <a:r>
-              <a:rPr lang="de-DE" sz="2400" dirty="0"/>
-              <a:t> at 3% </a:t>
-            </a:r>
-            <a:r>
-              <a:rPr lang="de-DE" sz="2400" dirty="0" err="1"/>
-              <a:t>of</a:t>
-            </a:r>
-            <a:r>
-              <a:rPr lang="de-DE" sz="2400" dirty="0"/>
-              <a:t> maximal </a:t>
-            </a:r>
-            <a:r>
-              <a:rPr lang="de-DE" sz="2400" dirty="0" err="1"/>
-              <a:t>signal</a:t>
-            </a:r>
-            <a:r>
-              <a:rPr lang="de-DE" sz="2400" dirty="0"/>
-              <a:t> </a:t>
-            </a:r>
-            <a:r>
-              <a:rPr lang="de-DE" sz="2400" dirty="0" err="1"/>
-              <a:t>intensity</a:t>
-            </a:r>
-            <a:r>
-              <a:rPr lang="de-DE" sz="2400" dirty="0"/>
-              <a:t>. Applied </a:t>
-            </a:r>
-            <a:r>
-              <a:rPr lang="de-DE" sz="2400" dirty="0" err="1"/>
-              <a:t>to</a:t>
-            </a:r>
-            <a:r>
-              <a:rPr lang="de-DE" sz="2400" dirty="0"/>
-              <a:t> </a:t>
-            </a:r>
-            <a:r>
-              <a:rPr lang="de-DE" sz="2400" dirty="0" err="1"/>
-              <a:t>normalized</a:t>
-            </a:r>
-            <a:r>
-              <a:rPr lang="de-DE" sz="2400" dirty="0"/>
-              <a:t> </a:t>
-            </a:r>
-            <a:r>
-              <a:rPr lang="de-DE" sz="2400" dirty="0" err="1"/>
-              <a:t>values</a:t>
-            </a:r>
-            <a:r>
-              <a:rPr lang="de-DE" sz="2400" dirty="0"/>
-              <a:t> </a:t>
-            </a:r>
-            <a:r>
-              <a:rPr lang="de-DE" sz="2400" dirty="0" err="1"/>
-              <a:t>for</a:t>
-            </a:r>
-            <a:r>
-              <a:rPr lang="de-DE" sz="2400" dirty="0"/>
-              <a:t> </a:t>
-            </a:r>
-            <a:r>
-              <a:rPr lang="de-DE" sz="2400" dirty="0" err="1"/>
-              <a:t>control</a:t>
-            </a:r>
-            <a:r>
-              <a:rPr lang="de-DE" sz="2400" dirty="0"/>
-              <a:t> and </a:t>
-            </a:r>
-            <a:r>
-              <a:rPr lang="de-DE" sz="2400" dirty="0" err="1"/>
-              <a:t>RNase-treated</a:t>
-            </a:r>
-            <a:r>
-              <a:rPr lang="de-DE" sz="2400" dirty="0"/>
-              <a:t> sample. </a:t>
-            </a:r>
-          </a:p>
-          <a:p>
-            <a:endParaRPr lang="en-US" dirty="0"/>
+              <a:rPr lang="en-US" sz="2400" noProof="0" dirty="0"/>
+              <a:t> for peak detection was set at 3% of maximal signal intensity. Applied to normalized values for control and RNase-treated sample. </a:t>
+            </a:r>
+          </a:p>
+          <a:p>
+            <a:endParaRPr lang="en-US" noProof="0" dirty="0"/>
           </a:p>
         </p:txBody>
       </p:sp>
@@ -7845,7 +7665,7 @@
         </p:nvSpPr>
         <p:spPr>
           <a:xfrm>
-            <a:off x="782631" y="15813023"/>
+            <a:off x="882079" y="16846665"/>
             <a:ext cx="13908659" cy="1938992"/>
           </a:xfrm>
           <a:prstGeom prst="rect">
@@ -7861,486 +7681,82 @@
           <a:p>
             <a:pPr algn="just"/>
             <a:r>
-              <a:rPr lang="de-DE" sz="2400" b="1" dirty="0"/>
-              <a:t>Shift </a:t>
-            </a:r>
-            <a:r>
-              <a:rPr lang="de-DE" sz="2400" b="1" dirty="0" err="1"/>
-              <a:t>Characteristics</a:t>
-            </a:r>
-            <a:r>
-              <a:rPr lang="de-DE" sz="2400" b="1" dirty="0"/>
-              <a:t> </a:t>
-            </a:r>
-            <a:r>
-              <a:rPr lang="de-DE" sz="2400" dirty="0">
+              <a:rPr lang="en-US" sz="2400" b="1" noProof="0" dirty="0"/>
+              <a:t>Shift Characteristics </a:t>
+            </a:r>
+            <a:r>
+              <a:rPr lang="en-US" sz="2400" noProof="0" dirty="0">
                 <a:latin typeface="Source Sans Pro" panose="020B0503030403020204" pitchFamily="34" charset="0"/>
                 <a:ea typeface="Source Sans Pro" panose="020B0503030403020204" pitchFamily="34" charset="0"/>
               </a:rPr>
-              <a:t>Protein </a:t>
-            </a:r>
-            <a:r>
-              <a:rPr lang="de-DE" sz="2400" dirty="0" err="1">
+              <a:t>Protein distributions were </a:t>
+            </a:r>
+          </a:p>
+          <a:p>
+            <a:pPr algn="just"/>
+            <a:r>
+              <a:rPr lang="en-US" sz="2400" noProof="0" dirty="0">
                 <a:latin typeface="Source Sans Pro" panose="020B0503030403020204" pitchFamily="34" charset="0"/>
                 <a:ea typeface="Source Sans Pro" panose="020B0503030403020204" pitchFamily="34" charset="0"/>
               </a:rPr>
-              <a:t>distributions</a:t>
-            </a:r>
-            <a:r>
-              <a:rPr lang="de-DE" sz="2400" dirty="0">
-                <a:latin typeface="Source Sans Pro" panose="020B0503030403020204" pitchFamily="34" charset="0"/>
-                <a:ea typeface="Source Sans Pro" panose="020B0503030403020204" pitchFamily="34" charset="0"/>
-              </a:rPr>
-              <a:t> </a:t>
-            </a:r>
-            <a:r>
-              <a:rPr lang="de-DE" sz="2400" dirty="0" err="1">
-                <a:latin typeface="Source Sans Pro" panose="020B0503030403020204" pitchFamily="34" charset="0"/>
-                <a:ea typeface="Source Sans Pro" panose="020B0503030403020204" pitchFamily="34" charset="0"/>
-              </a:rPr>
-              <a:t>were</a:t>
-            </a:r>
-            <a:r>
-              <a:rPr lang="de-DE" sz="2400" dirty="0">
-                <a:latin typeface="Source Sans Pro" panose="020B0503030403020204" pitchFamily="34" charset="0"/>
-                <a:ea typeface="Source Sans Pro" panose="020B0503030403020204" pitchFamily="34" charset="0"/>
-              </a:rPr>
-              <a:t> </a:t>
-            </a:r>
-          </a:p>
-          <a:p>
-            <a:pPr algn="just"/>
-            <a:r>
-              <a:rPr lang="de-DE" sz="2400" dirty="0" err="1">
-                <a:latin typeface="Source Sans Pro" panose="020B0503030403020204" pitchFamily="34" charset="0"/>
-                <a:ea typeface="Source Sans Pro" panose="020B0503030403020204" pitchFamily="34" charset="0"/>
-              </a:rPr>
-              <a:t>summarized</a:t>
-            </a:r>
-            <a:r>
-              <a:rPr lang="de-DE" sz="2400" dirty="0">
-                <a:latin typeface="Source Sans Pro" panose="020B0503030403020204" pitchFamily="34" charset="0"/>
-                <a:ea typeface="Source Sans Pro" panose="020B0503030403020204" pitchFamily="34" charset="0"/>
-              </a:rPr>
-              <a:t> </a:t>
-            </a:r>
-            <a:r>
-              <a:rPr lang="de-DE" sz="2400" dirty="0" err="1">
-                <a:latin typeface="Source Sans Pro" panose="020B0503030403020204" pitchFamily="34" charset="0"/>
-                <a:ea typeface="Source Sans Pro" panose="020B0503030403020204" pitchFamily="34" charset="0"/>
-              </a:rPr>
-              <a:t>using</a:t>
-            </a:r>
-            <a:r>
-              <a:rPr lang="de-DE" sz="2400" dirty="0">
-                <a:latin typeface="Source Sans Pro" panose="020B0503030403020204" pitchFamily="34" charset="0"/>
-                <a:ea typeface="Source Sans Pro" panose="020B0503030403020204" pitchFamily="34" charset="0"/>
-              </a:rPr>
-              <a:t> </a:t>
-            </a:r>
-            <a:r>
-              <a:rPr lang="de-DE" sz="2400" dirty="0" err="1">
-                <a:latin typeface="Source Sans Pro" panose="020B0503030403020204" pitchFamily="34" charset="0"/>
-                <a:ea typeface="Source Sans Pro" panose="020B0503030403020204" pitchFamily="34" charset="0"/>
-              </a:rPr>
-              <a:t>the</a:t>
-            </a:r>
-            <a:r>
-              <a:rPr lang="de-DE" sz="2400" dirty="0">
-                <a:latin typeface="Source Sans Pro" panose="020B0503030403020204" pitchFamily="34" charset="0"/>
-                <a:ea typeface="Source Sans Pro" panose="020B0503030403020204" pitchFamily="34" charset="0"/>
-              </a:rPr>
-              <a:t> Center </a:t>
-            </a:r>
-            <a:r>
-              <a:rPr lang="de-DE" sz="2400" dirty="0" err="1">
-                <a:latin typeface="Source Sans Pro" panose="020B0503030403020204" pitchFamily="34" charset="0"/>
-                <a:ea typeface="Source Sans Pro" panose="020B0503030403020204" pitchFamily="34" charset="0"/>
-              </a:rPr>
-              <a:t>of</a:t>
-            </a:r>
-            <a:r>
-              <a:rPr lang="de-DE" sz="2400" dirty="0">
-                <a:latin typeface="Source Sans Pro" panose="020B0503030403020204" pitchFamily="34" charset="0"/>
-                <a:ea typeface="Source Sans Pro" panose="020B0503030403020204" pitchFamily="34" charset="0"/>
-              </a:rPr>
-              <a:t> </a:t>
-            </a:r>
-            <a:r>
-              <a:rPr lang="de-DE" sz="2400" dirty="0" err="1">
-                <a:latin typeface="Source Sans Pro" panose="020B0503030403020204" pitchFamily="34" charset="0"/>
-                <a:ea typeface="Source Sans Pro" panose="020B0503030403020204" pitchFamily="34" charset="0"/>
-              </a:rPr>
-              <a:t>Mass</a:t>
-            </a:r>
-            <a:r>
-              <a:rPr lang="de-DE" sz="2400" dirty="0">
-                <a:latin typeface="Source Sans Pro" panose="020B0503030403020204" pitchFamily="34" charset="0"/>
-                <a:ea typeface="Source Sans Pro" panose="020B0503030403020204" pitchFamily="34" charset="0"/>
-              </a:rPr>
-              <a:t> (</a:t>
-            </a:r>
-            <a:r>
-              <a:rPr lang="de-DE" sz="2400" dirty="0" err="1">
+              <a:t>summarized using the Center of Mass (</a:t>
+            </a:r>
+            <a:r>
+              <a:rPr lang="en-US" sz="2400" noProof="0" dirty="0" err="1">
                 <a:latin typeface="Source Sans Pro" panose="020B0503030403020204" pitchFamily="34" charset="0"/>
                 <a:ea typeface="Source Sans Pro" panose="020B0503030403020204" pitchFamily="34" charset="0"/>
               </a:rPr>
               <a:t>CoM</a:t>
             </a:r>
             <a:r>
-              <a:rPr lang="de-DE" sz="2400" dirty="0">
+              <a:rPr lang="en-US" sz="2400" noProof="0" dirty="0">
                 <a:latin typeface="Source Sans Pro" panose="020B0503030403020204" pitchFamily="34" charset="0"/>
                 <a:ea typeface="Source Sans Pro" panose="020B0503030403020204" pitchFamily="34" charset="0"/>
               </a:rPr>
-              <a:t>), </a:t>
-            </a:r>
-            <a:r>
-              <a:rPr lang="de-DE" sz="2400" dirty="0" err="1">
+              <a:t>), calculated</a:t>
+            </a:r>
+          </a:p>
+          <a:p>
+            <a:pPr algn="just"/>
+            <a:r>
+              <a:rPr lang="en-US" sz="2400" noProof="0" dirty="0">
                 <a:latin typeface="Source Sans Pro" panose="020B0503030403020204" pitchFamily="34" charset="0"/>
                 <a:ea typeface="Source Sans Pro" panose="020B0503030403020204" pitchFamily="34" charset="0"/>
               </a:rPr>
-              <a:t>calculated</a:t>
-            </a:r>
-            <a:endParaRPr lang="de-DE" sz="2400" dirty="0">
-              <a:latin typeface="Source Sans Pro" panose="020B0503030403020204" pitchFamily="34" charset="0"/>
-              <a:ea typeface="Source Sans Pro" panose="020B0503030403020204" pitchFamily="34" charset="0"/>
-            </a:endParaRPr>
-          </a:p>
-          <a:p>
-            <a:pPr algn="just"/>
-            <a:r>
-              <a:rPr lang="de-DE" sz="2400" dirty="0">
-                <a:latin typeface="Source Sans Pro" panose="020B0503030403020204" pitchFamily="34" charset="0"/>
-                <a:ea typeface="Source Sans Pro" panose="020B0503030403020204" pitchFamily="34" charset="0"/>
-              </a:rPr>
-              <a:t> </a:t>
-            </a:r>
-            <a:r>
-              <a:rPr lang="de-DE" sz="2400" dirty="0" err="1">
-                <a:latin typeface="Source Sans Pro" panose="020B0503030403020204" pitchFamily="34" charset="0"/>
-                <a:ea typeface="Source Sans Pro" panose="020B0503030403020204" pitchFamily="34" charset="0"/>
-              </a:rPr>
-              <a:t>as</a:t>
-            </a:r>
-            <a:r>
-              <a:rPr lang="de-DE" sz="2400" dirty="0">
-                <a:latin typeface="Source Sans Pro" panose="020B0503030403020204" pitchFamily="34" charset="0"/>
-                <a:ea typeface="Source Sans Pro" panose="020B0503030403020204" pitchFamily="34" charset="0"/>
-              </a:rPr>
-              <a:t> </a:t>
-            </a:r>
-            <a:r>
-              <a:rPr lang="de-DE" sz="2400" dirty="0" err="1">
-                <a:latin typeface="Source Sans Pro" panose="020B0503030403020204" pitchFamily="34" charset="0"/>
-                <a:ea typeface="Source Sans Pro" panose="020B0503030403020204" pitchFamily="34" charset="0"/>
-              </a:rPr>
-              <a:t>the</a:t>
-            </a:r>
-            <a:r>
-              <a:rPr lang="de-DE" sz="2400" dirty="0">
-                <a:latin typeface="Source Sans Pro" panose="020B0503030403020204" pitchFamily="34" charset="0"/>
-                <a:ea typeface="Source Sans Pro" panose="020B0503030403020204" pitchFamily="34" charset="0"/>
-              </a:rPr>
-              <a:t> </a:t>
-            </a:r>
-            <a:r>
-              <a:rPr lang="de-DE" sz="2400" dirty="0" err="1">
-                <a:latin typeface="Source Sans Pro" panose="020B0503030403020204" pitchFamily="34" charset="0"/>
-                <a:ea typeface="Source Sans Pro" panose="020B0503030403020204" pitchFamily="34" charset="0"/>
-              </a:rPr>
-              <a:t>weighted</a:t>
-            </a:r>
-            <a:r>
-              <a:rPr lang="de-DE" sz="2400" dirty="0">
-                <a:latin typeface="Source Sans Pro" panose="020B0503030403020204" pitchFamily="34" charset="0"/>
-                <a:ea typeface="Source Sans Pro" panose="020B0503030403020204" pitchFamily="34" charset="0"/>
-              </a:rPr>
-              <a:t> </a:t>
-            </a:r>
-            <a:r>
-              <a:rPr lang="de-DE" sz="2400" dirty="0" err="1">
-                <a:latin typeface="Source Sans Pro" panose="020B0503030403020204" pitchFamily="34" charset="0"/>
-                <a:ea typeface="Source Sans Pro" panose="020B0503030403020204" pitchFamily="34" charset="0"/>
-              </a:rPr>
-              <a:t>average</a:t>
-            </a:r>
-            <a:r>
-              <a:rPr lang="de-DE" sz="2400" dirty="0">
-                <a:latin typeface="Source Sans Pro" panose="020B0503030403020204" pitchFamily="34" charset="0"/>
-                <a:ea typeface="Source Sans Pro" panose="020B0503030403020204" pitchFamily="34" charset="0"/>
-              </a:rPr>
-              <a:t> </a:t>
-            </a:r>
-            <a:r>
-              <a:rPr lang="de-DE" sz="2400" dirty="0" err="1">
-                <a:latin typeface="Source Sans Pro" panose="020B0503030403020204" pitchFamily="34" charset="0"/>
-                <a:ea typeface="Source Sans Pro" panose="020B0503030403020204" pitchFamily="34" charset="0"/>
-              </a:rPr>
-              <a:t>across</a:t>
-            </a:r>
-            <a:r>
-              <a:rPr lang="de-DE" sz="2400" dirty="0">
-                <a:latin typeface="Source Sans Pro" panose="020B0503030403020204" pitchFamily="34" charset="0"/>
-                <a:ea typeface="Source Sans Pro" panose="020B0503030403020204" pitchFamily="34" charset="0"/>
-              </a:rPr>
-              <a:t> all </a:t>
-            </a:r>
-            <a:r>
-              <a:rPr lang="de-DE" sz="2400" dirty="0" err="1">
-                <a:latin typeface="Source Sans Pro" panose="020B0503030403020204" pitchFamily="34" charset="0"/>
-                <a:ea typeface="Source Sans Pro" panose="020B0503030403020204" pitchFamily="34" charset="0"/>
-              </a:rPr>
-              <a:t>fractions</a:t>
-            </a:r>
-            <a:r>
-              <a:rPr lang="de-DE" sz="2400" dirty="0">
-                <a:latin typeface="Source Sans Pro" panose="020B0503030403020204" pitchFamily="34" charset="0"/>
-                <a:ea typeface="Source Sans Pro" panose="020B0503030403020204" pitchFamily="34" charset="0"/>
-              </a:rPr>
-              <a:t>. </a:t>
-            </a:r>
-            <a:r>
-              <a:rPr lang="de-DE" sz="2400" dirty="0" err="1">
-                <a:latin typeface="Source Sans Pro" panose="020B0503030403020204" pitchFamily="34" charset="0"/>
-                <a:ea typeface="Source Sans Pro" panose="020B0503030403020204" pitchFamily="34" charset="0"/>
-              </a:rPr>
-              <a:t>Shifts</a:t>
-            </a:r>
-            <a:r>
-              <a:rPr lang="de-DE" sz="2400" dirty="0">
-                <a:latin typeface="Source Sans Pro" panose="020B0503030403020204" pitchFamily="34" charset="0"/>
-                <a:ea typeface="Source Sans Pro" panose="020B0503030403020204" pitchFamily="34" charset="0"/>
-              </a:rPr>
-              <a:t> </a:t>
-            </a:r>
-            <a:r>
-              <a:rPr lang="de-DE" sz="2400" dirty="0" err="1">
-                <a:latin typeface="Source Sans Pro" panose="020B0503030403020204" pitchFamily="34" charset="0"/>
-                <a:ea typeface="Source Sans Pro" panose="020B0503030403020204" pitchFamily="34" charset="0"/>
-              </a:rPr>
-              <a:t>were</a:t>
-            </a:r>
-            <a:r>
-              <a:rPr lang="de-DE" sz="2400" dirty="0">
-                <a:latin typeface="Source Sans Pro" panose="020B0503030403020204" pitchFamily="34" charset="0"/>
-                <a:ea typeface="Source Sans Pro" panose="020B0503030403020204" pitchFamily="34" charset="0"/>
-              </a:rPr>
-              <a:t> </a:t>
-            </a:r>
-            <a:r>
-              <a:rPr lang="de-DE" sz="2400" dirty="0" err="1">
-                <a:latin typeface="Source Sans Pro" panose="020B0503030403020204" pitchFamily="34" charset="0"/>
-                <a:ea typeface="Source Sans Pro" panose="020B0503030403020204" pitchFamily="34" charset="0"/>
-              </a:rPr>
-              <a:t>defined</a:t>
-            </a:r>
-            <a:r>
-              <a:rPr lang="de-DE" sz="2400" dirty="0">
-                <a:latin typeface="Source Sans Pro" panose="020B0503030403020204" pitchFamily="34" charset="0"/>
-                <a:ea typeface="Source Sans Pro" panose="020B0503030403020204" pitchFamily="34" charset="0"/>
-              </a:rPr>
-              <a:t> </a:t>
-            </a:r>
-            <a:r>
-              <a:rPr lang="de-DE" sz="2400" dirty="0" err="1">
-                <a:latin typeface="Source Sans Pro" panose="020B0503030403020204" pitchFamily="34" charset="0"/>
-                <a:ea typeface="Source Sans Pro" panose="020B0503030403020204" pitchFamily="34" charset="0"/>
-              </a:rPr>
-              <a:t>as</a:t>
-            </a:r>
-            <a:r>
-              <a:rPr lang="de-DE" sz="2400" dirty="0">
-                <a:latin typeface="Source Sans Pro" panose="020B0503030403020204" pitchFamily="34" charset="0"/>
-                <a:ea typeface="Source Sans Pro" panose="020B0503030403020204" pitchFamily="34" charset="0"/>
-              </a:rPr>
-              <a:t> </a:t>
-            </a:r>
-            <a:r>
-              <a:rPr lang="de-DE" sz="2400" dirty="0" err="1">
+              <a:t> as the weighted average across all fractions. Shifts were defined as </a:t>
+            </a:r>
+            <a:r>
+              <a:rPr lang="en-US" sz="2400" noProof="0" dirty="0" err="1">
                 <a:latin typeface="Source Sans Pro" panose="020B0503030403020204" pitchFamily="34" charset="0"/>
                 <a:ea typeface="Source Sans Pro" panose="020B0503030403020204" pitchFamily="34" charset="0"/>
               </a:rPr>
               <a:t>CoM_Ctrl</a:t>
             </a:r>
             <a:r>
-              <a:rPr lang="de-DE" sz="2400" dirty="0">
+              <a:rPr lang="en-US" sz="2400" noProof="0" dirty="0">
                 <a:latin typeface="Source Sans Pro" panose="020B0503030403020204" pitchFamily="34" charset="0"/>
                 <a:ea typeface="Source Sans Pro" panose="020B0503030403020204" pitchFamily="34" charset="0"/>
               </a:rPr>
               <a:t> – </a:t>
             </a:r>
             <a:r>
-              <a:rPr lang="de-DE" sz="2400" dirty="0" err="1">
+              <a:rPr lang="en-US" sz="2400" noProof="0" dirty="0" err="1">
                 <a:latin typeface="Source Sans Pro" panose="020B0503030403020204" pitchFamily="34" charset="0"/>
                 <a:ea typeface="Source Sans Pro" panose="020B0503030403020204" pitchFamily="34" charset="0"/>
               </a:rPr>
               <a:t>CoM_RNase</a:t>
             </a:r>
             <a:r>
-              <a:rPr lang="de-DE" sz="2400" dirty="0">
+              <a:rPr lang="en-US" sz="2400" noProof="0" dirty="0">
                 <a:latin typeface="Source Sans Pro" panose="020B0503030403020204" pitchFamily="34" charset="0"/>
                 <a:ea typeface="Source Sans Pro" panose="020B0503030403020204" pitchFamily="34" charset="0"/>
               </a:rPr>
-              <a:t>: positive </a:t>
-            </a:r>
-            <a:r>
-              <a:rPr lang="de-DE" sz="2400" dirty="0" err="1">
-                <a:latin typeface="Source Sans Pro" panose="020B0503030403020204" pitchFamily="34" charset="0"/>
-                <a:ea typeface="Source Sans Pro" panose="020B0503030403020204" pitchFamily="34" charset="0"/>
-              </a:rPr>
-              <a:t>values</a:t>
-            </a:r>
-            <a:r>
-              <a:rPr lang="de-DE" sz="2400" dirty="0">
-                <a:latin typeface="Source Sans Pro" panose="020B0503030403020204" pitchFamily="34" charset="0"/>
-                <a:ea typeface="Source Sans Pro" panose="020B0503030403020204" pitchFamily="34" charset="0"/>
-              </a:rPr>
-              <a:t> </a:t>
-            </a:r>
-            <a:r>
-              <a:rPr lang="de-DE" sz="2400" dirty="0" err="1">
-                <a:latin typeface="Source Sans Pro" panose="020B0503030403020204" pitchFamily="34" charset="0"/>
-                <a:ea typeface="Source Sans Pro" panose="020B0503030403020204" pitchFamily="34" charset="0"/>
-              </a:rPr>
-              <a:t>indicated</a:t>
-            </a:r>
-            <a:r>
-              <a:rPr lang="de-DE" sz="2400" dirty="0">
-                <a:latin typeface="Source Sans Pro" panose="020B0503030403020204" pitchFamily="34" charset="0"/>
-                <a:ea typeface="Source Sans Pro" panose="020B0503030403020204" pitchFamily="34" charset="0"/>
-              </a:rPr>
-              <a:t> a </a:t>
-            </a:r>
-            <a:r>
-              <a:rPr lang="de-DE" sz="2400" dirty="0" err="1">
-                <a:latin typeface="Source Sans Pro" panose="020B0503030403020204" pitchFamily="34" charset="0"/>
-                <a:ea typeface="Source Sans Pro" panose="020B0503030403020204" pitchFamily="34" charset="0"/>
-              </a:rPr>
-              <a:t>leftward</a:t>
-            </a:r>
-            <a:r>
-              <a:rPr lang="de-DE" sz="2400" dirty="0">
-                <a:latin typeface="Source Sans Pro" panose="020B0503030403020204" pitchFamily="34" charset="0"/>
-                <a:ea typeface="Source Sans Pro" panose="020B0503030403020204" pitchFamily="34" charset="0"/>
-              </a:rPr>
-              <a:t> shift, negative </a:t>
-            </a:r>
-            <a:r>
-              <a:rPr lang="de-DE" sz="2400" dirty="0" err="1">
-                <a:latin typeface="Source Sans Pro" panose="020B0503030403020204" pitchFamily="34" charset="0"/>
-                <a:ea typeface="Source Sans Pro" panose="020B0503030403020204" pitchFamily="34" charset="0"/>
-              </a:rPr>
-              <a:t>values</a:t>
-            </a:r>
-            <a:r>
-              <a:rPr lang="de-DE" sz="2400" dirty="0">
-                <a:latin typeface="Source Sans Pro" panose="020B0503030403020204" pitchFamily="34" charset="0"/>
-                <a:ea typeface="Source Sans Pro" panose="020B0503030403020204" pitchFamily="34" charset="0"/>
-              </a:rPr>
-              <a:t> a </a:t>
-            </a:r>
-            <a:r>
-              <a:rPr lang="de-DE" sz="2400" dirty="0" err="1">
-                <a:latin typeface="Source Sans Pro" panose="020B0503030403020204" pitchFamily="34" charset="0"/>
-                <a:ea typeface="Source Sans Pro" panose="020B0503030403020204" pitchFamily="34" charset="0"/>
-              </a:rPr>
-              <a:t>rightward</a:t>
-            </a:r>
-            <a:r>
-              <a:rPr lang="de-DE" sz="2400" dirty="0">
-                <a:latin typeface="Source Sans Pro" panose="020B0503030403020204" pitchFamily="34" charset="0"/>
-                <a:ea typeface="Source Sans Pro" panose="020B0503030403020204" pitchFamily="34" charset="0"/>
-              </a:rPr>
-              <a:t> shift, and </a:t>
-            </a:r>
-            <a:r>
-              <a:rPr lang="de-DE" sz="2400" dirty="0" err="1">
-                <a:latin typeface="Source Sans Pro" panose="020B0503030403020204" pitchFamily="34" charset="0"/>
-                <a:ea typeface="Source Sans Pro" panose="020B0503030403020204" pitchFamily="34" charset="0"/>
-              </a:rPr>
-              <a:t>values</a:t>
-            </a:r>
-            <a:r>
-              <a:rPr lang="de-DE" sz="2400" dirty="0">
-                <a:latin typeface="Source Sans Pro" panose="020B0503030403020204" pitchFamily="34" charset="0"/>
-                <a:ea typeface="Source Sans Pro" panose="020B0503030403020204" pitchFamily="34" charset="0"/>
-              </a:rPr>
-              <a:t> </a:t>
-            </a:r>
-            <a:r>
-              <a:rPr lang="de-DE" sz="2400" dirty="0" err="1">
-                <a:latin typeface="Source Sans Pro" panose="020B0503030403020204" pitchFamily="34" charset="0"/>
-                <a:ea typeface="Source Sans Pro" panose="020B0503030403020204" pitchFamily="34" charset="0"/>
-              </a:rPr>
-              <a:t>near</a:t>
-            </a:r>
-            <a:r>
-              <a:rPr lang="de-DE" sz="2400" dirty="0">
-                <a:latin typeface="Source Sans Pro" panose="020B0503030403020204" pitchFamily="34" charset="0"/>
-                <a:ea typeface="Source Sans Pro" panose="020B0503030403020204" pitchFamily="34" charset="0"/>
-              </a:rPr>
-              <a:t> </a:t>
-            </a:r>
-            <a:r>
-              <a:rPr lang="de-DE" sz="2400" dirty="0" err="1">
-                <a:latin typeface="Source Sans Pro" panose="020B0503030403020204" pitchFamily="34" charset="0"/>
-                <a:ea typeface="Source Sans Pro" panose="020B0503030403020204" pitchFamily="34" charset="0"/>
-              </a:rPr>
-              <a:t>zero</a:t>
-            </a:r>
-            <a:r>
-              <a:rPr lang="de-DE" sz="2400" dirty="0">
-                <a:latin typeface="Source Sans Pro" panose="020B0503030403020204" pitchFamily="34" charset="0"/>
-                <a:ea typeface="Source Sans Pro" panose="020B0503030403020204" pitchFamily="34" charset="0"/>
-              </a:rPr>
-              <a:t> </a:t>
-            </a:r>
-            <a:r>
-              <a:rPr lang="de-DE" sz="2400" dirty="0" err="1">
-                <a:latin typeface="Source Sans Pro" panose="020B0503030403020204" pitchFamily="34" charset="0"/>
-                <a:ea typeface="Source Sans Pro" panose="020B0503030403020204" pitchFamily="34" charset="0"/>
-              </a:rPr>
-              <a:t>no</a:t>
-            </a:r>
-            <a:r>
-              <a:rPr lang="de-DE" sz="2400" dirty="0">
-                <a:latin typeface="Source Sans Pro" panose="020B0503030403020204" pitchFamily="34" charset="0"/>
-                <a:ea typeface="Source Sans Pro" panose="020B0503030403020204" pitchFamily="34" charset="0"/>
-              </a:rPr>
-              <a:t> </a:t>
-            </a:r>
-            <a:r>
-              <a:rPr lang="de-DE" sz="2400" dirty="0" err="1">
-                <a:latin typeface="Source Sans Pro" panose="020B0503030403020204" pitchFamily="34" charset="0"/>
-                <a:ea typeface="Source Sans Pro" panose="020B0503030403020204" pitchFamily="34" charset="0"/>
-              </a:rPr>
-              <a:t>change</a:t>
-            </a:r>
-            <a:r>
-              <a:rPr lang="de-DE" sz="2400" dirty="0">
-                <a:latin typeface="Source Sans Pro" panose="020B0503030403020204" pitchFamily="34" charset="0"/>
-                <a:ea typeface="Source Sans Pro" panose="020B0503030403020204" pitchFamily="34" charset="0"/>
-              </a:rPr>
-              <a:t> in </a:t>
-            </a:r>
-            <a:r>
-              <a:rPr lang="de-DE" sz="2400" dirty="0" err="1">
-                <a:latin typeface="Source Sans Pro" panose="020B0503030403020204" pitchFamily="34" charset="0"/>
-                <a:ea typeface="Source Sans Pro" panose="020B0503030403020204" pitchFamily="34" charset="0"/>
-              </a:rPr>
-              <a:t>distribution</a:t>
-            </a:r>
-            <a:r>
-              <a:rPr lang="de-DE" sz="2400" dirty="0">
-                <a:latin typeface="Source Sans Pro" panose="020B0503030403020204" pitchFamily="34" charset="0"/>
-                <a:ea typeface="Source Sans Pro" panose="020B0503030403020204" pitchFamily="34" charset="0"/>
-              </a:rPr>
-              <a:t>.</a:t>
+              <a:t>: positive values indicated a leftward shift, negative values a rightward shift, and values near zero no change in distribution.</a:t>
             </a:r>
           </a:p>
           <a:p>
             <a:pPr algn="just"/>
-            <a:endParaRPr lang="en-US" sz="2400" dirty="0">
+            <a:endParaRPr lang="en-US" sz="2400" noProof="0" dirty="0">
               <a:latin typeface="Source Sans Pro" panose="020B0503030403020204" pitchFamily="34" charset="0"/>
               <a:ea typeface="Source Sans Pro" panose="020B0503030403020204" pitchFamily="34" charset="0"/>
             </a:endParaRPr>
@@ -8369,7 +7785,7 @@
         </p:blipFill>
         <p:spPr>
           <a:xfrm>
-            <a:off x="8454772" y="12292692"/>
+            <a:off x="8502076" y="13319527"/>
             <a:ext cx="6236519" cy="3421957"/>
           </a:xfrm>
           <a:prstGeom prst="rect">
@@ -8391,9 +7807,9 @@
         </p:nvGrpSpPr>
         <p:grpSpPr>
           <a:xfrm>
-            <a:off x="3823405" y="17284807"/>
+            <a:off x="4765060" y="18464738"/>
             <a:ext cx="4328867" cy="860116"/>
-            <a:chOff x="8711954" y="13579284"/>
+            <a:chOff x="9061760" y="14098081"/>
             <a:chExt cx="4328867" cy="860116"/>
           </a:xfrm>
         </p:grpSpPr>
@@ -8411,7 +7827,7 @@
           </p:nvSpPr>
           <p:spPr>
             <a:xfrm>
-              <a:off x="8711954" y="13579284"/>
+              <a:off x="9061760" y="14098081"/>
               <a:ext cx="4328867" cy="860116"/>
             </a:xfrm>
             <a:prstGeom prst="roundRect">
@@ -8447,7 +7863,7 @@
             <a:lstStyle/>
             <a:p>
               <a:pPr algn="r"/>
-              <a:endParaRPr lang="en-US" sz="3600" dirty="0">
+              <a:endParaRPr lang="en-US" sz="3600" noProof="0" dirty="0">
                 <a:solidFill>
                   <a:schemeClr val="tx1"/>
                 </a:solidFill>
@@ -8455,8 +7871,8 @@
             </a:p>
           </p:txBody>
         </p:sp>
-        <mc:AlternateContent xmlns:mc="http://schemas.openxmlformats.org/markup-compatibility/2006" xmlns:a14="http://schemas.microsoft.com/office/drawing/2010/main">
-          <mc:Choice Requires="a14">
+        <mc:AlternateContent xmlns:mc="http://schemas.openxmlformats.org/markup-compatibility/2006">
+          <mc:Choice xmlns:a14="http://schemas.microsoft.com/office/drawing/2010/main" Requires="a14">
             <p:sp>
               <p:nvSpPr>
                 <p:cNvPr id="47" name="Textfeld 46">
@@ -8471,7 +7887,7 @@
               </p:nvSpPr>
               <p:spPr>
                 <a:xfrm>
-                  <a:off x="8827773" y="13663964"/>
+                  <a:off x="9305642" y="14157997"/>
                   <a:ext cx="3990516" cy="721480"/>
                 </a:xfrm>
                 <a:prstGeom prst="rect">
@@ -8493,13 +7909,13 @@
                       </m:oMathParaPr>
                       <m:oMath xmlns:m="http://schemas.openxmlformats.org/officeDocument/2006/math">
                         <m:r>
-                          <a:rPr lang="de-DE" sz="2000" b="0" i="1" smtClean="0">
+                          <a:rPr lang="en-US" sz="2000" b="0" i="1" noProof="0" smtClean="0">
                             <a:latin typeface="Cambria Math" panose="02040503050406030204" pitchFamily="18" charset="0"/>
                           </a:rPr>
                           <m:t>𝐶𝑜𝑀</m:t>
                         </m:r>
                         <m:r>
-                          <a:rPr lang="de-DE" sz="2000" b="0" i="1" smtClean="0">
+                          <a:rPr lang="en-US" sz="2000" b="0" i="1" noProof="0" smtClean="0">
                             <a:latin typeface="Cambria Math" panose="02040503050406030204" pitchFamily="18" charset="0"/>
                           </a:rPr>
                           <m:t>= </m:t>
@@ -8507,7 +7923,7 @@
                         <m:f>
                           <m:fPr>
                             <m:ctrlPr>
-                              <a:rPr lang="de-DE" sz="2000" b="0" i="1" smtClean="0">
+                              <a:rPr lang="en-US" sz="2000" b="0" i="1" noProof="0" smtClean="0">
                                 <a:latin typeface="Cambria Math" panose="02040503050406030204" pitchFamily="18" charset="0"/>
                               </a:rPr>
                             </m:ctrlPr>
@@ -8518,7 +7934,7 @@
                                 <m:chr m:val="∑"/>
                                 <m:limLoc m:val="subSup"/>
                                 <m:ctrlPr>
-                                  <a:rPr lang="de-DE" sz="2000" b="0" i="1" smtClean="0">
+                                  <a:rPr lang="en-US" sz="2000" b="0" i="1" noProof="0" smtClean="0">
                                     <a:latin typeface="Cambria Math" panose="02040503050406030204" pitchFamily="18" charset="0"/>
                                   </a:rPr>
                                 </m:ctrlPr>
@@ -8528,13 +7944,13 @@
                                   <m:rPr>
                                     <m:brk m:alnAt="25"/>
                                   </m:rPr>
-                                  <a:rPr lang="de-DE" sz="2000" b="0" i="1" smtClean="0">
+                                  <a:rPr lang="en-US" sz="2000" b="0" i="1" noProof="0" smtClean="0">
                                     <a:latin typeface="Cambria Math" panose="02040503050406030204" pitchFamily="18" charset="0"/>
                                   </a:rPr>
                                   <m:t>𝑖</m:t>
                                 </m:r>
                                 <m:r>
-                                  <a:rPr lang="de-DE" sz="2000" b="0" i="1" smtClean="0">
+                                  <a:rPr lang="en-US" sz="2000" b="0" i="1" noProof="0" smtClean="0">
                                     <a:latin typeface="Cambria Math" panose="02040503050406030204" pitchFamily="18" charset="0"/>
                                   </a:rPr>
                                   <m:t>=1</m:t>
@@ -8542,7 +7958,7 @@
                               </m:sub>
                               <m:sup>
                                 <m:r>
-                                  <a:rPr lang="de-DE" sz="2000" b="0" i="1" smtClean="0">
+                                  <a:rPr lang="en-US" sz="2000" b="0" i="1" noProof="0" smtClean="0">
                                     <a:latin typeface="Cambria Math" panose="02040503050406030204" pitchFamily="18" charset="0"/>
                                   </a:rPr>
                                   <m:t>25</m:t>
@@ -8552,14 +7968,14 @@
                                 <m:sSub>
                                   <m:sSubPr>
                                     <m:ctrlPr>
-                                      <a:rPr lang="de-DE" sz="2000" b="0" i="1" smtClean="0">
+                                      <a:rPr lang="en-US" sz="2000" b="0" i="1" noProof="0" smtClean="0">
                                         <a:latin typeface="Cambria Math" panose="02040503050406030204" pitchFamily="18" charset="0"/>
                                       </a:rPr>
                                     </m:ctrlPr>
                                   </m:sSubPr>
                                   <m:e>
                                     <m:r>
-                                      <a:rPr lang="de-DE" sz="2000" b="0" i="1" smtClean="0">
+                                      <a:rPr lang="en-US" sz="2000" b="0" i="1" noProof="0" smtClean="0">
                                         <a:latin typeface="Cambria Math" panose="02040503050406030204" pitchFamily="18" charset="0"/>
                                       </a:rPr>
                                       <m:t>𝑓𝑟𝑎𝑐𝑡𝑖𝑜𝑛</m:t>
@@ -8567,7 +7983,7 @@
                                   </m:e>
                                   <m:sub>
                                     <m:r>
-                                      <a:rPr lang="de-DE" sz="2000" b="0" i="1" smtClean="0">
+                                      <a:rPr lang="en-US" sz="2000" b="0" i="1" noProof="0" smtClean="0">
                                         <a:latin typeface="Cambria Math" panose="02040503050406030204" pitchFamily="18" charset="0"/>
                                       </a:rPr>
                                       <m:t>𝑖</m:t>
@@ -8575,7 +7991,7 @@
                                   </m:sub>
                                 </m:sSub>
                                 <m:r>
-                                  <a:rPr lang="de-DE" sz="2000" b="0" i="1" smtClean="0">
+                                  <a:rPr lang="en-US" sz="2000" b="0" i="1" noProof="0" smtClean="0">
                                     <a:latin typeface="Cambria Math" panose="02040503050406030204" pitchFamily="18" charset="0"/>
                                   </a:rPr>
                                   <m:t>∗ </m:t>
@@ -8583,14 +7999,14 @@
                                 <m:sSub>
                                   <m:sSubPr>
                                     <m:ctrlPr>
-                                      <a:rPr lang="de-DE" sz="2000" b="0" i="1" smtClean="0">
+                                      <a:rPr lang="en-US" sz="2000" b="0" i="1" noProof="0" smtClean="0">
                                         <a:latin typeface="Cambria Math" panose="02040503050406030204" pitchFamily="18" charset="0"/>
                                       </a:rPr>
                                     </m:ctrlPr>
                                   </m:sSubPr>
                                   <m:e>
                                     <m:r>
-                                      <a:rPr lang="de-DE" sz="2000" b="0" i="1" smtClean="0">
+                                      <a:rPr lang="en-US" sz="2000" b="0" i="1" noProof="0" smtClean="0">
                                         <a:latin typeface="Cambria Math" panose="02040503050406030204" pitchFamily="18" charset="0"/>
                                       </a:rPr>
                                       <m:t>𝑖𝑛𝑡𝑒𝑛𝑠𝑖𝑡𝑦</m:t>
@@ -8598,7 +8014,7 @@
                                   </m:e>
                                   <m:sub>
                                     <m:r>
-                                      <a:rPr lang="de-DE" sz="2000" b="0" i="1" smtClean="0">
+                                      <a:rPr lang="en-US" sz="2000" b="0" i="1" noProof="0" smtClean="0">
                                         <a:latin typeface="Cambria Math" panose="02040503050406030204" pitchFamily="18" charset="0"/>
                                       </a:rPr>
                                       <m:t>𝑖</m:t>
@@ -8614,7 +8030,7 @@
                                 <m:chr m:val="∑"/>
                                 <m:limLoc m:val="subSup"/>
                                 <m:ctrlPr>
-                                  <a:rPr lang="de-DE" sz="2000" b="0" i="1" smtClean="0">
+                                  <a:rPr lang="en-US" sz="2000" b="0" i="1" noProof="0" smtClean="0">
                                     <a:latin typeface="Cambria Math" panose="02040503050406030204" pitchFamily="18" charset="0"/>
                                   </a:rPr>
                                 </m:ctrlPr>
@@ -8624,13 +8040,13 @@
                                   <m:rPr>
                                     <m:brk m:alnAt="25"/>
                                   </m:rPr>
-                                  <a:rPr lang="de-DE" sz="2000" b="0" i="1" smtClean="0">
+                                  <a:rPr lang="en-US" sz="2000" b="0" i="1" noProof="0" smtClean="0">
                                     <a:latin typeface="Cambria Math" panose="02040503050406030204" pitchFamily="18" charset="0"/>
                                   </a:rPr>
                                   <m:t>𝑖</m:t>
                                 </m:r>
                                 <m:r>
-                                  <a:rPr lang="de-DE" sz="2000" b="0" i="1" smtClean="0">
+                                  <a:rPr lang="en-US" sz="2000" b="0" i="1" noProof="0" smtClean="0">
                                     <a:latin typeface="Cambria Math" panose="02040503050406030204" pitchFamily="18" charset="0"/>
                                   </a:rPr>
                                   <m:t>=1</m:t>
@@ -8638,7 +8054,7 @@
                               </m:sub>
                               <m:sup>
                                 <m:r>
-                                  <a:rPr lang="de-DE" sz="2000" b="0" i="1" smtClean="0">
+                                  <a:rPr lang="en-US" sz="2000" b="0" i="1" noProof="0" smtClean="0">
                                     <a:latin typeface="Cambria Math" panose="02040503050406030204" pitchFamily="18" charset="0"/>
                                   </a:rPr>
                                   <m:t>25</m:t>
@@ -8648,14 +8064,14 @@
                                 <m:sSub>
                                   <m:sSubPr>
                                     <m:ctrlPr>
-                                      <a:rPr lang="de-DE" sz="2000" b="0" i="1" smtClean="0">
+                                      <a:rPr lang="en-US" sz="2000" b="0" i="1" noProof="0" smtClean="0">
                                         <a:latin typeface="Cambria Math" panose="02040503050406030204" pitchFamily="18" charset="0"/>
                                       </a:rPr>
                                     </m:ctrlPr>
                                   </m:sSubPr>
                                   <m:e>
                                     <m:r>
-                                      <a:rPr lang="de-DE" sz="2000" b="0" i="1" smtClean="0">
+                                      <a:rPr lang="en-US" sz="2000" b="0" i="1" noProof="0" smtClean="0">
                                         <a:latin typeface="Cambria Math" panose="02040503050406030204" pitchFamily="18" charset="0"/>
                                       </a:rPr>
                                       <m:t>𝑖𝑛𝑡𝑒𝑛𝑠𝑖𝑡𝑦</m:t>
@@ -8663,7 +8079,7 @@
                                   </m:e>
                                   <m:sub>
                                     <m:r>
-                                      <a:rPr lang="de-DE" sz="2000" b="0" i="1" smtClean="0">
+                                      <a:rPr lang="en-US" sz="2000" b="0" i="1" noProof="0" smtClean="0">
                                         <a:latin typeface="Cambria Math" panose="02040503050406030204" pitchFamily="18" charset="0"/>
                                       </a:rPr>
                                       <m:t>𝑖</m:t>
@@ -8677,18 +8093,18 @@
                       </m:oMath>
                     </m:oMathPara>
                   </a14:m>
-                  <a:endParaRPr lang="en-US" sz="2000" dirty="0"/>
+                  <a:endParaRPr lang="en-US" sz="2000" noProof="0" dirty="0"/>
                 </a:p>
               </p:txBody>
             </p:sp>
           </mc:Choice>
-          <mc:Fallback xmlns="">
+          <mc:Fallback>
             <p:sp>
               <p:nvSpPr>
-                <p:cNvPr id="67" name="Textfeld 66">
+                <p:cNvPr id="47" name="Textfeld 46">
                   <a:extLst>
                     <a:ext uri="{FF2B5EF4-FFF2-40B4-BE49-F238E27FC236}">
-                      <a16:creationId xmlns:a16="http://schemas.microsoft.com/office/drawing/2014/main" id="{9303BE98-8E93-1F5E-26C1-7C6E72A7E9EF}"/>
+                      <a16:creationId xmlns:a16="http://schemas.microsoft.com/office/drawing/2014/main" id="{C8697122-1F57-2A95-C751-74F7E5823F08}"/>
                     </a:ext>
                   </a:extLst>
                 </p:cNvPr>
@@ -8699,7 +8115,7 @@
               </p:nvSpPr>
               <p:spPr>
                 <a:xfrm>
-                  <a:off x="8827773" y="13663964"/>
+                  <a:off x="9305642" y="14157997"/>
                   <a:ext cx="3990516" cy="721480"/>
                 </a:xfrm>
                 <a:prstGeom prst="rect">
@@ -8708,7 +8124,7 @@
                 <a:blipFill>
                   <a:blip r:embed="rId15"/>
                   <a:stretch>
-                    <a:fillRect l="-952" t="-67241" b="-103448"/>
+                    <a:fillRect/>
                   </a:stretch>
                 </a:blipFill>
               </p:spPr>
@@ -8717,7 +8133,7 @@
                 <a:lstStyle/>
                 <a:p>
                   <a:r>
-                    <a:rPr lang="en-US">
+                    <a:rPr lang="de-DE">
                       <a:noFill/>
                     </a:rPr>
                     <a:t> </a:t>
@@ -8741,13 +8157,13 @@
           <p:nvPr>
             <p:extLst>
               <p:ext uri="{D42A27DB-BD31-4B8C-83A1-F6EECF244321}">
-                <p14:modId xmlns:p14="http://schemas.microsoft.com/office/powerpoint/2010/main" val="4140878414"/>
+                <p14:modId xmlns:p14="http://schemas.microsoft.com/office/powerpoint/2010/main" val="930634812"/>
               </p:ext>
             </p:extLst>
           </p:nvPr>
         </p:nvGraphicFramePr>
         <p:xfrm>
-          <a:off x="10263008" y="17649999"/>
+          <a:off x="10284771" y="18443121"/>
           <a:ext cx="4328867" cy="2525627"/>
         </p:xfrm>
         <a:graphic>
@@ -8770,7 +8186,7 @@
         </p:nvSpPr>
         <p:spPr>
           <a:xfrm>
-            <a:off x="829098" y="17798789"/>
+            <a:off x="898676" y="19136735"/>
             <a:ext cx="9214407" cy="3631763"/>
           </a:xfrm>
           <a:prstGeom prst="rect">
@@ -8786,7 +8202,7 @@
           <a:p>
             <a:pPr algn="just"/>
             <a:r>
-              <a:rPr lang="de-DE" sz="2400" b="1" dirty="0">
+              <a:rPr lang="en-US" sz="2400" b="1" noProof="0" dirty="0">
                 <a:latin typeface="Source Sans Pro" panose="020B0503030403020204" pitchFamily="34" charset="0"/>
                 <a:ea typeface="Source Sans Pro" panose="020B0503030403020204" pitchFamily="34" charset="0"/>
               </a:rPr>
@@ -8795,7 +8211,7 @@
           </a:p>
           <a:p>
             <a:pPr algn="just"/>
-            <a:endParaRPr lang="de-DE" sz="1000" dirty="0">
+            <a:endParaRPr lang="en-US" sz="1000" noProof="0" dirty="0">
               <a:latin typeface="Source Sans Pro" panose="020B0503030403020204" pitchFamily="34" charset="0"/>
               <a:ea typeface="Source Sans Pro" panose="020B0503030403020204" pitchFamily="34" charset="0"/>
             </a:endParaRPr>
@@ -8803,543 +8219,102 @@
           <a:p>
             <a:pPr algn="just"/>
             <a:r>
-              <a:rPr lang="de-DE" sz="2400" b="1" dirty="0">
+              <a:rPr lang="en-US" sz="2400" b="1" noProof="0" dirty="0">
                 <a:latin typeface="Source Sans Pro" panose="020B0503030403020204" pitchFamily="34" charset="0"/>
                 <a:ea typeface="Source Sans Pro" panose="020B0503030403020204" pitchFamily="34" charset="0"/>
               </a:rPr>
               <a:t>T-Test: </a:t>
             </a:r>
             <a:r>
-              <a:rPr lang="de-DE" sz="2400" dirty="0" err="1">
+              <a:rPr lang="en-US" sz="2400" noProof="0" dirty="0">
                 <a:latin typeface="Source Sans Pro" panose="020B0503030403020204" pitchFamily="34" charset="0"/>
                 <a:ea typeface="Source Sans Pro" panose="020B0503030403020204" pitchFamily="34" charset="0"/>
               </a:rPr>
-              <a:t>To</a:t>
-            </a:r>
-            <a:r>
-              <a:rPr lang="de-DE" sz="2400" dirty="0">
-                <a:latin typeface="Source Sans Pro" panose="020B0503030403020204" pitchFamily="34" charset="0"/>
-                <a:ea typeface="Source Sans Pro" panose="020B0503030403020204" pitchFamily="34" charset="0"/>
-              </a:rPr>
-              <a:t> </a:t>
-            </a:r>
-            <a:r>
-              <a:rPr lang="de-DE" sz="2400" dirty="0" err="1">
-                <a:latin typeface="Source Sans Pro" panose="020B0503030403020204" pitchFamily="34" charset="0"/>
-                <a:ea typeface="Source Sans Pro" panose="020B0503030403020204" pitchFamily="34" charset="0"/>
-              </a:rPr>
-              <a:t>statistically</a:t>
-            </a:r>
-            <a:r>
-              <a:rPr lang="de-DE" sz="2400" dirty="0">
-                <a:latin typeface="Source Sans Pro" panose="020B0503030403020204" pitchFamily="34" charset="0"/>
-                <a:ea typeface="Source Sans Pro" panose="020B0503030403020204" pitchFamily="34" charset="0"/>
-              </a:rPr>
-              <a:t> </a:t>
-            </a:r>
-            <a:r>
-              <a:rPr lang="de-DE" sz="2400" dirty="0" err="1">
-                <a:latin typeface="Source Sans Pro" panose="020B0503030403020204" pitchFamily="34" charset="0"/>
-                <a:ea typeface="Source Sans Pro" panose="020B0503030403020204" pitchFamily="34" charset="0"/>
-              </a:rPr>
-              <a:t>assess</a:t>
-            </a:r>
-            <a:r>
-              <a:rPr lang="de-DE" sz="2400" dirty="0">
-                <a:latin typeface="Source Sans Pro" panose="020B0503030403020204" pitchFamily="34" charset="0"/>
-                <a:ea typeface="Source Sans Pro" panose="020B0503030403020204" pitchFamily="34" charset="0"/>
-              </a:rPr>
-              <a:t> RNA </a:t>
-            </a:r>
-            <a:r>
-              <a:rPr lang="de-DE" sz="2400" dirty="0" err="1">
-                <a:latin typeface="Source Sans Pro" panose="020B0503030403020204" pitchFamily="34" charset="0"/>
-                <a:ea typeface="Source Sans Pro" panose="020B0503030403020204" pitchFamily="34" charset="0"/>
-              </a:rPr>
-              <a:t>dependence</a:t>
-            </a:r>
-            <a:r>
-              <a:rPr lang="de-DE" sz="2400" dirty="0">
-                <a:latin typeface="Source Sans Pro" panose="020B0503030403020204" pitchFamily="34" charset="0"/>
-                <a:ea typeface="Source Sans Pro" panose="020B0503030403020204" pitchFamily="34" charset="0"/>
-              </a:rPr>
-              <a:t>, </a:t>
-            </a:r>
-            <a:r>
-              <a:rPr lang="de-DE" sz="2400" dirty="0" err="1">
-                <a:latin typeface="Source Sans Pro" panose="020B0503030403020204" pitchFamily="34" charset="0"/>
-                <a:ea typeface="Source Sans Pro" panose="020B0503030403020204" pitchFamily="34" charset="0"/>
-              </a:rPr>
-              <a:t>we</a:t>
-            </a:r>
-            <a:r>
-              <a:rPr lang="de-DE" sz="2400" dirty="0">
-                <a:latin typeface="Source Sans Pro" panose="020B0503030403020204" pitchFamily="34" charset="0"/>
-                <a:ea typeface="Source Sans Pro" panose="020B0503030403020204" pitchFamily="34" charset="0"/>
-              </a:rPr>
-              <a:t> </a:t>
-            </a:r>
-            <a:r>
-              <a:rPr lang="de-DE" sz="2400" dirty="0" err="1">
-                <a:latin typeface="Source Sans Pro" panose="020B0503030403020204" pitchFamily="34" charset="0"/>
-                <a:ea typeface="Source Sans Pro" panose="020B0503030403020204" pitchFamily="34" charset="0"/>
-              </a:rPr>
-              <a:t>computed</a:t>
-            </a:r>
-            <a:r>
-              <a:rPr lang="de-DE" sz="2400" dirty="0">
-                <a:latin typeface="Source Sans Pro" panose="020B0503030403020204" pitchFamily="34" charset="0"/>
-                <a:ea typeface="Source Sans Pro" panose="020B0503030403020204" pitchFamily="34" charset="0"/>
-              </a:rPr>
-              <a:t> shift </a:t>
-            </a:r>
-            <a:r>
-              <a:rPr lang="de-DE" sz="2400" dirty="0" err="1">
-                <a:latin typeface="Source Sans Pro" panose="020B0503030403020204" pitchFamily="34" charset="0"/>
-                <a:ea typeface="Source Sans Pro" panose="020B0503030403020204" pitchFamily="34" charset="0"/>
-              </a:rPr>
-              <a:t>distances</a:t>
-            </a:r>
-            <a:r>
-              <a:rPr lang="de-DE" sz="2400" dirty="0">
-                <a:latin typeface="Source Sans Pro" panose="020B0503030403020204" pitchFamily="34" charset="0"/>
-                <a:ea typeface="Source Sans Pro" panose="020B0503030403020204" pitchFamily="34" charset="0"/>
-              </a:rPr>
-              <a:t> </a:t>
-            </a:r>
-            <a:r>
-              <a:rPr lang="de-DE" sz="2400" dirty="0" err="1">
-                <a:latin typeface="Source Sans Pro" panose="020B0503030403020204" pitchFamily="34" charset="0"/>
-                <a:ea typeface="Source Sans Pro" panose="020B0503030403020204" pitchFamily="34" charset="0"/>
-              </a:rPr>
-              <a:t>from</a:t>
-            </a:r>
-            <a:r>
-              <a:rPr lang="de-DE" sz="2400" dirty="0">
-                <a:latin typeface="Source Sans Pro" panose="020B0503030403020204" pitchFamily="34" charset="0"/>
-                <a:ea typeface="Source Sans Pro" panose="020B0503030403020204" pitchFamily="34" charset="0"/>
-              </a:rPr>
-              <a:t> </a:t>
-            </a:r>
-            <a:r>
-              <a:rPr lang="de-DE" sz="2400" dirty="0" err="1">
+              <a:t>To statistically assess RNA dependence, we computed shift distances from </a:t>
+            </a:r>
+            <a:r>
+              <a:rPr lang="en-US" sz="2400" noProof="0" dirty="0" err="1">
                 <a:latin typeface="Source Sans Pro" panose="020B0503030403020204" pitchFamily="34" charset="0"/>
                 <a:ea typeface="Source Sans Pro" panose="020B0503030403020204" pitchFamily="34" charset="0"/>
               </a:rPr>
               <a:t>CoM</a:t>
             </a:r>
             <a:r>
-              <a:rPr lang="de-DE" sz="2400" dirty="0">
+              <a:rPr lang="en-US" sz="2400" noProof="0" dirty="0">
                 <a:latin typeface="Source Sans Pro" panose="020B0503030403020204" pitchFamily="34" charset="0"/>
                 <a:ea typeface="Source Sans Pro" panose="020B0503030403020204" pitchFamily="34" charset="0"/>
               </a:rPr>
-              <a:t> </a:t>
-            </a:r>
-            <a:r>
-              <a:rPr lang="de-DE" sz="2400" dirty="0" err="1">
+              <a:t> values across all replicates. A Shapiro-Wilk test was performed to confirm normality. If normally distributed, a one-sided t-test was used to assess whether the mean shift exceeded 1. </a:t>
+            </a:r>
+          </a:p>
+          <a:p>
+            <a:pPr algn="just"/>
+            <a:endParaRPr lang="en-US" sz="1000" noProof="0" dirty="0">
+              <a:latin typeface="Source Sans Pro" panose="020B0503030403020204" pitchFamily="34" charset="0"/>
+              <a:ea typeface="Source Sans Pro" panose="020B0503030403020204" pitchFamily="34" charset="0"/>
+            </a:endParaRPr>
+          </a:p>
+          <a:p>
+            <a:pPr algn="just"/>
+            <a:r>
+              <a:rPr lang="en-US" sz="2400" noProof="0" dirty="0">
                 <a:latin typeface="Source Sans Pro" panose="020B0503030403020204" pitchFamily="34" charset="0"/>
                 <a:ea typeface="Source Sans Pro" panose="020B0503030403020204" pitchFamily="34" charset="0"/>
               </a:rPr>
-              <a:t>values</a:t>
-            </a:r>
-            <a:r>
-              <a:rPr lang="de-DE" sz="2400" dirty="0">
-                <a:latin typeface="Source Sans Pro" panose="020B0503030403020204" pitchFamily="34" charset="0"/>
-                <a:ea typeface="Source Sans Pro" panose="020B0503030403020204" pitchFamily="34" charset="0"/>
-              </a:rPr>
-              <a:t> </a:t>
-            </a:r>
-            <a:r>
-              <a:rPr lang="de-DE" sz="2400" dirty="0" err="1">
-                <a:latin typeface="Source Sans Pro" panose="020B0503030403020204" pitchFamily="34" charset="0"/>
-                <a:ea typeface="Source Sans Pro" panose="020B0503030403020204" pitchFamily="34" charset="0"/>
-              </a:rPr>
-              <a:t>across</a:t>
-            </a:r>
-            <a:r>
-              <a:rPr lang="de-DE" sz="2400" dirty="0">
-                <a:latin typeface="Source Sans Pro" panose="020B0503030403020204" pitchFamily="34" charset="0"/>
-                <a:ea typeface="Source Sans Pro" panose="020B0503030403020204" pitchFamily="34" charset="0"/>
-              </a:rPr>
-              <a:t> all </a:t>
-            </a:r>
-            <a:r>
-              <a:rPr lang="de-DE" sz="2400" dirty="0" err="1">
-                <a:latin typeface="Source Sans Pro" panose="020B0503030403020204" pitchFamily="34" charset="0"/>
-                <a:ea typeface="Source Sans Pro" panose="020B0503030403020204" pitchFamily="34" charset="0"/>
-              </a:rPr>
-              <a:t>replicates</a:t>
-            </a:r>
-            <a:r>
-              <a:rPr lang="de-DE" sz="2400" dirty="0">
-                <a:latin typeface="Source Sans Pro" panose="020B0503030403020204" pitchFamily="34" charset="0"/>
-                <a:ea typeface="Source Sans Pro" panose="020B0503030403020204" pitchFamily="34" charset="0"/>
-              </a:rPr>
-              <a:t>. A Shapiro-Wilk </a:t>
-            </a:r>
-            <a:r>
-              <a:rPr lang="de-DE" sz="2400" dirty="0" err="1">
-                <a:latin typeface="Source Sans Pro" panose="020B0503030403020204" pitchFamily="34" charset="0"/>
-                <a:ea typeface="Source Sans Pro" panose="020B0503030403020204" pitchFamily="34" charset="0"/>
-              </a:rPr>
-              <a:t>test</a:t>
-            </a:r>
-            <a:r>
-              <a:rPr lang="de-DE" sz="2400" dirty="0">
-                <a:latin typeface="Source Sans Pro" panose="020B0503030403020204" pitchFamily="34" charset="0"/>
-                <a:ea typeface="Source Sans Pro" panose="020B0503030403020204" pitchFamily="34" charset="0"/>
-              </a:rPr>
-              <a:t> was </a:t>
-            </a:r>
-            <a:r>
-              <a:rPr lang="de-DE" sz="2400" dirty="0" err="1">
-                <a:latin typeface="Source Sans Pro" panose="020B0503030403020204" pitchFamily="34" charset="0"/>
-                <a:ea typeface="Source Sans Pro" panose="020B0503030403020204" pitchFamily="34" charset="0"/>
-              </a:rPr>
-              <a:t>performed</a:t>
-            </a:r>
-            <a:r>
-              <a:rPr lang="de-DE" sz="2400" dirty="0">
-                <a:latin typeface="Source Sans Pro" panose="020B0503030403020204" pitchFamily="34" charset="0"/>
-                <a:ea typeface="Source Sans Pro" panose="020B0503030403020204" pitchFamily="34" charset="0"/>
-              </a:rPr>
-              <a:t> </a:t>
-            </a:r>
-            <a:r>
-              <a:rPr lang="de-DE" sz="2400" dirty="0" err="1">
-                <a:latin typeface="Source Sans Pro" panose="020B0503030403020204" pitchFamily="34" charset="0"/>
-                <a:ea typeface="Source Sans Pro" panose="020B0503030403020204" pitchFamily="34" charset="0"/>
-              </a:rPr>
-              <a:t>to</a:t>
-            </a:r>
-            <a:r>
-              <a:rPr lang="de-DE" sz="2400" dirty="0">
-                <a:latin typeface="Source Sans Pro" panose="020B0503030403020204" pitchFamily="34" charset="0"/>
-                <a:ea typeface="Source Sans Pro" panose="020B0503030403020204" pitchFamily="34" charset="0"/>
-              </a:rPr>
-              <a:t> </a:t>
-            </a:r>
-            <a:r>
-              <a:rPr lang="de-DE" sz="2400" dirty="0" err="1">
-                <a:latin typeface="Source Sans Pro" panose="020B0503030403020204" pitchFamily="34" charset="0"/>
-                <a:ea typeface="Source Sans Pro" panose="020B0503030403020204" pitchFamily="34" charset="0"/>
-              </a:rPr>
-              <a:t>confirm</a:t>
-            </a:r>
-            <a:r>
-              <a:rPr lang="de-DE" sz="2400" dirty="0">
-                <a:latin typeface="Source Sans Pro" panose="020B0503030403020204" pitchFamily="34" charset="0"/>
-                <a:ea typeface="Source Sans Pro" panose="020B0503030403020204" pitchFamily="34" charset="0"/>
-              </a:rPr>
-              <a:t> </a:t>
-            </a:r>
-            <a:r>
-              <a:rPr lang="de-DE" sz="2400" dirty="0" err="1">
-                <a:latin typeface="Source Sans Pro" panose="020B0503030403020204" pitchFamily="34" charset="0"/>
-                <a:ea typeface="Source Sans Pro" panose="020B0503030403020204" pitchFamily="34" charset="0"/>
-              </a:rPr>
-              <a:t>normality</a:t>
-            </a:r>
-            <a:r>
-              <a:rPr lang="de-DE" sz="2400" dirty="0">
-                <a:latin typeface="Source Sans Pro" panose="020B0503030403020204" pitchFamily="34" charset="0"/>
-                <a:ea typeface="Source Sans Pro" panose="020B0503030403020204" pitchFamily="34" charset="0"/>
-              </a:rPr>
-              <a:t>. </a:t>
-            </a:r>
-            <a:r>
-              <a:rPr lang="de-DE" sz="2400" dirty="0" err="1">
-                <a:latin typeface="Source Sans Pro" panose="020B0503030403020204" pitchFamily="34" charset="0"/>
-                <a:ea typeface="Source Sans Pro" panose="020B0503030403020204" pitchFamily="34" charset="0"/>
-              </a:rPr>
-              <a:t>If</a:t>
-            </a:r>
-            <a:r>
-              <a:rPr lang="de-DE" sz="2400" dirty="0">
-                <a:latin typeface="Source Sans Pro" panose="020B0503030403020204" pitchFamily="34" charset="0"/>
-                <a:ea typeface="Source Sans Pro" panose="020B0503030403020204" pitchFamily="34" charset="0"/>
-              </a:rPr>
-              <a:t> </a:t>
-            </a:r>
-            <a:r>
-              <a:rPr lang="de-DE" sz="2400" dirty="0" err="1">
-                <a:latin typeface="Source Sans Pro" panose="020B0503030403020204" pitchFamily="34" charset="0"/>
-                <a:ea typeface="Source Sans Pro" panose="020B0503030403020204" pitchFamily="34" charset="0"/>
-              </a:rPr>
-              <a:t>normally</a:t>
-            </a:r>
-            <a:r>
-              <a:rPr lang="de-DE" sz="2400" dirty="0">
-                <a:latin typeface="Source Sans Pro" panose="020B0503030403020204" pitchFamily="34" charset="0"/>
-                <a:ea typeface="Source Sans Pro" panose="020B0503030403020204" pitchFamily="34" charset="0"/>
-              </a:rPr>
-              <a:t> </a:t>
-            </a:r>
-            <a:r>
-              <a:rPr lang="de-DE" sz="2400" dirty="0" err="1">
-                <a:latin typeface="Source Sans Pro" panose="020B0503030403020204" pitchFamily="34" charset="0"/>
-                <a:ea typeface="Source Sans Pro" panose="020B0503030403020204" pitchFamily="34" charset="0"/>
-              </a:rPr>
-              <a:t>distributed</a:t>
-            </a:r>
-            <a:r>
-              <a:rPr lang="de-DE" sz="2400" dirty="0">
-                <a:latin typeface="Source Sans Pro" panose="020B0503030403020204" pitchFamily="34" charset="0"/>
-                <a:ea typeface="Source Sans Pro" panose="020B0503030403020204" pitchFamily="34" charset="0"/>
-              </a:rPr>
-              <a:t>, a </a:t>
-            </a:r>
-            <a:r>
-              <a:rPr lang="de-DE" sz="2400" dirty="0" err="1">
-                <a:latin typeface="Source Sans Pro" panose="020B0503030403020204" pitchFamily="34" charset="0"/>
-                <a:ea typeface="Source Sans Pro" panose="020B0503030403020204" pitchFamily="34" charset="0"/>
-              </a:rPr>
-              <a:t>one-sided</a:t>
-            </a:r>
-            <a:r>
-              <a:rPr lang="de-DE" sz="2400" dirty="0">
-                <a:latin typeface="Source Sans Pro" panose="020B0503030403020204" pitchFamily="34" charset="0"/>
-                <a:ea typeface="Source Sans Pro" panose="020B0503030403020204" pitchFamily="34" charset="0"/>
-              </a:rPr>
-              <a:t> t-test was </a:t>
-            </a:r>
-            <a:r>
-              <a:rPr lang="de-DE" sz="2400" dirty="0" err="1">
-                <a:latin typeface="Source Sans Pro" panose="020B0503030403020204" pitchFamily="34" charset="0"/>
-                <a:ea typeface="Source Sans Pro" panose="020B0503030403020204" pitchFamily="34" charset="0"/>
-              </a:rPr>
-              <a:t>used</a:t>
-            </a:r>
-            <a:r>
-              <a:rPr lang="de-DE" sz="2400" dirty="0">
-                <a:latin typeface="Source Sans Pro" panose="020B0503030403020204" pitchFamily="34" charset="0"/>
-                <a:ea typeface="Source Sans Pro" panose="020B0503030403020204" pitchFamily="34" charset="0"/>
-              </a:rPr>
-              <a:t> </a:t>
-            </a:r>
-            <a:r>
-              <a:rPr lang="de-DE" sz="2400" dirty="0" err="1">
-                <a:latin typeface="Source Sans Pro" panose="020B0503030403020204" pitchFamily="34" charset="0"/>
-                <a:ea typeface="Source Sans Pro" panose="020B0503030403020204" pitchFamily="34" charset="0"/>
-              </a:rPr>
-              <a:t>to</a:t>
-            </a:r>
-            <a:r>
-              <a:rPr lang="de-DE" sz="2400" dirty="0">
-                <a:latin typeface="Source Sans Pro" panose="020B0503030403020204" pitchFamily="34" charset="0"/>
-                <a:ea typeface="Source Sans Pro" panose="020B0503030403020204" pitchFamily="34" charset="0"/>
-              </a:rPr>
-              <a:t> </a:t>
-            </a:r>
-            <a:r>
-              <a:rPr lang="de-DE" sz="2400" dirty="0" err="1">
-                <a:latin typeface="Source Sans Pro" panose="020B0503030403020204" pitchFamily="34" charset="0"/>
-                <a:ea typeface="Source Sans Pro" panose="020B0503030403020204" pitchFamily="34" charset="0"/>
-              </a:rPr>
-              <a:t>assess</a:t>
-            </a:r>
-            <a:r>
-              <a:rPr lang="de-DE" sz="2400" dirty="0">
-                <a:latin typeface="Source Sans Pro" panose="020B0503030403020204" pitchFamily="34" charset="0"/>
-                <a:ea typeface="Source Sans Pro" panose="020B0503030403020204" pitchFamily="34" charset="0"/>
-              </a:rPr>
-              <a:t> </a:t>
-            </a:r>
-            <a:r>
-              <a:rPr lang="de-DE" sz="2400" dirty="0" err="1">
-                <a:latin typeface="Source Sans Pro" panose="020B0503030403020204" pitchFamily="34" charset="0"/>
-                <a:ea typeface="Source Sans Pro" panose="020B0503030403020204" pitchFamily="34" charset="0"/>
-              </a:rPr>
-              <a:t>whether</a:t>
-            </a:r>
-            <a:r>
-              <a:rPr lang="de-DE" sz="2400" dirty="0">
-                <a:latin typeface="Source Sans Pro" panose="020B0503030403020204" pitchFamily="34" charset="0"/>
-                <a:ea typeface="Source Sans Pro" panose="020B0503030403020204" pitchFamily="34" charset="0"/>
-              </a:rPr>
-              <a:t> </a:t>
-            </a:r>
-            <a:r>
-              <a:rPr lang="de-DE" sz="2400" dirty="0" err="1">
-                <a:latin typeface="Source Sans Pro" panose="020B0503030403020204" pitchFamily="34" charset="0"/>
-                <a:ea typeface="Source Sans Pro" panose="020B0503030403020204" pitchFamily="34" charset="0"/>
-              </a:rPr>
-              <a:t>the</a:t>
-            </a:r>
-            <a:r>
-              <a:rPr lang="de-DE" sz="2400" dirty="0">
-                <a:latin typeface="Source Sans Pro" panose="020B0503030403020204" pitchFamily="34" charset="0"/>
-                <a:ea typeface="Source Sans Pro" panose="020B0503030403020204" pitchFamily="34" charset="0"/>
-              </a:rPr>
-              <a:t> </a:t>
-            </a:r>
-            <a:r>
-              <a:rPr lang="de-DE" sz="2400" dirty="0" err="1">
-                <a:latin typeface="Source Sans Pro" panose="020B0503030403020204" pitchFamily="34" charset="0"/>
-                <a:ea typeface="Source Sans Pro" panose="020B0503030403020204" pitchFamily="34" charset="0"/>
-              </a:rPr>
-              <a:t>mean</a:t>
-            </a:r>
-            <a:r>
-              <a:rPr lang="de-DE" sz="2400" dirty="0">
-                <a:latin typeface="Source Sans Pro" panose="020B0503030403020204" pitchFamily="34" charset="0"/>
-                <a:ea typeface="Source Sans Pro" panose="020B0503030403020204" pitchFamily="34" charset="0"/>
-              </a:rPr>
-              <a:t> shift </a:t>
-            </a:r>
-            <a:r>
-              <a:rPr lang="de-DE" sz="2400" dirty="0" err="1">
-                <a:latin typeface="Source Sans Pro" panose="020B0503030403020204" pitchFamily="34" charset="0"/>
-                <a:ea typeface="Source Sans Pro" panose="020B0503030403020204" pitchFamily="34" charset="0"/>
-              </a:rPr>
-              <a:t>exceeded</a:t>
-            </a:r>
-            <a:r>
-              <a:rPr lang="de-DE" sz="2400" dirty="0">
-                <a:latin typeface="Source Sans Pro" panose="020B0503030403020204" pitchFamily="34" charset="0"/>
-                <a:ea typeface="Source Sans Pro" panose="020B0503030403020204" pitchFamily="34" charset="0"/>
-              </a:rPr>
-              <a:t> 1. </a:t>
-            </a:r>
-          </a:p>
-          <a:p>
-            <a:pPr algn="just"/>
-            <a:endParaRPr lang="de-DE" sz="1000" dirty="0">
-              <a:latin typeface="Source Sans Pro" panose="020B0503030403020204" pitchFamily="34" charset="0"/>
-              <a:ea typeface="Source Sans Pro" panose="020B0503030403020204" pitchFamily="34" charset="0"/>
-            </a:endParaRPr>
-          </a:p>
-          <a:p>
-            <a:pPr algn="just"/>
-            <a:r>
-              <a:rPr lang="de-DE" sz="2400" dirty="0">
-                <a:latin typeface="Source Sans Pro" panose="020B0503030403020204" pitchFamily="34" charset="0"/>
-                <a:ea typeface="Source Sans Pro" panose="020B0503030403020204" pitchFamily="34" charset="0"/>
-              </a:rPr>
-              <a:t>Out </a:t>
-            </a:r>
-            <a:r>
-              <a:rPr lang="de-DE" sz="2400" dirty="0" err="1">
-                <a:latin typeface="Source Sans Pro" panose="020B0503030403020204" pitchFamily="34" charset="0"/>
-                <a:ea typeface="Source Sans Pro" panose="020B0503030403020204" pitchFamily="34" charset="0"/>
-              </a:rPr>
-              <a:t>of</a:t>
-            </a:r>
-            <a:r>
-              <a:rPr lang="de-DE" sz="2400" dirty="0">
-                <a:latin typeface="Source Sans Pro" panose="020B0503030403020204" pitchFamily="34" charset="0"/>
-                <a:ea typeface="Source Sans Pro" panose="020B0503030403020204" pitchFamily="34" charset="0"/>
-              </a:rPr>
-              <a:t> 7159 </a:t>
-            </a:r>
-            <a:r>
-              <a:rPr lang="de-DE" sz="2400" dirty="0" err="1">
+              <a:t>Out of 7159 </a:t>
+            </a:r>
+            <a:r>
+              <a:rPr lang="en-US" sz="2400" noProof="0" dirty="0" err="1">
                 <a:latin typeface="Source Sans Pro" panose="020B0503030403020204" pitchFamily="34" charset="0"/>
                 <a:ea typeface="Source Sans Pro" panose="020B0503030403020204" pitchFamily="34" charset="0"/>
               </a:rPr>
               <a:t>analysed</a:t>
             </a:r>
             <a:r>
-              <a:rPr lang="de-DE" sz="2400" dirty="0">
+              <a:rPr lang="en-US" sz="2400" noProof="0" dirty="0">
                 <a:latin typeface="Source Sans Pro" panose="020B0503030403020204" pitchFamily="34" charset="0"/>
                 <a:ea typeface="Source Sans Pro" panose="020B0503030403020204" pitchFamily="34" charset="0"/>
               </a:rPr>
               <a:t> Proteins, </a:t>
             </a:r>
             <a:r>
-              <a:rPr lang="de-DE" sz="2400" b="1" dirty="0">
+              <a:rPr lang="en-US" sz="2400" b="1" noProof="0" dirty="0">
                 <a:latin typeface="Source Sans Pro" panose="020B0503030403020204" pitchFamily="34" charset="0"/>
                 <a:ea typeface="Source Sans Pro" panose="020B0503030403020204" pitchFamily="34" charset="0"/>
               </a:rPr>
               <a:t>794 </a:t>
             </a:r>
             <a:r>
-              <a:rPr lang="de-DE" sz="2400" b="1" dirty="0" err="1">
+              <a:rPr lang="en-US" sz="2400" b="1" noProof="0" dirty="0" err="1">
                 <a:latin typeface="Source Sans Pro" panose="020B0503030403020204" pitchFamily="34" charset="0"/>
                 <a:ea typeface="Source Sans Pro" panose="020B0503030403020204" pitchFamily="34" charset="0"/>
               </a:rPr>
               <a:t>exihibited</a:t>
             </a:r>
             <a:r>
-              <a:rPr lang="de-DE" sz="2400" b="1" dirty="0">
+              <a:rPr lang="en-US" sz="2400" b="1" noProof="0" dirty="0">
                 <a:latin typeface="Source Sans Pro" panose="020B0503030403020204" pitchFamily="34" charset="0"/>
                 <a:ea typeface="Source Sans Pro" panose="020B0503030403020204" pitchFamily="34" charset="0"/>
               </a:rPr>
-              <a:t> a </a:t>
-            </a:r>
-            <a:r>
-              <a:rPr lang="de-DE" sz="2400" b="1" dirty="0" err="1">
+              <a:t> a significant shift  </a:t>
+            </a:r>
+            <a:r>
+              <a:rPr lang="en-US" sz="2400" noProof="0" dirty="0">
                 <a:latin typeface="Source Sans Pro" panose="020B0503030403020204" pitchFamily="34" charset="0"/>
                 <a:ea typeface="Source Sans Pro" panose="020B0503030403020204" pitchFamily="34" charset="0"/>
               </a:rPr>
-              <a:t>significant</a:t>
-            </a:r>
-            <a:r>
-              <a:rPr lang="de-DE" sz="2400" b="1" dirty="0">
-                <a:latin typeface="Source Sans Pro" panose="020B0503030403020204" pitchFamily="34" charset="0"/>
-                <a:ea typeface="Source Sans Pro" panose="020B0503030403020204" pitchFamily="34" charset="0"/>
-              </a:rPr>
-              <a:t> shift  </a:t>
-            </a:r>
-            <a:r>
-              <a:rPr lang="de-DE" sz="2400" dirty="0">
-                <a:latin typeface="Source Sans Pro" panose="020B0503030403020204" pitchFamily="34" charset="0"/>
-                <a:ea typeface="Source Sans Pro" panose="020B0503030403020204" pitchFamily="34" charset="0"/>
-              </a:rPr>
-              <a:t>and </a:t>
-            </a:r>
-            <a:r>
-              <a:rPr lang="de-DE" sz="2400" dirty="0" err="1">
-                <a:latin typeface="Source Sans Pro" panose="020B0503030403020204" pitchFamily="34" charset="0"/>
-                <a:ea typeface="Source Sans Pro" panose="020B0503030403020204" pitchFamily="34" charset="0"/>
-              </a:rPr>
-              <a:t>where</a:t>
-            </a:r>
-            <a:r>
-              <a:rPr lang="de-DE" sz="2400" dirty="0">
-                <a:latin typeface="Source Sans Pro" panose="020B0503030403020204" pitchFamily="34" charset="0"/>
-                <a:ea typeface="Source Sans Pro" panose="020B0503030403020204" pitchFamily="34" charset="0"/>
-              </a:rPr>
-              <a:t> </a:t>
-            </a:r>
-            <a:r>
-              <a:rPr lang="de-DE" sz="2400" dirty="0" err="1">
-                <a:latin typeface="Source Sans Pro" panose="020B0503030403020204" pitchFamily="34" charset="0"/>
-                <a:ea typeface="Source Sans Pro" panose="020B0503030403020204" pitchFamily="34" charset="0"/>
-              </a:rPr>
-              <a:t>classified</a:t>
-            </a:r>
-            <a:r>
-              <a:rPr lang="de-DE" sz="2400" dirty="0">
-                <a:latin typeface="Source Sans Pro" panose="020B0503030403020204" pitchFamily="34" charset="0"/>
-                <a:ea typeface="Source Sans Pro" panose="020B0503030403020204" pitchFamily="34" charset="0"/>
-              </a:rPr>
-              <a:t> </a:t>
-            </a:r>
-            <a:r>
-              <a:rPr lang="de-DE" sz="2400" dirty="0" err="1">
-                <a:latin typeface="Source Sans Pro" panose="020B0503030403020204" pitchFamily="34" charset="0"/>
-                <a:ea typeface="Source Sans Pro" panose="020B0503030403020204" pitchFamily="34" charset="0"/>
-              </a:rPr>
-              <a:t>as</a:t>
-            </a:r>
-            <a:r>
-              <a:rPr lang="de-DE" sz="2400" dirty="0">
-                <a:latin typeface="Source Sans Pro" panose="020B0503030403020204" pitchFamily="34" charset="0"/>
-                <a:ea typeface="Source Sans Pro" panose="020B0503030403020204" pitchFamily="34" charset="0"/>
-              </a:rPr>
-              <a:t> RBPs. </a:t>
+              <a:t>and where classified as RBPs. </a:t>
             </a:r>
           </a:p>
           <a:p>
             <a:pPr algn="just"/>
-            <a:endParaRPr lang="de-DE" sz="2400" dirty="0">
+            <a:endParaRPr lang="en-US" sz="2400" noProof="0" dirty="0">
               <a:latin typeface="Source Sans Pro" panose="020B0503030403020204" pitchFamily="34" charset="0"/>
               <a:ea typeface="Source Sans Pro" panose="020B0503030403020204" pitchFamily="34" charset="0"/>
             </a:endParaRPr>
           </a:p>
           <a:p>
-            <a:endParaRPr lang="en-US" dirty="0"/>
+            <a:endParaRPr lang="en-US" noProof="0" dirty="0"/>
           </a:p>
         </p:txBody>
       </p:sp>
@@ -9357,7 +8332,7 @@
         </p:nvSpPr>
         <p:spPr>
           <a:xfrm>
-            <a:off x="10202964" y="20184847"/>
+            <a:off x="10205042" y="21096358"/>
             <a:ext cx="4488326" cy="646331"/>
           </a:xfrm>
           <a:prstGeom prst="rect">
@@ -9373,233 +8348,40 @@
           <a:p>
             <a:pPr algn="just"/>
             <a:r>
-              <a:rPr lang="de-DE" sz="1200" b="1" i="1" dirty="0">
+              <a:rPr lang="en-US" sz="1200" b="1" i="1" dirty="0">
                 <a:latin typeface="Source Sans Pro" panose="020B0503030403020204" pitchFamily="34" charset="0"/>
                 <a:ea typeface="Source Sans Pro" panose="020B0503030403020204" pitchFamily="34" charset="0"/>
               </a:rPr>
-              <a:t>Abb. X </a:t>
-            </a:r>
-            <a:r>
-              <a:rPr lang="de-DE" sz="1200" b="1" i="1" dirty="0" err="1">
+              <a:t>Fig</a:t>
+            </a:r>
+            <a:r>
+              <a:rPr lang="en-US" sz="1200" b="1" i="1" noProof="0" dirty="0">
                 <a:latin typeface="Source Sans Pro" panose="020B0503030403020204" pitchFamily="34" charset="0"/>
                 <a:ea typeface="Source Sans Pro" panose="020B0503030403020204" pitchFamily="34" charset="0"/>
               </a:rPr>
-              <a:t>Results</a:t>
-            </a:r>
-            <a:r>
-              <a:rPr lang="de-DE" sz="1200" b="1" i="1" dirty="0">
-                <a:latin typeface="Source Sans Pro" panose="020B0503030403020204" pitchFamily="34" charset="0"/>
-                <a:ea typeface="Source Sans Pro" panose="020B0503030403020204" pitchFamily="34" charset="0"/>
-              </a:rPr>
-              <a:t> and </a:t>
-            </a:r>
-            <a:r>
-              <a:rPr lang="de-DE" sz="1200" b="1" i="1" dirty="0" err="1">
-                <a:latin typeface="Source Sans Pro" panose="020B0503030403020204" pitchFamily="34" charset="0"/>
-                <a:ea typeface="Source Sans Pro" panose="020B0503030403020204" pitchFamily="34" charset="0"/>
-              </a:rPr>
-              <a:t>Limitations</a:t>
-            </a:r>
-            <a:r>
-              <a:rPr lang="de-DE" sz="1200" b="1" i="1" dirty="0">
-                <a:latin typeface="Source Sans Pro" panose="020B0503030403020204" pitchFamily="34" charset="0"/>
-                <a:ea typeface="Source Sans Pro" panose="020B0503030403020204" pitchFamily="34" charset="0"/>
-              </a:rPr>
-              <a:t> </a:t>
-            </a:r>
-            <a:r>
-              <a:rPr lang="de-DE" sz="1200" b="1" i="1" dirty="0" err="1">
-                <a:latin typeface="Source Sans Pro" panose="020B0503030403020204" pitchFamily="34" charset="0"/>
-                <a:ea typeface="Source Sans Pro" panose="020B0503030403020204" pitchFamily="34" charset="0"/>
-              </a:rPr>
-              <a:t>of</a:t>
-            </a:r>
-            <a:r>
-              <a:rPr lang="de-DE" sz="1200" b="1" i="1" dirty="0">
-                <a:latin typeface="Source Sans Pro" panose="020B0503030403020204" pitchFamily="34" charset="0"/>
-                <a:ea typeface="Source Sans Pro" panose="020B0503030403020204" pitchFamily="34" charset="0"/>
-              </a:rPr>
-              <a:t> Shift </a:t>
-            </a:r>
-            <a:r>
-              <a:rPr lang="de-DE" sz="1200" b="1" i="1" dirty="0" err="1">
+              <a:t>. X Results and Limitations of Shift </a:t>
+            </a:r>
+            <a:r>
+              <a:rPr lang="en-US" sz="1200" b="1" i="1" noProof="0" dirty="0" err="1">
                 <a:latin typeface="Source Sans Pro" panose="020B0503030403020204" pitchFamily="34" charset="0"/>
                 <a:ea typeface="Source Sans Pro" panose="020B0503030403020204" pitchFamily="34" charset="0"/>
               </a:rPr>
               <a:t>Sginificance</a:t>
             </a:r>
             <a:r>
-              <a:rPr lang="de-DE" sz="1200" b="1" i="1" dirty="0">
+              <a:rPr lang="en-US" sz="1200" b="1" i="1" noProof="0" dirty="0">
                 <a:latin typeface="Source Sans Pro" panose="020B0503030403020204" pitchFamily="34" charset="0"/>
                 <a:ea typeface="Source Sans Pro" panose="020B0503030403020204" pitchFamily="34" charset="0"/>
               </a:rPr>
-              <a:t> </a:t>
-            </a:r>
-            <a:r>
-              <a:rPr lang="de-DE" sz="1200" b="1" i="1" dirty="0" err="1">
+              <a:t> Testing: </a:t>
+            </a:r>
+            <a:r>
+              <a:rPr lang="en-US" sz="1200" i="1" noProof="0" dirty="0">
                 <a:latin typeface="Source Sans Pro" panose="020B0503030403020204" pitchFamily="34" charset="0"/>
                 <a:ea typeface="Source Sans Pro" panose="020B0503030403020204" pitchFamily="34" charset="0"/>
               </a:rPr>
-              <a:t>Testing</a:t>
-            </a:r>
-            <a:r>
-              <a:rPr lang="de-DE" sz="1200" b="1" i="1" dirty="0">
-                <a:latin typeface="Source Sans Pro" panose="020B0503030403020204" pitchFamily="34" charset="0"/>
-                <a:ea typeface="Source Sans Pro" panose="020B0503030403020204" pitchFamily="34" charset="0"/>
-              </a:rPr>
-              <a:t>: </a:t>
-            </a:r>
-            <a:r>
-              <a:rPr lang="de-DE" sz="1200" i="1" dirty="0">
-                <a:latin typeface="Source Sans Pro" panose="020B0503030403020204" pitchFamily="34" charset="0"/>
-                <a:ea typeface="Source Sans Pro" panose="020B0503030403020204" pitchFamily="34" charset="0"/>
-              </a:rPr>
-              <a:t>Outcome </a:t>
-            </a:r>
-            <a:r>
-              <a:rPr lang="de-DE" sz="1200" i="1" dirty="0" err="1">
-                <a:latin typeface="Source Sans Pro" panose="020B0503030403020204" pitchFamily="34" charset="0"/>
-                <a:ea typeface="Source Sans Pro" panose="020B0503030403020204" pitchFamily="34" charset="0"/>
-              </a:rPr>
-              <a:t>of</a:t>
-            </a:r>
-            <a:r>
-              <a:rPr lang="de-DE" sz="1200" i="1" dirty="0">
-                <a:latin typeface="Source Sans Pro" panose="020B0503030403020204" pitchFamily="34" charset="0"/>
-                <a:ea typeface="Source Sans Pro" panose="020B0503030403020204" pitchFamily="34" charset="0"/>
-              </a:rPr>
-              <a:t> t-test and </a:t>
-            </a:r>
-            <a:r>
-              <a:rPr lang="de-DE" sz="1200" i="1" dirty="0" err="1">
-                <a:latin typeface="Source Sans Pro" panose="020B0503030403020204" pitchFamily="34" charset="0"/>
-                <a:ea typeface="Source Sans Pro" panose="020B0503030403020204" pitchFamily="34" charset="0"/>
-              </a:rPr>
-              <a:t>pipeline</a:t>
-            </a:r>
-            <a:r>
-              <a:rPr lang="de-DE" sz="1200" i="1" dirty="0">
-                <a:latin typeface="Source Sans Pro" panose="020B0503030403020204" pitchFamily="34" charset="0"/>
-                <a:ea typeface="Source Sans Pro" panose="020B0503030403020204" pitchFamily="34" charset="0"/>
-              </a:rPr>
-              <a:t> </a:t>
-            </a:r>
-            <a:r>
-              <a:rPr lang="de-DE" sz="1200" i="1" dirty="0" err="1">
-                <a:latin typeface="Source Sans Pro" panose="020B0503030403020204" pitchFamily="34" charset="0"/>
-                <a:ea typeface="Source Sans Pro" panose="020B0503030403020204" pitchFamily="34" charset="0"/>
-              </a:rPr>
-              <a:t>evaluation</a:t>
-            </a:r>
-            <a:r>
-              <a:rPr lang="de-DE" sz="1200" i="1" dirty="0">
-                <a:latin typeface="Source Sans Pro" panose="020B0503030403020204" pitchFamily="34" charset="0"/>
-                <a:ea typeface="Source Sans Pro" panose="020B0503030403020204" pitchFamily="34" charset="0"/>
-              </a:rPr>
-              <a:t> </a:t>
-            </a:r>
-            <a:r>
-              <a:rPr lang="de-DE" sz="1200" i="1" dirty="0" err="1">
-                <a:latin typeface="Source Sans Pro" panose="020B0503030403020204" pitchFamily="34" charset="0"/>
-                <a:ea typeface="Source Sans Pro" panose="020B0503030403020204" pitchFamily="34" charset="0"/>
-              </a:rPr>
-              <a:t>for</a:t>
-            </a:r>
-            <a:r>
-              <a:rPr lang="de-DE" sz="1200" i="1" dirty="0">
-                <a:latin typeface="Source Sans Pro" panose="020B0503030403020204" pitchFamily="34" charset="0"/>
-                <a:ea typeface="Source Sans Pro" panose="020B0503030403020204" pitchFamily="34" charset="0"/>
-              </a:rPr>
-              <a:t> all </a:t>
-            </a:r>
-            <a:r>
-              <a:rPr lang="de-DE" sz="1200" i="1" dirty="0" err="1">
-                <a:latin typeface="Source Sans Pro" panose="020B0503030403020204" pitchFamily="34" charset="0"/>
-                <a:ea typeface="Source Sans Pro" panose="020B0503030403020204" pitchFamily="34" charset="0"/>
-              </a:rPr>
-              <a:t>proteins</a:t>
-            </a:r>
-            <a:r>
-              <a:rPr lang="de-DE" sz="1200" i="1" dirty="0">
-                <a:latin typeface="Source Sans Pro" panose="020B0503030403020204" pitchFamily="34" charset="0"/>
-                <a:ea typeface="Source Sans Pro" panose="020B0503030403020204" pitchFamily="34" charset="0"/>
-              </a:rPr>
-              <a:t>, </a:t>
-            </a:r>
-            <a:r>
-              <a:rPr lang="de-DE" sz="1200" i="1" dirty="0" err="1">
-                <a:latin typeface="Source Sans Pro" panose="020B0503030403020204" pitchFamily="34" charset="0"/>
-                <a:ea typeface="Source Sans Pro" panose="020B0503030403020204" pitchFamily="34" charset="0"/>
-              </a:rPr>
-              <a:t>with</a:t>
-            </a:r>
-            <a:r>
-              <a:rPr lang="de-DE" sz="1200" i="1" dirty="0">
-                <a:latin typeface="Source Sans Pro" panose="020B0503030403020204" pitchFamily="34" charset="0"/>
-                <a:ea typeface="Source Sans Pro" panose="020B0503030403020204" pitchFamily="34" charset="0"/>
-              </a:rPr>
-              <a:t> </a:t>
-            </a:r>
-            <a:r>
-              <a:rPr lang="de-DE" sz="1200" i="1" dirty="0" err="1">
-                <a:latin typeface="Source Sans Pro" panose="020B0503030403020204" pitchFamily="34" charset="0"/>
-                <a:ea typeface="Source Sans Pro" panose="020B0503030403020204" pitchFamily="34" charset="0"/>
-              </a:rPr>
-              <a:t>representation</a:t>
-            </a:r>
-            <a:r>
-              <a:rPr lang="de-DE" sz="1200" i="1" dirty="0">
-                <a:latin typeface="Source Sans Pro" panose="020B0503030403020204" pitchFamily="34" charset="0"/>
-                <a:ea typeface="Source Sans Pro" panose="020B0503030403020204" pitchFamily="34" charset="0"/>
-              </a:rPr>
-              <a:t> </a:t>
-            </a:r>
-            <a:r>
-              <a:rPr lang="de-DE" sz="1200" i="1" dirty="0" err="1">
-                <a:latin typeface="Source Sans Pro" panose="020B0503030403020204" pitchFamily="34" charset="0"/>
-                <a:ea typeface="Source Sans Pro" panose="020B0503030403020204" pitchFamily="34" charset="0"/>
-              </a:rPr>
-              <a:t>of</a:t>
-            </a:r>
-            <a:r>
-              <a:rPr lang="de-DE" sz="1200" i="1" dirty="0">
-                <a:latin typeface="Source Sans Pro" panose="020B0503030403020204" pitchFamily="34" charset="0"/>
-                <a:ea typeface="Source Sans Pro" panose="020B0503030403020204" pitchFamily="34" charset="0"/>
-              </a:rPr>
-              <a:t> all </a:t>
-            </a:r>
-            <a:r>
-              <a:rPr lang="de-DE" sz="1200" i="1" dirty="0" err="1">
-                <a:latin typeface="Source Sans Pro" panose="020B0503030403020204" pitchFamily="34" charset="0"/>
-                <a:ea typeface="Source Sans Pro" panose="020B0503030403020204" pitchFamily="34" charset="0"/>
-              </a:rPr>
-              <a:t>excluded</a:t>
-            </a:r>
-            <a:r>
-              <a:rPr lang="de-DE" sz="1200" i="1" dirty="0">
-                <a:latin typeface="Source Sans Pro" panose="020B0503030403020204" pitchFamily="34" charset="0"/>
-                <a:ea typeface="Source Sans Pro" panose="020B0503030403020204" pitchFamily="34" charset="0"/>
-              </a:rPr>
-              <a:t> </a:t>
-            </a:r>
-            <a:r>
-              <a:rPr lang="de-DE" sz="1200" i="1" dirty="0" err="1">
-                <a:latin typeface="Source Sans Pro" panose="020B0503030403020204" pitchFamily="34" charset="0"/>
-                <a:ea typeface="Source Sans Pro" panose="020B0503030403020204" pitchFamily="34" charset="0"/>
-              </a:rPr>
-              <a:t>proteins</a:t>
-            </a:r>
-            <a:r>
-              <a:rPr lang="de-DE" sz="1200" i="1" dirty="0">
-                <a:latin typeface="Source Sans Pro" panose="020B0503030403020204" pitchFamily="34" charset="0"/>
-                <a:ea typeface="Source Sans Pro" panose="020B0503030403020204" pitchFamily="34" charset="0"/>
-              </a:rPr>
-              <a:t>. </a:t>
-            </a:r>
-            <a:endParaRPr lang="en-US" sz="1200" i="1" dirty="0">
-              <a:latin typeface="Source Sans Pro" panose="020B0503030403020204" pitchFamily="34" charset="0"/>
-              <a:ea typeface="Source Sans Pro" panose="020B0503030403020204" pitchFamily="34" charset="0"/>
-            </a:endParaRPr>
+              <a:t>Outcome of t-test and pipeline evaluation for all proteins, with representation of all excluded proteins. </a:t>
+            </a:r>
           </a:p>
         </p:txBody>
       </p:sp>
@@ -9617,7 +8399,7 @@
         </p:nvSpPr>
         <p:spPr>
           <a:xfrm>
-            <a:off x="8408304" y="15749398"/>
+            <a:off x="8478844" y="16779116"/>
             <a:ext cx="6282985" cy="461665"/>
           </a:xfrm>
           <a:prstGeom prst="rect">
@@ -9632,300 +8414,359 @@
           <a:lstStyle/>
           <a:p>
             <a:r>
-              <a:rPr lang="de-DE" sz="1200" b="1" i="1" dirty="0">
+              <a:rPr lang="en-US" sz="1200" b="1" i="1" dirty="0">
                 <a:latin typeface="Source Sans Pro" panose="020B0503030403020204" pitchFamily="34" charset="0"/>
                 <a:ea typeface="Source Sans Pro" panose="020B0503030403020204" pitchFamily="34" charset="0"/>
               </a:rPr>
-              <a:t>Abb. X  </a:t>
-            </a:r>
-            <a:r>
-              <a:rPr lang="de-DE" sz="1200" b="1" i="1" dirty="0" err="1">
+              <a:t>Fig</a:t>
+            </a:r>
+            <a:r>
+              <a:rPr lang="en-US" sz="1200" b="1" i="1" noProof="0" dirty="0">
                 <a:latin typeface="Source Sans Pro" panose="020B0503030403020204" pitchFamily="34" charset="0"/>
                 <a:ea typeface="Source Sans Pro" panose="020B0503030403020204" pitchFamily="34" charset="0"/>
               </a:rPr>
-              <a:t>Intensity</a:t>
-            </a:r>
-            <a:r>
-              <a:rPr lang="de-DE" sz="1200" b="1" i="1" dirty="0">
+              <a:t>. X  Intensity profile of RS6 : </a:t>
+            </a:r>
+            <a:r>
+              <a:rPr lang="en-US" sz="1200" i="1" noProof="0" dirty="0">
                 <a:latin typeface="Source Sans Pro" panose="020B0503030403020204" pitchFamily="34" charset="0"/>
                 <a:ea typeface="Source Sans Pro" panose="020B0503030403020204" pitchFamily="34" charset="0"/>
               </a:rPr>
-              <a:t> </a:t>
-            </a:r>
-            <a:r>
-              <a:rPr lang="de-DE" sz="1200" b="1" i="1" dirty="0" err="1">
-                <a:latin typeface="Source Sans Pro" panose="020B0503030403020204" pitchFamily="34" charset="0"/>
-                <a:ea typeface="Source Sans Pro" panose="020B0503030403020204" pitchFamily="34" charset="0"/>
-              </a:rPr>
-              <a:t>profile</a:t>
-            </a:r>
-            <a:r>
-              <a:rPr lang="de-DE" sz="1200" b="1" i="1" dirty="0">
-                <a:latin typeface="Source Sans Pro" panose="020B0503030403020204" pitchFamily="34" charset="0"/>
-                <a:ea typeface="Source Sans Pro" panose="020B0503030403020204" pitchFamily="34" charset="0"/>
-              </a:rPr>
-              <a:t> </a:t>
-            </a:r>
-            <a:r>
-              <a:rPr lang="de-DE" sz="1200" b="1" i="1" dirty="0" err="1">
-                <a:latin typeface="Source Sans Pro" panose="020B0503030403020204" pitchFamily="34" charset="0"/>
-                <a:ea typeface="Source Sans Pro" panose="020B0503030403020204" pitchFamily="34" charset="0"/>
-              </a:rPr>
-              <a:t>of</a:t>
-            </a:r>
-            <a:r>
-              <a:rPr lang="de-DE" sz="1200" b="1" i="1" dirty="0">
-                <a:latin typeface="Source Sans Pro" panose="020B0503030403020204" pitchFamily="34" charset="0"/>
-                <a:ea typeface="Source Sans Pro" panose="020B0503030403020204" pitchFamily="34" charset="0"/>
-              </a:rPr>
-              <a:t> RS6 : </a:t>
-            </a:r>
-            <a:r>
-              <a:rPr lang="de-DE" sz="1200" i="1" dirty="0">
-                <a:latin typeface="Source Sans Pro" panose="020B0503030403020204" pitchFamily="34" charset="0"/>
-                <a:ea typeface="Source Sans Pro" panose="020B0503030403020204" pitchFamily="34" charset="0"/>
-              </a:rPr>
-              <a:t>Plot </a:t>
-            </a:r>
-            <a:r>
-              <a:rPr lang="de-DE" sz="1200" i="1" dirty="0" err="1">
-                <a:latin typeface="Source Sans Pro" panose="020B0503030403020204" pitchFamily="34" charset="0"/>
-                <a:ea typeface="Source Sans Pro" panose="020B0503030403020204" pitchFamily="34" charset="0"/>
-              </a:rPr>
-              <a:t>shows</a:t>
-            </a:r>
-            <a:r>
-              <a:rPr lang="de-DE" sz="1200" i="1" dirty="0">
-                <a:latin typeface="Source Sans Pro" panose="020B0503030403020204" pitchFamily="34" charset="0"/>
-                <a:ea typeface="Source Sans Pro" panose="020B0503030403020204" pitchFamily="34" charset="0"/>
-              </a:rPr>
-              <a:t> </a:t>
-            </a:r>
-            <a:r>
-              <a:rPr lang="de-DE" sz="1200" i="1" dirty="0" err="1">
-                <a:latin typeface="Source Sans Pro" panose="020B0503030403020204" pitchFamily="34" charset="0"/>
-                <a:ea typeface="Source Sans Pro" panose="020B0503030403020204" pitchFamily="34" charset="0"/>
-              </a:rPr>
-              <a:t>normalized</a:t>
-            </a:r>
-            <a:r>
-              <a:rPr lang="de-DE" sz="1200" i="1" dirty="0">
-                <a:latin typeface="Source Sans Pro" panose="020B0503030403020204" pitchFamily="34" charset="0"/>
-                <a:ea typeface="Source Sans Pro" panose="020B0503030403020204" pitchFamily="34" charset="0"/>
-              </a:rPr>
-              <a:t> </a:t>
-            </a:r>
-            <a:r>
-              <a:rPr lang="de-DE" sz="1200" i="1" dirty="0" err="1">
-                <a:latin typeface="Source Sans Pro" panose="020B0503030403020204" pitchFamily="34" charset="0"/>
-                <a:ea typeface="Source Sans Pro" panose="020B0503030403020204" pitchFamily="34" charset="0"/>
-              </a:rPr>
-              <a:t>signal</a:t>
-            </a:r>
-            <a:r>
-              <a:rPr lang="de-DE" sz="1200" i="1" dirty="0">
-                <a:latin typeface="Source Sans Pro" panose="020B0503030403020204" pitchFamily="34" charset="0"/>
-                <a:ea typeface="Source Sans Pro" panose="020B0503030403020204" pitchFamily="34" charset="0"/>
-              </a:rPr>
-              <a:t> </a:t>
-            </a:r>
-            <a:r>
-              <a:rPr lang="de-DE" sz="1200" i="1" dirty="0" err="1">
-                <a:latin typeface="Source Sans Pro" panose="020B0503030403020204" pitchFamily="34" charset="0"/>
-                <a:ea typeface="Source Sans Pro" panose="020B0503030403020204" pitchFamily="34" charset="0"/>
-              </a:rPr>
-              <a:t>distributions</a:t>
-            </a:r>
-            <a:r>
-              <a:rPr lang="de-DE" sz="1200" i="1" dirty="0">
-                <a:latin typeface="Source Sans Pro" panose="020B0503030403020204" pitchFamily="34" charset="0"/>
-                <a:ea typeface="Source Sans Pro" panose="020B0503030403020204" pitchFamily="34" charset="0"/>
-              </a:rPr>
-              <a:t> </a:t>
-            </a:r>
-            <a:r>
-              <a:rPr lang="de-DE" sz="1200" i="1" dirty="0" err="1">
-                <a:latin typeface="Source Sans Pro" panose="020B0503030403020204" pitchFamily="34" charset="0"/>
-                <a:ea typeface="Source Sans Pro" panose="020B0503030403020204" pitchFamily="34" charset="0"/>
-              </a:rPr>
-              <a:t>as</a:t>
-            </a:r>
-            <a:r>
-              <a:rPr lang="de-DE" sz="1200" i="1" dirty="0">
-                <a:latin typeface="Source Sans Pro" panose="020B0503030403020204" pitchFamily="34" charset="0"/>
-                <a:ea typeface="Source Sans Pro" panose="020B0503030403020204" pitchFamily="34" charset="0"/>
-              </a:rPr>
-              <a:t> </a:t>
-            </a:r>
-            <a:r>
-              <a:rPr lang="de-DE" sz="1200" i="1" dirty="0" err="1">
-                <a:latin typeface="Source Sans Pro" panose="020B0503030403020204" pitchFamily="34" charset="0"/>
-                <a:ea typeface="Source Sans Pro" panose="020B0503030403020204" pitchFamily="34" charset="0"/>
-              </a:rPr>
-              <a:t>well</a:t>
-            </a:r>
-            <a:r>
-              <a:rPr lang="de-DE" sz="1200" i="1" dirty="0">
-                <a:latin typeface="Source Sans Pro" panose="020B0503030403020204" pitchFamily="34" charset="0"/>
-                <a:ea typeface="Source Sans Pro" panose="020B0503030403020204" pitchFamily="34" charset="0"/>
-              </a:rPr>
-              <a:t> </a:t>
-            </a:r>
-            <a:r>
-              <a:rPr lang="de-DE" sz="1200" i="1" dirty="0" err="1">
-                <a:latin typeface="Source Sans Pro" panose="020B0503030403020204" pitchFamily="34" charset="0"/>
-                <a:ea typeface="Source Sans Pro" panose="020B0503030403020204" pitchFamily="34" charset="0"/>
-              </a:rPr>
-              <a:t>as</a:t>
-            </a:r>
-            <a:r>
-              <a:rPr lang="de-DE" sz="1200" i="1" dirty="0">
-                <a:latin typeface="Source Sans Pro" panose="020B0503030403020204" pitchFamily="34" charset="0"/>
-                <a:ea typeface="Source Sans Pro" panose="020B0503030403020204" pitchFamily="34" charset="0"/>
-              </a:rPr>
-              <a:t> </a:t>
-            </a:r>
-            <a:r>
-              <a:rPr lang="de-DE" sz="1200" i="1" dirty="0" err="1">
-                <a:latin typeface="Source Sans Pro" panose="020B0503030403020204" pitchFamily="34" charset="0"/>
-                <a:ea typeface="Source Sans Pro" panose="020B0503030403020204" pitchFamily="34" charset="0"/>
-              </a:rPr>
-              <a:t>extracted</a:t>
-            </a:r>
-            <a:r>
-              <a:rPr lang="de-DE" sz="1200" i="1" dirty="0">
-                <a:latin typeface="Source Sans Pro" panose="020B0503030403020204" pitchFamily="34" charset="0"/>
-                <a:ea typeface="Source Sans Pro" panose="020B0503030403020204" pitchFamily="34" charset="0"/>
-              </a:rPr>
-              <a:t> </a:t>
-            </a:r>
-            <a:r>
-              <a:rPr lang="de-DE" sz="1200" i="1" dirty="0" err="1">
-                <a:latin typeface="Source Sans Pro" panose="020B0503030403020204" pitchFamily="34" charset="0"/>
-                <a:ea typeface="Source Sans Pro" panose="020B0503030403020204" pitchFamily="34" charset="0"/>
-              </a:rPr>
-              <a:t>descriptive</a:t>
-            </a:r>
-            <a:r>
-              <a:rPr lang="de-DE" sz="1200" i="1" dirty="0">
-                <a:latin typeface="Source Sans Pro" panose="020B0503030403020204" pitchFamily="34" charset="0"/>
-                <a:ea typeface="Source Sans Pro" panose="020B0503030403020204" pitchFamily="34" charset="0"/>
-              </a:rPr>
-              <a:t> </a:t>
-            </a:r>
-            <a:r>
-              <a:rPr lang="de-DE" sz="1200" i="1" dirty="0" err="1">
-                <a:latin typeface="Source Sans Pro" panose="020B0503030403020204" pitchFamily="34" charset="0"/>
-                <a:ea typeface="Source Sans Pro" panose="020B0503030403020204" pitchFamily="34" charset="0"/>
-              </a:rPr>
-              <a:t>parameters</a:t>
-            </a:r>
-            <a:r>
-              <a:rPr lang="de-DE" sz="1200" i="1" dirty="0">
-                <a:latin typeface="Source Sans Pro" panose="020B0503030403020204" pitchFamily="34" charset="0"/>
-                <a:ea typeface="Source Sans Pro" panose="020B0503030403020204" pitchFamily="34" charset="0"/>
-              </a:rPr>
-              <a:t> such </a:t>
-            </a:r>
-            <a:r>
-              <a:rPr lang="de-DE" sz="1200" i="1" dirty="0" err="1">
-                <a:latin typeface="Source Sans Pro" panose="020B0503030403020204" pitchFamily="34" charset="0"/>
-                <a:ea typeface="Source Sans Pro" panose="020B0503030403020204" pitchFamily="34" charset="0"/>
-              </a:rPr>
-              <a:t>as</a:t>
-            </a:r>
-            <a:r>
-              <a:rPr lang="de-DE" sz="1200" i="1" dirty="0">
-                <a:latin typeface="Source Sans Pro" panose="020B0503030403020204" pitchFamily="34" charset="0"/>
-                <a:ea typeface="Source Sans Pro" panose="020B0503030403020204" pitchFamily="34" charset="0"/>
-              </a:rPr>
-              <a:t> </a:t>
-            </a:r>
-            <a:r>
-              <a:rPr lang="de-DE" sz="1200" i="1" dirty="0" err="1">
-                <a:latin typeface="Source Sans Pro" panose="020B0503030403020204" pitchFamily="34" charset="0"/>
-                <a:ea typeface="Source Sans Pro" panose="020B0503030403020204" pitchFamily="34" charset="0"/>
-              </a:rPr>
-              <a:t>peak</a:t>
-            </a:r>
-            <a:r>
-              <a:rPr lang="de-DE" sz="1200" i="1" dirty="0">
-                <a:latin typeface="Source Sans Pro" panose="020B0503030403020204" pitchFamily="34" charset="0"/>
-                <a:ea typeface="Source Sans Pro" panose="020B0503030403020204" pitchFamily="34" charset="0"/>
-              </a:rPr>
-              <a:t> </a:t>
-            </a:r>
-            <a:r>
-              <a:rPr lang="de-DE" sz="1200" i="1" dirty="0" err="1">
-                <a:latin typeface="Source Sans Pro" panose="020B0503030403020204" pitchFamily="34" charset="0"/>
-                <a:ea typeface="Source Sans Pro" panose="020B0503030403020204" pitchFamily="34" charset="0"/>
-              </a:rPr>
-              <a:t>positions</a:t>
-            </a:r>
-            <a:r>
-              <a:rPr lang="de-DE" sz="1200" i="1" dirty="0">
-                <a:latin typeface="Source Sans Pro" panose="020B0503030403020204" pitchFamily="34" charset="0"/>
-                <a:ea typeface="Source Sans Pro" panose="020B0503030403020204" pitchFamily="34" charset="0"/>
-              </a:rPr>
-              <a:t>, </a:t>
-            </a:r>
-            <a:r>
-              <a:rPr lang="de-DE" sz="1200" i="1" dirty="0" err="1">
-                <a:latin typeface="Source Sans Pro" panose="020B0503030403020204" pitchFamily="34" charset="0"/>
-                <a:ea typeface="Source Sans Pro" panose="020B0503030403020204" pitchFamily="34" charset="0"/>
-              </a:rPr>
-              <a:t>peak</a:t>
-            </a:r>
-            <a:r>
-              <a:rPr lang="de-DE" sz="1200" i="1" dirty="0">
-                <a:latin typeface="Source Sans Pro" panose="020B0503030403020204" pitchFamily="34" charset="0"/>
-                <a:ea typeface="Source Sans Pro" panose="020B0503030403020204" pitchFamily="34" charset="0"/>
-              </a:rPr>
-              <a:t> </a:t>
-            </a:r>
-            <a:r>
-              <a:rPr lang="de-DE" sz="1200" i="1" dirty="0" err="1">
-                <a:latin typeface="Source Sans Pro" panose="020B0503030403020204" pitchFamily="34" charset="0"/>
-                <a:ea typeface="Source Sans Pro" panose="020B0503030403020204" pitchFamily="34" charset="0"/>
-              </a:rPr>
-              <a:t>heights</a:t>
-            </a:r>
-            <a:r>
-              <a:rPr lang="de-DE" sz="1200" i="1" dirty="0">
-                <a:latin typeface="Source Sans Pro" panose="020B0503030403020204" pitchFamily="34" charset="0"/>
-                <a:ea typeface="Source Sans Pro" panose="020B0503030403020204" pitchFamily="34" charset="0"/>
-              </a:rPr>
-              <a:t>, and shift </a:t>
-            </a:r>
-            <a:r>
-              <a:rPr lang="de-DE" sz="1200" i="1" dirty="0" err="1">
-                <a:latin typeface="Source Sans Pro" panose="020B0503030403020204" pitchFamily="34" charset="0"/>
-                <a:ea typeface="Source Sans Pro" panose="020B0503030403020204" pitchFamily="34" charset="0"/>
-              </a:rPr>
-              <a:t>distance</a:t>
-            </a:r>
-            <a:r>
-              <a:rPr lang="de-DE" sz="1200" i="1" dirty="0">
-                <a:latin typeface="Source Sans Pro" panose="020B0503030403020204" pitchFamily="34" charset="0"/>
-                <a:ea typeface="Source Sans Pro" panose="020B0503030403020204" pitchFamily="34" charset="0"/>
-              </a:rPr>
-              <a:t>, t-test </a:t>
-            </a:r>
-            <a:r>
-              <a:rPr lang="de-DE" sz="1200" i="1" dirty="0" err="1">
+              <a:t>Plot shows normalized signal distributions as well as extracted descriptive parameters such as peak positions, peak heights, and shift distance, t-test </a:t>
+            </a:r>
+            <a:r>
+              <a:rPr lang="en-US" sz="1200" i="1" noProof="0" dirty="0" err="1">
                 <a:latin typeface="Source Sans Pro" panose="020B0503030403020204" pitchFamily="34" charset="0"/>
                 <a:ea typeface="Source Sans Pro" panose="020B0503030403020204" pitchFamily="34" charset="0"/>
               </a:rPr>
               <a:t>rsults</a:t>
             </a:r>
             <a:r>
-              <a:rPr lang="de-DE" sz="1200" i="1" dirty="0">
+              <a:rPr lang="en-US" sz="1200" i="1" noProof="0" dirty="0">
                 <a:latin typeface="Source Sans Pro" panose="020B0503030403020204" pitchFamily="34" charset="0"/>
                 <a:ea typeface="Source Sans Pro" panose="020B0503030403020204" pitchFamily="34" charset="0"/>
               </a:rPr>
               <a:t>, etc. </a:t>
             </a:r>
-            <a:endParaRPr lang="en-US" sz="1200" i="1" dirty="0">
+          </a:p>
+        </p:txBody>
+      </p:sp>
+      <p:sp>
+        <p:nvSpPr>
+          <p:cNvPr id="13" name="Textfeld 12">
+            <a:extLst>
+              <a:ext uri="{FF2B5EF4-FFF2-40B4-BE49-F238E27FC236}">
+                <a16:creationId xmlns:a16="http://schemas.microsoft.com/office/drawing/2014/main" id="{B1FDECB6-1FBA-D64A-249B-C2A37669EFAA}"/>
+              </a:ext>
+            </a:extLst>
+          </p:cNvPr>
+          <p:cNvSpPr txBox="1"/>
+          <p:nvPr/>
+        </p:nvSpPr>
+        <p:spPr>
+          <a:xfrm>
+            <a:off x="830996" y="7194777"/>
+            <a:ext cx="6015282" cy="5262979"/>
+          </a:xfrm>
+          <a:prstGeom prst="rect">
+            <a:avLst/>
+          </a:prstGeom>
+          <a:noFill/>
+        </p:spPr>
+        <p:txBody>
+          <a:bodyPr wrap="square" rtlCol="0">
+            <a:spAutoFit/>
+          </a:bodyPr>
+          <a:lstStyle/>
+          <a:p>
+            <a:r>
+              <a:rPr lang="en-US" sz="2400" noProof="0" dirty="0"/>
+              <a:t>To verify the reproducibility of the triplicates in our dataset, Spearman correlations were calculated between all replicate–fraction combinations. The resulting correlation coefficients (</a:t>
+            </a:r>
+            <a:r>
+              <a:rPr lang="en-US" sz="2400" noProof="0" dirty="0" err="1"/>
+              <a:t>r-values</a:t>
+            </a:r>
+            <a:r>
+              <a:rPr lang="en-US" sz="2400" noProof="0" dirty="0"/>
+              <a:t>) were visualized as two separate heatmaps - one for the RNase treatment (Fig. X on the right) and one for the control condition. </a:t>
+            </a:r>
+            <a:endParaRPr lang="en-US" sz="2400" dirty="0"/>
+          </a:p>
+          <a:p>
+            <a:r>
+              <a:rPr lang="en-US" sz="2400" noProof="0" dirty="0"/>
+              <a:t>Reproducibility is indicated by high correlations within corresponding fractions across replicates, which should appear as prominent diagonal patterns in 3×3 blocks on the heatmaps. </a:t>
+            </a:r>
+            <a:r>
+              <a:rPr lang="en-US" sz="2400" dirty="0"/>
+              <a:t>This diagonal correlation structure was evident in both treatments.</a:t>
+            </a:r>
+            <a:endParaRPr lang="en-US" sz="2400" noProof="0" dirty="0"/>
+          </a:p>
+        </p:txBody>
+      </p:sp>
+      <p:pic>
+        <p:nvPicPr>
+          <p:cNvPr id="53" name="Grafik 52" descr="Ein Bild, das Text, Screenshot, Farbigkeit, Reihe enthält.&#10;&#10;KI-generierte Inhalte können fehlerhaft sein.">
+            <a:extLst>
+              <a:ext uri="{FF2B5EF4-FFF2-40B4-BE49-F238E27FC236}">
+                <a16:creationId xmlns:a16="http://schemas.microsoft.com/office/drawing/2014/main" id="{BAAF9A28-A00D-D8F6-8487-F57CBEA64C0C}"/>
+              </a:ext>
+            </a:extLst>
+          </p:cNvPr>
+          <p:cNvPicPr>
+            <a:picLocks noChangeAspect="1"/>
+          </p:cNvPicPr>
+          <p:nvPr/>
+        </p:nvPicPr>
+        <p:blipFill>
+          <a:blip r:embed="rId17">
+            <a:extLst>
+              <a:ext uri="{28A0092B-C50C-407E-A947-70E740481C1C}">
+                <a14:useLocalDpi xmlns:a14="http://schemas.microsoft.com/office/drawing/2010/main" val="0"/>
+              </a:ext>
+            </a:extLst>
+          </a:blip>
+          <a:stretch>
+            <a:fillRect/>
+          </a:stretch>
+        </p:blipFill>
+        <p:spPr>
+          <a:xfrm>
+            <a:off x="7311060" y="7217510"/>
+            <a:ext cx="7082565" cy="4721710"/>
+          </a:xfrm>
+          <a:prstGeom prst="rect">
+            <a:avLst/>
+          </a:prstGeom>
+        </p:spPr>
+      </p:pic>
+      <p:sp>
+        <p:nvSpPr>
+          <p:cNvPr id="56" name="Textfeld 55">
+            <a:extLst>
+              <a:ext uri="{FF2B5EF4-FFF2-40B4-BE49-F238E27FC236}">
+                <a16:creationId xmlns:a16="http://schemas.microsoft.com/office/drawing/2014/main" id="{7866C7D8-BD84-2809-E6DA-3A7BCF109C79}"/>
+              </a:ext>
+            </a:extLst>
+          </p:cNvPr>
+          <p:cNvSpPr txBox="1"/>
+          <p:nvPr/>
+        </p:nvSpPr>
+        <p:spPr>
+          <a:xfrm>
+            <a:off x="7278015" y="11954804"/>
+            <a:ext cx="7115610" cy="646331"/>
+          </a:xfrm>
+          <a:prstGeom prst="rect">
+            <a:avLst/>
+          </a:prstGeom>
+          <a:noFill/>
+        </p:spPr>
+        <p:txBody>
+          <a:bodyPr wrap="square" rtlCol="0">
+            <a:spAutoFit/>
+          </a:bodyPr>
+          <a:lstStyle/>
+          <a:p>
+            <a:r>
+              <a:rPr lang="de-DE" sz="1200" b="1" i="1" dirty="0"/>
+              <a:t>Fig. X </a:t>
+            </a:r>
+            <a:r>
+              <a:rPr lang="de-DE" sz="1200" b="1" i="1" dirty="0" err="1"/>
+              <a:t>Reproducibility</a:t>
+            </a:r>
+            <a:r>
+              <a:rPr lang="de-DE" sz="1200" b="1" i="1" dirty="0"/>
+              <a:t> </a:t>
+            </a:r>
+            <a:r>
+              <a:rPr lang="de-DE" sz="1200" b="1" i="1" dirty="0" err="1"/>
+              <a:t>heatmap</a:t>
+            </a:r>
+            <a:r>
+              <a:rPr lang="de-DE" sz="1200" b="1" i="1" dirty="0"/>
+              <a:t> (</a:t>
+            </a:r>
+            <a:r>
+              <a:rPr lang="de-DE" sz="1200" b="1" i="1" dirty="0" err="1"/>
+              <a:t>RNase</a:t>
+            </a:r>
+            <a:r>
+              <a:rPr lang="de-DE" sz="1200" b="1" i="1" dirty="0"/>
+              <a:t>, Spearman </a:t>
+            </a:r>
+            <a:r>
+              <a:rPr lang="de-DE" sz="1200" b="1" i="1" dirty="0" err="1"/>
+              <a:t>correlation</a:t>
+            </a:r>
+            <a:r>
+              <a:rPr lang="de-DE" sz="1200" b="1" i="1" dirty="0"/>
+              <a:t>): </a:t>
+            </a:r>
+            <a:r>
+              <a:rPr lang="de-DE" sz="1200" dirty="0" err="1"/>
+              <a:t>Heatmap</a:t>
+            </a:r>
+            <a:r>
+              <a:rPr lang="de-DE" sz="1200" dirty="0"/>
+              <a:t> </a:t>
+            </a:r>
+            <a:r>
+              <a:rPr lang="de-DE" sz="1200" dirty="0" err="1"/>
+              <a:t>displays</a:t>
+            </a:r>
+            <a:r>
+              <a:rPr lang="de-DE" sz="1200" dirty="0"/>
+              <a:t> </a:t>
+            </a:r>
+            <a:r>
+              <a:rPr lang="de-DE" sz="1200" dirty="0" err="1"/>
+              <a:t>pairwise</a:t>
+            </a:r>
+            <a:r>
+              <a:rPr lang="de-DE" sz="1200" dirty="0"/>
+              <a:t> Spearman </a:t>
+            </a:r>
+            <a:r>
+              <a:rPr lang="de-DE" sz="1200" dirty="0" err="1"/>
+              <a:t>correlation</a:t>
+            </a:r>
+            <a:r>
+              <a:rPr lang="de-DE" sz="1200" dirty="0"/>
+              <a:t> </a:t>
+            </a:r>
+            <a:r>
+              <a:rPr lang="de-DE" sz="1200" dirty="0" err="1"/>
+              <a:t>coefficients</a:t>
+            </a:r>
+            <a:r>
+              <a:rPr lang="de-DE" sz="1200" dirty="0"/>
+              <a:t> </a:t>
+            </a:r>
+            <a:r>
+              <a:rPr lang="de-DE" sz="1200" dirty="0" err="1"/>
+              <a:t>between</a:t>
+            </a:r>
+            <a:r>
+              <a:rPr lang="de-DE" sz="1200" dirty="0"/>
+              <a:t> all </a:t>
+            </a:r>
+            <a:r>
+              <a:rPr lang="de-DE" sz="1200" dirty="0" err="1"/>
+              <a:t>replicate</a:t>
+            </a:r>
+            <a:r>
+              <a:rPr lang="de-DE" sz="1200" dirty="0"/>
+              <a:t>–</a:t>
+            </a:r>
+            <a:r>
+              <a:rPr lang="de-DE" sz="1200" dirty="0" err="1"/>
+              <a:t>fraction</a:t>
+            </a:r>
+            <a:r>
+              <a:rPr lang="de-DE" sz="1200" dirty="0"/>
+              <a:t> </a:t>
+            </a:r>
+            <a:r>
+              <a:rPr lang="de-DE" sz="1200" dirty="0" err="1"/>
+              <a:t>combinations</a:t>
+            </a:r>
+            <a:r>
+              <a:rPr lang="de-DE" sz="1200" dirty="0"/>
+              <a:t> </a:t>
+            </a:r>
+            <a:r>
+              <a:rPr lang="de-DE" sz="1200" dirty="0" err="1"/>
+              <a:t>under</a:t>
+            </a:r>
+            <a:r>
+              <a:rPr lang="de-DE" sz="1200" dirty="0"/>
+              <a:t> </a:t>
+            </a:r>
+            <a:r>
+              <a:rPr lang="de-DE" sz="1200" dirty="0" err="1"/>
+              <a:t>RNase</a:t>
+            </a:r>
+            <a:r>
+              <a:rPr lang="de-DE" sz="1200" dirty="0"/>
+              <a:t> </a:t>
+            </a:r>
+            <a:r>
+              <a:rPr lang="de-DE" sz="1200" dirty="0" err="1"/>
+              <a:t>treatment</a:t>
+            </a:r>
+            <a:r>
+              <a:rPr lang="de-DE" sz="1200" dirty="0"/>
+              <a:t>. High </a:t>
+            </a:r>
+            <a:r>
+              <a:rPr lang="de-DE" sz="1200" dirty="0" err="1"/>
+              <a:t>correlations</a:t>
+            </a:r>
+            <a:r>
+              <a:rPr lang="de-DE" sz="1200" dirty="0"/>
+              <a:t> </a:t>
+            </a:r>
+            <a:r>
+              <a:rPr lang="de-DE" sz="1200" dirty="0" err="1"/>
+              <a:t>within</a:t>
+            </a:r>
+            <a:r>
+              <a:rPr lang="de-DE" sz="1200" dirty="0"/>
+              <a:t> 3×3 diagonal </a:t>
+            </a:r>
+            <a:r>
+              <a:rPr lang="de-DE" sz="1200" dirty="0" err="1"/>
+              <a:t>blocks</a:t>
+            </a:r>
+            <a:r>
+              <a:rPr lang="de-DE" sz="1200" dirty="0"/>
+              <a:t> </a:t>
+            </a:r>
+            <a:r>
+              <a:rPr lang="de-DE" sz="1200" dirty="0" err="1"/>
+              <a:t>indicate</a:t>
+            </a:r>
+            <a:r>
+              <a:rPr lang="de-DE" sz="1200" dirty="0"/>
+              <a:t> strong </a:t>
+            </a:r>
+            <a:r>
+              <a:rPr lang="de-DE" sz="1200" dirty="0" err="1"/>
+              <a:t>reproducibility</a:t>
+            </a:r>
+            <a:r>
+              <a:rPr lang="de-DE" sz="1200" dirty="0"/>
+              <a:t> </a:t>
+            </a:r>
+            <a:r>
+              <a:rPr lang="de-DE" sz="1200" dirty="0" err="1"/>
+              <a:t>across</a:t>
+            </a:r>
+            <a:r>
+              <a:rPr lang="de-DE" sz="1200" dirty="0"/>
+              <a:t> </a:t>
+            </a:r>
+            <a:r>
+              <a:rPr lang="de-DE" sz="1200" dirty="0" err="1"/>
+              <a:t>corresponding</a:t>
+            </a:r>
+            <a:r>
+              <a:rPr lang="de-DE" sz="1200" dirty="0"/>
+              <a:t> </a:t>
+            </a:r>
+            <a:r>
+              <a:rPr lang="de-DE" sz="1200" dirty="0" err="1"/>
+              <a:t>fractions</a:t>
+            </a:r>
+            <a:r>
+              <a:rPr lang="de-DE" sz="1200" dirty="0"/>
+              <a:t>.</a:t>
+            </a:r>
+            <a:endParaRPr lang="en-US" sz="1200" i="1" noProof="0" dirty="0">
               <a:latin typeface="Source Sans Pro" panose="020B0503030403020204" pitchFamily="34" charset="0"/>
               <a:ea typeface="Source Sans Pro" panose="020B0503030403020204" pitchFamily="34" charset="0"/>
             </a:endParaRPr>

</xml_diff>

<commit_message>
Mitosis part and moved parts arround
</commit_message>
<xml_diff>
--- a/RiboZwo.pptx
+++ b/RiboZwo.pptx
@@ -118,7 +118,7 @@
 <file path=ppt/revisionInfo.xml><?xml version="1.0" encoding="utf-8"?>
 <p1510:revInfo xmlns:a="http://schemas.openxmlformats.org/drawingml/2006/main" xmlns:r="http://schemas.openxmlformats.org/officeDocument/2006/relationships" xmlns:p1510="http://schemas.microsoft.com/office/powerpoint/2015/10/main">
   <p1510:revLst>
-    <p1510:client id="{E5A86D5C-552E-4995-AB32-5E49D96B1D3A}" v="26" dt="2025-07-04T07:16:43.022"/>
+    <p1510:client id="{E5A86D5C-552E-4995-AB32-5E49D96B1D3A}" v="30" dt="2025-07-04T12:10:23.929"/>
   </p1510:revLst>
 </p1510:revInfo>
 </file>
@@ -128,7 +128,7 @@
   <pc:docChgLst>
     <pc:chgData name="Cihan Zeyrek" userId="dd9724baaf2e43d1" providerId="LiveId" clId="{E5A86D5C-552E-4995-AB32-5E49D96B1D3A}"/>
     <pc:docChg chg="undo redo custSel delSld modSld">
-      <pc:chgData name="Cihan Zeyrek" userId="dd9724baaf2e43d1" providerId="LiveId" clId="{E5A86D5C-552E-4995-AB32-5E49D96B1D3A}" dt="2025-07-04T07:16:58.909" v="4339" actId="1076"/>
+      <pc:chgData name="Cihan Zeyrek" userId="dd9724baaf2e43d1" providerId="LiveId" clId="{E5A86D5C-552E-4995-AB32-5E49D96B1D3A}" dt="2025-07-04T12:14:56.378" v="4414" actId="1076"/>
       <pc:docMkLst>
         <pc:docMk/>
       </pc:docMkLst>
@@ -220,7 +220,7 @@
         </pc:spChg>
       </pc:sldChg>
       <pc:sldChg chg="addSp delSp modSp mod">
-        <pc:chgData name="Cihan Zeyrek" userId="dd9724baaf2e43d1" providerId="LiveId" clId="{E5A86D5C-552E-4995-AB32-5E49D96B1D3A}" dt="2025-07-04T07:16:58.909" v="4339" actId="1076"/>
+        <pc:chgData name="Cihan Zeyrek" userId="dd9724baaf2e43d1" providerId="LiveId" clId="{E5A86D5C-552E-4995-AB32-5E49D96B1D3A}" dt="2025-07-04T12:14:56.378" v="4414" actId="1076"/>
         <pc:sldMkLst>
           <pc:docMk/>
           <pc:sldMk cId="3613911005" sldId="258"/>
@@ -282,7 +282,15 @@
           </ac:spMkLst>
         </pc:spChg>
         <pc:spChg chg="mod">
-          <ac:chgData name="Cihan Zeyrek" userId="dd9724baaf2e43d1" providerId="LiveId" clId="{E5A86D5C-552E-4995-AB32-5E49D96B1D3A}" dt="2025-07-03T13:41:54.663" v="2908" actId="790"/>
+          <ac:chgData name="Cihan Zeyrek" userId="dd9724baaf2e43d1" providerId="LiveId" clId="{E5A86D5C-552E-4995-AB32-5E49D96B1D3A}" dt="2025-07-04T12:14:43.019" v="4411" actId="1076"/>
+          <ac:spMkLst>
+            <pc:docMk/>
+            <pc:sldMk cId="3613911005" sldId="258"/>
+            <ac:spMk id="14" creationId="{AB754934-85BC-3E41-3BC6-0759F2D51BE4}"/>
+          </ac:spMkLst>
+        </pc:spChg>
+        <pc:spChg chg="mod">
+          <ac:chgData name="Cihan Zeyrek" userId="dd9724baaf2e43d1" providerId="LiveId" clId="{E5A86D5C-552E-4995-AB32-5E49D96B1D3A}" dt="2025-07-04T12:09:32.805" v="4362" actId="1076"/>
           <ac:spMkLst>
             <pc:docMk/>
             <pc:sldMk cId="3613911005" sldId="258"/>
@@ -290,11 +298,19 @@
           </ac:spMkLst>
         </pc:spChg>
         <pc:spChg chg="mod">
-          <ac:chgData name="Cihan Zeyrek" userId="dd9724baaf2e43d1" providerId="LiveId" clId="{E5A86D5C-552E-4995-AB32-5E49D96B1D3A}" dt="2025-07-03T13:41:54.663" v="2908" actId="790"/>
+          <ac:chgData name="Cihan Zeyrek" userId="dd9724baaf2e43d1" providerId="LiveId" clId="{E5A86D5C-552E-4995-AB32-5E49D96B1D3A}" dt="2025-07-04T12:14:14.797" v="4403" actId="1076"/>
           <ac:spMkLst>
             <pc:docMk/>
             <pc:sldMk cId="3613911005" sldId="258"/>
             <ac:spMk id="16" creationId="{0FCE50A5-8321-3A15-8F2E-E7A4119AE242}"/>
+          </ac:spMkLst>
+        </pc:spChg>
+        <pc:spChg chg="mod">
+          <ac:chgData name="Cihan Zeyrek" userId="dd9724baaf2e43d1" providerId="LiveId" clId="{E5A86D5C-552E-4995-AB32-5E49D96B1D3A}" dt="2025-07-04T12:13:35.547" v="4394" actId="1076"/>
+          <ac:spMkLst>
+            <pc:docMk/>
+            <pc:sldMk cId="3613911005" sldId="258"/>
+            <ac:spMk id="17" creationId="{78BA0288-07D1-398D-6200-42A4A63DE015}"/>
           </ac:spMkLst>
         </pc:spChg>
         <pc:spChg chg="mod">
@@ -306,11 +322,27 @@
           </ac:spMkLst>
         </pc:spChg>
         <pc:spChg chg="mod">
-          <ac:chgData name="Cihan Zeyrek" userId="dd9724baaf2e43d1" providerId="LiveId" clId="{E5A86D5C-552E-4995-AB32-5E49D96B1D3A}" dt="2025-07-03T13:41:54.663" v="2908" actId="790"/>
+          <ac:chgData name="Cihan Zeyrek" userId="dd9724baaf2e43d1" providerId="LiveId" clId="{E5A86D5C-552E-4995-AB32-5E49D96B1D3A}" dt="2025-07-04T12:11:46.511" v="4379" actId="14100"/>
+          <ac:spMkLst>
+            <pc:docMk/>
+            <pc:sldMk cId="3613911005" sldId="258"/>
+            <ac:spMk id="21" creationId="{A0CD15E0-7BFA-5A9D-1A3C-5F6A9AC9CC1F}"/>
+          </ac:spMkLst>
+        </pc:spChg>
+        <pc:spChg chg="mod">
+          <ac:chgData name="Cihan Zeyrek" userId="dd9724baaf2e43d1" providerId="LiveId" clId="{E5A86D5C-552E-4995-AB32-5E49D96B1D3A}" dt="2025-07-04T12:14:48.359" v="4412" actId="14100"/>
           <ac:spMkLst>
             <pc:docMk/>
             <pc:sldMk cId="3613911005" sldId="258"/>
             <ac:spMk id="22" creationId="{CADA5048-84E9-7610-1363-103CE5D313B8}"/>
+          </ac:spMkLst>
+        </pc:spChg>
+        <pc:spChg chg="mod">
+          <ac:chgData name="Cihan Zeyrek" userId="dd9724baaf2e43d1" providerId="LiveId" clId="{E5A86D5C-552E-4995-AB32-5E49D96B1D3A}" dt="2025-07-04T12:13:54.121" v="4398" actId="14100"/>
+          <ac:spMkLst>
+            <pc:docMk/>
+            <pc:sldMk cId="3613911005" sldId="258"/>
+            <ac:spMk id="23" creationId="{05D3A7DB-93DD-7817-A586-701FA44BDDE8}"/>
           </ac:spMkLst>
         </pc:spChg>
         <pc:spChg chg="mod">
@@ -319,6 +351,14 @@
             <pc:docMk/>
             <pc:sldMk cId="3613911005" sldId="258"/>
             <ac:spMk id="26" creationId="{BE290EAF-1A4B-D335-43DA-78DE46D94BC7}"/>
+          </ac:spMkLst>
+        </pc:spChg>
+        <pc:spChg chg="add mod">
+          <ac:chgData name="Cihan Zeyrek" userId="dd9724baaf2e43d1" providerId="LiveId" clId="{E5A86D5C-552E-4995-AB32-5E49D96B1D3A}" dt="2025-07-04T12:11:53.989" v="4380" actId="1076"/>
+          <ac:spMkLst>
+            <pc:docMk/>
+            <pc:sldMk cId="3613911005" sldId="258"/>
+            <ac:spMk id="36" creationId="{F123235E-33F2-9698-09ED-DD83FD4F8AAD}"/>
           </ac:spMkLst>
         </pc:spChg>
         <pc:spChg chg="mod">
@@ -337,12 +377,36 @@
             <ac:spMk id="40" creationId="{9E00ACD3-20DA-AFDB-EE91-F0B099D4597C}"/>
           </ac:spMkLst>
         </pc:spChg>
+        <pc:spChg chg="add mod">
+          <ac:chgData name="Cihan Zeyrek" userId="dd9724baaf2e43d1" providerId="LiveId" clId="{E5A86D5C-552E-4995-AB32-5E49D96B1D3A}" dt="2025-07-04T12:11:35.975" v="4377" actId="1076"/>
+          <ac:spMkLst>
+            <pc:docMk/>
+            <pc:sldMk cId="3613911005" sldId="258"/>
+            <ac:spMk id="43" creationId="{9C753B82-7F3B-08F2-D5CA-903A2F39B2EF}"/>
+          </ac:spMkLst>
+        </pc:spChg>
+        <pc:spChg chg="add mod">
+          <ac:chgData name="Cihan Zeyrek" userId="dd9724baaf2e43d1" providerId="LiveId" clId="{E5A86D5C-552E-4995-AB32-5E49D96B1D3A}" dt="2025-07-04T12:12:00.166" v="4381" actId="1076"/>
+          <ac:spMkLst>
+            <pc:docMk/>
+            <pc:sldMk cId="3613911005" sldId="258"/>
+            <ac:spMk id="44" creationId="{C41FF133-ADEB-E4F3-48D0-CDE044ACB3E5}"/>
+          </ac:spMkLst>
+        </pc:spChg>
         <pc:spChg chg="mod">
           <ac:chgData name="Cihan Zeyrek" userId="dd9724baaf2e43d1" providerId="LiveId" clId="{E5A86D5C-552E-4995-AB32-5E49D96B1D3A}" dt="2025-07-03T13:41:54.663" v="2908" actId="790"/>
           <ac:spMkLst>
             <pc:docMk/>
             <pc:sldMk cId="3613911005" sldId="258"/>
             <ac:spMk id="45" creationId="{383CE23E-E30E-605A-7CAB-C3F82B7FB91A}"/>
+          </ac:spMkLst>
+        </pc:spChg>
+        <pc:spChg chg="mod">
+          <ac:chgData name="Cihan Zeyrek" userId="dd9724baaf2e43d1" providerId="LiveId" clId="{E5A86D5C-552E-4995-AB32-5E49D96B1D3A}" dt="2025-07-04T12:14:23.688" v="4406" actId="1076"/>
+          <ac:spMkLst>
+            <pc:docMk/>
+            <pc:sldMk cId="3613911005" sldId="258"/>
+            <ac:spMk id="46" creationId="{09012934-17D9-9E1F-A0A5-E6B32DB352BC}"/>
           </ac:spMkLst>
         </pc:spChg>
         <pc:spChg chg="mod">
@@ -377,12 +441,28 @@
             <ac:spMk id="51" creationId="{1EFE5839-827F-4EE7-93B1-21F410F3AF68}"/>
           </ac:spMkLst>
         </pc:spChg>
+        <pc:spChg chg="mod">
+          <ac:chgData name="Cihan Zeyrek" userId="dd9724baaf2e43d1" providerId="LiveId" clId="{E5A86D5C-552E-4995-AB32-5E49D96B1D3A}" dt="2025-07-04T12:14:35.508" v="4409" actId="1076"/>
+          <ac:spMkLst>
+            <pc:docMk/>
+            <pc:sldMk cId="3613911005" sldId="258"/>
+            <ac:spMk id="52" creationId="{0C9E6692-E493-9100-A3A2-2553EE851C05}"/>
+          </ac:spMkLst>
+        </pc:spChg>
         <pc:spChg chg="add mod">
           <ac:chgData name="Cihan Zeyrek" userId="dd9724baaf2e43d1" providerId="LiveId" clId="{E5A86D5C-552E-4995-AB32-5E49D96B1D3A}" dt="2025-07-03T14:16:27.570" v="3691" actId="113"/>
           <ac:spMkLst>
             <pc:docMk/>
             <pc:sldMk cId="3613911005" sldId="258"/>
             <ac:spMk id="56" creationId="{7866C7D8-BD84-2809-E6DA-3A7BCF109C79}"/>
+          </ac:spMkLst>
+        </pc:spChg>
+        <pc:spChg chg="mod">
+          <ac:chgData name="Cihan Zeyrek" userId="dd9724baaf2e43d1" providerId="LiveId" clId="{E5A86D5C-552E-4995-AB32-5E49D96B1D3A}" dt="2025-07-04T12:14:56.378" v="4414" actId="1076"/>
+          <ac:spMkLst>
+            <pc:docMk/>
+            <pc:sldMk cId="3613911005" sldId="258"/>
+            <ac:spMk id="73" creationId="{497B7107-C6F9-BC8E-32F9-4EB58EBC3122}"/>
           </ac:spMkLst>
         </pc:spChg>
         <pc:grpChg chg="mod">
@@ -426,6 +506,14 @@
           </ac:picMkLst>
         </pc:picChg>
         <pc:picChg chg="mod">
+          <ac:chgData name="Cihan Zeyrek" userId="dd9724baaf2e43d1" providerId="LiveId" clId="{E5A86D5C-552E-4995-AB32-5E49D96B1D3A}" dt="2025-07-04T12:13:37.934" v="4395" actId="1076"/>
+          <ac:picMkLst>
+            <pc:docMk/>
+            <pc:sldMk cId="3613911005" sldId="258"/>
+            <ac:picMk id="38" creationId="{E5FDED8C-E7AC-C058-2B47-E49642388937}"/>
+          </ac:picMkLst>
+        </pc:picChg>
+        <pc:picChg chg="mod">
           <ac:chgData name="Cihan Zeyrek" userId="dd9724baaf2e43d1" providerId="LiveId" clId="{E5A86D5C-552E-4995-AB32-5E49D96B1D3A}" dt="2025-07-03T13:40:43.839" v="2891" actId="1076"/>
           <ac:picMkLst>
             <pc:docMk/>
@@ -466,11 +554,27 @@
           </ac:picMkLst>
         </pc:picChg>
         <pc:picChg chg="add mod">
-          <ac:chgData name="Cihan Zeyrek" userId="dd9724baaf2e43d1" providerId="LiveId" clId="{E5A86D5C-552E-4995-AB32-5E49D96B1D3A}" dt="2025-07-04T07:16:58.909" v="4339" actId="1076"/>
+          <ac:chgData name="Cihan Zeyrek" userId="dd9724baaf2e43d1" providerId="LiveId" clId="{E5A86D5C-552E-4995-AB32-5E49D96B1D3A}" dt="2025-07-04T12:11:32.745" v="4376" actId="1076"/>
           <ac:picMkLst>
             <pc:docMk/>
             <pc:sldMk cId="3613911005" sldId="258"/>
             <ac:picMk id="58" creationId="{A4E66611-3D6E-9A44-4656-502C42629693}"/>
+          </ac:picMkLst>
+        </pc:picChg>
+        <pc:picChg chg="mod">
+          <ac:chgData name="Cihan Zeyrek" userId="dd9724baaf2e43d1" providerId="LiveId" clId="{E5A86D5C-552E-4995-AB32-5E49D96B1D3A}" dt="2025-07-04T12:14:38.686" v="4410" actId="1076"/>
+          <ac:picMkLst>
+            <pc:docMk/>
+            <pc:sldMk cId="3613911005" sldId="258"/>
+            <ac:picMk id="68" creationId="{288F68B4-DDA1-2EEB-9F23-81C0A0F5FDB5}"/>
+          </ac:picMkLst>
+        </pc:picChg>
+        <pc:picChg chg="mod">
+          <ac:chgData name="Cihan Zeyrek" userId="dd9724baaf2e43d1" providerId="LiveId" clId="{E5A86D5C-552E-4995-AB32-5E49D96B1D3A}" dt="2025-07-04T12:14:51.643" v="4413" actId="1076"/>
+          <ac:picMkLst>
+            <pc:docMk/>
+            <pc:sldMk cId="3613911005" sldId="258"/>
+            <ac:picMk id="72" creationId="{08B70003-AD1E-4701-456D-41507D8EABB7}"/>
           </ac:picMkLst>
         </pc:picChg>
       </pc:sldChg>
@@ -5072,8 +5176,8 @@
         </p:nvSpPr>
         <p:spPr>
           <a:xfrm>
-            <a:off x="15370492" y="16768694"/>
-            <a:ext cx="14295120" cy="10898714"/>
+            <a:off x="15400185" y="16615940"/>
+            <a:ext cx="14295120" cy="8643709"/>
           </a:xfrm>
           <a:prstGeom prst="roundRect">
             <a:avLst>
@@ -5134,8 +5238,8 @@
         </p:nvSpPr>
         <p:spPr>
           <a:xfrm>
-            <a:off x="609595" y="28108222"/>
-            <a:ext cx="15600292" cy="10195805"/>
+            <a:off x="15286763" y="25651859"/>
+            <a:ext cx="14528007" cy="12645545"/>
           </a:xfrm>
           <a:prstGeom prst="roundRect">
             <a:avLst>
@@ -5196,8 +5300,8 @@
         </p:nvSpPr>
         <p:spPr>
           <a:xfrm>
-            <a:off x="16687800" y="28259607"/>
-            <a:ext cx="12977812" cy="10003290"/>
+            <a:off x="563913" y="28191603"/>
+            <a:ext cx="14217724" cy="10003290"/>
           </a:xfrm>
           <a:prstGeom prst="roundRect">
             <a:avLst>
@@ -5526,7 +5630,7 @@
         </p:nvSpPr>
         <p:spPr>
           <a:xfrm>
-            <a:off x="15848412" y="17300030"/>
+            <a:off x="15595757" y="16812766"/>
             <a:ext cx="16684555" cy="9893430"/>
           </a:xfrm>
           <a:prstGeom prst="rect">
@@ -5558,15 +5662,24 @@
           <a:lstStyle/>
           <a:p>
             <a:r>
-              <a:rPr lang="en-US" sz="4000" noProof="0" dirty="0">
+              <a:rPr lang="en-US" sz="4000" dirty="0">
                 <a:solidFill>
                   <a:schemeClr val="tx1"/>
                 </a:solidFill>
                 <a:latin typeface="Source Sans Pro" panose="020B0503030403020204" pitchFamily="34" charset="0"/>
                 <a:ea typeface="Source Sans Pro" panose="020B0503030403020204" pitchFamily="34" charset="0"/>
               </a:rPr>
-              <a:t>Mitosis: Finding my home</a:t>
-            </a:r>
+              <a:t>Identification of Mitosis-Specific RBPs: Clocking in for the season</a:t>
+            </a:r>
+          </a:p>
+          <a:p>
+            <a:endParaRPr lang="en-US" sz="4000" noProof="0" dirty="0">
+              <a:solidFill>
+                <a:schemeClr val="tx1"/>
+              </a:solidFill>
+              <a:latin typeface="Source Sans Pro" panose="020B0503030403020204" pitchFamily="34" charset="0"/>
+              <a:ea typeface="Source Sans Pro" panose="020B0503030403020204" pitchFamily="34" charset="0"/>
+            </a:endParaRPr>
           </a:p>
         </p:txBody>
       </p:sp>
@@ -5584,7 +5697,7 @@
         </p:nvSpPr>
         <p:spPr>
           <a:xfrm>
-            <a:off x="882079" y="28280022"/>
+            <a:off x="15449965" y="25898532"/>
             <a:ext cx="15355262" cy="9995591"/>
           </a:xfrm>
           <a:prstGeom prst="rect">
@@ -5651,7 +5764,7 @@
         </p:nvSpPr>
         <p:spPr>
           <a:xfrm>
-            <a:off x="16920689" y="28610869"/>
+            <a:off x="854627" y="28439764"/>
             <a:ext cx="12383450" cy="7837827"/>
           </a:xfrm>
           <a:prstGeom prst="rect">
@@ -6285,7 +6398,7 @@
         </p:blipFill>
         <p:spPr>
           <a:xfrm>
-            <a:off x="22737947" y="33472771"/>
+            <a:off x="6929493" y="31010872"/>
             <a:ext cx="6449752" cy="4364752"/>
           </a:xfrm>
           <a:prstGeom prst="rect">
@@ -7888,7 +8001,7 @@
         </p:nvSpPr>
         <p:spPr>
           <a:xfrm>
-            <a:off x="9253627" y="28414067"/>
+            <a:off x="22687042" y="26194178"/>
             <a:ext cx="6776884" cy="5105981"/>
           </a:xfrm>
           <a:prstGeom prst="rect">
@@ -7958,7 +8071,7 @@
         </p:blipFill>
         <p:spPr>
           <a:xfrm>
-            <a:off x="9351757" y="28561755"/>
+            <a:off x="22656645" y="26246968"/>
             <a:ext cx="6611709" cy="4958783"/>
           </a:xfrm>
           <a:prstGeom prst="rect">
@@ -7980,7 +8093,7 @@
         </p:nvSpPr>
         <p:spPr>
           <a:xfrm>
-            <a:off x="952552" y="34026312"/>
+            <a:off x="15709390" y="32900676"/>
             <a:ext cx="5005853" cy="3811211"/>
           </a:xfrm>
           <a:prstGeom prst="rect">
@@ -8050,7 +8163,7 @@
         </p:blipFill>
         <p:spPr>
           <a:xfrm>
-            <a:off x="952553" y="34114423"/>
+            <a:off x="15857545" y="32949588"/>
             <a:ext cx="4857698" cy="3643274"/>
           </a:xfrm>
           <a:prstGeom prst="rect">
@@ -8072,8 +8185,8 @@
         </p:nvSpPr>
         <p:spPr>
           <a:xfrm>
-            <a:off x="876288" y="28871353"/>
-            <a:ext cx="8377339" cy="5539978"/>
+            <a:off x="15360712" y="26807152"/>
+            <a:ext cx="7670217" cy="5909310"/>
           </a:xfrm>
           <a:prstGeom prst="rect">
             <a:avLst/>
@@ -8273,7 +8386,7 @@
         </p:nvSpPr>
         <p:spPr>
           <a:xfrm>
-            <a:off x="6043140" y="34032715"/>
+            <a:off x="20715243" y="32092643"/>
             <a:ext cx="10001633" cy="4216539"/>
           </a:xfrm>
           <a:prstGeom prst="rect">
@@ -8324,7 +8437,17 @@
                 <a:latin typeface="Source Sans Pro" panose="020B0503030403020204" pitchFamily="34" charset="0"/>
                 <a:ea typeface="Source Sans Pro" panose="020B0503030403020204" pitchFamily="34" charset="0"/>
               </a:rPr>
-              <a:t> validate the efficiency in clustering of the two parameters we created a heatmap with a specific </a:t>
+              <a:t> validate the efficiency in clustering of </a:t>
+            </a:r>
+          </a:p>
+          <a:p>
+            <a:pPr algn="just"/>
+            <a:r>
+              <a:rPr lang="en-US" sz="2400" noProof="0" dirty="0">
+                <a:latin typeface="Source Sans Pro" panose="020B0503030403020204" pitchFamily="34" charset="0"/>
+                <a:ea typeface="Source Sans Pro" panose="020B0503030403020204" pitchFamily="34" charset="0"/>
+              </a:rPr>
+              <a:t>the two parameters we created a heatmap with a specific </a:t>
             </a:r>
             <a:r>
               <a:rPr lang="en-US" sz="2400" b="1" noProof="0" dirty="0" err="1">
@@ -8509,14 +8632,535 @@
         </p:blipFill>
         <p:spPr>
           <a:xfrm>
-            <a:off x="21981638" y="17990679"/>
-            <a:ext cx="7315834" cy="5486876"/>
+            <a:off x="22074595" y="17620186"/>
+            <a:ext cx="6864416" cy="5148312"/>
           </a:xfrm>
           <a:prstGeom prst="rect">
             <a:avLst/>
           </a:prstGeom>
         </p:spPr>
       </p:pic>
+      <p:sp>
+        <p:nvSpPr>
+          <p:cNvPr id="36" name="Textfeld 35">
+            <a:extLst>
+              <a:ext uri="{FF2B5EF4-FFF2-40B4-BE49-F238E27FC236}">
+                <a16:creationId xmlns:a16="http://schemas.microsoft.com/office/drawing/2014/main" id="{F123235E-33F2-9698-09ED-DD83FD4F8AAD}"/>
+              </a:ext>
+            </a:extLst>
+          </p:cNvPr>
+          <p:cNvSpPr txBox="1"/>
+          <p:nvPr/>
+        </p:nvSpPr>
+        <p:spPr>
+          <a:xfrm>
+            <a:off x="15633676" y="17652922"/>
+            <a:ext cx="6501830" cy="6370975"/>
+          </a:xfrm>
+          <a:prstGeom prst="rect">
+            <a:avLst/>
+          </a:prstGeom>
+          <a:noFill/>
+        </p:spPr>
+        <p:txBody>
+          <a:bodyPr wrap="square" rtlCol="0">
+            <a:spAutoFit/>
+          </a:bodyPr>
+          <a:lstStyle/>
+          <a:p>
+            <a:r>
+              <a:rPr lang="de-DE" sz="2400" b="1" dirty="0" err="1"/>
+              <a:t>Comparative</a:t>
+            </a:r>
+            <a:r>
+              <a:rPr lang="de-DE" sz="2400" b="1" dirty="0"/>
+              <a:t> Shift Analysis</a:t>
+            </a:r>
+            <a:endParaRPr lang="en-US" sz="2400" b="1" dirty="0"/>
+          </a:p>
+          <a:p>
+            <a:r>
+              <a:rPr lang="en-US" sz="2400" dirty="0"/>
+              <a:t>To investigate RNA-binding protein (RBP) activity beyond mitosis, we applied the same shift analysis pipeline to non-synchronized HeLa cells. For each protein, shift distances were calculated using center of mass (</a:t>
+            </a:r>
+            <a:r>
+              <a:rPr lang="en-US" sz="2400" dirty="0" err="1"/>
+              <a:t>CoM</a:t>
+            </a:r>
+            <a:r>
+              <a:rPr lang="en-US" sz="2400" dirty="0"/>
+              <a:t>) values derived from normalized signal distributions across all replicates. Normality was evaluated using the Shapiro–Wilk test, and statistical significance was determined by a one-sided t-test against a defined threshold.</a:t>
+            </a:r>
+          </a:p>
+          <a:p>
+            <a:r>
+              <a:rPr lang="en-US" sz="2400" dirty="0"/>
+              <a:t>This scatterplot visualizes the resulting shift distances for each protein, comparing mitotic and non-synchronized conditions. Each point represents a protein and reflects its condition-specific RNA dependence. </a:t>
+            </a:r>
+          </a:p>
+          <a:p>
+            <a:endParaRPr lang="en-US" sz="2400" dirty="0"/>
+          </a:p>
+        </p:txBody>
+      </p:sp>
+      <p:sp>
+        <p:nvSpPr>
+          <p:cNvPr id="43" name="Textfeld 42">
+            <a:extLst>
+              <a:ext uri="{FF2B5EF4-FFF2-40B4-BE49-F238E27FC236}">
+                <a16:creationId xmlns:a16="http://schemas.microsoft.com/office/drawing/2014/main" id="{9C753B82-7F3B-08F2-D5CA-903A2F39B2EF}"/>
+              </a:ext>
+            </a:extLst>
+          </p:cNvPr>
+          <p:cNvSpPr txBox="1"/>
+          <p:nvPr/>
+        </p:nvSpPr>
+        <p:spPr>
+          <a:xfrm>
+            <a:off x="21952883" y="22885382"/>
+            <a:ext cx="7107839" cy="1015663"/>
+          </a:xfrm>
+          <a:prstGeom prst="rect">
+            <a:avLst/>
+          </a:prstGeom>
+          <a:noFill/>
+        </p:spPr>
+        <p:txBody>
+          <a:bodyPr wrap="square" rtlCol="0">
+            <a:spAutoFit/>
+          </a:bodyPr>
+          <a:lstStyle/>
+          <a:p>
+            <a:r>
+              <a:rPr lang="de-DE" sz="1200" b="1" dirty="0"/>
+              <a:t>Fig. X </a:t>
+            </a:r>
+            <a:r>
+              <a:rPr lang="de-DE" sz="1200" b="1" i="1" dirty="0" err="1"/>
+              <a:t>Comparative</a:t>
+            </a:r>
+            <a:r>
+              <a:rPr lang="de-DE" sz="1200" b="1" i="1" dirty="0"/>
+              <a:t> Shift Scatterplot (</a:t>
+            </a:r>
+            <a:r>
+              <a:rPr lang="de-DE" sz="1200" b="1" i="1" dirty="0" err="1"/>
+              <a:t>Mitosis</a:t>
+            </a:r>
+            <a:r>
+              <a:rPr lang="de-DE" sz="1200" b="1" i="1" dirty="0"/>
+              <a:t> vs. Non-</a:t>
+            </a:r>
+            <a:r>
+              <a:rPr lang="de-DE" sz="1200" b="1" i="1" dirty="0" err="1"/>
+              <a:t>Synchronized</a:t>
+            </a:r>
+            <a:r>
+              <a:rPr lang="de-DE" sz="1200" b="1" i="1" dirty="0"/>
+              <a:t>)</a:t>
+            </a:r>
+            <a:r>
+              <a:rPr lang="de-DE" sz="1200" b="1" dirty="0"/>
+              <a:t>:</a:t>
+            </a:r>
+            <a:r>
+              <a:rPr lang="de-DE" sz="1200" dirty="0"/>
+              <a:t> Scatterplot </a:t>
+            </a:r>
+            <a:r>
+              <a:rPr lang="de-DE" sz="1200" dirty="0" err="1"/>
+              <a:t>displays</a:t>
+            </a:r>
+            <a:r>
+              <a:rPr lang="de-DE" sz="1200" dirty="0"/>
+              <a:t> shift </a:t>
+            </a:r>
+            <a:r>
+              <a:rPr lang="de-DE" sz="1200" dirty="0" err="1"/>
+              <a:t>distances</a:t>
+            </a:r>
+            <a:r>
+              <a:rPr lang="de-DE" sz="1200" dirty="0"/>
+              <a:t> </a:t>
+            </a:r>
+            <a:r>
+              <a:rPr lang="de-DE" sz="1200" dirty="0" err="1"/>
+              <a:t>derived</a:t>
+            </a:r>
+            <a:r>
+              <a:rPr lang="de-DE" sz="1200" dirty="0"/>
+              <a:t> </a:t>
+            </a:r>
+            <a:r>
+              <a:rPr lang="de-DE" sz="1200" dirty="0" err="1"/>
+              <a:t>from</a:t>
+            </a:r>
+            <a:r>
+              <a:rPr lang="de-DE" sz="1200" dirty="0"/>
+              <a:t> </a:t>
+            </a:r>
+            <a:r>
+              <a:rPr lang="de-DE" sz="1200" dirty="0" err="1"/>
+              <a:t>center</a:t>
+            </a:r>
+            <a:r>
+              <a:rPr lang="de-DE" sz="1200" dirty="0"/>
+              <a:t> </a:t>
+            </a:r>
+            <a:r>
+              <a:rPr lang="de-DE" sz="1200" dirty="0" err="1"/>
+              <a:t>of</a:t>
+            </a:r>
+            <a:r>
+              <a:rPr lang="de-DE" sz="1200" dirty="0"/>
+              <a:t> </a:t>
+            </a:r>
+            <a:r>
+              <a:rPr lang="de-DE" sz="1200" dirty="0" err="1"/>
+              <a:t>mass</a:t>
+            </a:r>
+            <a:r>
+              <a:rPr lang="de-DE" sz="1200" dirty="0"/>
+              <a:t> (</a:t>
+            </a:r>
+            <a:r>
+              <a:rPr lang="de-DE" sz="1200" dirty="0" err="1"/>
+              <a:t>CoM</a:t>
+            </a:r>
+            <a:r>
+              <a:rPr lang="de-DE" sz="1200" dirty="0"/>
+              <a:t>) </a:t>
+            </a:r>
+            <a:r>
+              <a:rPr lang="de-DE" sz="1200" dirty="0" err="1"/>
+              <a:t>values</a:t>
+            </a:r>
+            <a:r>
+              <a:rPr lang="de-DE" sz="1200" dirty="0"/>
+              <a:t> </a:t>
+            </a:r>
+            <a:r>
+              <a:rPr lang="de-DE" sz="1200" dirty="0" err="1"/>
+              <a:t>for</a:t>
+            </a:r>
+            <a:r>
+              <a:rPr lang="de-DE" sz="1200" dirty="0"/>
+              <a:t> all </a:t>
+            </a:r>
+            <a:r>
+              <a:rPr lang="de-DE" sz="1200" dirty="0" err="1"/>
+              <a:t>proteins</a:t>
+            </a:r>
+            <a:r>
+              <a:rPr lang="de-DE" sz="1200" dirty="0"/>
+              <a:t> </a:t>
+            </a:r>
+            <a:r>
+              <a:rPr lang="de-DE" sz="1200" dirty="0" err="1"/>
+              <a:t>under</a:t>
+            </a:r>
+            <a:r>
+              <a:rPr lang="de-DE" sz="1200" dirty="0"/>
+              <a:t> </a:t>
+            </a:r>
+            <a:r>
+              <a:rPr lang="de-DE" sz="1200" dirty="0" err="1"/>
+              <a:t>both</a:t>
+            </a:r>
+            <a:r>
+              <a:rPr lang="de-DE" sz="1200" dirty="0"/>
+              <a:t> </a:t>
+            </a:r>
+            <a:r>
+              <a:rPr lang="de-DE" sz="1200" dirty="0" err="1"/>
+              <a:t>conditions</a:t>
+            </a:r>
+            <a:r>
+              <a:rPr lang="de-DE" sz="1200" dirty="0"/>
+              <a:t>. </a:t>
+            </a:r>
+            <a:r>
+              <a:rPr lang="de-DE" sz="1200" dirty="0" err="1"/>
+              <a:t>Each</a:t>
+            </a:r>
+            <a:r>
+              <a:rPr lang="de-DE" sz="1200" dirty="0"/>
+              <a:t> </a:t>
+            </a:r>
+            <a:r>
+              <a:rPr lang="de-DE" sz="1200" dirty="0" err="1"/>
+              <a:t>point</a:t>
+            </a:r>
+            <a:r>
+              <a:rPr lang="de-DE" sz="1200" dirty="0"/>
+              <a:t> </a:t>
+            </a:r>
+            <a:r>
+              <a:rPr lang="de-DE" sz="1200" dirty="0" err="1"/>
+              <a:t>represents</a:t>
+            </a:r>
+            <a:r>
+              <a:rPr lang="de-DE" sz="1200" dirty="0"/>
+              <a:t> </a:t>
+            </a:r>
+            <a:r>
+              <a:rPr lang="de-DE" sz="1200" dirty="0" err="1"/>
+              <a:t>one</a:t>
+            </a:r>
+            <a:r>
+              <a:rPr lang="de-DE" sz="1200" dirty="0"/>
+              <a:t> </a:t>
+            </a:r>
+            <a:r>
+              <a:rPr lang="de-DE" sz="1200" dirty="0" err="1"/>
+              <a:t>protein</a:t>
+            </a:r>
+            <a:r>
+              <a:rPr lang="de-DE" sz="1200" dirty="0"/>
+              <a:t>, color-</a:t>
+            </a:r>
+            <a:r>
+              <a:rPr lang="de-DE" sz="1200" dirty="0" err="1"/>
+              <a:t>coded</a:t>
+            </a:r>
+            <a:r>
+              <a:rPr lang="de-DE" sz="1200" dirty="0"/>
+              <a:t> </a:t>
+            </a:r>
+            <a:r>
+              <a:rPr lang="de-DE" sz="1200" dirty="0" err="1"/>
+              <a:t>by</a:t>
+            </a:r>
+            <a:r>
+              <a:rPr lang="de-DE" sz="1200" dirty="0"/>
+              <a:t> </a:t>
+            </a:r>
+            <a:r>
+              <a:rPr lang="de-DE" sz="1200" dirty="0" err="1"/>
+              <a:t>statistical</a:t>
+            </a:r>
+            <a:r>
+              <a:rPr lang="de-DE" sz="1200" dirty="0"/>
+              <a:t> </a:t>
+            </a:r>
+            <a:r>
+              <a:rPr lang="de-DE" sz="1200" dirty="0" err="1"/>
+              <a:t>significance</a:t>
+            </a:r>
+            <a:r>
+              <a:rPr lang="de-DE" sz="1200" dirty="0"/>
+              <a:t>. The </a:t>
+            </a:r>
+            <a:r>
+              <a:rPr lang="de-DE" sz="1200" dirty="0" err="1"/>
+              <a:t>red</a:t>
+            </a:r>
+            <a:r>
+              <a:rPr lang="de-DE" sz="1200" dirty="0"/>
+              <a:t> </a:t>
+            </a:r>
+            <a:r>
+              <a:rPr lang="de-DE" sz="1200" dirty="0" err="1"/>
+              <a:t>dashed</a:t>
+            </a:r>
+            <a:r>
+              <a:rPr lang="de-DE" sz="1200" dirty="0"/>
+              <a:t> </a:t>
+            </a:r>
+            <a:r>
+              <a:rPr lang="de-DE" sz="1200" dirty="0" err="1"/>
+              <a:t>identity</a:t>
+            </a:r>
+            <a:r>
+              <a:rPr lang="de-DE" sz="1200" dirty="0"/>
+              <a:t> </a:t>
+            </a:r>
+            <a:r>
+              <a:rPr lang="de-DE" sz="1200" dirty="0" err="1"/>
+              <a:t>line</a:t>
+            </a:r>
+            <a:r>
+              <a:rPr lang="de-DE" sz="1200" dirty="0"/>
+              <a:t> </a:t>
+            </a:r>
+            <a:r>
+              <a:rPr lang="de-DE" sz="1200" dirty="0" err="1"/>
+              <a:t>marks</a:t>
+            </a:r>
+            <a:r>
+              <a:rPr lang="de-DE" sz="1200" dirty="0"/>
+              <a:t> </a:t>
+            </a:r>
+            <a:r>
+              <a:rPr lang="de-DE" sz="1200" dirty="0" err="1"/>
+              <a:t>equal</a:t>
+            </a:r>
+            <a:r>
+              <a:rPr lang="de-DE" sz="1200" dirty="0"/>
+              <a:t> shift </a:t>
+            </a:r>
+            <a:r>
+              <a:rPr lang="de-DE" sz="1200" dirty="0" err="1"/>
+              <a:t>behavior</a:t>
+            </a:r>
+            <a:r>
+              <a:rPr lang="de-DE" sz="1200" dirty="0"/>
+              <a:t>; </a:t>
+            </a:r>
+            <a:r>
+              <a:rPr lang="de-DE" sz="1200" dirty="0" err="1"/>
+              <a:t>proteins</a:t>
+            </a:r>
+            <a:r>
+              <a:rPr lang="de-DE" sz="1200" dirty="0"/>
+              <a:t> </a:t>
+            </a:r>
+            <a:r>
+              <a:rPr lang="de-DE" sz="1200" dirty="0" err="1"/>
+              <a:t>below</a:t>
+            </a:r>
+            <a:r>
+              <a:rPr lang="de-DE" sz="1200" dirty="0"/>
+              <a:t> </a:t>
+            </a:r>
+            <a:r>
+              <a:rPr lang="de-DE" sz="1200" dirty="0" err="1"/>
+              <a:t>the</a:t>
+            </a:r>
+            <a:r>
+              <a:rPr lang="de-DE" sz="1200" dirty="0"/>
+              <a:t> </a:t>
+            </a:r>
+            <a:r>
+              <a:rPr lang="de-DE" sz="1200" dirty="0" err="1"/>
+              <a:t>line</a:t>
+            </a:r>
+            <a:r>
+              <a:rPr lang="de-DE" sz="1200" dirty="0"/>
+              <a:t> </a:t>
+            </a:r>
+            <a:r>
+              <a:rPr lang="de-DE" sz="1200" dirty="0" err="1"/>
+              <a:t>show</a:t>
+            </a:r>
+            <a:r>
+              <a:rPr lang="de-DE" sz="1200" dirty="0"/>
+              <a:t> </a:t>
+            </a:r>
+            <a:r>
+              <a:rPr lang="de-DE" sz="1200" dirty="0" err="1"/>
+              <a:t>mitosis-specific</a:t>
+            </a:r>
+            <a:r>
+              <a:rPr lang="de-DE" sz="1200" dirty="0"/>
+              <a:t> </a:t>
+            </a:r>
+            <a:r>
+              <a:rPr lang="de-DE" sz="1200" dirty="0" err="1"/>
+              <a:t>leftward</a:t>
+            </a:r>
+            <a:r>
+              <a:rPr lang="de-DE" sz="1200" dirty="0"/>
+              <a:t> </a:t>
+            </a:r>
+            <a:r>
+              <a:rPr lang="de-DE" sz="1200" dirty="0" err="1"/>
+              <a:t>shifts</a:t>
+            </a:r>
+            <a:r>
+              <a:rPr lang="de-DE" sz="1200" dirty="0"/>
+              <a:t>, </a:t>
+            </a:r>
+            <a:r>
+              <a:rPr lang="de-DE" sz="1200" dirty="0" err="1"/>
+              <a:t>suggesting</a:t>
+            </a:r>
+            <a:r>
+              <a:rPr lang="de-DE" sz="1200" dirty="0"/>
+              <a:t> RNA </a:t>
+            </a:r>
+            <a:r>
+              <a:rPr lang="de-DE" sz="1200" dirty="0" err="1"/>
+              <a:t>dependency</a:t>
+            </a:r>
+            <a:r>
+              <a:rPr lang="de-DE" sz="1200" dirty="0"/>
+              <a:t> </a:t>
+            </a:r>
+            <a:r>
+              <a:rPr lang="de-DE" sz="1200" dirty="0" err="1"/>
+              <a:t>unique</a:t>
+            </a:r>
+            <a:r>
+              <a:rPr lang="de-DE" sz="1200" dirty="0"/>
+              <a:t> </a:t>
+            </a:r>
+            <a:r>
+              <a:rPr lang="de-DE" sz="1200" dirty="0" err="1"/>
+              <a:t>to</a:t>
+            </a:r>
+            <a:r>
+              <a:rPr lang="de-DE" sz="1200" dirty="0"/>
+              <a:t> </a:t>
+            </a:r>
+            <a:r>
+              <a:rPr lang="de-DE" sz="1200" dirty="0" err="1"/>
+              <a:t>mitosis</a:t>
+            </a:r>
+            <a:r>
+              <a:rPr lang="de-DE" sz="1200" dirty="0"/>
+              <a:t>.</a:t>
+            </a:r>
+            <a:endParaRPr lang="en-US" sz="1200" dirty="0"/>
+          </a:p>
+        </p:txBody>
+      </p:sp>
+      <p:sp>
+        <p:nvSpPr>
+          <p:cNvPr id="44" name="Textfeld 43">
+            <a:extLst>
+              <a:ext uri="{FF2B5EF4-FFF2-40B4-BE49-F238E27FC236}">
+                <a16:creationId xmlns:a16="http://schemas.microsoft.com/office/drawing/2014/main" id="{C41FF133-ADEB-E4F3-48D0-CDE044ACB3E5}"/>
+              </a:ext>
+            </a:extLst>
+          </p:cNvPr>
+          <p:cNvSpPr txBox="1"/>
+          <p:nvPr/>
+        </p:nvSpPr>
+        <p:spPr>
+          <a:xfrm>
+            <a:off x="15595757" y="23876888"/>
+            <a:ext cx="13817660" cy="1477328"/>
+          </a:xfrm>
+          <a:prstGeom prst="rect">
+            <a:avLst/>
+          </a:prstGeom>
+          <a:noFill/>
+        </p:spPr>
+        <p:txBody>
+          <a:bodyPr wrap="square" rtlCol="0">
+            <a:spAutoFit/>
+          </a:bodyPr>
+          <a:lstStyle/>
+          <a:p>
+            <a:r>
+              <a:rPr lang="en-US" sz="2400" dirty="0"/>
+              <a:t>The red dashed identity line marks equal shifts across both cell states. Proteins falling below this line such as </a:t>
+            </a:r>
+            <a:r>
+              <a:rPr lang="en-US" sz="2400" b="1" dirty="0" err="1"/>
+              <a:t>RiboSix</a:t>
+            </a:r>
+            <a:r>
+              <a:rPr lang="en-US" sz="2400" dirty="0"/>
+              <a:t> show stronger RNA dependency during mitosis, suggesting their role is tightly linked to this specific cellular phase. Indeed, mitosis appears to be the active season for our little RBP hero.</a:t>
+            </a:r>
+          </a:p>
+          <a:p>
+            <a:endParaRPr lang="en-US" dirty="0"/>
+          </a:p>
+        </p:txBody>
+      </p:sp>
     </p:spTree>
     <p:extLst>
       <p:ext uri="{BB962C8B-B14F-4D97-AF65-F5344CB8AC3E}">

</xml_diff>

<commit_message>
Made heatmap axis bigger
</commit_message>
<xml_diff>
--- a/RiboZwo.pptx
+++ b/RiboZwo.pptx
@@ -118,7 +118,7 @@
 <file path=ppt/revisionInfo.xml><?xml version="1.0" encoding="utf-8"?>
 <p1510:revInfo xmlns:a="http://schemas.openxmlformats.org/drawingml/2006/main" xmlns:r="http://schemas.openxmlformats.org/officeDocument/2006/relationships" xmlns:p1510="http://schemas.microsoft.com/office/powerpoint/2015/10/main">
   <p1510:revLst>
-    <p1510:client id="{E5A86D5C-552E-4995-AB32-5E49D96B1D3A}" v="30" dt="2025-07-04T12:10:23.929"/>
+    <p1510:client id="{E5A86D5C-552E-4995-AB32-5E49D96B1D3A}" v="31" dt="2025-07-04T12:58:18.777"/>
   </p1510:revLst>
 </p1510:revInfo>
 </file>
@@ -128,7 +128,7 @@
   <pc:docChgLst>
     <pc:chgData name="Cihan Zeyrek" userId="dd9724baaf2e43d1" providerId="LiveId" clId="{E5A86D5C-552E-4995-AB32-5E49D96B1D3A}"/>
     <pc:docChg chg="undo redo custSel delSld modSld">
-      <pc:chgData name="Cihan Zeyrek" userId="dd9724baaf2e43d1" providerId="LiveId" clId="{E5A86D5C-552E-4995-AB32-5E49D96B1D3A}" dt="2025-07-04T12:14:56.378" v="4414" actId="1076"/>
+      <pc:chgData name="Cihan Zeyrek" userId="dd9724baaf2e43d1" providerId="LiveId" clId="{E5A86D5C-552E-4995-AB32-5E49D96B1D3A}" dt="2025-07-04T12:59:09.791" v="4429" actId="14100"/>
       <pc:docMkLst>
         <pc:docMk/>
       </pc:docMkLst>
@@ -220,7 +220,7 @@
         </pc:spChg>
       </pc:sldChg>
       <pc:sldChg chg="addSp delSp modSp mod">
-        <pc:chgData name="Cihan Zeyrek" userId="dd9724baaf2e43d1" providerId="LiveId" clId="{E5A86D5C-552E-4995-AB32-5E49D96B1D3A}" dt="2025-07-04T12:14:56.378" v="4414" actId="1076"/>
+        <pc:chgData name="Cihan Zeyrek" userId="dd9724baaf2e43d1" providerId="LiveId" clId="{E5A86D5C-552E-4995-AB32-5E49D96B1D3A}" dt="2025-07-04T12:59:09.791" v="4429" actId="14100"/>
         <pc:sldMkLst>
           <pc:docMk/>
           <pc:sldMk cId="3613911005" sldId="258"/>
@@ -450,7 +450,7 @@
           </ac:spMkLst>
         </pc:spChg>
         <pc:spChg chg="add mod">
-          <ac:chgData name="Cihan Zeyrek" userId="dd9724baaf2e43d1" providerId="LiveId" clId="{E5A86D5C-552E-4995-AB32-5E49D96B1D3A}" dt="2025-07-03T14:16:27.570" v="3691" actId="113"/>
+          <ac:chgData name="Cihan Zeyrek" userId="dd9724baaf2e43d1" providerId="LiveId" clId="{E5A86D5C-552E-4995-AB32-5E49D96B1D3A}" dt="2025-07-04T12:59:09.791" v="4429" actId="14100"/>
           <ac:spMkLst>
             <pc:docMk/>
             <pc:sldMk cId="3613911005" sldId="258"/>
@@ -529,8 +529,8 @@
             <ac:picMk id="46" creationId="{0D302B69-227B-F98A-9C17-505C30F9EF34}"/>
           </ac:picMkLst>
         </pc:picChg>
-        <pc:picChg chg="add mod">
-          <ac:chgData name="Cihan Zeyrek" userId="dd9724baaf2e43d1" providerId="LiveId" clId="{E5A86D5C-552E-4995-AB32-5E49D96B1D3A}" dt="2025-07-03T14:10:34.175" v="3535" actId="1076"/>
+        <pc:picChg chg="add del mod">
+          <ac:chgData name="Cihan Zeyrek" userId="dd9724baaf2e43d1" providerId="LiveId" clId="{E5A86D5C-552E-4995-AB32-5E49D96B1D3A}" dt="2025-07-04T12:58:45.916" v="4423" actId="478"/>
           <ac:picMkLst>
             <pc:docMk/>
             <pc:sldMk cId="3613911005" sldId="258"/>
@@ -543,6 +543,14 @@
             <pc:docMk/>
             <pc:sldMk cId="3613911005" sldId="258"/>
             <ac:picMk id="55" creationId="{2850C1C9-B223-F7BE-1D76-2515B899DD6B}"/>
+          </ac:picMkLst>
+        </pc:picChg>
+        <pc:picChg chg="add mod modCrop">
+          <ac:chgData name="Cihan Zeyrek" userId="dd9724baaf2e43d1" providerId="LiveId" clId="{E5A86D5C-552E-4995-AB32-5E49D96B1D3A}" dt="2025-07-04T12:59:04.179" v="4428" actId="14100"/>
+          <ac:picMkLst>
+            <pc:docMk/>
+            <pc:sldMk cId="3613911005" sldId="258"/>
+            <ac:picMk id="55" creationId="{35A664B3-803F-4536-2EE5-578ED541F8BF}"/>
           </ac:picMkLst>
         </pc:picChg>
         <pc:picChg chg="add del mod">
@@ -7720,42 +7728,6 @@
           </a:p>
         </p:txBody>
       </p:sp>
-      <p:pic>
-        <p:nvPicPr>
-          <p:cNvPr id="53" name="Grafik 52" descr="Ein Bild, das Text, Screenshot, Farbigkeit, Reihe enthält.&#10;&#10;KI-generierte Inhalte können fehlerhaft sein.">
-            <a:extLst>
-              <a:ext uri="{FF2B5EF4-FFF2-40B4-BE49-F238E27FC236}">
-                <a16:creationId xmlns:a16="http://schemas.microsoft.com/office/drawing/2014/main" id="{BAAF9A28-A00D-D8F6-8487-F57CBEA64C0C}"/>
-              </a:ext>
-            </a:extLst>
-          </p:cNvPr>
-          <p:cNvPicPr>
-            <a:picLocks noChangeAspect="1"/>
-          </p:cNvPicPr>
-          <p:nvPr/>
-        </p:nvPicPr>
-        <p:blipFill>
-          <a:blip r:embed="rId17">
-            <a:extLst>
-              <a:ext uri="{28A0092B-C50C-407E-A947-70E740481C1C}">
-                <a14:useLocalDpi xmlns:a14="http://schemas.microsoft.com/office/drawing/2010/main" val="0"/>
-              </a:ext>
-            </a:extLst>
-          </a:blip>
-          <a:stretch>
-            <a:fillRect/>
-          </a:stretch>
-        </p:blipFill>
-        <p:spPr>
-          <a:xfrm>
-            <a:off x="7311060" y="7217510"/>
-            <a:ext cx="7082565" cy="4721710"/>
-          </a:xfrm>
-          <a:prstGeom prst="rect">
-            <a:avLst/>
-          </a:prstGeom>
-        </p:spPr>
-      </p:pic>
       <p:sp>
         <p:nvSpPr>
           <p:cNvPr id="56" name="Textfeld 55">
@@ -7770,8 +7742,8 @@
         </p:nvSpPr>
         <p:spPr>
           <a:xfrm>
-            <a:off x="7278015" y="11954804"/>
-            <a:ext cx="7115610" cy="646331"/>
+            <a:off x="6978285" y="11954804"/>
+            <a:ext cx="7415340" cy="646331"/>
           </a:xfrm>
           <a:prstGeom prst="rect">
             <a:avLst/>
@@ -8058,7 +8030,7 @@
           <p:nvPr/>
         </p:nvPicPr>
         <p:blipFill>
-          <a:blip r:embed="rId18">
+          <a:blip r:embed="rId17">
             <a:extLst>
               <a:ext uri="{28A0092B-C50C-407E-A947-70E740481C1C}">
                 <a14:useLocalDpi xmlns:a14="http://schemas.microsoft.com/office/drawing/2010/main" val="0"/>
@@ -8150,7 +8122,7 @@
           <p:nvPr/>
         </p:nvPicPr>
         <p:blipFill>
-          <a:blip r:embed="rId19">
+          <a:blip r:embed="rId18">
             <a:extLst>
               <a:ext uri="{28A0092B-C50C-407E-A947-70E740481C1C}">
                 <a14:useLocalDpi xmlns:a14="http://schemas.microsoft.com/office/drawing/2010/main" val="0"/>
@@ -8619,7 +8591,7 @@
           <p:nvPr/>
         </p:nvPicPr>
         <p:blipFill>
-          <a:blip r:embed="rId20">
+          <a:blip r:embed="rId19">
             <a:extLst>
               <a:ext uri="{28A0092B-C50C-407E-A947-70E740481C1C}">
                 <a14:useLocalDpi xmlns:a14="http://schemas.microsoft.com/office/drawing/2010/main" val="0"/>
@@ -9161,6 +9133,43 @@
           </a:p>
         </p:txBody>
       </p:sp>
+      <p:pic>
+        <p:nvPicPr>
+          <p:cNvPr id="55" name="Grafik 54" descr="Ein Bild, das Screenshot, Text, Farbigkeit, Reihe enthält.&#10;&#10;KI-generierte Inhalte können fehlerhaft sein.">
+            <a:extLst>
+              <a:ext uri="{FF2B5EF4-FFF2-40B4-BE49-F238E27FC236}">
+                <a16:creationId xmlns:a16="http://schemas.microsoft.com/office/drawing/2014/main" id="{35A664B3-803F-4536-2EE5-578ED541F8BF}"/>
+              </a:ext>
+            </a:extLst>
+          </p:cNvPr>
+          <p:cNvPicPr>
+            <a:picLocks noChangeAspect="1"/>
+          </p:cNvPicPr>
+          <p:nvPr/>
+        </p:nvPicPr>
+        <p:blipFill>
+          <a:blip r:embed="rId20">
+            <a:extLst>
+              <a:ext uri="{28A0092B-C50C-407E-A947-70E740481C1C}">
+                <a14:useLocalDpi xmlns:a14="http://schemas.microsoft.com/office/drawing/2010/main" val="0"/>
+              </a:ext>
+            </a:extLst>
+          </a:blip>
+          <a:srcRect l="2118" t="4855" r="1441" b="4768"/>
+          <a:stretch>
+            <a:fillRect/>
+          </a:stretch>
+        </p:blipFill>
+        <p:spPr>
+          <a:xfrm>
+            <a:off x="6978285" y="7124435"/>
+            <a:ext cx="7762767" cy="4849741"/>
+          </a:xfrm>
+          <a:prstGeom prst="rect">
+            <a:avLst/>
+          </a:prstGeom>
+        </p:spPr>
+      </p:pic>
     </p:spTree>
     <p:extLst>
       <p:ext uri="{BB962C8B-B14F-4D97-AF65-F5344CB8AC3E}">

</xml_diff>

<commit_message>
clusters hoffe ist nicht zu ugly
</commit_message>
<xml_diff>
--- a/RiboZwo.pptx
+++ b/RiboZwo.pptx
@@ -594,7 +594,7 @@
 <file path=ppt/charts/chart1.xml><?xml version="1.0" encoding="utf-8"?>
 <c:chartSpace xmlns:c="http://schemas.openxmlformats.org/drawingml/2006/chart" xmlns:a="http://schemas.openxmlformats.org/drawingml/2006/main" xmlns:r="http://schemas.openxmlformats.org/officeDocument/2006/relationships" xmlns:c16r2="http://schemas.microsoft.com/office/drawing/2015/06/chart">
   <c:date1904 val="0"/>
-  <c:lang val="de-DE"/>
+  <c:lang val="en-GB"/>
   <c:roundedCorners val="0"/>
   <mc:AlternateContent xmlns:mc="http://schemas.openxmlformats.org/markup-compatibility/2006">
     <mc:Choice xmlns:c14="http://schemas.microsoft.com/office/drawing/2007/8/2/chart" Requires="c14">
@@ -1604,7 +1604,7 @@
           <a:p>
             <a:fld id="{12610477-6C94-4391-BBDC-B8E9BB33E658}" type="datetimeFigureOut">
               <a:rPr lang="de-DE" smtClean="0"/>
-              <a:t>05.07.25</a:t>
+              <a:t>05.07.2025</a:t>
             </a:fld>
             <a:endParaRPr lang="de-DE"/>
           </a:p>
@@ -1762,7 +1762,7 @@
           <a:p>
             <a:fld id="{B23F8280-8283-495D-A659-9194DB8B63EA}" type="slidenum">
               <a:rPr lang="de-DE" smtClean="0"/>
-              <a:t>‹Nr.›</a:t>
+              <a:t>‹#›</a:t>
             </a:fld>
             <a:endParaRPr lang="de-DE"/>
           </a:p>
@@ -2110,7 +2110,7 @@
           <a:p>
             <a:fld id="{F9ACF1CB-8064-4AFF-8DFB-49A00122A1FD}" type="datetimeFigureOut">
               <a:rPr lang="de-DE" smtClean="0"/>
-              <a:t>05.07.25</a:t>
+              <a:t>05.07.2025</a:t>
             </a:fld>
             <a:endParaRPr lang="de-DE"/>
           </a:p>
@@ -2152,7 +2152,7 @@
           <a:p>
             <a:fld id="{79580C82-F813-4CCE-B4AC-52ACFAE55A43}" type="slidenum">
               <a:rPr lang="de-DE" smtClean="0"/>
-              <a:t>‹Nr.›</a:t>
+              <a:t>‹#›</a:t>
             </a:fld>
             <a:endParaRPr lang="de-DE"/>
           </a:p>
@@ -2280,7 +2280,7 @@
           <a:p>
             <a:fld id="{F9ACF1CB-8064-4AFF-8DFB-49A00122A1FD}" type="datetimeFigureOut">
               <a:rPr lang="de-DE" smtClean="0"/>
-              <a:t>05.07.25</a:t>
+              <a:t>05.07.2025</a:t>
             </a:fld>
             <a:endParaRPr lang="de-DE"/>
           </a:p>
@@ -2322,7 +2322,7 @@
           <a:p>
             <a:fld id="{79580C82-F813-4CCE-B4AC-52ACFAE55A43}" type="slidenum">
               <a:rPr lang="de-DE" smtClean="0"/>
-              <a:t>‹Nr.›</a:t>
+              <a:t>‹#›</a:t>
             </a:fld>
             <a:endParaRPr lang="de-DE"/>
           </a:p>
@@ -2460,7 +2460,7 @@
           <a:p>
             <a:fld id="{F9ACF1CB-8064-4AFF-8DFB-49A00122A1FD}" type="datetimeFigureOut">
               <a:rPr lang="de-DE" smtClean="0"/>
-              <a:t>05.07.25</a:t>
+              <a:t>05.07.2025</a:t>
             </a:fld>
             <a:endParaRPr lang="de-DE"/>
           </a:p>
@@ -2502,7 +2502,7 @@
           <a:p>
             <a:fld id="{79580C82-F813-4CCE-B4AC-52ACFAE55A43}" type="slidenum">
               <a:rPr lang="de-DE" smtClean="0"/>
-              <a:t>‹Nr.›</a:t>
+              <a:t>‹#›</a:t>
             </a:fld>
             <a:endParaRPr lang="de-DE"/>
           </a:p>
@@ -2630,7 +2630,7 @@
           <a:p>
             <a:fld id="{F9ACF1CB-8064-4AFF-8DFB-49A00122A1FD}" type="datetimeFigureOut">
               <a:rPr lang="de-DE" smtClean="0"/>
-              <a:t>05.07.25</a:t>
+              <a:t>05.07.2025</a:t>
             </a:fld>
             <a:endParaRPr lang="de-DE"/>
           </a:p>
@@ -2672,7 +2672,7 @@
           <a:p>
             <a:fld id="{79580C82-F813-4CCE-B4AC-52ACFAE55A43}" type="slidenum">
               <a:rPr lang="de-DE" smtClean="0"/>
-              <a:t>‹Nr.›</a:t>
+              <a:t>‹#›</a:t>
             </a:fld>
             <a:endParaRPr lang="de-DE"/>
           </a:p>
@@ -2876,7 +2876,7 @@
           <a:p>
             <a:fld id="{F9ACF1CB-8064-4AFF-8DFB-49A00122A1FD}" type="datetimeFigureOut">
               <a:rPr lang="de-DE" smtClean="0"/>
-              <a:t>05.07.25</a:t>
+              <a:t>05.07.2025</a:t>
             </a:fld>
             <a:endParaRPr lang="de-DE"/>
           </a:p>
@@ -2918,7 +2918,7 @@
           <a:p>
             <a:fld id="{79580C82-F813-4CCE-B4AC-52ACFAE55A43}" type="slidenum">
               <a:rPr lang="de-DE" smtClean="0"/>
-              <a:t>‹Nr.›</a:t>
+              <a:t>‹#›</a:t>
             </a:fld>
             <a:endParaRPr lang="de-DE"/>
           </a:p>
@@ -3108,7 +3108,7 @@
           <a:p>
             <a:fld id="{F9ACF1CB-8064-4AFF-8DFB-49A00122A1FD}" type="datetimeFigureOut">
               <a:rPr lang="de-DE" smtClean="0"/>
-              <a:t>05.07.25</a:t>
+              <a:t>05.07.2025</a:t>
             </a:fld>
             <a:endParaRPr lang="de-DE"/>
           </a:p>
@@ -3150,7 +3150,7 @@
           <a:p>
             <a:fld id="{79580C82-F813-4CCE-B4AC-52ACFAE55A43}" type="slidenum">
               <a:rPr lang="de-DE" smtClean="0"/>
-              <a:t>‹Nr.›</a:t>
+              <a:t>‹#›</a:t>
             </a:fld>
             <a:endParaRPr lang="de-DE"/>
           </a:p>
@@ -3475,7 +3475,7 @@
           <a:p>
             <a:fld id="{F9ACF1CB-8064-4AFF-8DFB-49A00122A1FD}" type="datetimeFigureOut">
               <a:rPr lang="de-DE" smtClean="0"/>
-              <a:t>05.07.25</a:t>
+              <a:t>05.07.2025</a:t>
             </a:fld>
             <a:endParaRPr lang="de-DE"/>
           </a:p>
@@ -3517,7 +3517,7 @@
           <a:p>
             <a:fld id="{79580C82-F813-4CCE-B4AC-52ACFAE55A43}" type="slidenum">
               <a:rPr lang="de-DE" smtClean="0"/>
-              <a:t>‹Nr.›</a:t>
+              <a:t>‹#›</a:t>
             </a:fld>
             <a:endParaRPr lang="de-DE"/>
           </a:p>
@@ -3593,7 +3593,7 @@
           <a:p>
             <a:fld id="{F9ACF1CB-8064-4AFF-8DFB-49A00122A1FD}" type="datetimeFigureOut">
               <a:rPr lang="de-DE" smtClean="0"/>
-              <a:t>05.07.25</a:t>
+              <a:t>05.07.2025</a:t>
             </a:fld>
             <a:endParaRPr lang="de-DE"/>
           </a:p>
@@ -3635,7 +3635,7 @@
           <a:p>
             <a:fld id="{79580C82-F813-4CCE-B4AC-52ACFAE55A43}" type="slidenum">
               <a:rPr lang="de-DE" smtClean="0"/>
-              <a:t>‹Nr.›</a:t>
+              <a:t>‹#›</a:t>
             </a:fld>
             <a:endParaRPr lang="de-DE"/>
           </a:p>
@@ -3688,7 +3688,7 @@
           <a:p>
             <a:fld id="{F9ACF1CB-8064-4AFF-8DFB-49A00122A1FD}" type="datetimeFigureOut">
               <a:rPr lang="de-DE" smtClean="0"/>
-              <a:t>05.07.25</a:t>
+              <a:t>05.07.2025</a:t>
             </a:fld>
             <a:endParaRPr lang="de-DE"/>
           </a:p>
@@ -3730,7 +3730,7 @@
           <a:p>
             <a:fld id="{79580C82-F813-4CCE-B4AC-52ACFAE55A43}" type="slidenum">
               <a:rPr lang="de-DE" smtClean="0"/>
-              <a:t>‹Nr.›</a:t>
+              <a:t>‹#›</a:t>
             </a:fld>
             <a:endParaRPr lang="de-DE"/>
           </a:p>
@@ -3965,7 +3965,7 @@
           <a:p>
             <a:fld id="{F9ACF1CB-8064-4AFF-8DFB-49A00122A1FD}" type="datetimeFigureOut">
               <a:rPr lang="de-DE" smtClean="0"/>
-              <a:t>05.07.25</a:t>
+              <a:t>05.07.2025</a:t>
             </a:fld>
             <a:endParaRPr lang="de-DE"/>
           </a:p>
@@ -4007,7 +4007,7 @@
           <a:p>
             <a:fld id="{79580C82-F813-4CCE-B4AC-52ACFAE55A43}" type="slidenum">
               <a:rPr lang="de-DE" smtClean="0"/>
-              <a:t>‹Nr.›</a:t>
+              <a:t>‹#›</a:t>
             </a:fld>
             <a:endParaRPr lang="de-DE"/>
           </a:p>
@@ -4222,7 +4222,7 @@
           <a:p>
             <a:fld id="{F9ACF1CB-8064-4AFF-8DFB-49A00122A1FD}" type="datetimeFigureOut">
               <a:rPr lang="de-DE" smtClean="0"/>
-              <a:t>05.07.25</a:t>
+              <a:t>05.07.2025</a:t>
             </a:fld>
             <a:endParaRPr lang="de-DE"/>
           </a:p>
@@ -4264,7 +4264,7 @@
           <a:p>
             <a:fld id="{79580C82-F813-4CCE-B4AC-52ACFAE55A43}" type="slidenum">
               <a:rPr lang="de-DE" smtClean="0"/>
-              <a:t>‹Nr.›</a:t>
+              <a:t>‹#›</a:t>
             </a:fld>
             <a:endParaRPr lang="de-DE"/>
           </a:p>
@@ -4507,7 +4507,7 @@
           <a:p>
             <a:fld id="{F9ACF1CB-8064-4AFF-8DFB-49A00122A1FD}" type="datetimeFigureOut">
               <a:rPr lang="de-DE" smtClean="0"/>
-              <a:t>05.07.25</a:t>
+              <a:t>05.07.2025</a:t>
             </a:fld>
             <a:endParaRPr lang="de-DE"/>
           </a:p>
@@ -4585,7 +4585,7 @@
           <a:p>
             <a:fld id="{79580C82-F813-4CCE-B4AC-52ACFAE55A43}" type="slidenum">
               <a:rPr lang="de-DE" smtClean="0"/>
-              <a:t>‹Nr.›</a:t>
+              <a:t>‹#›</a:t>
             </a:fld>
             <a:endParaRPr lang="de-DE"/>
           </a:p>
@@ -5270,68 +5270,6 @@
       </p:sp>
       <p:sp>
         <p:nvSpPr>
-          <p:cNvPr id="22" name="Abgerundetes Rechteck 21">
-            <a:extLst>
-              <a:ext uri="{FF2B5EF4-FFF2-40B4-BE49-F238E27FC236}">
-                <a16:creationId xmlns:a16="http://schemas.microsoft.com/office/drawing/2014/main" id="{CADA5048-84E9-7610-1363-103CE5D313B8}"/>
-              </a:ext>
-            </a:extLst>
-          </p:cNvPr>
-          <p:cNvSpPr/>
-          <p:nvPr/>
-        </p:nvSpPr>
-        <p:spPr>
-          <a:xfrm>
-            <a:off x="15286763" y="25651859"/>
-            <a:ext cx="14528007" cy="12645545"/>
-          </a:xfrm>
-          <a:prstGeom prst="roundRect">
-            <a:avLst>
-              <a:gd name="adj" fmla="val 5015"/>
-            </a:avLst>
-          </a:prstGeom>
-          <a:solidFill>
-            <a:srgbClr val="E49596">
-              <a:alpha val="33168"/>
-            </a:srgbClr>
-          </a:solidFill>
-          <a:ln w="63500">
-            <a:solidFill>
-              <a:srgbClr val="B22F28"/>
-            </a:solidFill>
-          </a:ln>
-        </p:spPr>
-        <p:style>
-          <a:lnRef idx="2">
-            <a:schemeClr val="accent1">
-              <a:shade val="15000"/>
-            </a:schemeClr>
-          </a:lnRef>
-          <a:fillRef idx="1">
-            <a:schemeClr val="accent1"/>
-          </a:fillRef>
-          <a:effectRef idx="0">
-            <a:schemeClr val="accent1"/>
-          </a:effectRef>
-          <a:fontRef idx="minor">
-            <a:schemeClr val="lt1"/>
-          </a:fontRef>
-        </p:style>
-        <p:txBody>
-          <a:bodyPr rtlCol="0" anchor="t"/>
-          <a:lstStyle/>
-          <a:p>
-            <a:pPr algn="r"/>
-            <a:endParaRPr lang="en-US" sz="3600" noProof="0" dirty="0">
-              <a:solidFill>
-                <a:schemeClr val="tx1"/>
-              </a:solidFill>
-            </a:endParaRPr>
-          </a:p>
-        </p:txBody>
-      </p:sp>
-      <p:sp>
-        <p:nvSpPr>
           <p:cNvPr id="4" name="Rechteck 3">
             <a:extLst>
               <a:ext uri="{FF2B5EF4-FFF2-40B4-BE49-F238E27FC236}">
@@ -6688,10 +6626,10 @@
       </p:sp>
       <p:pic>
         <p:nvPicPr>
-          <p:cNvPr id="72" name="Picture 71" descr="A screenshot of a video game&#10;&#10;AI-generated content may be incorrect.">
+          <p:cNvPr id="58" name="Grafik 57">
             <a:extLst>
               <a:ext uri="{FF2B5EF4-FFF2-40B4-BE49-F238E27FC236}">
-                <a16:creationId xmlns:a16="http://schemas.microsoft.com/office/drawing/2014/main" id="{08B70003-AD1E-4701-456D-41507D8EABB7}"/>
+                <a16:creationId xmlns:a16="http://schemas.microsoft.com/office/drawing/2014/main" id="{A4E66611-3D6E-9A44-4656-502C42629693}"/>
               </a:ext>
             </a:extLst>
           </p:cNvPr>
@@ -6714,567 +6652,6 @@
         </p:blipFill>
         <p:spPr>
           <a:xfrm>
-            <a:off x="22656645" y="26246968"/>
-            <a:ext cx="6611709" cy="4958783"/>
-          </a:xfrm>
-          <a:prstGeom prst="rect">
-            <a:avLst/>
-          </a:prstGeom>
-        </p:spPr>
-      </p:pic>
-      <p:sp>
-        <p:nvSpPr>
-          <p:cNvPr id="14" name="Rectangle 13">
-            <a:extLst>
-              <a:ext uri="{FF2B5EF4-FFF2-40B4-BE49-F238E27FC236}">
-                <a16:creationId xmlns:a16="http://schemas.microsoft.com/office/drawing/2014/main" id="{AB754934-85BC-3E41-3BC6-0759F2D51BE4}"/>
-              </a:ext>
-            </a:extLst>
-          </p:cNvPr>
-          <p:cNvSpPr/>
-          <p:nvPr/>
-        </p:nvSpPr>
-        <p:spPr>
-          <a:xfrm>
-            <a:off x="15709390" y="32900676"/>
-            <a:ext cx="5005853" cy="3811211"/>
-          </a:xfrm>
-          <a:prstGeom prst="rect">
-            <a:avLst/>
-          </a:prstGeom>
-          <a:solidFill>
-            <a:schemeClr val="bg1"/>
-          </a:solidFill>
-          <a:ln>
-            <a:noFill/>
-          </a:ln>
-        </p:spPr>
-        <p:style>
-          <a:lnRef idx="2">
-            <a:schemeClr val="accent1">
-              <a:shade val="15000"/>
-            </a:schemeClr>
-          </a:lnRef>
-          <a:fillRef idx="1">
-            <a:schemeClr val="accent1"/>
-          </a:fillRef>
-          <a:effectRef idx="0">
-            <a:schemeClr val="accent1"/>
-          </a:effectRef>
-          <a:fontRef idx="minor">
-            <a:schemeClr val="lt1"/>
-          </a:fontRef>
-        </p:style>
-        <p:txBody>
-          <a:bodyPr rtlCol="0" anchor="t"/>
-          <a:lstStyle/>
-          <a:p>
-            <a:pPr algn="r"/>
-            <a:endParaRPr lang="en-GB" sz="3600" dirty="0">
-              <a:solidFill>
-                <a:schemeClr val="tx1"/>
-              </a:solidFill>
-            </a:endParaRPr>
-          </a:p>
-        </p:txBody>
-      </p:sp>
-      <p:pic>
-        <p:nvPicPr>
-          <p:cNvPr id="68" name="Picture 67" descr="A yellow and orange squares&#10;&#10;AI-generated content may be incorrect.">
-            <a:extLst>
-              <a:ext uri="{FF2B5EF4-FFF2-40B4-BE49-F238E27FC236}">
-                <a16:creationId xmlns:a16="http://schemas.microsoft.com/office/drawing/2014/main" id="{288F68B4-DDA1-2EEB-9F23-81C0A0F5FDB5}"/>
-              </a:ext>
-            </a:extLst>
-          </p:cNvPr>
-          <p:cNvPicPr>
-            <a:picLocks noChangeAspect="1"/>
-          </p:cNvPicPr>
-          <p:nvPr/>
-        </p:nvPicPr>
-        <p:blipFill>
-          <a:blip r:embed="rId11">
-            <a:extLst>
-              <a:ext uri="{28A0092B-C50C-407E-A947-70E740481C1C}">
-                <a14:useLocalDpi xmlns:a14="http://schemas.microsoft.com/office/drawing/2010/main" val="0"/>
-              </a:ext>
-            </a:extLst>
-          </a:blip>
-          <a:stretch>
-            <a:fillRect/>
-          </a:stretch>
-        </p:blipFill>
-        <p:spPr>
-          <a:xfrm>
-            <a:off x="15857545" y="32949588"/>
-            <a:ext cx="4857698" cy="3643274"/>
-          </a:xfrm>
-          <a:prstGeom prst="rect">
-            <a:avLst/>
-          </a:prstGeom>
-        </p:spPr>
-      </p:pic>
-      <p:sp>
-        <p:nvSpPr>
-          <p:cNvPr id="46" name="Textfeld 48">
-            <a:extLst>
-              <a:ext uri="{FF2B5EF4-FFF2-40B4-BE49-F238E27FC236}">
-                <a16:creationId xmlns:a16="http://schemas.microsoft.com/office/drawing/2014/main" id="{09012934-17D9-9E1F-A0A5-E6B32DB352BC}"/>
-              </a:ext>
-            </a:extLst>
-          </p:cNvPr>
-          <p:cNvSpPr txBox="1"/>
-          <p:nvPr/>
-        </p:nvSpPr>
-        <p:spPr>
-          <a:xfrm>
-            <a:off x="15360712" y="26807152"/>
-            <a:ext cx="7670217" cy="5909310"/>
-          </a:xfrm>
-          <a:prstGeom prst="rect">
-            <a:avLst/>
-          </a:prstGeom>
-          <a:noFill/>
-        </p:spPr>
-        <p:txBody>
-          <a:bodyPr wrap="square" rtlCol="0">
-            <a:spAutoFit/>
-          </a:bodyPr>
-          <a:lstStyle/>
-          <a:p>
-            <a:pPr algn="just"/>
-            <a:r>
-              <a:rPr lang="en-GB" sz="2400" b="1" dirty="0">
-                <a:latin typeface="Source Sans Pro" panose="020B0503030403020204" pitchFamily="34" charset="0"/>
-                <a:ea typeface="Source Sans Pro" panose="020B0503030403020204" pitchFamily="34" charset="0"/>
-              </a:rPr>
-              <a:t>DBSCAN :</a:t>
-            </a:r>
-          </a:p>
-          <a:p>
-            <a:r>
-              <a:rPr lang="en-GB" sz="2400" dirty="0"/>
-              <a:t>is a clustering algorithm that can classify points in low-density regions as it considers </a:t>
-            </a:r>
-            <a:r>
-              <a:rPr lang="en-GB" sz="2400" b="1" dirty="0"/>
-              <a:t>point density and distance</a:t>
-            </a:r>
-            <a:r>
-              <a:rPr lang="en-GB" sz="2400" dirty="0"/>
-              <a:t>.</a:t>
-            </a:r>
-          </a:p>
-          <a:p>
-            <a:r>
-              <a:rPr lang="en-GB" sz="2400" b="1" dirty="0"/>
-              <a:t>ε (epsilon):</a:t>
-            </a:r>
-            <a:r>
-              <a:rPr lang="en-GB" sz="2400" dirty="0"/>
-              <a:t> The maximum distance between two points to be considered </a:t>
-            </a:r>
-            <a:r>
-              <a:rPr lang="en-GB" sz="2400" dirty="0" err="1"/>
-              <a:t>neighbors</a:t>
-            </a:r>
-            <a:r>
-              <a:rPr lang="en-GB" sz="2400" dirty="0"/>
-              <a:t>.</a:t>
-            </a:r>
-          </a:p>
-          <a:p>
-            <a:pPr marL="800100" lvl="1" indent="-342900">
-              <a:buFont typeface="Arial" panose="020B0604020202020204" pitchFamily="34" charset="0"/>
-              <a:buChar char="•"/>
-            </a:pPr>
-            <a:r>
-              <a:rPr lang="en-GB" sz="2400" dirty="0"/>
-              <a:t>If ε </a:t>
-            </a:r>
-            <a:r>
-              <a:rPr lang="en-GB" sz="2400" b="1" dirty="0"/>
-              <a:t>low </a:t>
-            </a:r>
-            <a:r>
-              <a:rPr lang="en-GB" sz="2400" dirty="0"/>
-              <a:t>=&gt; most points are classified as noise.</a:t>
-            </a:r>
-          </a:p>
-          <a:p>
-            <a:pPr marL="800100" lvl="1" indent="-342900">
-              <a:buFont typeface="Arial" panose="020B0604020202020204" pitchFamily="34" charset="0"/>
-              <a:buChar char="•"/>
-            </a:pPr>
-            <a:r>
-              <a:rPr lang="en-GB" sz="2400" dirty="0"/>
-              <a:t>If ε </a:t>
-            </a:r>
-            <a:r>
-              <a:rPr lang="en-GB" sz="2400" b="1" dirty="0"/>
-              <a:t>high </a:t>
-            </a:r>
-            <a:r>
-              <a:rPr lang="en-GB" sz="2400" dirty="0"/>
-              <a:t>=&gt; noise points may form a single large, meaningless cluster.</a:t>
-            </a:r>
-          </a:p>
-          <a:p>
-            <a:pPr lvl="1"/>
-            <a:r>
-              <a:rPr lang="en-GB" sz="2400" b="1" dirty="0" err="1"/>
-              <a:t>MinPts</a:t>
-            </a:r>
-            <a:r>
-              <a:rPr lang="en-GB" sz="2400" b="1" dirty="0"/>
-              <a:t>:</a:t>
-            </a:r>
-            <a:r>
-              <a:rPr lang="en-GB" sz="2400" dirty="0"/>
-              <a:t> The minimum number of </a:t>
-            </a:r>
-            <a:r>
-              <a:rPr lang="en-GB" sz="2400" dirty="0" err="1"/>
-              <a:t>neighbors</a:t>
-            </a:r>
-            <a:r>
-              <a:rPr lang="en-GB" sz="2400" dirty="0"/>
-              <a:t> (within ε distance) required to form a </a:t>
-            </a:r>
-            <a:r>
-              <a:rPr lang="en-GB" sz="2400" b="1" dirty="0"/>
-              <a:t>core point, border points</a:t>
-            </a:r>
-            <a:r>
-              <a:rPr lang="en-GB" sz="2400" dirty="0"/>
-              <a:t> are those within ε of a core point.</a:t>
-            </a:r>
-          </a:p>
-          <a:p>
-            <a:pPr marL="800100" lvl="1" indent="-342900">
-              <a:buFont typeface="Arial" panose="020B0604020202020204" pitchFamily="34" charset="0"/>
-              <a:buChar char="•"/>
-            </a:pPr>
-            <a:r>
-              <a:rPr lang="en-GB" sz="2400" dirty="0"/>
-              <a:t>If </a:t>
-            </a:r>
-            <a:r>
-              <a:rPr lang="en-GB" sz="2400" dirty="0" err="1"/>
-              <a:t>MinPts</a:t>
-            </a:r>
-            <a:r>
-              <a:rPr lang="en-GB" sz="2400" dirty="0"/>
-              <a:t>  </a:t>
-            </a:r>
-            <a:r>
-              <a:rPr lang="en-GB" sz="2400" b="1" dirty="0"/>
-              <a:t>low</a:t>
-            </a:r>
-            <a:r>
-              <a:rPr lang="en-GB" sz="2400" dirty="0">
-                <a:solidFill>
-                  <a:srgbClr val="B22F28"/>
-                </a:solidFill>
-              </a:rPr>
-              <a:t> </a:t>
-            </a:r>
-            <a:r>
-              <a:rPr lang="en-GB" sz="2400" dirty="0"/>
-              <a:t>=&gt;  isolated points can form clusters.</a:t>
-            </a:r>
-          </a:p>
-          <a:p>
-            <a:pPr marL="800100" lvl="1" indent="-342900">
-              <a:buFont typeface="Arial" panose="020B0604020202020204" pitchFamily="34" charset="0"/>
-              <a:buChar char="•"/>
-            </a:pPr>
-            <a:r>
-              <a:rPr lang="en-GB" sz="2400" dirty="0"/>
-              <a:t>If </a:t>
-            </a:r>
-            <a:r>
-              <a:rPr lang="en-GB" sz="2400" dirty="0" err="1"/>
-              <a:t>MinPts</a:t>
-            </a:r>
-            <a:r>
-              <a:rPr lang="en-GB" sz="2400" dirty="0"/>
-              <a:t>  </a:t>
-            </a:r>
-            <a:r>
-              <a:rPr lang="en-GB" sz="2400" b="1" dirty="0"/>
-              <a:t>high</a:t>
-            </a:r>
-            <a:r>
-              <a:rPr lang="en-GB" sz="2400" dirty="0"/>
-              <a:t> =&gt; large, dense clusters form, smaller ones are missed.</a:t>
-            </a:r>
-          </a:p>
-          <a:p>
-            <a:endParaRPr lang="en-US" noProof="0" dirty="0"/>
-          </a:p>
-        </p:txBody>
-      </p:sp>
-      <p:sp>
-        <p:nvSpPr>
-          <p:cNvPr id="52" name="Textfeld 48">
-            <a:extLst>
-              <a:ext uri="{FF2B5EF4-FFF2-40B4-BE49-F238E27FC236}">
-                <a16:creationId xmlns:a16="http://schemas.microsoft.com/office/drawing/2014/main" id="{0C9E6692-E493-9100-A3A2-2553EE851C05}"/>
-              </a:ext>
-            </a:extLst>
-          </p:cNvPr>
-          <p:cNvSpPr txBox="1"/>
-          <p:nvPr/>
-        </p:nvSpPr>
-        <p:spPr>
-          <a:xfrm>
-            <a:off x="20715243" y="32092643"/>
-            <a:ext cx="10001633" cy="4216539"/>
-          </a:xfrm>
-          <a:prstGeom prst="rect">
-            <a:avLst/>
-          </a:prstGeom>
-          <a:noFill/>
-        </p:spPr>
-        <p:txBody>
-          <a:bodyPr wrap="square" rtlCol="0">
-            <a:spAutoFit/>
-          </a:bodyPr>
-          <a:lstStyle/>
-          <a:p>
-            <a:pPr algn="just"/>
-            <a:r>
-              <a:rPr lang="en-US" sz="2400" b="1" noProof="0" dirty="0">
-                <a:latin typeface="Source Sans Pro" panose="020B0503030403020204" pitchFamily="34" charset="0"/>
-                <a:ea typeface="Source Sans Pro" panose="020B0503030403020204" pitchFamily="34" charset="0"/>
-              </a:rPr>
-              <a:t>Statistical Analysis</a:t>
-            </a:r>
-          </a:p>
-          <a:p>
-            <a:pPr algn="just"/>
-            <a:endParaRPr lang="en-US" sz="1000" noProof="0" dirty="0">
-              <a:latin typeface="Source Sans Pro" panose="020B0503030403020204" pitchFamily="34" charset="0"/>
-              <a:ea typeface="Source Sans Pro" panose="020B0503030403020204" pitchFamily="34" charset="0"/>
-            </a:endParaRPr>
-          </a:p>
-          <a:p>
-            <a:pPr algn="just"/>
-            <a:r>
-              <a:rPr lang="en-US" sz="2400" noProof="0" dirty="0">
-                <a:latin typeface="Source Sans Pro" panose="020B0503030403020204" pitchFamily="34" charset="0"/>
-                <a:ea typeface="Source Sans Pro" panose="020B0503030403020204" pitchFamily="34" charset="0"/>
-              </a:rPr>
-              <a:t>In order to </a:t>
-            </a:r>
-            <a:r>
-              <a:rPr lang="en-US" sz="2400" noProof="0" dirty="0" err="1">
-                <a:latin typeface="Source Sans Pro" panose="020B0503030403020204" pitchFamily="34" charset="0"/>
-                <a:ea typeface="Source Sans Pro" panose="020B0503030403020204" pitchFamily="34" charset="0"/>
-              </a:rPr>
-              <a:t>cualitativly</a:t>
-            </a:r>
-            <a:r>
-              <a:rPr lang="en-US" sz="2400" noProof="0" dirty="0">
-                <a:latin typeface="Source Sans Pro" panose="020B0503030403020204" pitchFamily="34" charset="0"/>
-                <a:ea typeface="Source Sans Pro" panose="020B0503030403020204" pitchFamily="34" charset="0"/>
-              </a:rPr>
-              <a:t> validate the efficiency in clustering of </a:t>
-            </a:r>
-          </a:p>
-          <a:p>
-            <a:pPr algn="just"/>
-            <a:r>
-              <a:rPr lang="en-US" sz="2400" noProof="0" dirty="0">
-                <a:latin typeface="Source Sans Pro" panose="020B0503030403020204" pitchFamily="34" charset="0"/>
-                <a:ea typeface="Source Sans Pro" panose="020B0503030403020204" pitchFamily="34" charset="0"/>
-              </a:rPr>
-              <a:t>the two parameters we created a heatmap with a specific </a:t>
-            </a:r>
-            <a:r>
-              <a:rPr lang="en-US" sz="2400" b="1" noProof="0" dirty="0" err="1">
-                <a:latin typeface="Source Sans Pro" panose="020B0503030403020204" pitchFamily="34" charset="0"/>
-                <a:ea typeface="Source Sans Pro" panose="020B0503030403020204" pitchFamily="34" charset="0"/>
-              </a:rPr>
-              <a:t>sc</a:t>
-            </a:r>
-            <a:r>
-              <a:rPr lang="en-US" sz="2400" b="1" dirty="0" err="1">
-                <a:latin typeface="Source Sans Pro" panose="020B0503030403020204" pitchFamily="34" charset="0"/>
-                <a:ea typeface="Source Sans Pro" panose="020B0503030403020204" pitchFamily="34" charset="0"/>
-              </a:rPr>
-              <a:t>oring</a:t>
-            </a:r>
-            <a:r>
-              <a:rPr lang="en-US" sz="2400" b="1" dirty="0">
-                <a:latin typeface="Source Sans Pro" panose="020B0503030403020204" pitchFamily="34" charset="0"/>
-                <a:ea typeface="Source Sans Pro" panose="020B0503030403020204" pitchFamily="34" charset="0"/>
-              </a:rPr>
-              <a:t> logic</a:t>
-            </a:r>
-          </a:p>
-          <a:p>
-            <a:pPr algn="just"/>
-            <a:endParaRPr lang="en-US" sz="2400" b="1" noProof="0" dirty="0">
-              <a:latin typeface="Source Sans Pro" panose="020B0503030403020204" pitchFamily="34" charset="0"/>
-              <a:ea typeface="Source Sans Pro" panose="020B0503030403020204" pitchFamily="34" charset="0"/>
-            </a:endParaRPr>
-          </a:p>
-          <a:p>
-            <a:pPr algn="just"/>
-            <a:r>
-              <a:rPr lang="en-US" sz="2400" noProof="0" dirty="0">
-                <a:latin typeface="Source Sans Pro" panose="020B0503030403020204" pitchFamily="34" charset="0"/>
-                <a:ea typeface="Source Sans Pro" panose="020B0503030403020204" pitchFamily="34" charset="0"/>
-              </a:rPr>
-              <a:t>And following Proteins (based on CORUM) </a:t>
-            </a:r>
-            <a:r>
-              <a:rPr lang="en-US" sz="2400" dirty="0">
-                <a:latin typeface="Source Sans Pro" panose="020B0503030403020204" pitchFamily="34" charset="0"/>
-                <a:ea typeface="Source Sans Pro" panose="020B0503030403020204" pitchFamily="34" charset="0"/>
-              </a:rPr>
-              <a:t>as … </a:t>
-            </a:r>
-          </a:p>
-          <a:p>
-            <a:pPr algn="just"/>
-            <a:endParaRPr lang="en-US" sz="2400" noProof="0" dirty="0">
-              <a:latin typeface="Source Sans Pro" panose="020B0503030403020204" pitchFamily="34" charset="0"/>
-              <a:ea typeface="Source Sans Pro" panose="020B0503030403020204" pitchFamily="34" charset="0"/>
-            </a:endParaRPr>
-          </a:p>
-          <a:p>
-            <a:pPr algn="just"/>
-            <a:r>
-              <a:rPr lang="en-US" sz="2400" dirty="0" err="1">
-                <a:latin typeface="Source Sans Pro" panose="020B0503030403020204" pitchFamily="34" charset="0"/>
-                <a:ea typeface="Source Sans Pro" panose="020B0503030403020204" pitchFamily="34" charset="0"/>
-              </a:rPr>
-              <a:t>Positv</a:t>
-            </a:r>
-            <a:r>
-              <a:rPr lang="en-US" sz="2400" dirty="0">
-                <a:latin typeface="Source Sans Pro" panose="020B0503030403020204" pitchFamily="34" charset="0"/>
-                <a:ea typeface="Source Sans Pro" panose="020B0503030403020204" pitchFamily="34" charset="0"/>
-              </a:rPr>
-              <a:t>  </a:t>
-            </a:r>
-            <a:r>
-              <a:rPr lang="en-US" sz="2400" dirty="0" err="1">
-                <a:latin typeface="Source Sans Pro" panose="020B0503030403020204" pitchFamily="34" charset="0"/>
-                <a:ea typeface="Source Sans Pro" panose="020B0503030403020204" pitchFamily="34" charset="0"/>
-              </a:rPr>
-              <a:t>Controll</a:t>
-            </a:r>
-            <a:r>
-              <a:rPr lang="en-US" sz="2400" dirty="0">
-                <a:latin typeface="Source Sans Pro" panose="020B0503030403020204" pitchFamily="34" charset="0"/>
-                <a:ea typeface="Source Sans Pro" panose="020B0503030403020204" pitchFamily="34" charset="0"/>
-              </a:rPr>
-              <a:t>:  Proteins from Complex XXX</a:t>
-            </a:r>
-          </a:p>
-          <a:p>
-            <a:pPr algn="just"/>
-            <a:endParaRPr lang="en-US" sz="2400" dirty="0">
-              <a:latin typeface="Source Sans Pro" panose="020B0503030403020204" pitchFamily="34" charset="0"/>
-              <a:ea typeface="Source Sans Pro" panose="020B0503030403020204" pitchFamily="34" charset="0"/>
-            </a:endParaRPr>
-          </a:p>
-          <a:p>
-            <a:pPr algn="just"/>
-            <a:r>
-              <a:rPr lang="en-US" sz="2400" dirty="0" err="1">
-                <a:latin typeface="Source Sans Pro" panose="020B0503030403020204" pitchFamily="34" charset="0"/>
-                <a:ea typeface="Source Sans Pro" panose="020B0503030403020204" pitchFamily="34" charset="0"/>
-              </a:rPr>
-              <a:t>Negativ</a:t>
-            </a:r>
-            <a:r>
-              <a:rPr lang="en-US" sz="2400" dirty="0">
-                <a:latin typeface="Source Sans Pro" panose="020B0503030403020204" pitchFamily="34" charset="0"/>
-                <a:ea typeface="Source Sans Pro" panose="020B0503030403020204" pitchFamily="34" charset="0"/>
-              </a:rPr>
-              <a:t> </a:t>
-            </a:r>
-            <a:r>
-              <a:rPr lang="en-US" sz="2400" dirty="0" err="1">
-                <a:latin typeface="Source Sans Pro" panose="020B0503030403020204" pitchFamily="34" charset="0"/>
-                <a:ea typeface="Source Sans Pro" panose="020B0503030403020204" pitchFamily="34" charset="0"/>
-              </a:rPr>
-              <a:t>Controll</a:t>
-            </a:r>
-            <a:r>
-              <a:rPr lang="en-US" sz="2400" dirty="0">
-                <a:latin typeface="Source Sans Pro" panose="020B0503030403020204" pitchFamily="34" charset="0"/>
-                <a:ea typeface="Source Sans Pro" panose="020B0503030403020204" pitchFamily="34" charset="0"/>
-              </a:rPr>
-              <a:t>:  </a:t>
-            </a:r>
-            <a:r>
-              <a:rPr lang="en-US" sz="2400" dirty="0" err="1">
-                <a:latin typeface="Source Sans Pro" panose="020B0503030403020204" pitchFamily="34" charset="0"/>
-                <a:ea typeface="Source Sans Pro" panose="020B0503030403020204" pitchFamily="34" charset="0"/>
-              </a:rPr>
-              <a:t>Prteins</a:t>
-            </a:r>
-            <a:r>
-              <a:rPr lang="en-US" sz="2400" dirty="0">
-                <a:latin typeface="Source Sans Pro" panose="020B0503030403020204" pitchFamily="34" charset="0"/>
-                <a:ea typeface="Source Sans Pro" panose="020B0503030403020204" pitchFamily="34" charset="0"/>
-              </a:rPr>
-              <a:t> X and Y </a:t>
-            </a:r>
-          </a:p>
-          <a:p>
-            <a:pPr algn="just"/>
-            <a:r>
-              <a:rPr lang="en-US" sz="2400" dirty="0">
-                <a:latin typeface="Source Sans Pro" panose="020B0503030403020204" pitchFamily="34" charset="0"/>
-                <a:ea typeface="Source Sans Pro" panose="020B0503030403020204" pitchFamily="34" charset="0"/>
-              </a:rPr>
-              <a:t> </a:t>
-            </a:r>
-            <a:endParaRPr lang="en-US" sz="2400" noProof="0" dirty="0">
-              <a:latin typeface="Source Sans Pro" panose="020B0503030403020204" pitchFamily="34" charset="0"/>
-              <a:ea typeface="Source Sans Pro" panose="020B0503030403020204" pitchFamily="34" charset="0"/>
-            </a:endParaRPr>
-          </a:p>
-          <a:p>
-            <a:endParaRPr lang="en-US" noProof="0" dirty="0"/>
-          </a:p>
-        </p:txBody>
-      </p:sp>
-      <p:pic>
-        <p:nvPicPr>
-          <p:cNvPr id="58" name="Grafik 57">
-            <a:extLst>
-              <a:ext uri="{FF2B5EF4-FFF2-40B4-BE49-F238E27FC236}">
-                <a16:creationId xmlns:a16="http://schemas.microsoft.com/office/drawing/2014/main" id="{A4E66611-3D6E-9A44-4656-502C42629693}"/>
-              </a:ext>
-            </a:extLst>
-          </p:cNvPr>
-          <p:cNvPicPr>
-            <a:picLocks noChangeAspect="1"/>
-          </p:cNvPicPr>
-          <p:nvPr/>
-        </p:nvPicPr>
-        <p:blipFill>
-          <a:blip r:embed="rId12">
-            <a:extLst>
-              <a:ext uri="{28A0092B-C50C-407E-A947-70E740481C1C}">
-                <a14:useLocalDpi xmlns:a14="http://schemas.microsoft.com/office/drawing/2010/main" val="0"/>
-              </a:ext>
-            </a:extLst>
-          </a:blip>
-          <a:stretch>
-            <a:fillRect/>
-          </a:stretch>
-        </p:blipFill>
-        <p:spPr>
-          <a:xfrm>
             <a:off x="22074595" y="17620186"/>
             <a:ext cx="6864416" cy="5148312"/>
           </a:xfrm>
@@ -7833,7 +7210,7 @@
           <p:nvPr/>
         </p:nvPicPr>
         <p:blipFill>
-          <a:blip r:embed="rId13">
+          <a:blip r:embed="rId11">
             <a:extLst>
               <a:ext uri="{28A0092B-C50C-407E-A947-70E740481C1C}">
                 <a14:useLocalDpi xmlns:a14="http://schemas.microsoft.com/office/drawing/2010/main" val="0"/>
@@ -7870,7 +7247,7 @@
           <p:nvPr/>
         </p:nvPicPr>
         <p:blipFill>
-          <a:blip r:embed="rId14"/>
+          <a:blip r:embed="rId12"/>
           <a:stretch>
             <a:fillRect/>
           </a:stretch>
@@ -8233,7 +7610,7 @@
           <p:nvPr/>
         </p:nvPicPr>
         <p:blipFill>
-          <a:blip r:embed="rId15">
+          <a:blip r:embed="rId13">
             <a:extLst>
               <a:ext uri="{28A0092B-C50C-407E-A947-70E740481C1C}">
                 <a14:useLocalDpi xmlns:a14="http://schemas.microsoft.com/office/drawing/2010/main" val="0"/>
@@ -8269,7 +7646,7 @@
           <p:nvPr/>
         </p:nvPicPr>
         <p:blipFill>
-          <a:blip r:embed="rId16">
+          <a:blip r:embed="rId14">
             <a:extLst>
               <a:ext uri="{28A0092B-C50C-407E-A947-70E740481C1C}">
                 <a14:useLocalDpi xmlns:a14="http://schemas.microsoft.com/office/drawing/2010/main" val="0"/>
@@ -8567,8 +7944,8 @@
             </a:p>
           </p:txBody>
         </p:sp>
-        <mc:AlternateContent xmlns:mc="http://schemas.openxmlformats.org/markup-compatibility/2006">
-          <mc:Choice xmlns:a14="http://schemas.microsoft.com/office/drawing/2010/main" Requires="a14">
+        <mc:AlternateContent xmlns:mc="http://schemas.openxmlformats.org/markup-compatibility/2006" xmlns:a14="http://schemas.microsoft.com/office/drawing/2010/main">
+          <mc:Choice Requires="a14">
             <p:sp>
               <p:nvSpPr>
                 <p:cNvPr id="50" name="Textfeld 49">
@@ -8794,7 +8171,7 @@
               </p:txBody>
             </p:sp>
           </mc:Choice>
-          <mc:Fallback>
+          <mc:Fallback xmlns="">
             <p:sp>
               <p:nvSpPr>
                 <p:cNvPr id="50" name="Textfeld 49">
@@ -10422,8 +9799,8 @@
           </a:p>
         </p:txBody>
       </p:sp>
-      <mc:AlternateContent xmlns:mc="http://schemas.openxmlformats.org/markup-compatibility/2006">
-        <mc:Choice xmlns:a14="http://schemas.microsoft.com/office/drawing/2010/main" Requires="a14">
+      <mc:AlternateContent xmlns:mc="http://schemas.openxmlformats.org/markup-compatibility/2006" xmlns:a14="http://schemas.microsoft.com/office/drawing/2010/main">
+        <mc:Choice Requires="a14">
           <p:sp>
             <p:nvSpPr>
               <p:cNvPr id="115" name="Textfeld 114">
@@ -10452,6 +9829,7 @@
               </a:bodyPr>
               <a:lstStyle/>
               <a:p>
+                <a:pPr/>
                 <a14:m>
                   <m:oMathPara xmlns:m="http://schemas.openxmlformats.org/officeDocument/2006/math">
                     <m:oMathParaPr>
@@ -10532,7 +9910,7 @@
             </p:txBody>
           </p:sp>
         </mc:Choice>
-        <mc:Fallback>
+        <mc:Fallback xmlns="">
           <p:sp>
             <p:nvSpPr>
               <p:cNvPr id="115" name="Textfeld 114">
@@ -10615,6 +9993,1021 @@
           </a:p>
           <a:p>
             <a:endParaRPr lang="en-US" sz="2400" dirty="0"/>
+          </a:p>
+        </p:txBody>
+      </p:sp>
+      <p:sp>
+        <p:nvSpPr>
+          <p:cNvPr id="17" name="Abgerundetes Rechteck 21">
+            <a:extLst>
+              <a:ext uri="{FF2B5EF4-FFF2-40B4-BE49-F238E27FC236}">
+                <a16:creationId xmlns:a16="http://schemas.microsoft.com/office/drawing/2014/main" id="{CADA5048-84E9-7610-1363-103CE5D313B8}"/>
+              </a:ext>
+            </a:extLst>
+          </p:cNvPr>
+          <p:cNvSpPr/>
+          <p:nvPr/>
+        </p:nvSpPr>
+        <p:spPr>
+          <a:xfrm>
+            <a:off x="15213808" y="25798474"/>
+            <a:ext cx="14528007" cy="12396420"/>
+          </a:xfrm>
+          <a:prstGeom prst="roundRect">
+            <a:avLst>
+              <a:gd name="adj" fmla="val 5015"/>
+            </a:avLst>
+          </a:prstGeom>
+          <a:solidFill>
+            <a:srgbClr val="E49596">
+              <a:alpha val="33168"/>
+            </a:srgbClr>
+          </a:solidFill>
+          <a:ln w="63500">
+            <a:solidFill>
+              <a:srgbClr val="B22F28"/>
+            </a:solidFill>
+          </a:ln>
+        </p:spPr>
+        <p:style>
+          <a:lnRef idx="2">
+            <a:schemeClr val="accent1">
+              <a:shade val="15000"/>
+            </a:schemeClr>
+          </a:lnRef>
+          <a:fillRef idx="1">
+            <a:schemeClr val="accent1"/>
+          </a:fillRef>
+          <a:effectRef idx="0">
+            <a:schemeClr val="accent1"/>
+          </a:effectRef>
+          <a:fontRef idx="minor">
+            <a:schemeClr val="lt1"/>
+          </a:fontRef>
+        </p:style>
+        <p:txBody>
+          <a:bodyPr rtlCol="0" anchor="t"/>
+          <a:lstStyle/>
+          <a:p>
+            <a:pPr algn="r"/>
+            <a:endParaRPr lang="en-US" sz="3600" noProof="0" dirty="0">
+              <a:solidFill>
+                <a:schemeClr val="tx1"/>
+              </a:solidFill>
+            </a:endParaRPr>
+          </a:p>
+        </p:txBody>
+      </p:sp>
+      <p:sp>
+        <p:nvSpPr>
+          <p:cNvPr id="23" name="Rectangle 22">
+            <a:extLst>
+              <a:ext uri="{FF2B5EF4-FFF2-40B4-BE49-F238E27FC236}">
+                <a16:creationId xmlns:a16="http://schemas.microsoft.com/office/drawing/2014/main" id="{497B7107-C6F9-BC8E-32F9-4EB58EBC3122}"/>
+              </a:ext>
+            </a:extLst>
+          </p:cNvPr>
+          <p:cNvSpPr/>
+          <p:nvPr/>
+        </p:nvSpPr>
+        <p:spPr>
+          <a:xfrm>
+            <a:off x="23799288" y="25973133"/>
+            <a:ext cx="5656553" cy="4159284"/>
+          </a:xfrm>
+          <a:prstGeom prst="rect">
+            <a:avLst/>
+          </a:prstGeom>
+          <a:solidFill>
+            <a:schemeClr val="bg1"/>
+          </a:solidFill>
+          <a:ln>
+            <a:noFill/>
+          </a:ln>
+        </p:spPr>
+        <p:style>
+          <a:lnRef idx="2">
+            <a:schemeClr val="accent1">
+              <a:shade val="15000"/>
+            </a:schemeClr>
+          </a:lnRef>
+          <a:fillRef idx="1">
+            <a:schemeClr val="accent1"/>
+          </a:fillRef>
+          <a:effectRef idx="0">
+            <a:schemeClr val="accent1"/>
+          </a:effectRef>
+          <a:fontRef idx="minor">
+            <a:schemeClr val="lt1"/>
+          </a:fontRef>
+        </p:style>
+        <p:txBody>
+          <a:bodyPr rtlCol="0" anchor="t"/>
+          <a:lstStyle/>
+          <a:p>
+            <a:pPr algn="r"/>
+            <a:endParaRPr lang="en-GB" sz="3600" dirty="0">
+              <a:solidFill>
+                <a:schemeClr val="tx1"/>
+              </a:solidFill>
+            </a:endParaRPr>
+          </a:p>
+        </p:txBody>
+      </p:sp>
+      <p:pic>
+        <p:nvPicPr>
+          <p:cNvPr id="32" name="Picture 31" descr="A screenshot of a video game&#10;&#10;AI-generated content may be incorrect.">
+            <a:extLst>
+              <a:ext uri="{FF2B5EF4-FFF2-40B4-BE49-F238E27FC236}">
+                <a16:creationId xmlns:a16="http://schemas.microsoft.com/office/drawing/2014/main" id="{08B70003-AD1E-4701-456D-41507D8EABB7}"/>
+              </a:ext>
+            </a:extLst>
+          </p:cNvPr>
+          <p:cNvPicPr>
+            <a:picLocks noChangeAspect="1"/>
+          </p:cNvPicPr>
+          <p:nvPr/>
+        </p:nvPicPr>
+        <p:blipFill>
+          <a:blip r:embed="rId23">
+            <a:extLst>
+              <a:ext uri="{28A0092B-C50C-407E-A947-70E740481C1C}">
+                <a14:useLocalDpi xmlns:a14="http://schemas.microsoft.com/office/drawing/2010/main" val="0"/>
+              </a:ext>
+            </a:extLst>
+          </a:blip>
+          <a:stretch>
+            <a:fillRect/>
+          </a:stretch>
+        </p:blipFill>
+        <p:spPr>
+          <a:xfrm>
+            <a:off x="23827897" y="26008271"/>
+            <a:ext cx="5542441" cy="4156832"/>
+          </a:xfrm>
+          <a:prstGeom prst="rect">
+            <a:avLst/>
+          </a:prstGeom>
+        </p:spPr>
+      </p:pic>
+      <p:sp>
+        <p:nvSpPr>
+          <p:cNvPr id="33" name="Rectangle 32">
+            <a:extLst>
+              <a:ext uri="{FF2B5EF4-FFF2-40B4-BE49-F238E27FC236}">
+                <a16:creationId xmlns:a16="http://schemas.microsoft.com/office/drawing/2014/main" id="{AB754934-85BC-3E41-3BC6-0759F2D51BE4}"/>
+              </a:ext>
+            </a:extLst>
+          </p:cNvPr>
+          <p:cNvSpPr/>
+          <p:nvPr/>
+        </p:nvSpPr>
+        <p:spPr>
+          <a:xfrm>
+            <a:off x="15725617" y="34315537"/>
+            <a:ext cx="4508066" cy="3264631"/>
+          </a:xfrm>
+          <a:prstGeom prst="rect">
+            <a:avLst/>
+          </a:prstGeom>
+          <a:solidFill>
+            <a:schemeClr val="bg1"/>
+          </a:solidFill>
+          <a:ln>
+            <a:noFill/>
+          </a:ln>
+        </p:spPr>
+        <p:style>
+          <a:lnRef idx="2">
+            <a:schemeClr val="accent1">
+              <a:shade val="15000"/>
+            </a:schemeClr>
+          </a:lnRef>
+          <a:fillRef idx="1">
+            <a:schemeClr val="accent1"/>
+          </a:fillRef>
+          <a:effectRef idx="0">
+            <a:schemeClr val="accent1"/>
+          </a:effectRef>
+          <a:fontRef idx="minor">
+            <a:schemeClr val="lt1"/>
+          </a:fontRef>
+        </p:style>
+        <p:txBody>
+          <a:bodyPr rtlCol="0" anchor="t"/>
+          <a:lstStyle/>
+          <a:p>
+            <a:pPr algn="r"/>
+            <a:endParaRPr lang="en-GB" sz="3600" dirty="0">
+              <a:solidFill>
+                <a:schemeClr val="tx1"/>
+              </a:solidFill>
+            </a:endParaRPr>
+          </a:p>
+        </p:txBody>
+      </p:sp>
+      <p:pic>
+        <p:nvPicPr>
+          <p:cNvPr id="38" name="Picture 37" descr="A yellow and orange squares&#10;&#10;AI-generated content may be incorrect.">
+            <a:extLst>
+              <a:ext uri="{FF2B5EF4-FFF2-40B4-BE49-F238E27FC236}">
+                <a16:creationId xmlns:a16="http://schemas.microsoft.com/office/drawing/2014/main" id="{288F68B4-DDA1-2EEB-9F23-81C0A0F5FDB5}"/>
+              </a:ext>
+            </a:extLst>
+          </p:cNvPr>
+          <p:cNvPicPr>
+            <a:picLocks noChangeAspect="1"/>
+          </p:cNvPicPr>
+          <p:nvPr/>
+        </p:nvPicPr>
+        <p:blipFill>
+          <a:blip r:embed="rId24">
+            <a:extLst>
+              <a:ext uri="{28A0092B-C50C-407E-A947-70E740481C1C}">
+                <a14:useLocalDpi xmlns:a14="http://schemas.microsoft.com/office/drawing/2010/main" val="0"/>
+              </a:ext>
+            </a:extLst>
+          </a:blip>
+          <a:stretch>
+            <a:fillRect/>
+          </a:stretch>
+        </p:blipFill>
+        <p:spPr>
+          <a:xfrm>
+            <a:off x="15839213" y="34379540"/>
+            <a:ext cx="4280873" cy="3210655"/>
+          </a:xfrm>
+          <a:prstGeom prst="rect">
+            <a:avLst/>
+          </a:prstGeom>
+        </p:spPr>
+      </p:pic>
+      <p:sp>
+        <p:nvSpPr>
+          <p:cNvPr id="53" name="Textfeld 48">
+            <a:extLst>
+              <a:ext uri="{FF2B5EF4-FFF2-40B4-BE49-F238E27FC236}">
+                <a16:creationId xmlns:a16="http://schemas.microsoft.com/office/drawing/2014/main" id="{09012934-17D9-9E1F-A0A5-E6B32DB352BC}"/>
+              </a:ext>
+            </a:extLst>
+          </p:cNvPr>
+          <p:cNvSpPr txBox="1"/>
+          <p:nvPr/>
+        </p:nvSpPr>
+        <p:spPr>
+          <a:xfrm>
+            <a:off x="15457632" y="26456645"/>
+            <a:ext cx="8341656" cy="3323987"/>
+          </a:xfrm>
+          <a:prstGeom prst="rect">
+            <a:avLst/>
+          </a:prstGeom>
+          <a:noFill/>
+        </p:spPr>
+        <p:txBody>
+          <a:bodyPr wrap="square" rtlCol="0">
+            <a:spAutoFit/>
+          </a:bodyPr>
+          <a:lstStyle/>
+          <a:p>
+            <a:pPr algn="just"/>
+            <a:r>
+              <a:rPr lang="en-GB" sz="2400" b="1" dirty="0">
+                <a:latin typeface="Source Sans Pro" panose="020B0503030403020204" pitchFamily="34" charset="0"/>
+                <a:ea typeface="Source Sans Pro" panose="020B0503030403020204" pitchFamily="34" charset="0"/>
+              </a:rPr>
+              <a:t>DBSCAN :</a:t>
+            </a:r>
+          </a:p>
+          <a:p>
+            <a:r>
+              <a:rPr lang="en-GB" sz="2400" dirty="0">
+                <a:latin typeface="Source Sans Pro" panose="020B0503030403020204" pitchFamily="34" charset="0"/>
+                <a:ea typeface="Source Sans Pro" panose="020B0503030403020204" pitchFamily="34" charset="0"/>
+              </a:rPr>
+              <a:t>is a clustering algorithm that can classify points in low-density regions as it considers point density and distance.</a:t>
+            </a:r>
+          </a:p>
+          <a:p>
+            <a:pPr marL="342900" indent="-342900">
+              <a:buFont typeface="Arial" panose="020B0604020202020204" pitchFamily="34" charset="0"/>
+              <a:buChar char="•"/>
+            </a:pPr>
+            <a:r>
+              <a:rPr lang="en-GB" sz="2400" b="1" dirty="0">
+                <a:latin typeface="Source Sans Pro" panose="020B0503030403020204" pitchFamily="34" charset="0"/>
+                <a:ea typeface="Source Sans Pro" panose="020B0503030403020204" pitchFamily="34" charset="0"/>
+              </a:rPr>
+              <a:t>ε (epsilon): </a:t>
+            </a:r>
+            <a:r>
+              <a:rPr lang="en-GB" sz="2400" dirty="0">
+                <a:latin typeface="Source Sans Pro" panose="020B0503030403020204" pitchFamily="34" charset="0"/>
+                <a:ea typeface="Source Sans Pro" panose="020B0503030403020204" pitchFamily="34" charset="0"/>
+              </a:rPr>
+              <a:t>The maximum distance between two points to be considered </a:t>
+            </a:r>
+            <a:r>
+              <a:rPr lang="en-GB" sz="2400" dirty="0" err="1">
+                <a:latin typeface="Source Sans Pro" panose="020B0503030403020204" pitchFamily="34" charset="0"/>
+                <a:ea typeface="Source Sans Pro" panose="020B0503030403020204" pitchFamily="34" charset="0"/>
+              </a:rPr>
+              <a:t>neighbors</a:t>
+            </a:r>
+            <a:r>
+              <a:rPr lang="en-GB" sz="2400" dirty="0">
+                <a:latin typeface="Source Sans Pro" panose="020B0503030403020204" pitchFamily="34" charset="0"/>
+                <a:ea typeface="Source Sans Pro" panose="020B0503030403020204" pitchFamily="34" charset="0"/>
+              </a:rPr>
+              <a:t>. </a:t>
+            </a:r>
+          </a:p>
+          <a:p>
+            <a:pPr marL="342900" indent="-342900">
+              <a:buFont typeface="Arial" panose="020B0604020202020204" pitchFamily="34" charset="0"/>
+              <a:buChar char="•"/>
+            </a:pPr>
+            <a:r>
+              <a:rPr lang="en-GB" sz="2400" b="1" dirty="0" err="1">
+                <a:latin typeface="Source Sans Pro" panose="020B0503030403020204" pitchFamily="34" charset="0"/>
+                <a:ea typeface="Source Sans Pro" panose="020B0503030403020204" pitchFamily="34" charset="0"/>
+              </a:rPr>
+              <a:t>MinPts</a:t>
+            </a:r>
+            <a:r>
+              <a:rPr lang="en-GB" sz="2400" b="1" dirty="0">
+                <a:latin typeface="Source Sans Pro" panose="020B0503030403020204" pitchFamily="34" charset="0"/>
+                <a:ea typeface="Source Sans Pro" panose="020B0503030403020204" pitchFamily="34" charset="0"/>
+              </a:rPr>
+              <a:t>: </a:t>
+            </a:r>
+            <a:r>
+              <a:rPr lang="en-GB" sz="2400" dirty="0">
+                <a:latin typeface="Source Sans Pro" panose="020B0503030403020204" pitchFamily="34" charset="0"/>
+                <a:ea typeface="Source Sans Pro" panose="020B0503030403020204" pitchFamily="34" charset="0"/>
+              </a:rPr>
+              <a:t>The minimum number of </a:t>
+            </a:r>
+            <a:r>
+              <a:rPr lang="en-GB" sz="2400" dirty="0" err="1">
+                <a:latin typeface="Source Sans Pro" panose="020B0503030403020204" pitchFamily="34" charset="0"/>
+                <a:ea typeface="Source Sans Pro" panose="020B0503030403020204" pitchFamily="34" charset="0"/>
+              </a:rPr>
+              <a:t>neighbors</a:t>
+            </a:r>
+            <a:r>
+              <a:rPr lang="en-GB" sz="2400" dirty="0">
+                <a:latin typeface="Source Sans Pro" panose="020B0503030403020204" pitchFamily="34" charset="0"/>
+                <a:ea typeface="Source Sans Pro" panose="020B0503030403020204" pitchFamily="34" charset="0"/>
+              </a:rPr>
+              <a:t> (within ε distance) to form a core point, border points are those within ε of a core point.</a:t>
+            </a:r>
+          </a:p>
+          <a:p>
+            <a:endParaRPr lang="en-US" noProof="0" dirty="0"/>
+          </a:p>
+        </p:txBody>
+      </p:sp>
+      <p:sp>
+        <p:nvSpPr>
+          <p:cNvPr id="54" name="Textfeld 48">
+            <a:extLst>
+              <a:ext uri="{FF2B5EF4-FFF2-40B4-BE49-F238E27FC236}">
+                <a16:creationId xmlns:a16="http://schemas.microsoft.com/office/drawing/2014/main" id="{0C9E6692-E493-9100-A3A2-2553EE851C05}"/>
+              </a:ext>
+            </a:extLst>
+          </p:cNvPr>
+          <p:cNvSpPr txBox="1"/>
+          <p:nvPr/>
+        </p:nvSpPr>
+        <p:spPr>
+          <a:xfrm>
+            <a:off x="15469068" y="29296448"/>
+            <a:ext cx="8330220" cy="3416320"/>
+          </a:xfrm>
+          <a:prstGeom prst="rect">
+            <a:avLst/>
+          </a:prstGeom>
+          <a:noFill/>
+        </p:spPr>
+        <p:txBody>
+          <a:bodyPr wrap="square" rtlCol="0">
+            <a:spAutoFit/>
+          </a:bodyPr>
+          <a:lstStyle/>
+          <a:p>
+            <a:pPr algn="just"/>
+            <a:r>
+              <a:rPr lang="en-US" sz="2400" b="1" dirty="0">
+                <a:latin typeface="Source Sans Pro" panose="020B0503030403020204" pitchFamily="34" charset="0"/>
+                <a:ea typeface="Source Sans Pro" panose="020B0503030403020204" pitchFamily="34" charset="0"/>
+              </a:rPr>
+              <a:t>Choosing parameters </a:t>
+            </a:r>
+            <a:endParaRPr lang="en-US" sz="2400" dirty="0">
+              <a:latin typeface="Source Sans Pro" panose="020B0503030403020204" pitchFamily="34" charset="0"/>
+              <a:ea typeface="Source Sans Pro" panose="020B0503030403020204" pitchFamily="34" charset="0"/>
+            </a:endParaRPr>
+          </a:p>
+          <a:p>
+            <a:pPr algn="just"/>
+            <a:r>
+              <a:rPr lang="en-US" sz="2400" dirty="0">
+                <a:latin typeface="Source Sans Pro" panose="020B0503030403020204" pitchFamily="34" charset="0"/>
+                <a:ea typeface="Source Sans Pro" panose="020B0503030403020204" pitchFamily="34" charset="0"/>
+              </a:rPr>
+              <a:t>To validate the efficiency in clustering we created a heatmap with a specific scoring logic. We adjusted our DBSCAN </a:t>
+            </a:r>
+            <a:r>
+              <a:rPr lang="en-US" sz="2400" b="1" dirty="0">
+                <a:latin typeface="Source Sans Pro" panose="020B0503030403020204" pitchFamily="34" charset="0"/>
+                <a:ea typeface="Source Sans Pro" panose="020B0503030403020204" pitchFamily="34" charset="0"/>
+              </a:rPr>
+              <a:t>to </a:t>
+            </a:r>
+            <a:r>
+              <a:rPr lang="en-GB" sz="2400" b="1" dirty="0">
+                <a:latin typeface="Source Sans Pro" panose="020B0503030403020204" pitchFamily="34" charset="0"/>
+                <a:ea typeface="Source Sans Pro" panose="020B0503030403020204" pitchFamily="34" charset="0"/>
+              </a:rPr>
+              <a:t>ε = 0.7 and </a:t>
+            </a:r>
+            <a:r>
+              <a:rPr lang="en-GB" sz="2400" b="1" dirty="0" err="1">
+                <a:latin typeface="Source Sans Pro" panose="020B0503030403020204" pitchFamily="34" charset="0"/>
+                <a:ea typeface="Source Sans Pro" panose="020B0503030403020204" pitchFamily="34" charset="0"/>
+              </a:rPr>
+              <a:t>MintPts</a:t>
+            </a:r>
+            <a:r>
+              <a:rPr lang="en-GB" sz="2400" b="1" dirty="0">
+                <a:latin typeface="Source Sans Pro" panose="020B0503030403020204" pitchFamily="34" charset="0"/>
+                <a:ea typeface="Source Sans Pro" panose="020B0503030403020204" pitchFamily="34" charset="0"/>
+              </a:rPr>
+              <a:t> = 4. </a:t>
+            </a:r>
+          </a:p>
+          <a:p>
+            <a:pPr algn="just"/>
+            <a:endParaRPr lang="en-GB" sz="2400" dirty="0">
+              <a:latin typeface="Source Sans Pro" panose="020B0503030403020204" pitchFamily="34" charset="0"/>
+              <a:ea typeface="Source Sans Pro" panose="020B0503030403020204" pitchFamily="34" charset="0"/>
+            </a:endParaRPr>
+          </a:p>
+          <a:p>
+            <a:pPr algn="just"/>
+            <a:endParaRPr lang="en-GB" sz="2400" b="1" dirty="0"/>
+          </a:p>
+          <a:p>
+            <a:pPr algn="just"/>
+            <a:endParaRPr lang="en-GB" sz="2400" b="1" dirty="0">
+              <a:latin typeface="Source Sans Pro" panose="020B0503030403020204" pitchFamily="34" charset="0"/>
+              <a:ea typeface="Source Sans Pro" panose="020B0503030403020204" pitchFamily="34" charset="0"/>
+            </a:endParaRPr>
+          </a:p>
+          <a:p>
+            <a:pPr algn="just"/>
+            <a:endParaRPr lang="en-US" sz="2400" b="1" dirty="0">
+              <a:latin typeface="Source Sans Pro" panose="020B0503030403020204" pitchFamily="34" charset="0"/>
+              <a:ea typeface="Source Sans Pro" panose="020B0503030403020204" pitchFamily="34" charset="0"/>
+            </a:endParaRPr>
+          </a:p>
+          <a:p>
+            <a:pPr algn="just"/>
+            <a:endParaRPr lang="en-US" sz="2400" b="1" noProof="0" dirty="0">
+              <a:latin typeface="Source Sans Pro" panose="020B0503030403020204" pitchFamily="34" charset="0"/>
+              <a:ea typeface="Source Sans Pro" panose="020B0503030403020204" pitchFamily="34" charset="0"/>
+            </a:endParaRPr>
+          </a:p>
+        </p:txBody>
+      </p:sp>
+      <p:pic>
+        <p:nvPicPr>
+          <p:cNvPr id="57" name="Picture 56" descr="A graph with lines and numbers&#10;&#10;AI-generated content may be incorrect.">
+            <a:extLst>
+              <a:ext uri="{FF2B5EF4-FFF2-40B4-BE49-F238E27FC236}">
+                <a16:creationId xmlns:a16="http://schemas.microsoft.com/office/drawing/2014/main" id="{BA45D2D3-0CCB-F156-B9E7-9449A21DFDC2}"/>
+              </a:ext>
+            </a:extLst>
+          </p:cNvPr>
+          <p:cNvPicPr>
+            <a:picLocks noChangeAspect="1"/>
+          </p:cNvPicPr>
+          <p:nvPr/>
+        </p:nvPicPr>
+        <p:blipFill>
+          <a:blip r:embed="rId25">
+            <a:extLst>
+              <a:ext uri="{28A0092B-C50C-407E-A947-70E740481C1C}">
+                <a14:useLocalDpi xmlns:a14="http://schemas.microsoft.com/office/drawing/2010/main" val="0"/>
+              </a:ext>
+            </a:extLst>
+          </a:blip>
+          <a:stretch>
+            <a:fillRect/>
+          </a:stretch>
+        </p:blipFill>
+        <p:spPr>
+          <a:xfrm>
+            <a:off x="26843963" y="30952853"/>
+            <a:ext cx="2734251" cy="2050688"/>
+          </a:xfrm>
+          <a:prstGeom prst="rect">
+            <a:avLst/>
+          </a:prstGeom>
+        </p:spPr>
+      </p:pic>
+      <p:pic>
+        <p:nvPicPr>
+          <p:cNvPr id="59" name="Picture 58" descr="A graph of a number of lines&#10;&#10;AI-generated content may be incorrect.">
+            <a:extLst>
+              <a:ext uri="{FF2B5EF4-FFF2-40B4-BE49-F238E27FC236}">
+                <a16:creationId xmlns:a16="http://schemas.microsoft.com/office/drawing/2014/main" id="{C670D429-FCC7-1BE6-830C-944CA7885502}"/>
+              </a:ext>
+            </a:extLst>
+          </p:cNvPr>
+          <p:cNvPicPr>
+            <a:picLocks noChangeAspect="1"/>
+          </p:cNvPicPr>
+          <p:nvPr/>
+        </p:nvPicPr>
+        <p:blipFill>
+          <a:blip r:embed="rId26">
+            <a:extLst>
+              <a:ext uri="{28A0092B-C50C-407E-A947-70E740481C1C}">
+                <a14:useLocalDpi xmlns:a14="http://schemas.microsoft.com/office/drawing/2010/main" val="0"/>
+              </a:ext>
+            </a:extLst>
+          </a:blip>
+          <a:stretch>
+            <a:fillRect/>
+          </a:stretch>
+        </p:blipFill>
+        <p:spPr>
+          <a:xfrm>
+            <a:off x="20976465" y="30973884"/>
+            <a:ext cx="2711946" cy="2033959"/>
+          </a:xfrm>
+          <a:prstGeom prst="rect">
+            <a:avLst/>
+          </a:prstGeom>
+        </p:spPr>
+      </p:pic>
+      <p:pic>
+        <p:nvPicPr>
+          <p:cNvPr id="60" name="Picture 59" descr="A graph of a number of fractions&#10;&#10;AI-generated content may be incorrect.">
+            <a:extLst>
+              <a:ext uri="{FF2B5EF4-FFF2-40B4-BE49-F238E27FC236}">
+                <a16:creationId xmlns:a16="http://schemas.microsoft.com/office/drawing/2014/main" id="{EE66F933-BDCC-0514-DC0C-7AA0C7AAAC36}"/>
+              </a:ext>
+            </a:extLst>
+          </p:cNvPr>
+          <p:cNvPicPr>
+            <a:picLocks noChangeAspect="1"/>
+          </p:cNvPicPr>
+          <p:nvPr/>
+        </p:nvPicPr>
+        <p:blipFill>
+          <a:blip r:embed="rId27">
+            <a:extLst>
+              <a:ext uri="{28A0092B-C50C-407E-A947-70E740481C1C}">
+                <a14:useLocalDpi xmlns:a14="http://schemas.microsoft.com/office/drawing/2010/main" val="0"/>
+              </a:ext>
+            </a:extLst>
+          </a:blip>
+          <a:stretch>
+            <a:fillRect/>
+          </a:stretch>
+        </p:blipFill>
+        <p:spPr>
+          <a:xfrm>
+            <a:off x="20976465" y="35551084"/>
+            <a:ext cx="2711946" cy="2033959"/>
+          </a:xfrm>
+          <a:prstGeom prst="rect">
+            <a:avLst/>
+          </a:prstGeom>
+        </p:spPr>
+      </p:pic>
+      <p:pic>
+        <p:nvPicPr>
+          <p:cNvPr id="61" name="Picture 60" descr="A graph of a number of people&#10;&#10;AI-generated content may be incorrect.">
+            <a:extLst>
+              <a:ext uri="{FF2B5EF4-FFF2-40B4-BE49-F238E27FC236}">
+                <a16:creationId xmlns:a16="http://schemas.microsoft.com/office/drawing/2014/main" id="{8B99C15E-AF69-C01B-6273-40520FCDE5F6}"/>
+              </a:ext>
+            </a:extLst>
+          </p:cNvPr>
+          <p:cNvPicPr>
+            <a:picLocks noChangeAspect="1"/>
+          </p:cNvPicPr>
+          <p:nvPr/>
+        </p:nvPicPr>
+        <p:blipFill>
+          <a:blip r:embed="rId28">
+            <a:extLst>
+              <a:ext uri="{28A0092B-C50C-407E-A947-70E740481C1C}">
+                <a14:useLocalDpi xmlns:a14="http://schemas.microsoft.com/office/drawing/2010/main" val="0"/>
+              </a:ext>
+            </a:extLst>
+          </a:blip>
+          <a:stretch>
+            <a:fillRect/>
+          </a:stretch>
+        </p:blipFill>
+        <p:spPr>
+          <a:xfrm>
+            <a:off x="20976465" y="33228377"/>
+            <a:ext cx="2711946" cy="2033959"/>
+          </a:xfrm>
+          <a:prstGeom prst="rect">
+            <a:avLst/>
+          </a:prstGeom>
+        </p:spPr>
+      </p:pic>
+      <p:pic>
+        <p:nvPicPr>
+          <p:cNvPr id="62" name="Picture 61" descr="A graph with lines and numbers&#10;&#10;AI-generated content may be incorrect.">
+            <a:extLst>
+              <a:ext uri="{FF2B5EF4-FFF2-40B4-BE49-F238E27FC236}">
+                <a16:creationId xmlns:a16="http://schemas.microsoft.com/office/drawing/2014/main" id="{788EBA3F-04C0-8072-0F06-18147B6CBB7C}"/>
+              </a:ext>
+            </a:extLst>
+          </p:cNvPr>
+          <p:cNvPicPr>
+            <a:picLocks noChangeAspect="1"/>
+          </p:cNvPicPr>
+          <p:nvPr/>
+        </p:nvPicPr>
+        <p:blipFill>
+          <a:blip r:embed="rId29">
+            <a:extLst>
+              <a:ext uri="{28A0092B-C50C-407E-A947-70E740481C1C}">
+                <a14:useLocalDpi xmlns:a14="http://schemas.microsoft.com/office/drawing/2010/main" val="0"/>
+              </a:ext>
+            </a:extLst>
+          </a:blip>
+          <a:stretch>
+            <a:fillRect/>
+          </a:stretch>
+        </p:blipFill>
+        <p:spPr>
+          <a:xfrm>
+            <a:off x="23900842" y="30973884"/>
+            <a:ext cx="2711946" cy="2033960"/>
+          </a:xfrm>
+          <a:prstGeom prst="rect">
+            <a:avLst/>
+          </a:prstGeom>
+        </p:spPr>
+      </p:pic>
+      <p:sp>
+        <p:nvSpPr>
+          <p:cNvPr id="63" name="TextBox 62">
+            <a:extLst>
+              <a:ext uri="{FF2B5EF4-FFF2-40B4-BE49-F238E27FC236}">
+                <a16:creationId xmlns:a16="http://schemas.microsoft.com/office/drawing/2014/main" id="{FB6012F1-D660-D8EE-62F5-079445394ECC}"/>
+              </a:ext>
+            </a:extLst>
+          </p:cNvPr>
+          <p:cNvSpPr txBox="1"/>
+          <p:nvPr/>
+        </p:nvSpPr>
+        <p:spPr>
+          <a:xfrm>
+            <a:off x="23799972" y="32790300"/>
+            <a:ext cx="5749199" cy="3693319"/>
+          </a:xfrm>
+          <a:prstGeom prst="rect">
+            <a:avLst/>
+          </a:prstGeom>
+          <a:noFill/>
+        </p:spPr>
+        <p:txBody>
+          <a:bodyPr wrap="square" rtlCol="0">
+            <a:spAutoFit/>
+          </a:bodyPr>
+          <a:lstStyle/>
+          <a:p>
+            <a:endParaRPr lang="en-GB" sz="2400" b="1" dirty="0"/>
+          </a:p>
+          <a:p>
+            <a:pPr algn="just"/>
+            <a:r>
+              <a:rPr lang="en-GB" sz="2400" b="1" dirty="0">
+                <a:latin typeface="Source Sans Pro" panose="020B0503030403020204" pitchFamily="34" charset="0"/>
+                <a:ea typeface="Source Sans Pro" panose="020B0503030403020204" pitchFamily="34" charset="0"/>
+              </a:rPr>
+              <a:t>Outcome</a:t>
+            </a:r>
+            <a:r>
+              <a:rPr lang="en-GB" sz="2400" dirty="0">
+                <a:latin typeface="Source Sans Pro" panose="020B0503030403020204" pitchFamily="34" charset="0"/>
+                <a:ea typeface="Source Sans Pro" panose="020B0503030403020204" pitchFamily="34" charset="0"/>
+              </a:rPr>
+              <a:t>: - did I find my Family? </a:t>
+            </a:r>
+          </a:p>
+          <a:p>
+            <a:pPr marL="342900" indent="-342900" algn="just">
+              <a:buFont typeface="Arial" panose="020B0604020202020204" pitchFamily="34" charset="0"/>
+              <a:buChar char="•"/>
+            </a:pPr>
+            <a:r>
+              <a:rPr lang="en-GB" sz="2400" b="1" dirty="0">
+                <a:latin typeface="Source Sans Pro" panose="020B0503030403020204" pitchFamily="34" charset="0"/>
+                <a:ea typeface="Source Sans Pro" panose="020B0503030403020204" pitchFamily="34" charset="0"/>
+              </a:rPr>
+              <a:t>From 40S Ribosomal Complex</a:t>
+            </a:r>
+            <a:r>
+              <a:rPr lang="en-GB" sz="2400" dirty="0">
+                <a:latin typeface="Source Sans Pro" panose="020B0503030403020204" pitchFamily="34" charset="0"/>
+                <a:ea typeface="Source Sans Pro" panose="020B0503030403020204" pitchFamily="34" charset="0"/>
+              </a:rPr>
+              <a:t>: 3 out of 4 proteins where </a:t>
+            </a:r>
+            <a:r>
+              <a:rPr lang="en-GB" sz="2400" dirty="0" err="1">
+                <a:latin typeface="Source Sans Pro" panose="020B0503030403020204" pitchFamily="34" charset="0"/>
+                <a:ea typeface="Source Sans Pro" panose="020B0503030403020204" pitchFamily="34" charset="0"/>
+              </a:rPr>
+              <a:t>clusterd</a:t>
+            </a:r>
+            <a:r>
+              <a:rPr lang="en-GB" sz="2400" dirty="0">
+                <a:latin typeface="Source Sans Pro" panose="020B0503030403020204" pitchFamily="34" charset="0"/>
+                <a:ea typeface="Source Sans Pro" panose="020B0503030403020204" pitchFamily="34" charset="0"/>
+              </a:rPr>
+              <a:t> together (cluster 4)</a:t>
+            </a:r>
+          </a:p>
+          <a:p>
+            <a:pPr marL="342900" indent="-342900" algn="just">
+              <a:buFont typeface="Arial" panose="020B0604020202020204" pitchFamily="34" charset="0"/>
+              <a:buChar char="•"/>
+            </a:pPr>
+            <a:r>
+              <a:rPr lang="en-GB" sz="2400" b="1" dirty="0">
+                <a:latin typeface="Source Sans Pro" panose="020B0503030403020204" pitchFamily="34" charset="0"/>
+                <a:ea typeface="Source Sans Pro" panose="020B0503030403020204" pitchFamily="34" charset="0"/>
+              </a:rPr>
+              <a:t>From Nop56p-associated pre-rRNA complex: </a:t>
+            </a:r>
+            <a:r>
+              <a:rPr lang="en-GB" sz="2400" dirty="0">
+                <a:latin typeface="Source Sans Pro" panose="020B0503030403020204" pitchFamily="34" charset="0"/>
+                <a:ea typeface="Source Sans Pro" panose="020B0503030403020204" pitchFamily="34" charset="0"/>
+              </a:rPr>
+              <a:t>4 out of 9 where </a:t>
+            </a:r>
+            <a:r>
+              <a:rPr lang="en-GB" sz="2400" dirty="0" err="1">
+                <a:latin typeface="Source Sans Pro" panose="020B0503030403020204" pitchFamily="34" charset="0"/>
+                <a:ea typeface="Source Sans Pro" panose="020B0503030403020204" pitchFamily="34" charset="0"/>
+              </a:rPr>
+              <a:t>clusterd</a:t>
+            </a:r>
+            <a:r>
+              <a:rPr lang="en-GB" sz="2400" dirty="0">
+                <a:latin typeface="Source Sans Pro" panose="020B0503030403020204" pitchFamily="34" charset="0"/>
+                <a:ea typeface="Source Sans Pro" panose="020B0503030403020204" pitchFamily="34" charset="0"/>
+              </a:rPr>
+              <a:t> together. </a:t>
+            </a:r>
+          </a:p>
+          <a:p>
+            <a:pPr marL="342900" indent="-342900" algn="just">
+              <a:buFont typeface="Arial" panose="020B0604020202020204" pitchFamily="34" charset="0"/>
+              <a:buChar char="•"/>
+            </a:pPr>
+            <a:r>
+              <a:rPr lang="en-GB" sz="2400" dirty="0">
+                <a:latin typeface="Source Sans Pro" panose="020B0503030403020204" pitchFamily="34" charset="0"/>
+                <a:ea typeface="Source Sans Pro" panose="020B0503030403020204" pitchFamily="34" charset="0"/>
+              </a:rPr>
+              <a:t>Total number of Proteins in cluster 4: 13 </a:t>
+            </a:r>
+          </a:p>
+          <a:p>
+            <a:endParaRPr lang="en-GB" dirty="0"/>
+          </a:p>
+        </p:txBody>
+      </p:sp>
+      <p:sp>
+        <p:nvSpPr>
+          <p:cNvPr id="64" name="TextBox 63">
+            <a:extLst>
+              <a:ext uri="{FF2B5EF4-FFF2-40B4-BE49-F238E27FC236}">
+                <a16:creationId xmlns:a16="http://schemas.microsoft.com/office/drawing/2014/main" id="{0692B99A-25D6-876B-977C-49A97151F2D1}"/>
+              </a:ext>
+            </a:extLst>
+          </p:cNvPr>
+          <p:cNvSpPr txBox="1"/>
+          <p:nvPr/>
+        </p:nvSpPr>
+        <p:spPr>
+          <a:xfrm>
+            <a:off x="15490782" y="30943641"/>
+            <a:ext cx="5397475" cy="3693319"/>
+          </a:xfrm>
+          <a:prstGeom prst="rect">
+            <a:avLst/>
+          </a:prstGeom>
+          <a:noFill/>
+        </p:spPr>
+        <p:txBody>
+          <a:bodyPr wrap="square" rtlCol="0">
+            <a:spAutoFit/>
+          </a:bodyPr>
+          <a:lstStyle/>
+          <a:p>
+            <a:pPr algn="just"/>
+            <a:r>
+              <a:rPr lang="en-GB" sz="2400" b="1" dirty="0">
+                <a:latin typeface="Source Sans Pro" panose="020B0503030403020204" pitchFamily="34" charset="0"/>
+                <a:ea typeface="Source Sans Pro" panose="020B0503030403020204" pitchFamily="34" charset="0"/>
+              </a:rPr>
+              <a:t>Choosing a control :  - there I am again</a:t>
+            </a:r>
+          </a:p>
+          <a:p>
+            <a:pPr marL="342900" indent="-342900">
+              <a:buFont typeface="Arial" panose="020B0604020202020204" pitchFamily="34" charset="0"/>
+              <a:buChar char="•"/>
+            </a:pPr>
+            <a:r>
+              <a:rPr lang="en-GB" sz="2400" b="1" dirty="0"/>
+              <a:t>40S Ribosomal Complex</a:t>
+            </a:r>
+            <a:r>
+              <a:rPr lang="en-GB" sz="2400" dirty="0"/>
+              <a:t>: A complex that, according to CORUM data, exists and includes 4 proteins from our RBS (ribosome binding site) during mitosis </a:t>
+            </a:r>
+            <a:r>
+              <a:rPr lang="en-GB" sz="2400" b="1" dirty="0"/>
+              <a:t>positive control </a:t>
+            </a:r>
+            <a:endParaRPr lang="en-GB" sz="2400" dirty="0"/>
+          </a:p>
+          <a:p>
+            <a:pPr marL="342900" indent="-342900">
+              <a:buFont typeface="Arial" panose="020B0604020202020204" pitchFamily="34" charset="0"/>
+              <a:buChar char="•"/>
+            </a:pPr>
+            <a:r>
+              <a:rPr lang="en-GB" sz="2400" dirty="0"/>
+              <a:t>The proteins </a:t>
+            </a:r>
+            <a:r>
+              <a:rPr lang="en-GB" sz="2400" b="1" dirty="0"/>
+              <a:t>UIMC1_HUMAN</a:t>
+            </a:r>
+            <a:r>
+              <a:rPr lang="en-GB" sz="2400" dirty="0"/>
+              <a:t> and </a:t>
+            </a:r>
+            <a:r>
+              <a:rPr lang="en-GB" sz="2400" b="1" dirty="0"/>
+              <a:t>LPPRC_HUMAN</a:t>
+            </a:r>
+            <a:r>
+              <a:rPr lang="en-GB" sz="2400" dirty="0"/>
+              <a:t> were used as </a:t>
+            </a:r>
+            <a:r>
+              <a:rPr lang="en-GB" sz="2400" b="1" dirty="0"/>
+              <a:t>negative controls</a:t>
+            </a:r>
+          </a:p>
+          <a:p>
+            <a:endParaRPr lang="en-GB" dirty="0"/>
+          </a:p>
+        </p:txBody>
+      </p:sp>
+      <p:sp>
+        <p:nvSpPr>
+          <p:cNvPr id="65" name="Textfeld 42">
+            <a:extLst>
+              <a:ext uri="{FF2B5EF4-FFF2-40B4-BE49-F238E27FC236}">
+                <a16:creationId xmlns:a16="http://schemas.microsoft.com/office/drawing/2014/main" id="{51C0C865-513A-31B1-BC04-D65F54F85A14}"/>
+              </a:ext>
+            </a:extLst>
+          </p:cNvPr>
+          <p:cNvSpPr txBox="1"/>
+          <p:nvPr/>
+        </p:nvSpPr>
+        <p:spPr>
+          <a:xfrm>
+            <a:off x="15725617" y="37580168"/>
+            <a:ext cx="4630034" cy="646331"/>
+          </a:xfrm>
+          <a:prstGeom prst="rect">
+            <a:avLst/>
+          </a:prstGeom>
+          <a:noFill/>
+        </p:spPr>
+        <p:txBody>
+          <a:bodyPr wrap="square" rtlCol="0">
+            <a:spAutoFit/>
+          </a:bodyPr>
+          <a:lstStyle/>
+          <a:p>
+            <a:r>
+              <a:rPr lang="de-DE" sz="1200" b="1" dirty="0"/>
+              <a:t>Fig. X </a:t>
+            </a:r>
+            <a:r>
+              <a:rPr lang="de-DE" sz="1200" b="1" i="1" dirty="0"/>
+              <a:t>Heatmap of  accuracy for  comibantions of Parameters for DBSCAN: </a:t>
+            </a:r>
+            <a:r>
+              <a:rPr lang="de-DE" sz="1200" i="1" dirty="0"/>
+              <a:t>Accuaracy calculated on pos. and neg. controls, from </a:t>
+            </a:r>
+            <a:r>
+              <a:rPr lang="en-GB" sz="1200" dirty="0">
+                <a:latin typeface="Source Sans Pro" panose="020B0503030403020204" pitchFamily="34" charset="0"/>
+                <a:ea typeface="Source Sans Pro" panose="020B0503030403020204" pitchFamily="34" charset="0"/>
+              </a:rPr>
+              <a:t>ε (0.5-1.5) and </a:t>
+            </a:r>
+            <a:r>
+              <a:rPr lang="en-GB" sz="1200" dirty="0" err="1">
+                <a:latin typeface="Source Sans Pro" panose="020B0503030403020204" pitchFamily="34" charset="0"/>
+                <a:ea typeface="Source Sans Pro" panose="020B0503030403020204" pitchFamily="34" charset="0"/>
+              </a:rPr>
+              <a:t>MintPts</a:t>
+            </a:r>
+            <a:r>
+              <a:rPr lang="en-GB" sz="1200" dirty="0">
+                <a:latin typeface="Source Sans Pro" panose="020B0503030403020204" pitchFamily="34" charset="0"/>
+                <a:ea typeface="Source Sans Pro" panose="020B0503030403020204" pitchFamily="34" charset="0"/>
+              </a:rPr>
+              <a:t> (1-10).  Lower and higher ε lower the accuracy. </a:t>
+            </a:r>
+            <a:endParaRPr lang="en-US" sz="1200" dirty="0"/>
+          </a:p>
+        </p:txBody>
+      </p:sp>
+      <p:sp>
+        <p:nvSpPr>
+          <p:cNvPr id="66" name="Textfeld 42">
+            <a:extLst>
+              <a:ext uri="{FF2B5EF4-FFF2-40B4-BE49-F238E27FC236}">
+                <a16:creationId xmlns:a16="http://schemas.microsoft.com/office/drawing/2014/main" id="{E7E3BFD5-B88F-923D-A725-BF06D94A593E}"/>
+              </a:ext>
+            </a:extLst>
+          </p:cNvPr>
+          <p:cNvSpPr txBox="1"/>
+          <p:nvPr/>
+        </p:nvSpPr>
+        <p:spPr>
+          <a:xfrm>
+            <a:off x="23725031" y="30174604"/>
+            <a:ext cx="5730810" cy="646331"/>
+          </a:xfrm>
+          <a:prstGeom prst="rect">
+            <a:avLst/>
+          </a:prstGeom>
+          <a:noFill/>
+        </p:spPr>
+        <p:txBody>
+          <a:bodyPr wrap="square" rtlCol="0">
+            <a:spAutoFit/>
+          </a:bodyPr>
+          <a:lstStyle/>
+          <a:p>
+            <a:r>
+              <a:rPr lang="de-DE" sz="1200" b="1" dirty="0"/>
+              <a:t>Fig. X Proteins in 2D Pca showing results from clustering method DBSCAN: </a:t>
+            </a:r>
+            <a:r>
+              <a:rPr lang="de-DE" sz="1200" dirty="0"/>
+              <a:t>Only Proteins from RBPs in Mitosis where clustered. Dimension reduction on Data from Ctrl : COM and Peak hight. </a:t>
+            </a:r>
+            <a:r>
+              <a:rPr lang="en-GB" sz="1200" b="1" dirty="0">
+                <a:latin typeface="Source Sans Pro" panose="020B0503030403020204" pitchFamily="34" charset="0"/>
+                <a:ea typeface="Source Sans Pro" panose="020B0503030403020204" pitchFamily="34" charset="0"/>
+              </a:rPr>
+              <a:t>ε = 0.7 and </a:t>
+            </a:r>
+            <a:r>
+              <a:rPr lang="en-GB" sz="1200" b="1" dirty="0" err="1">
+                <a:latin typeface="Source Sans Pro" panose="020B0503030403020204" pitchFamily="34" charset="0"/>
+                <a:ea typeface="Source Sans Pro" panose="020B0503030403020204" pitchFamily="34" charset="0"/>
+              </a:rPr>
+              <a:t>MintPts</a:t>
+            </a:r>
+            <a:r>
+              <a:rPr lang="en-GB" sz="1200" b="1" dirty="0">
+                <a:latin typeface="Source Sans Pro" panose="020B0503030403020204" pitchFamily="34" charset="0"/>
+                <a:ea typeface="Source Sans Pro" panose="020B0503030403020204" pitchFamily="34" charset="0"/>
+              </a:rPr>
+              <a:t> = 4.</a:t>
+            </a:r>
+            <a:endParaRPr lang="en-US" sz="1200" dirty="0"/>
           </a:p>
         </p:txBody>
       </p:sp>

</xml_diff>

<commit_message>
Rechtschreibung sonst alles :)
</commit_message>
<xml_diff>
--- a/RiboZwo.pptx
+++ b/RiboZwo.pptx
@@ -5146,68 +5146,6 @@
       </p:sp>
       <p:sp>
         <p:nvSpPr>
-          <p:cNvPr id="19" name="Abgerundetes Rechteck 18">
-            <a:extLst>
-              <a:ext uri="{FF2B5EF4-FFF2-40B4-BE49-F238E27FC236}">
-                <a16:creationId xmlns:a16="http://schemas.microsoft.com/office/drawing/2014/main" id="{A79DB282-97A5-4F70-6071-974EECF280C5}"/>
-              </a:ext>
-            </a:extLst>
-          </p:cNvPr>
-          <p:cNvSpPr/>
-          <p:nvPr/>
-        </p:nvSpPr>
-        <p:spPr>
-          <a:xfrm>
-            <a:off x="15330252" y="9094236"/>
-            <a:ext cx="14295120" cy="7288578"/>
-          </a:xfrm>
-          <a:prstGeom prst="roundRect">
-            <a:avLst>
-              <a:gd name="adj" fmla="val 9636"/>
-            </a:avLst>
-          </a:prstGeom>
-          <a:solidFill>
-            <a:srgbClr val="E49596">
-              <a:alpha val="33168"/>
-            </a:srgbClr>
-          </a:solidFill>
-          <a:ln w="63500">
-            <a:solidFill>
-              <a:srgbClr val="B22F28"/>
-            </a:solidFill>
-          </a:ln>
-        </p:spPr>
-        <p:style>
-          <a:lnRef idx="2">
-            <a:schemeClr val="accent1">
-              <a:shade val="15000"/>
-            </a:schemeClr>
-          </a:lnRef>
-          <a:fillRef idx="1">
-            <a:schemeClr val="accent1"/>
-          </a:fillRef>
-          <a:effectRef idx="0">
-            <a:schemeClr val="accent1"/>
-          </a:effectRef>
-          <a:fontRef idx="minor">
-            <a:schemeClr val="lt1"/>
-          </a:fontRef>
-        </p:style>
-        <p:txBody>
-          <a:bodyPr rtlCol="0" anchor="t"/>
-          <a:lstStyle/>
-          <a:p>
-            <a:pPr algn="r"/>
-            <a:endParaRPr lang="en-US" sz="3600" noProof="0" dirty="0">
-              <a:solidFill>
-                <a:schemeClr val="tx1"/>
-              </a:solidFill>
-            </a:endParaRPr>
-          </a:p>
-        </p:txBody>
-      </p:sp>
-      <p:sp>
-        <p:nvSpPr>
           <p:cNvPr id="21" name="Abgerundetes Rechteck 20">
             <a:extLst>
               <a:ext uri="{FF2B5EF4-FFF2-40B4-BE49-F238E27FC236}">
@@ -5385,102 +5323,6 @@
               </a:rPr>
               <a:t>Reproducibility Analysis: Am I real? </a:t>
             </a:r>
-          </a:p>
-        </p:txBody>
-      </p:sp>
-      <p:sp>
-        <p:nvSpPr>
-          <p:cNvPr id="6" name="Rechteck 5">
-            <a:extLst>
-              <a:ext uri="{FF2B5EF4-FFF2-40B4-BE49-F238E27FC236}">
-                <a16:creationId xmlns:a16="http://schemas.microsoft.com/office/drawing/2014/main" id="{E69F82B7-9325-55F2-F381-69F57FF389B3}"/>
-              </a:ext>
-            </a:extLst>
-          </p:cNvPr>
-          <p:cNvSpPr/>
-          <p:nvPr/>
-        </p:nvSpPr>
-        <p:spPr>
-          <a:xfrm>
-            <a:off x="15848412" y="9507867"/>
-            <a:ext cx="12574188" cy="2197105"/>
-          </a:xfrm>
-          <a:prstGeom prst="rect">
-            <a:avLst/>
-          </a:prstGeom>
-          <a:noFill/>
-          <a:ln w="44450">
-            <a:noFill/>
-          </a:ln>
-        </p:spPr>
-        <p:style>
-          <a:lnRef idx="2">
-            <a:schemeClr val="accent1">
-              <a:shade val="15000"/>
-            </a:schemeClr>
-          </a:lnRef>
-          <a:fillRef idx="1">
-            <a:schemeClr val="accent1"/>
-          </a:fillRef>
-          <a:effectRef idx="0">
-            <a:schemeClr val="accent1"/>
-          </a:effectRef>
-          <a:fontRef idx="minor">
-            <a:schemeClr val="lt1"/>
-          </a:fontRef>
-        </p:style>
-        <p:txBody>
-          <a:bodyPr rtlCol="0" anchor="t"/>
-          <a:lstStyle/>
-          <a:p>
-            <a:r>
-              <a:rPr lang="en-US" sz="4000" noProof="0" dirty="0">
-                <a:solidFill>
-                  <a:schemeClr val="tx1"/>
-                </a:solidFill>
-                <a:latin typeface="Source Sans Pro" panose="020B0503030403020204" pitchFamily="34" charset="0"/>
-                <a:ea typeface="Source Sans Pro" panose="020B0503030403020204" pitchFamily="34" charset="0"/>
-              </a:rPr>
-              <a:t>Normalization: Finding the right fit for the day </a:t>
-            </a:r>
-          </a:p>
-          <a:p>
-            <a:endParaRPr lang="en-US" sz="4000" noProof="0" dirty="0">
-              <a:solidFill>
-                <a:schemeClr val="tx1"/>
-              </a:solidFill>
-              <a:latin typeface="Source Sans Pro" panose="020B0503030403020204" pitchFamily="34" charset="0"/>
-              <a:ea typeface="Source Sans Pro" panose="020B0503030403020204" pitchFamily="34" charset="0"/>
-            </a:endParaRPr>
-          </a:p>
-          <a:p>
-            <a:pPr marL="571500" indent="-571500">
-              <a:buFontTx/>
-              <a:buChar char="-"/>
-            </a:pPr>
-            <a:r>
-              <a:rPr lang="en-US" sz="4000" noProof="0" dirty="0">
-                <a:solidFill>
-                  <a:schemeClr val="tx1"/>
-                </a:solidFill>
-                <a:latin typeface="Source Sans Pro" panose="020B0503030403020204" pitchFamily="34" charset="0"/>
-                <a:ea typeface="Source Sans Pro" panose="020B0503030403020204" pitchFamily="34" charset="0"/>
-              </a:rPr>
-              <a:t>SD + Mean</a:t>
-            </a:r>
-          </a:p>
-          <a:p>
-            <a:pPr marL="571500" indent="-571500">
-              <a:buFontTx/>
-              <a:buChar char="-"/>
-            </a:pPr>
-            <a:endParaRPr lang="en-US" sz="4000" noProof="0" dirty="0">
-              <a:solidFill>
-                <a:schemeClr val="tx1"/>
-              </a:solidFill>
-              <a:latin typeface="Source Sans Pro" panose="020B0503030403020204" pitchFamily="34" charset="0"/>
-              <a:ea typeface="Source Sans Pro" panose="020B0503030403020204" pitchFamily="34" charset="0"/>
-            </a:endParaRPr>
           </a:p>
         </p:txBody>
       </p:sp>
@@ -6190,66 +6032,298 @@
       </p:sp>
       <p:sp>
         <p:nvSpPr>
-          <p:cNvPr id="12" name="Rectangle 11">
+          <p:cNvPr id="13" name="Textfeld 12">
             <a:extLst>
               <a:ext uri="{FF2B5EF4-FFF2-40B4-BE49-F238E27FC236}">
-                <a16:creationId xmlns:a16="http://schemas.microsoft.com/office/drawing/2014/main" id="{B9A6FAFB-7C49-7213-7BD8-8E66DBEDBBBF}"/>
+                <a16:creationId xmlns:a16="http://schemas.microsoft.com/office/drawing/2014/main" id="{B1FDECB6-1FBA-D64A-249B-C2A37669EFAA}"/>
               </a:ext>
             </a:extLst>
           </p:cNvPr>
-          <p:cNvSpPr/>
+          <p:cNvSpPr txBox="1"/>
           <p:nvPr/>
         </p:nvSpPr>
         <p:spPr>
           <a:xfrm>
-            <a:off x="15848412" y="11927105"/>
-            <a:ext cx="5359001" cy="3924705"/>
+            <a:off x="830996" y="7194777"/>
+            <a:ext cx="6015282" cy="5262979"/>
           </a:xfrm>
           <a:prstGeom prst="rect">
             <a:avLst/>
           </a:prstGeom>
-          <a:solidFill>
-            <a:schemeClr val="bg1"/>
-          </a:solidFill>
-          <a:ln>
-            <a:noFill/>
-          </a:ln>
+          <a:noFill/>
         </p:spPr>
-        <p:style>
-          <a:lnRef idx="2">
-            <a:schemeClr val="accent1">
-              <a:shade val="15000"/>
-            </a:schemeClr>
-          </a:lnRef>
-          <a:fillRef idx="1">
-            <a:schemeClr val="accent1"/>
-          </a:fillRef>
-          <a:effectRef idx="0">
-            <a:schemeClr val="accent1"/>
-          </a:effectRef>
-          <a:fontRef idx="minor">
-            <a:schemeClr val="lt1"/>
-          </a:fontRef>
-        </p:style>
-        <p:txBody>
-          <a:bodyPr rtlCol="0" anchor="t"/>
+        <p:txBody>
+          <a:bodyPr wrap="square" rtlCol="0">
+            <a:spAutoFit/>
+          </a:bodyPr>
           <a:lstStyle/>
           <a:p>
-            <a:pPr algn="r"/>
-            <a:endParaRPr lang="en-US" sz="3600" noProof="0" dirty="0">
-              <a:solidFill>
-                <a:schemeClr val="tx1"/>
-              </a:solidFill>
+            <a:pPr algn="just"/>
+            <a:r>
+              <a:rPr lang="en-US" sz="2400" noProof="0" dirty="0"/>
+              <a:t>To verify the reproducibility of the triplicates in our dataset, Spearman correlations were calculated between all replicate–fraction combinations. The resulting correlation coefficients (</a:t>
+            </a:r>
+            <a:r>
+              <a:rPr lang="en-US" sz="2400" noProof="0" dirty="0" err="1"/>
+              <a:t>r-values</a:t>
+            </a:r>
+            <a:r>
+              <a:rPr lang="en-US" sz="2400" noProof="0" dirty="0"/>
+              <a:t>) were visualized as two separate heatmaps - one for the RNase treatment (Fig. X on the right) and one for the control condition. </a:t>
+            </a:r>
+            <a:endParaRPr lang="en-US" sz="2400" dirty="0"/>
+          </a:p>
+          <a:p>
+            <a:pPr algn="just"/>
+            <a:r>
+              <a:rPr lang="en-US" sz="2400" noProof="0" dirty="0"/>
+              <a:t>Reproducibility is indicated by high correlations within corresponding fractions across replicates, which should appear as prominent diagonal patterns in 3×3 blocks on the heatmaps. </a:t>
+            </a:r>
+            <a:r>
+              <a:rPr lang="en-US" sz="2400" dirty="0"/>
+              <a:t>This diagonal correlation structure was evident in both treatments.</a:t>
+            </a:r>
+            <a:endParaRPr lang="en-US" sz="2400" noProof="0" dirty="0"/>
+          </a:p>
+        </p:txBody>
+      </p:sp>
+      <p:sp>
+        <p:nvSpPr>
+          <p:cNvPr id="56" name="Textfeld 55">
+            <a:extLst>
+              <a:ext uri="{FF2B5EF4-FFF2-40B4-BE49-F238E27FC236}">
+                <a16:creationId xmlns:a16="http://schemas.microsoft.com/office/drawing/2014/main" id="{7866C7D8-BD84-2809-E6DA-3A7BCF109C79}"/>
+              </a:ext>
+            </a:extLst>
+          </p:cNvPr>
+          <p:cNvSpPr txBox="1"/>
+          <p:nvPr/>
+        </p:nvSpPr>
+        <p:spPr>
+          <a:xfrm>
+            <a:off x="6978285" y="11954804"/>
+            <a:ext cx="7415340" cy="646331"/>
+          </a:xfrm>
+          <a:prstGeom prst="rect">
+            <a:avLst/>
+          </a:prstGeom>
+          <a:noFill/>
+        </p:spPr>
+        <p:txBody>
+          <a:bodyPr wrap="square" rtlCol="0">
+            <a:spAutoFit/>
+          </a:bodyPr>
+          <a:lstStyle/>
+          <a:p>
+            <a:r>
+              <a:rPr lang="de-DE" sz="1200" b="1" i="1" dirty="0"/>
+              <a:t>Fig. X </a:t>
+            </a:r>
+            <a:r>
+              <a:rPr lang="de-DE" sz="1200" b="1" i="1" dirty="0" err="1"/>
+              <a:t>Reproducibility</a:t>
+            </a:r>
+            <a:r>
+              <a:rPr lang="de-DE" sz="1200" b="1" i="1" dirty="0"/>
+              <a:t> </a:t>
+            </a:r>
+            <a:r>
+              <a:rPr lang="de-DE" sz="1200" b="1" i="1" dirty="0" err="1"/>
+              <a:t>heatmap</a:t>
+            </a:r>
+            <a:r>
+              <a:rPr lang="de-DE" sz="1200" b="1" i="1" dirty="0"/>
+              <a:t> (</a:t>
+            </a:r>
+            <a:r>
+              <a:rPr lang="de-DE" sz="1200" b="1" i="1" dirty="0" err="1"/>
+              <a:t>RNase</a:t>
+            </a:r>
+            <a:r>
+              <a:rPr lang="de-DE" sz="1200" b="1" i="1" dirty="0"/>
+              <a:t>, Spearman </a:t>
+            </a:r>
+            <a:r>
+              <a:rPr lang="de-DE" sz="1200" b="1" i="1" dirty="0" err="1"/>
+              <a:t>correlation</a:t>
+            </a:r>
+            <a:r>
+              <a:rPr lang="de-DE" sz="1200" b="1" i="1" dirty="0"/>
+              <a:t>): </a:t>
+            </a:r>
+            <a:r>
+              <a:rPr lang="de-DE" sz="1200" dirty="0" err="1"/>
+              <a:t>Heatmap</a:t>
+            </a:r>
+            <a:r>
+              <a:rPr lang="de-DE" sz="1200" dirty="0"/>
+              <a:t> </a:t>
+            </a:r>
+            <a:r>
+              <a:rPr lang="de-DE" sz="1200" dirty="0" err="1"/>
+              <a:t>displays</a:t>
+            </a:r>
+            <a:r>
+              <a:rPr lang="de-DE" sz="1200" dirty="0"/>
+              <a:t> </a:t>
+            </a:r>
+            <a:r>
+              <a:rPr lang="de-DE" sz="1200" dirty="0" err="1"/>
+              <a:t>pairwise</a:t>
+            </a:r>
+            <a:r>
+              <a:rPr lang="de-DE" sz="1200" dirty="0"/>
+              <a:t> Spearman </a:t>
+            </a:r>
+            <a:r>
+              <a:rPr lang="de-DE" sz="1200" dirty="0" err="1"/>
+              <a:t>correlation</a:t>
+            </a:r>
+            <a:r>
+              <a:rPr lang="de-DE" sz="1200" dirty="0"/>
+              <a:t> </a:t>
+            </a:r>
+            <a:r>
+              <a:rPr lang="de-DE" sz="1200" dirty="0" err="1"/>
+              <a:t>coefficients</a:t>
+            </a:r>
+            <a:r>
+              <a:rPr lang="de-DE" sz="1200" dirty="0"/>
+              <a:t> </a:t>
+            </a:r>
+            <a:r>
+              <a:rPr lang="de-DE" sz="1200" dirty="0" err="1"/>
+              <a:t>between</a:t>
+            </a:r>
+            <a:r>
+              <a:rPr lang="de-DE" sz="1200" dirty="0"/>
+              <a:t> all </a:t>
+            </a:r>
+            <a:r>
+              <a:rPr lang="de-DE" sz="1200" dirty="0" err="1"/>
+              <a:t>replicate</a:t>
+            </a:r>
+            <a:r>
+              <a:rPr lang="de-DE" sz="1200" dirty="0"/>
+              <a:t>–</a:t>
+            </a:r>
+            <a:r>
+              <a:rPr lang="de-DE" sz="1200" dirty="0" err="1"/>
+              <a:t>fraction</a:t>
+            </a:r>
+            <a:r>
+              <a:rPr lang="de-DE" sz="1200" dirty="0"/>
+              <a:t> </a:t>
+            </a:r>
+            <a:r>
+              <a:rPr lang="de-DE" sz="1200" dirty="0" err="1"/>
+              <a:t>combinations</a:t>
+            </a:r>
+            <a:r>
+              <a:rPr lang="de-DE" sz="1200" dirty="0"/>
+              <a:t> </a:t>
+            </a:r>
+            <a:r>
+              <a:rPr lang="de-DE" sz="1200" dirty="0" err="1"/>
+              <a:t>under</a:t>
+            </a:r>
+            <a:r>
+              <a:rPr lang="de-DE" sz="1200" dirty="0"/>
+              <a:t> </a:t>
+            </a:r>
+            <a:r>
+              <a:rPr lang="de-DE" sz="1200" dirty="0" err="1"/>
+              <a:t>RNase</a:t>
+            </a:r>
+            <a:r>
+              <a:rPr lang="de-DE" sz="1200" dirty="0"/>
+              <a:t> </a:t>
+            </a:r>
+            <a:r>
+              <a:rPr lang="de-DE" sz="1200" dirty="0" err="1"/>
+              <a:t>treatment</a:t>
+            </a:r>
+            <a:r>
+              <a:rPr lang="de-DE" sz="1200" dirty="0"/>
+              <a:t>. High </a:t>
+            </a:r>
+            <a:r>
+              <a:rPr lang="de-DE" sz="1200" dirty="0" err="1"/>
+              <a:t>correlations</a:t>
+            </a:r>
+            <a:r>
+              <a:rPr lang="de-DE" sz="1200" dirty="0"/>
+              <a:t> </a:t>
+            </a:r>
+            <a:r>
+              <a:rPr lang="de-DE" sz="1200" dirty="0" err="1"/>
+              <a:t>within</a:t>
+            </a:r>
+            <a:r>
+              <a:rPr lang="de-DE" sz="1200" dirty="0"/>
+              <a:t> 3×3 diagonal </a:t>
+            </a:r>
+            <a:r>
+              <a:rPr lang="de-DE" sz="1200" dirty="0" err="1"/>
+              <a:t>blocks</a:t>
+            </a:r>
+            <a:r>
+              <a:rPr lang="de-DE" sz="1200" dirty="0"/>
+              <a:t> </a:t>
+            </a:r>
+            <a:r>
+              <a:rPr lang="de-DE" sz="1200" dirty="0" err="1"/>
+              <a:t>indicate</a:t>
+            </a:r>
+            <a:r>
+              <a:rPr lang="de-DE" sz="1200" dirty="0"/>
+              <a:t> strong </a:t>
+            </a:r>
+            <a:r>
+              <a:rPr lang="de-DE" sz="1200" dirty="0" err="1"/>
+              <a:t>reproducibility</a:t>
+            </a:r>
+            <a:r>
+              <a:rPr lang="de-DE" sz="1200" dirty="0"/>
+              <a:t> </a:t>
+            </a:r>
+            <a:r>
+              <a:rPr lang="de-DE" sz="1200" dirty="0" err="1"/>
+              <a:t>across</a:t>
+            </a:r>
+            <a:r>
+              <a:rPr lang="de-DE" sz="1200" dirty="0"/>
+              <a:t> </a:t>
+            </a:r>
+            <a:r>
+              <a:rPr lang="de-DE" sz="1200" dirty="0" err="1"/>
+              <a:t>corresponding</a:t>
+            </a:r>
+            <a:r>
+              <a:rPr lang="de-DE" sz="1200" dirty="0"/>
+              <a:t> </a:t>
+            </a:r>
+            <a:r>
+              <a:rPr lang="de-DE" sz="1200" dirty="0" err="1"/>
+              <a:t>fractions</a:t>
+            </a:r>
+            <a:r>
+              <a:rPr lang="de-DE" sz="1200" dirty="0"/>
+              <a:t>.</a:t>
+            </a:r>
+            <a:endParaRPr lang="en-US" sz="1200" i="1" noProof="0" dirty="0">
+              <a:latin typeface="Source Sans Pro" panose="020B0503030403020204" pitchFamily="34" charset="0"/>
+              <a:ea typeface="Source Sans Pro" panose="020B0503030403020204" pitchFamily="34" charset="0"/>
             </a:endParaRPr>
           </a:p>
         </p:txBody>
       </p:sp>
       <p:pic>
         <p:nvPicPr>
-          <p:cNvPr id="8" name="Picture 7" descr="A graph with red dots&#10;&#10;AI-generated content may be incorrect.">
+          <p:cNvPr id="58" name="Grafik 57">
             <a:extLst>
               <a:ext uri="{FF2B5EF4-FFF2-40B4-BE49-F238E27FC236}">
-                <a16:creationId xmlns:a16="http://schemas.microsoft.com/office/drawing/2014/main" id="{58FC2CD0-6EDD-4966-192D-536096C3635D}"/>
+                <a16:creationId xmlns:a16="http://schemas.microsoft.com/office/drawing/2014/main" id="{A4E66611-3D6E-9A44-4656-502C42629693}"/>
               </a:ext>
             </a:extLst>
           </p:cNvPr>
@@ -6272,386 +6346,6 @@
         </p:blipFill>
         <p:spPr>
           <a:xfrm>
-            <a:off x="15902479" y="11965102"/>
-            <a:ext cx="5232939" cy="3924704"/>
-          </a:xfrm>
-          <a:prstGeom prst="rect">
-            <a:avLst/>
-          </a:prstGeom>
-        </p:spPr>
-      </p:pic>
-      <p:sp>
-        <p:nvSpPr>
-          <p:cNvPr id="13" name="Textfeld 12">
-            <a:extLst>
-              <a:ext uri="{FF2B5EF4-FFF2-40B4-BE49-F238E27FC236}">
-                <a16:creationId xmlns:a16="http://schemas.microsoft.com/office/drawing/2014/main" id="{B1FDECB6-1FBA-D64A-249B-C2A37669EFAA}"/>
-              </a:ext>
-            </a:extLst>
-          </p:cNvPr>
-          <p:cNvSpPr txBox="1"/>
-          <p:nvPr/>
-        </p:nvSpPr>
-        <p:spPr>
-          <a:xfrm>
-            <a:off x="830996" y="7194777"/>
-            <a:ext cx="6015282" cy="5262979"/>
-          </a:xfrm>
-          <a:prstGeom prst="rect">
-            <a:avLst/>
-          </a:prstGeom>
-          <a:noFill/>
-        </p:spPr>
-        <p:txBody>
-          <a:bodyPr wrap="square" rtlCol="0">
-            <a:spAutoFit/>
-          </a:bodyPr>
-          <a:lstStyle/>
-          <a:p>
-            <a:pPr algn="just"/>
-            <a:r>
-              <a:rPr lang="en-US" sz="2400" noProof="0" dirty="0"/>
-              <a:t>To verify the reproducibility of the triplicates in our dataset, Spearman correlations were calculated between all replicate–fraction combinations. The resulting correlation coefficients (</a:t>
-            </a:r>
-            <a:r>
-              <a:rPr lang="en-US" sz="2400" noProof="0" dirty="0" err="1"/>
-              <a:t>r-values</a:t>
-            </a:r>
-            <a:r>
-              <a:rPr lang="en-US" sz="2400" noProof="0" dirty="0"/>
-              <a:t>) were visualized as two separate heatmaps - one for the RNase treatment (Fig. X on the right) and one for the control condition. </a:t>
-            </a:r>
-            <a:endParaRPr lang="en-US" sz="2400" dirty="0"/>
-          </a:p>
-          <a:p>
-            <a:pPr algn="just"/>
-            <a:r>
-              <a:rPr lang="en-US" sz="2400" noProof="0" dirty="0"/>
-              <a:t>Reproducibility is indicated by high correlations within corresponding fractions across replicates, which should appear as prominent diagonal patterns in 3×3 blocks on the heatmaps. </a:t>
-            </a:r>
-            <a:r>
-              <a:rPr lang="en-US" sz="2400" dirty="0"/>
-              <a:t>This diagonal correlation structure was evident in both treatments.</a:t>
-            </a:r>
-            <a:endParaRPr lang="en-US" sz="2400" noProof="0" dirty="0"/>
-          </a:p>
-        </p:txBody>
-      </p:sp>
-      <p:sp>
-        <p:nvSpPr>
-          <p:cNvPr id="56" name="Textfeld 55">
-            <a:extLst>
-              <a:ext uri="{FF2B5EF4-FFF2-40B4-BE49-F238E27FC236}">
-                <a16:creationId xmlns:a16="http://schemas.microsoft.com/office/drawing/2014/main" id="{7866C7D8-BD84-2809-E6DA-3A7BCF109C79}"/>
-              </a:ext>
-            </a:extLst>
-          </p:cNvPr>
-          <p:cNvSpPr txBox="1"/>
-          <p:nvPr/>
-        </p:nvSpPr>
-        <p:spPr>
-          <a:xfrm>
-            <a:off x="6978285" y="11954804"/>
-            <a:ext cx="7415340" cy="646331"/>
-          </a:xfrm>
-          <a:prstGeom prst="rect">
-            <a:avLst/>
-          </a:prstGeom>
-          <a:noFill/>
-        </p:spPr>
-        <p:txBody>
-          <a:bodyPr wrap="square" rtlCol="0">
-            <a:spAutoFit/>
-          </a:bodyPr>
-          <a:lstStyle/>
-          <a:p>
-            <a:r>
-              <a:rPr lang="de-DE" sz="1200" b="1" i="1" dirty="0"/>
-              <a:t>Fig. X </a:t>
-            </a:r>
-            <a:r>
-              <a:rPr lang="de-DE" sz="1200" b="1" i="1" dirty="0" err="1"/>
-              <a:t>Reproducibility</a:t>
-            </a:r>
-            <a:r>
-              <a:rPr lang="de-DE" sz="1200" b="1" i="1" dirty="0"/>
-              <a:t> </a:t>
-            </a:r>
-            <a:r>
-              <a:rPr lang="de-DE" sz="1200" b="1" i="1" dirty="0" err="1"/>
-              <a:t>heatmap</a:t>
-            </a:r>
-            <a:r>
-              <a:rPr lang="de-DE" sz="1200" b="1" i="1" dirty="0"/>
-              <a:t> (</a:t>
-            </a:r>
-            <a:r>
-              <a:rPr lang="de-DE" sz="1200" b="1" i="1" dirty="0" err="1"/>
-              <a:t>RNase</a:t>
-            </a:r>
-            <a:r>
-              <a:rPr lang="de-DE" sz="1200" b="1" i="1" dirty="0"/>
-              <a:t>, Spearman </a:t>
-            </a:r>
-            <a:r>
-              <a:rPr lang="de-DE" sz="1200" b="1" i="1" dirty="0" err="1"/>
-              <a:t>correlation</a:t>
-            </a:r>
-            <a:r>
-              <a:rPr lang="de-DE" sz="1200" b="1" i="1" dirty="0"/>
-              <a:t>): </a:t>
-            </a:r>
-            <a:r>
-              <a:rPr lang="de-DE" sz="1200" dirty="0" err="1"/>
-              <a:t>Heatmap</a:t>
-            </a:r>
-            <a:r>
-              <a:rPr lang="de-DE" sz="1200" dirty="0"/>
-              <a:t> </a:t>
-            </a:r>
-            <a:r>
-              <a:rPr lang="de-DE" sz="1200" dirty="0" err="1"/>
-              <a:t>displays</a:t>
-            </a:r>
-            <a:r>
-              <a:rPr lang="de-DE" sz="1200" dirty="0"/>
-              <a:t> </a:t>
-            </a:r>
-            <a:r>
-              <a:rPr lang="de-DE" sz="1200" dirty="0" err="1"/>
-              <a:t>pairwise</a:t>
-            </a:r>
-            <a:r>
-              <a:rPr lang="de-DE" sz="1200" dirty="0"/>
-              <a:t> Spearman </a:t>
-            </a:r>
-            <a:r>
-              <a:rPr lang="de-DE" sz="1200" dirty="0" err="1"/>
-              <a:t>correlation</a:t>
-            </a:r>
-            <a:r>
-              <a:rPr lang="de-DE" sz="1200" dirty="0"/>
-              <a:t> </a:t>
-            </a:r>
-            <a:r>
-              <a:rPr lang="de-DE" sz="1200" dirty="0" err="1"/>
-              <a:t>coefficients</a:t>
-            </a:r>
-            <a:r>
-              <a:rPr lang="de-DE" sz="1200" dirty="0"/>
-              <a:t> </a:t>
-            </a:r>
-            <a:r>
-              <a:rPr lang="de-DE" sz="1200" dirty="0" err="1"/>
-              <a:t>between</a:t>
-            </a:r>
-            <a:r>
-              <a:rPr lang="de-DE" sz="1200" dirty="0"/>
-              <a:t> all </a:t>
-            </a:r>
-            <a:r>
-              <a:rPr lang="de-DE" sz="1200" dirty="0" err="1"/>
-              <a:t>replicate</a:t>
-            </a:r>
-            <a:r>
-              <a:rPr lang="de-DE" sz="1200" dirty="0"/>
-              <a:t>–</a:t>
-            </a:r>
-            <a:r>
-              <a:rPr lang="de-DE" sz="1200" dirty="0" err="1"/>
-              <a:t>fraction</a:t>
-            </a:r>
-            <a:r>
-              <a:rPr lang="de-DE" sz="1200" dirty="0"/>
-              <a:t> </a:t>
-            </a:r>
-            <a:r>
-              <a:rPr lang="de-DE" sz="1200" dirty="0" err="1"/>
-              <a:t>combinations</a:t>
-            </a:r>
-            <a:r>
-              <a:rPr lang="de-DE" sz="1200" dirty="0"/>
-              <a:t> </a:t>
-            </a:r>
-            <a:r>
-              <a:rPr lang="de-DE" sz="1200" dirty="0" err="1"/>
-              <a:t>under</a:t>
-            </a:r>
-            <a:r>
-              <a:rPr lang="de-DE" sz="1200" dirty="0"/>
-              <a:t> </a:t>
-            </a:r>
-            <a:r>
-              <a:rPr lang="de-DE" sz="1200" dirty="0" err="1"/>
-              <a:t>RNase</a:t>
-            </a:r>
-            <a:r>
-              <a:rPr lang="de-DE" sz="1200" dirty="0"/>
-              <a:t> </a:t>
-            </a:r>
-            <a:r>
-              <a:rPr lang="de-DE" sz="1200" dirty="0" err="1"/>
-              <a:t>treatment</a:t>
-            </a:r>
-            <a:r>
-              <a:rPr lang="de-DE" sz="1200" dirty="0"/>
-              <a:t>. High </a:t>
-            </a:r>
-            <a:r>
-              <a:rPr lang="de-DE" sz="1200" dirty="0" err="1"/>
-              <a:t>correlations</a:t>
-            </a:r>
-            <a:r>
-              <a:rPr lang="de-DE" sz="1200" dirty="0"/>
-              <a:t> </a:t>
-            </a:r>
-            <a:r>
-              <a:rPr lang="de-DE" sz="1200" dirty="0" err="1"/>
-              <a:t>within</a:t>
-            </a:r>
-            <a:r>
-              <a:rPr lang="de-DE" sz="1200" dirty="0"/>
-              <a:t> 3×3 diagonal </a:t>
-            </a:r>
-            <a:r>
-              <a:rPr lang="de-DE" sz="1200" dirty="0" err="1"/>
-              <a:t>blocks</a:t>
-            </a:r>
-            <a:r>
-              <a:rPr lang="de-DE" sz="1200" dirty="0"/>
-              <a:t> </a:t>
-            </a:r>
-            <a:r>
-              <a:rPr lang="de-DE" sz="1200" dirty="0" err="1"/>
-              <a:t>indicate</a:t>
-            </a:r>
-            <a:r>
-              <a:rPr lang="de-DE" sz="1200" dirty="0"/>
-              <a:t> strong </a:t>
-            </a:r>
-            <a:r>
-              <a:rPr lang="de-DE" sz="1200" dirty="0" err="1"/>
-              <a:t>reproducibility</a:t>
-            </a:r>
-            <a:r>
-              <a:rPr lang="de-DE" sz="1200" dirty="0"/>
-              <a:t> </a:t>
-            </a:r>
-            <a:r>
-              <a:rPr lang="de-DE" sz="1200" dirty="0" err="1"/>
-              <a:t>across</a:t>
-            </a:r>
-            <a:r>
-              <a:rPr lang="de-DE" sz="1200" dirty="0"/>
-              <a:t> </a:t>
-            </a:r>
-            <a:r>
-              <a:rPr lang="de-DE" sz="1200" dirty="0" err="1"/>
-              <a:t>corresponding</a:t>
-            </a:r>
-            <a:r>
-              <a:rPr lang="de-DE" sz="1200" dirty="0"/>
-              <a:t> </a:t>
-            </a:r>
-            <a:r>
-              <a:rPr lang="de-DE" sz="1200" dirty="0" err="1"/>
-              <a:t>fractions</a:t>
-            </a:r>
-            <a:r>
-              <a:rPr lang="de-DE" sz="1200" dirty="0"/>
-              <a:t>.</a:t>
-            </a:r>
-            <a:endParaRPr lang="en-US" sz="1200" i="1" noProof="0" dirty="0">
-              <a:latin typeface="Source Sans Pro" panose="020B0503030403020204" pitchFamily="34" charset="0"/>
-              <a:ea typeface="Source Sans Pro" panose="020B0503030403020204" pitchFamily="34" charset="0"/>
-            </a:endParaRPr>
-          </a:p>
-        </p:txBody>
-      </p:sp>
-      <p:sp>
-        <p:nvSpPr>
-          <p:cNvPr id="73" name="Rectangle 72">
-            <a:extLst>
-              <a:ext uri="{FF2B5EF4-FFF2-40B4-BE49-F238E27FC236}">
-                <a16:creationId xmlns:a16="http://schemas.microsoft.com/office/drawing/2014/main" id="{497B7107-C6F9-BC8E-32F9-4EB58EBC3122}"/>
-              </a:ext>
-            </a:extLst>
-          </p:cNvPr>
-          <p:cNvSpPr/>
-          <p:nvPr/>
-        </p:nvSpPr>
-        <p:spPr>
-          <a:xfrm>
-            <a:off x="22687042" y="26194178"/>
-            <a:ext cx="6776884" cy="5105981"/>
-          </a:xfrm>
-          <a:prstGeom prst="rect">
-            <a:avLst/>
-          </a:prstGeom>
-          <a:solidFill>
-            <a:schemeClr val="bg1"/>
-          </a:solidFill>
-          <a:ln>
-            <a:noFill/>
-          </a:ln>
-        </p:spPr>
-        <p:style>
-          <a:lnRef idx="2">
-            <a:schemeClr val="accent1">
-              <a:shade val="15000"/>
-            </a:schemeClr>
-          </a:lnRef>
-          <a:fillRef idx="1">
-            <a:schemeClr val="accent1"/>
-          </a:fillRef>
-          <a:effectRef idx="0">
-            <a:schemeClr val="accent1"/>
-          </a:effectRef>
-          <a:fontRef idx="minor">
-            <a:schemeClr val="lt1"/>
-          </a:fontRef>
-        </p:style>
-        <p:txBody>
-          <a:bodyPr rtlCol="0" anchor="t"/>
-          <a:lstStyle/>
-          <a:p>
-            <a:pPr algn="r"/>
-            <a:endParaRPr lang="en-GB" sz="3600" dirty="0">
-              <a:solidFill>
-                <a:schemeClr val="tx1"/>
-              </a:solidFill>
-            </a:endParaRPr>
-          </a:p>
-        </p:txBody>
-      </p:sp>
-      <p:pic>
-        <p:nvPicPr>
-          <p:cNvPr id="58" name="Grafik 57">
-            <a:extLst>
-              <a:ext uri="{FF2B5EF4-FFF2-40B4-BE49-F238E27FC236}">
-                <a16:creationId xmlns:a16="http://schemas.microsoft.com/office/drawing/2014/main" id="{A4E66611-3D6E-9A44-4656-502C42629693}"/>
-              </a:ext>
-            </a:extLst>
-          </p:cNvPr>
-          <p:cNvPicPr>
-            <a:picLocks noChangeAspect="1"/>
-          </p:cNvPicPr>
-          <p:nvPr/>
-        </p:nvPicPr>
-        <p:blipFill>
-          <a:blip r:embed="rId10">
-            <a:extLst>
-              <a:ext uri="{28A0092B-C50C-407E-A947-70E740481C1C}">
-                <a14:useLocalDpi xmlns:a14="http://schemas.microsoft.com/office/drawing/2010/main" val="0"/>
-              </a:ext>
-            </a:extLst>
-          </a:blip>
-          <a:stretch>
-            <a:fillRect/>
-          </a:stretch>
-        </p:blipFill>
-        <p:spPr>
-          <a:xfrm>
             <a:off x="22074595" y="17620186"/>
             <a:ext cx="6864416" cy="5148312"/>
           </a:xfrm>
@@ -7210,7 +6904,7 @@
           <p:nvPr/>
         </p:nvPicPr>
         <p:blipFill>
-          <a:blip r:embed="rId11">
+          <a:blip r:embed="rId10">
             <a:extLst>
               <a:ext uri="{28A0092B-C50C-407E-A947-70E740481C1C}">
                 <a14:useLocalDpi xmlns:a14="http://schemas.microsoft.com/office/drawing/2010/main" val="0"/>
@@ -7247,7 +6941,7 @@
           <p:nvPr/>
         </p:nvPicPr>
         <p:blipFill>
-          <a:blip r:embed="rId12"/>
+          <a:blip r:embed="rId11"/>
           <a:stretch>
             <a:fillRect/>
           </a:stretch>
@@ -7610,7 +7304,7 @@
           <p:nvPr/>
         </p:nvPicPr>
         <p:blipFill>
-          <a:blip r:embed="rId13">
+          <a:blip r:embed="rId12">
             <a:extLst>
               <a:ext uri="{28A0092B-C50C-407E-A947-70E740481C1C}">
                 <a14:useLocalDpi xmlns:a14="http://schemas.microsoft.com/office/drawing/2010/main" val="0"/>
@@ -7646,7 +7340,7 @@
           <p:nvPr/>
         </p:nvPicPr>
         <p:blipFill>
-          <a:blip r:embed="rId14">
+          <a:blip r:embed="rId13">
             <a:extLst>
               <a:ext uri="{28A0092B-C50C-407E-A947-70E740481C1C}">
                 <a14:useLocalDpi xmlns:a14="http://schemas.microsoft.com/office/drawing/2010/main" val="0"/>
@@ -9998,7 +9692,483 @@
       </p:sp>
       <p:sp>
         <p:nvSpPr>
-          <p:cNvPr id="17" name="Abgerundetes Rechteck 21">
+          <p:cNvPr id="14" name="Abgerundetes Rechteck 18">
+            <a:extLst>
+              <a:ext uri="{FF2B5EF4-FFF2-40B4-BE49-F238E27FC236}">
+                <a16:creationId xmlns:a16="http://schemas.microsoft.com/office/drawing/2014/main" id="{A79DB282-97A5-4F70-6071-974EECF280C5}"/>
+              </a:ext>
+            </a:extLst>
+          </p:cNvPr>
+          <p:cNvSpPr/>
+          <p:nvPr/>
+        </p:nvSpPr>
+        <p:spPr>
+          <a:xfrm>
+            <a:off x="15330252" y="9094236"/>
+            <a:ext cx="14295120" cy="7288578"/>
+          </a:xfrm>
+          <a:prstGeom prst="roundRect">
+            <a:avLst>
+              <a:gd name="adj" fmla="val 9636"/>
+            </a:avLst>
+          </a:prstGeom>
+          <a:solidFill>
+            <a:srgbClr val="E49596">
+              <a:alpha val="33168"/>
+            </a:srgbClr>
+          </a:solidFill>
+          <a:ln w="63500">
+            <a:solidFill>
+              <a:srgbClr val="B22F28"/>
+            </a:solidFill>
+          </a:ln>
+        </p:spPr>
+        <p:style>
+          <a:lnRef idx="2">
+            <a:schemeClr val="accent1">
+              <a:shade val="15000"/>
+            </a:schemeClr>
+          </a:lnRef>
+          <a:fillRef idx="1">
+            <a:schemeClr val="accent1"/>
+          </a:fillRef>
+          <a:effectRef idx="0">
+            <a:schemeClr val="accent1"/>
+          </a:effectRef>
+          <a:fontRef idx="minor">
+            <a:schemeClr val="lt1"/>
+          </a:fontRef>
+        </p:style>
+        <p:txBody>
+          <a:bodyPr rtlCol="0" anchor="t"/>
+          <a:lstStyle/>
+          <a:p>
+            <a:pPr algn="r"/>
+            <a:endParaRPr lang="en-US" sz="3600" noProof="0" dirty="0">
+              <a:solidFill>
+                <a:schemeClr val="tx1"/>
+              </a:solidFill>
+            </a:endParaRPr>
+          </a:p>
+        </p:txBody>
+      </p:sp>
+      <p:sp>
+        <p:nvSpPr>
+          <p:cNvPr id="22" name="Rechteck 5">
+            <a:extLst>
+              <a:ext uri="{FF2B5EF4-FFF2-40B4-BE49-F238E27FC236}">
+                <a16:creationId xmlns:a16="http://schemas.microsoft.com/office/drawing/2014/main" id="{E69F82B7-9325-55F2-F381-69F57FF389B3}"/>
+              </a:ext>
+            </a:extLst>
+          </p:cNvPr>
+          <p:cNvSpPr/>
+          <p:nvPr/>
+        </p:nvSpPr>
+        <p:spPr>
+          <a:xfrm>
+            <a:off x="15848412" y="9507867"/>
+            <a:ext cx="12574188" cy="2197105"/>
+          </a:xfrm>
+          <a:prstGeom prst="rect">
+            <a:avLst/>
+          </a:prstGeom>
+          <a:noFill/>
+          <a:ln w="44450">
+            <a:noFill/>
+          </a:ln>
+        </p:spPr>
+        <p:style>
+          <a:lnRef idx="2">
+            <a:schemeClr val="accent1">
+              <a:shade val="15000"/>
+            </a:schemeClr>
+          </a:lnRef>
+          <a:fillRef idx="1">
+            <a:schemeClr val="accent1"/>
+          </a:fillRef>
+          <a:effectRef idx="0">
+            <a:schemeClr val="accent1"/>
+          </a:effectRef>
+          <a:fontRef idx="minor">
+            <a:schemeClr val="lt1"/>
+          </a:fontRef>
+        </p:style>
+        <p:txBody>
+          <a:bodyPr rtlCol="0" anchor="t"/>
+          <a:lstStyle/>
+          <a:p>
+            <a:r>
+              <a:rPr lang="en-US" sz="4000" noProof="0" dirty="0">
+                <a:solidFill>
+                  <a:schemeClr val="tx1"/>
+                </a:solidFill>
+                <a:latin typeface="Source Sans Pro" panose="020B0503030403020204" pitchFamily="34" charset="0"/>
+                <a:ea typeface="Source Sans Pro" panose="020B0503030403020204" pitchFamily="34" charset="0"/>
+              </a:rPr>
+              <a:t>Normalization: Finding the right fit for the day </a:t>
+            </a:r>
+          </a:p>
+          <a:p>
+            <a:endParaRPr lang="en-US" sz="4000" noProof="0" dirty="0">
+              <a:solidFill>
+                <a:schemeClr val="tx1"/>
+              </a:solidFill>
+              <a:latin typeface="Source Sans Pro" panose="020B0503030403020204" pitchFamily="34" charset="0"/>
+              <a:ea typeface="Source Sans Pro" panose="020B0503030403020204" pitchFamily="34" charset="0"/>
+            </a:endParaRPr>
+          </a:p>
+          <a:p>
+            <a:endParaRPr lang="en-US" sz="4000" noProof="0" dirty="0">
+              <a:solidFill>
+                <a:schemeClr val="tx1"/>
+              </a:solidFill>
+              <a:latin typeface="Source Sans Pro" panose="020B0503030403020204" pitchFamily="34" charset="0"/>
+              <a:ea typeface="Source Sans Pro" panose="020B0503030403020204" pitchFamily="34" charset="0"/>
+            </a:endParaRPr>
+          </a:p>
+        </p:txBody>
+      </p:sp>
+      <p:sp>
+        <p:nvSpPr>
+          <p:cNvPr id="46" name="Rectangle 45">
+            <a:extLst>
+              <a:ext uri="{FF2B5EF4-FFF2-40B4-BE49-F238E27FC236}">
+                <a16:creationId xmlns:a16="http://schemas.microsoft.com/office/drawing/2014/main" id="{B9A6FAFB-7C49-7213-7BD8-8E66DBEDBBBF}"/>
+              </a:ext>
+            </a:extLst>
+          </p:cNvPr>
+          <p:cNvSpPr/>
+          <p:nvPr/>
+        </p:nvSpPr>
+        <p:spPr>
+          <a:xfrm>
+            <a:off x="15804632" y="10370519"/>
+            <a:ext cx="5359001" cy="3924705"/>
+          </a:xfrm>
+          <a:prstGeom prst="rect">
+            <a:avLst/>
+          </a:prstGeom>
+          <a:solidFill>
+            <a:schemeClr val="bg1"/>
+          </a:solidFill>
+          <a:ln>
+            <a:noFill/>
+          </a:ln>
+        </p:spPr>
+        <p:style>
+          <a:lnRef idx="2">
+            <a:schemeClr val="accent1">
+              <a:shade val="15000"/>
+            </a:schemeClr>
+          </a:lnRef>
+          <a:fillRef idx="1">
+            <a:schemeClr val="accent1"/>
+          </a:fillRef>
+          <a:effectRef idx="0">
+            <a:schemeClr val="accent1"/>
+          </a:effectRef>
+          <a:fontRef idx="minor">
+            <a:schemeClr val="lt1"/>
+          </a:fontRef>
+        </p:style>
+        <p:txBody>
+          <a:bodyPr rtlCol="0" anchor="t"/>
+          <a:lstStyle/>
+          <a:p>
+            <a:pPr algn="r"/>
+            <a:endParaRPr lang="en-US" sz="3600" noProof="0" dirty="0">
+              <a:solidFill>
+                <a:schemeClr val="tx1"/>
+              </a:solidFill>
+            </a:endParaRPr>
+          </a:p>
+        </p:txBody>
+      </p:sp>
+      <p:pic>
+        <p:nvPicPr>
+          <p:cNvPr id="52" name="Picture 51" descr="A graph with red dots&#10;&#10;AI-generated content may be incorrect.">
+            <a:extLst>
+              <a:ext uri="{FF2B5EF4-FFF2-40B4-BE49-F238E27FC236}">
+                <a16:creationId xmlns:a16="http://schemas.microsoft.com/office/drawing/2014/main" id="{58FC2CD0-6EDD-4966-192D-536096C3635D}"/>
+              </a:ext>
+            </a:extLst>
+          </p:cNvPr>
+          <p:cNvPicPr>
+            <a:picLocks noChangeAspect="1"/>
+          </p:cNvPicPr>
+          <p:nvPr/>
+        </p:nvPicPr>
+        <p:blipFill>
+          <a:blip r:embed="rId23">
+            <a:extLst>
+              <a:ext uri="{28A0092B-C50C-407E-A947-70E740481C1C}">
+                <a14:useLocalDpi xmlns:a14="http://schemas.microsoft.com/office/drawing/2010/main" val="0"/>
+              </a:ext>
+            </a:extLst>
+          </a:blip>
+          <a:stretch>
+            <a:fillRect/>
+          </a:stretch>
+        </p:blipFill>
+        <p:spPr>
+          <a:xfrm>
+            <a:off x="15885797" y="10518058"/>
+            <a:ext cx="5232939" cy="3924704"/>
+          </a:xfrm>
+          <a:prstGeom prst="rect">
+            <a:avLst/>
+          </a:prstGeom>
+        </p:spPr>
+      </p:pic>
+      <p:sp>
+        <p:nvSpPr>
+          <p:cNvPr id="80" name="Textfeld 35">
+            <a:extLst>
+              <a:ext uri="{FF2B5EF4-FFF2-40B4-BE49-F238E27FC236}">
+                <a16:creationId xmlns:a16="http://schemas.microsoft.com/office/drawing/2014/main" id="{5F87CEC2-C09A-D583-E252-B532722A3A72}"/>
+              </a:ext>
+            </a:extLst>
+          </p:cNvPr>
+          <p:cNvSpPr txBox="1"/>
+          <p:nvPr/>
+        </p:nvSpPr>
+        <p:spPr>
+          <a:xfrm>
+            <a:off x="21666340" y="10318293"/>
+            <a:ext cx="7258967" cy="5262979"/>
+          </a:xfrm>
+          <a:prstGeom prst="rect">
+            <a:avLst/>
+          </a:prstGeom>
+          <a:noFill/>
+        </p:spPr>
+        <p:txBody>
+          <a:bodyPr wrap="square" rtlCol="0">
+            <a:spAutoFit/>
+          </a:bodyPr>
+          <a:lstStyle/>
+          <a:p>
+            <a:pPr algn="just"/>
+            <a:r>
+              <a:rPr lang="en-US" sz="2400" b="1" dirty="0"/>
+              <a:t>Information about Data</a:t>
+            </a:r>
+          </a:p>
+          <a:p>
+            <a:pPr marL="342900" indent="-342900" algn="just">
+              <a:buFont typeface="Arial" panose="020B0604020202020204" pitchFamily="34" charset="0"/>
+              <a:buChar char="•"/>
+            </a:pPr>
+            <a:r>
+              <a:rPr lang="en-US" sz="2400" dirty="0"/>
+              <a:t>Total number of Proteins: </a:t>
+            </a:r>
+          </a:p>
+          <a:p>
+            <a:pPr marL="342900" indent="-342900" algn="just">
+              <a:buFont typeface="Arial" panose="020B0604020202020204" pitchFamily="34" charset="0"/>
+              <a:buChar char="•"/>
+            </a:pPr>
+            <a:r>
+              <a:rPr lang="en-US" sz="2400" dirty="0"/>
+              <a:t>Number of Fractions: 25 Fractions </a:t>
+            </a:r>
+          </a:p>
+          <a:p>
+            <a:pPr marL="342900" indent="-342900" algn="just">
+              <a:buFont typeface="Arial" panose="020B0604020202020204" pitchFamily="34" charset="0"/>
+              <a:buChar char="•"/>
+            </a:pPr>
+            <a:r>
+              <a:rPr lang="en-US" sz="2400" dirty="0"/>
+              <a:t>Overall maximum intensity: 1514642849 (au.?) representing signal strength</a:t>
+            </a:r>
+          </a:p>
+          <a:p>
+            <a:pPr marL="342900" indent="-342900" algn="just">
+              <a:buFont typeface="Arial" panose="020B0604020202020204" pitchFamily="34" charset="0"/>
+              <a:buChar char="•"/>
+            </a:pPr>
+            <a:r>
+              <a:rPr lang="en-US" sz="2400" dirty="0"/>
+              <a:t>Overall minimum intensity: 0</a:t>
+            </a:r>
+          </a:p>
+          <a:p>
+            <a:pPr marL="342900" indent="-342900" algn="just">
+              <a:buFont typeface="Arial" panose="020B0604020202020204" pitchFamily="34" charset="0"/>
+              <a:buChar char="•"/>
+            </a:pPr>
+            <a:r>
+              <a:rPr lang="en-US" sz="2400" dirty="0"/>
+              <a:t>Number of Na: 0</a:t>
+            </a:r>
+          </a:p>
+          <a:p>
+            <a:pPr algn="just"/>
+            <a:endParaRPr lang="en-US" sz="2400" dirty="0"/>
+          </a:p>
+          <a:p>
+            <a:pPr algn="just"/>
+            <a:r>
+              <a:rPr lang="en-US" sz="2400" b="1" dirty="0"/>
+              <a:t>How we adapted our data for our </a:t>
+            </a:r>
+            <a:r>
+              <a:rPr lang="en-US" sz="2400" b="1" dirty="0" err="1"/>
+              <a:t>analisis</a:t>
+            </a:r>
+            <a:endParaRPr lang="en-US" sz="2400" b="1" dirty="0"/>
+          </a:p>
+          <a:p>
+            <a:pPr marL="342900" indent="-342900" algn="just">
+              <a:buFont typeface="Arial" panose="020B0604020202020204" pitchFamily="34" charset="0"/>
+              <a:buChar char="•"/>
+            </a:pPr>
+            <a:r>
+              <a:rPr lang="en-US" sz="2400" dirty="0" err="1"/>
+              <a:t>Averedging</a:t>
+            </a:r>
+            <a:r>
+              <a:rPr lang="en-US" sz="2400" dirty="0"/>
+              <a:t> over all Triplicates</a:t>
+            </a:r>
+          </a:p>
+          <a:p>
+            <a:pPr marL="342900" indent="-342900" algn="just">
+              <a:buFont typeface="Arial" panose="020B0604020202020204" pitchFamily="34" charset="0"/>
+              <a:buChar char="•"/>
+            </a:pPr>
+            <a:r>
+              <a:rPr lang="en-US" sz="2400" dirty="0"/>
+              <a:t>Normalizing to 100: </a:t>
+            </a:r>
+            <a:r>
+              <a:rPr lang="en-GB" sz="2400" dirty="0"/>
+              <a:t>each protein is scaled so that the distribution within the Ctrl and </a:t>
+            </a:r>
+            <a:r>
+              <a:rPr lang="en-GB" sz="2400" dirty="0" err="1"/>
+              <a:t>RNAse</a:t>
+            </a:r>
+            <a:r>
+              <a:rPr lang="en-GB" sz="2400" dirty="0"/>
+              <a:t> conditions each sums to 100</a:t>
+            </a:r>
+            <a:r>
+              <a:rPr lang="en-US" sz="2400" dirty="0"/>
+              <a:t> (for every Protein) </a:t>
+            </a:r>
+          </a:p>
+          <a:p>
+            <a:pPr algn="just"/>
+            <a:endParaRPr lang="en-GB" sz="2400" b="1" dirty="0"/>
+          </a:p>
+        </p:txBody>
+      </p:sp>
+      <p:sp>
+        <p:nvSpPr>
+          <p:cNvPr id="81" name="Textfeld 42">
+            <a:extLst>
+              <a:ext uri="{FF2B5EF4-FFF2-40B4-BE49-F238E27FC236}">
+                <a16:creationId xmlns:a16="http://schemas.microsoft.com/office/drawing/2014/main" id="{41369DCA-196A-371D-5FD4-AD524426A0EC}"/>
+              </a:ext>
+            </a:extLst>
+          </p:cNvPr>
+          <p:cNvSpPr txBox="1"/>
+          <p:nvPr/>
+        </p:nvSpPr>
+        <p:spPr>
+          <a:xfrm>
+            <a:off x="15725618" y="14446249"/>
+            <a:ext cx="5438016" cy="1384995"/>
+          </a:xfrm>
+          <a:prstGeom prst="rect">
+            <a:avLst/>
+          </a:prstGeom>
+          <a:noFill/>
+        </p:spPr>
+        <p:txBody>
+          <a:bodyPr wrap="square" rtlCol="0">
+            <a:spAutoFit/>
+          </a:bodyPr>
+          <a:lstStyle/>
+          <a:p>
+            <a:r>
+              <a:rPr lang="de-DE" sz="1200" b="1" dirty="0"/>
+              <a:t>Fig. X </a:t>
+            </a:r>
+            <a:r>
+              <a:rPr lang="en-GB" sz="1200" b="1" dirty="0"/>
+              <a:t>Mean protein intensities across 25 fractions under control conditions: </a:t>
+            </a:r>
+            <a:r>
+              <a:rPr lang="en-GB" sz="1200" dirty="0"/>
+              <a:t>Bar plot showing the average intensity for 25 randomly selected proteins measured across 25 fractions in the Ctrl condition. All Reps were averaged already. Each bar represents the mean intensity per protein, with error bars indicating the standard error of the mean (SEM) across fractions. This visualization highlights the variability in abundance profiles among different proteins across the cellular gradient. </a:t>
+            </a:r>
+            <a:endParaRPr lang="en-US" sz="1200" dirty="0"/>
+          </a:p>
+        </p:txBody>
+      </p:sp>
+      <p:sp>
+        <p:nvSpPr>
+          <p:cNvPr id="67" name="Rectangle 66">
+            <a:extLst>
+              <a:ext uri="{FF2B5EF4-FFF2-40B4-BE49-F238E27FC236}">
+                <a16:creationId xmlns:a16="http://schemas.microsoft.com/office/drawing/2014/main" id="{497B7107-C6F9-BC8E-32F9-4EB58EBC3122}"/>
+              </a:ext>
+            </a:extLst>
+          </p:cNvPr>
+          <p:cNvSpPr/>
+          <p:nvPr/>
+        </p:nvSpPr>
+        <p:spPr>
+          <a:xfrm>
+            <a:off x="22687042" y="26194178"/>
+            <a:ext cx="6776884" cy="5105981"/>
+          </a:xfrm>
+          <a:prstGeom prst="rect">
+            <a:avLst/>
+          </a:prstGeom>
+          <a:solidFill>
+            <a:schemeClr val="bg1"/>
+          </a:solidFill>
+          <a:ln>
+            <a:noFill/>
+          </a:ln>
+        </p:spPr>
+        <p:style>
+          <a:lnRef idx="2">
+            <a:schemeClr val="accent1">
+              <a:shade val="15000"/>
+            </a:schemeClr>
+          </a:lnRef>
+          <a:fillRef idx="1">
+            <a:schemeClr val="accent1"/>
+          </a:fillRef>
+          <a:effectRef idx="0">
+            <a:schemeClr val="accent1"/>
+          </a:effectRef>
+          <a:fontRef idx="minor">
+            <a:schemeClr val="lt1"/>
+          </a:fontRef>
+        </p:style>
+        <p:txBody>
+          <a:bodyPr rtlCol="0" anchor="t"/>
+          <a:lstStyle/>
+          <a:p>
+            <a:pPr algn="r"/>
+            <a:endParaRPr lang="en-GB" sz="3600" dirty="0">
+              <a:solidFill>
+                <a:schemeClr val="tx1"/>
+              </a:solidFill>
+            </a:endParaRPr>
+          </a:p>
+        </p:txBody>
+      </p:sp>
+      <p:sp>
+        <p:nvSpPr>
+          <p:cNvPr id="68" name="Abgerundetes Rechteck 21">
             <a:extLst>
               <a:ext uri="{FF2B5EF4-FFF2-40B4-BE49-F238E27FC236}">
                 <a16:creationId xmlns:a16="http://schemas.microsoft.com/office/drawing/2014/main" id="{CADA5048-84E9-7610-1363-103CE5D313B8}"/>
@@ -10060,7 +10230,7 @@
       </p:sp>
       <p:sp>
         <p:nvSpPr>
-          <p:cNvPr id="23" name="Rectangle 22">
+          <p:cNvPr id="69" name="Rectangle 68">
             <a:extLst>
               <a:ext uri="{FF2B5EF4-FFF2-40B4-BE49-F238E27FC236}">
                 <a16:creationId xmlns:a16="http://schemas.microsoft.com/office/drawing/2014/main" id="{497B7107-C6F9-BC8E-32F9-4EB58EBC3122}"/>
@@ -10116,7 +10286,7 @@
       </p:sp>
       <p:pic>
         <p:nvPicPr>
-          <p:cNvPr id="32" name="Picture 31" descr="A screenshot of a video game&#10;&#10;AI-generated content may be incorrect.">
+          <p:cNvPr id="70" name="Picture 69" descr="A screenshot of a video game&#10;&#10;AI-generated content may be incorrect.">
             <a:extLst>
               <a:ext uri="{FF2B5EF4-FFF2-40B4-BE49-F238E27FC236}">
                 <a16:creationId xmlns:a16="http://schemas.microsoft.com/office/drawing/2014/main" id="{08B70003-AD1E-4701-456D-41507D8EABB7}"/>
@@ -10129,7 +10299,7 @@
           <p:nvPr/>
         </p:nvPicPr>
         <p:blipFill>
-          <a:blip r:embed="rId23">
+          <a:blip r:embed="rId24">
             <a:extLst>
               <a:ext uri="{28A0092B-C50C-407E-A947-70E740481C1C}">
                 <a14:useLocalDpi xmlns:a14="http://schemas.microsoft.com/office/drawing/2010/main" val="0"/>
@@ -10152,7 +10322,7 @@
       </p:pic>
       <p:sp>
         <p:nvSpPr>
-          <p:cNvPr id="33" name="Rectangle 32">
+          <p:cNvPr id="71" name="Rectangle 70">
             <a:extLst>
               <a:ext uri="{FF2B5EF4-FFF2-40B4-BE49-F238E27FC236}">
                 <a16:creationId xmlns:a16="http://schemas.microsoft.com/office/drawing/2014/main" id="{AB754934-85BC-3E41-3BC6-0759F2D51BE4}"/>
@@ -10208,285 +10378,10 @@
       </p:sp>
       <p:pic>
         <p:nvPicPr>
-          <p:cNvPr id="38" name="Picture 37" descr="A yellow and orange squares&#10;&#10;AI-generated content may be incorrect.">
+          <p:cNvPr id="72" name="Picture 71" descr="A yellow and orange squares&#10;&#10;AI-generated content may be incorrect.">
             <a:extLst>
               <a:ext uri="{FF2B5EF4-FFF2-40B4-BE49-F238E27FC236}">
                 <a16:creationId xmlns:a16="http://schemas.microsoft.com/office/drawing/2014/main" id="{288F68B4-DDA1-2EEB-9F23-81C0A0F5FDB5}"/>
-              </a:ext>
-            </a:extLst>
-          </p:cNvPr>
-          <p:cNvPicPr>
-            <a:picLocks noChangeAspect="1"/>
-          </p:cNvPicPr>
-          <p:nvPr/>
-        </p:nvPicPr>
-        <p:blipFill>
-          <a:blip r:embed="rId24">
-            <a:extLst>
-              <a:ext uri="{28A0092B-C50C-407E-A947-70E740481C1C}">
-                <a14:useLocalDpi xmlns:a14="http://schemas.microsoft.com/office/drawing/2010/main" val="0"/>
-              </a:ext>
-            </a:extLst>
-          </a:blip>
-          <a:stretch>
-            <a:fillRect/>
-          </a:stretch>
-        </p:blipFill>
-        <p:spPr>
-          <a:xfrm>
-            <a:off x="15839213" y="34379540"/>
-            <a:ext cx="4280873" cy="3210655"/>
-          </a:xfrm>
-          <a:prstGeom prst="rect">
-            <a:avLst/>
-          </a:prstGeom>
-        </p:spPr>
-      </p:pic>
-      <p:sp>
-        <p:nvSpPr>
-          <p:cNvPr id="53" name="Textfeld 48">
-            <a:extLst>
-              <a:ext uri="{FF2B5EF4-FFF2-40B4-BE49-F238E27FC236}">
-                <a16:creationId xmlns:a16="http://schemas.microsoft.com/office/drawing/2014/main" id="{09012934-17D9-9E1F-A0A5-E6B32DB352BC}"/>
-              </a:ext>
-            </a:extLst>
-          </p:cNvPr>
-          <p:cNvSpPr txBox="1"/>
-          <p:nvPr/>
-        </p:nvSpPr>
-        <p:spPr>
-          <a:xfrm>
-            <a:off x="15457632" y="26456645"/>
-            <a:ext cx="8341656" cy="3323987"/>
-          </a:xfrm>
-          <a:prstGeom prst="rect">
-            <a:avLst/>
-          </a:prstGeom>
-          <a:noFill/>
-        </p:spPr>
-        <p:txBody>
-          <a:bodyPr wrap="square" rtlCol="0">
-            <a:spAutoFit/>
-          </a:bodyPr>
-          <a:lstStyle/>
-          <a:p>
-            <a:pPr algn="just"/>
-            <a:r>
-              <a:rPr lang="en-GB" sz="2400" b="1" dirty="0">
-                <a:latin typeface="Source Sans Pro" panose="020B0503030403020204" pitchFamily="34" charset="0"/>
-                <a:ea typeface="Source Sans Pro" panose="020B0503030403020204" pitchFamily="34" charset="0"/>
-              </a:rPr>
-              <a:t>DBSCAN :</a:t>
-            </a:r>
-          </a:p>
-          <a:p>
-            <a:r>
-              <a:rPr lang="en-GB" sz="2400" dirty="0">
-                <a:latin typeface="Source Sans Pro" panose="020B0503030403020204" pitchFamily="34" charset="0"/>
-                <a:ea typeface="Source Sans Pro" panose="020B0503030403020204" pitchFamily="34" charset="0"/>
-              </a:rPr>
-              <a:t>is a clustering algorithm that can classify points in low-density regions as it considers point density and distance.</a:t>
-            </a:r>
-          </a:p>
-          <a:p>
-            <a:pPr marL="342900" indent="-342900">
-              <a:buFont typeface="Arial" panose="020B0604020202020204" pitchFamily="34" charset="0"/>
-              <a:buChar char="•"/>
-            </a:pPr>
-            <a:r>
-              <a:rPr lang="en-GB" sz="2400" b="1" dirty="0">
-                <a:latin typeface="Source Sans Pro" panose="020B0503030403020204" pitchFamily="34" charset="0"/>
-                <a:ea typeface="Source Sans Pro" panose="020B0503030403020204" pitchFamily="34" charset="0"/>
-              </a:rPr>
-              <a:t>ε (epsilon): </a:t>
-            </a:r>
-            <a:r>
-              <a:rPr lang="en-GB" sz="2400" dirty="0">
-                <a:latin typeface="Source Sans Pro" panose="020B0503030403020204" pitchFamily="34" charset="0"/>
-                <a:ea typeface="Source Sans Pro" panose="020B0503030403020204" pitchFamily="34" charset="0"/>
-              </a:rPr>
-              <a:t>The maximum distance between two points to be considered </a:t>
-            </a:r>
-            <a:r>
-              <a:rPr lang="en-GB" sz="2400" dirty="0" err="1">
-                <a:latin typeface="Source Sans Pro" panose="020B0503030403020204" pitchFamily="34" charset="0"/>
-                <a:ea typeface="Source Sans Pro" panose="020B0503030403020204" pitchFamily="34" charset="0"/>
-              </a:rPr>
-              <a:t>neighbors</a:t>
-            </a:r>
-            <a:r>
-              <a:rPr lang="en-GB" sz="2400" dirty="0">
-                <a:latin typeface="Source Sans Pro" panose="020B0503030403020204" pitchFamily="34" charset="0"/>
-                <a:ea typeface="Source Sans Pro" panose="020B0503030403020204" pitchFamily="34" charset="0"/>
-              </a:rPr>
-              <a:t>. </a:t>
-            </a:r>
-          </a:p>
-          <a:p>
-            <a:pPr marL="342900" indent="-342900">
-              <a:buFont typeface="Arial" panose="020B0604020202020204" pitchFamily="34" charset="0"/>
-              <a:buChar char="•"/>
-            </a:pPr>
-            <a:r>
-              <a:rPr lang="en-GB" sz="2400" b="1" dirty="0" err="1">
-                <a:latin typeface="Source Sans Pro" panose="020B0503030403020204" pitchFamily="34" charset="0"/>
-                <a:ea typeface="Source Sans Pro" panose="020B0503030403020204" pitchFamily="34" charset="0"/>
-              </a:rPr>
-              <a:t>MinPts</a:t>
-            </a:r>
-            <a:r>
-              <a:rPr lang="en-GB" sz="2400" b="1" dirty="0">
-                <a:latin typeface="Source Sans Pro" panose="020B0503030403020204" pitchFamily="34" charset="0"/>
-                <a:ea typeface="Source Sans Pro" panose="020B0503030403020204" pitchFamily="34" charset="0"/>
-              </a:rPr>
-              <a:t>: </a:t>
-            </a:r>
-            <a:r>
-              <a:rPr lang="en-GB" sz="2400" dirty="0">
-                <a:latin typeface="Source Sans Pro" panose="020B0503030403020204" pitchFamily="34" charset="0"/>
-                <a:ea typeface="Source Sans Pro" panose="020B0503030403020204" pitchFamily="34" charset="0"/>
-              </a:rPr>
-              <a:t>The minimum number of </a:t>
-            </a:r>
-            <a:r>
-              <a:rPr lang="en-GB" sz="2400" dirty="0" err="1">
-                <a:latin typeface="Source Sans Pro" panose="020B0503030403020204" pitchFamily="34" charset="0"/>
-                <a:ea typeface="Source Sans Pro" panose="020B0503030403020204" pitchFamily="34" charset="0"/>
-              </a:rPr>
-              <a:t>neighbors</a:t>
-            </a:r>
-            <a:r>
-              <a:rPr lang="en-GB" sz="2400" dirty="0">
-                <a:latin typeface="Source Sans Pro" panose="020B0503030403020204" pitchFamily="34" charset="0"/>
-                <a:ea typeface="Source Sans Pro" panose="020B0503030403020204" pitchFamily="34" charset="0"/>
-              </a:rPr>
-              <a:t> (within ε distance) to form a core point, border points are those within ε of a core point.</a:t>
-            </a:r>
-          </a:p>
-          <a:p>
-            <a:endParaRPr lang="en-US" noProof="0" dirty="0"/>
-          </a:p>
-        </p:txBody>
-      </p:sp>
-      <p:sp>
-        <p:nvSpPr>
-          <p:cNvPr id="54" name="Textfeld 48">
-            <a:extLst>
-              <a:ext uri="{FF2B5EF4-FFF2-40B4-BE49-F238E27FC236}">
-                <a16:creationId xmlns:a16="http://schemas.microsoft.com/office/drawing/2014/main" id="{0C9E6692-E493-9100-A3A2-2553EE851C05}"/>
-              </a:ext>
-            </a:extLst>
-          </p:cNvPr>
-          <p:cNvSpPr txBox="1"/>
-          <p:nvPr/>
-        </p:nvSpPr>
-        <p:spPr>
-          <a:xfrm>
-            <a:off x="15469068" y="29296448"/>
-            <a:ext cx="8330220" cy="3416320"/>
-          </a:xfrm>
-          <a:prstGeom prst="rect">
-            <a:avLst/>
-          </a:prstGeom>
-          <a:noFill/>
-        </p:spPr>
-        <p:txBody>
-          <a:bodyPr wrap="square" rtlCol="0">
-            <a:spAutoFit/>
-          </a:bodyPr>
-          <a:lstStyle/>
-          <a:p>
-            <a:pPr algn="just"/>
-            <a:r>
-              <a:rPr lang="en-US" sz="2400" b="1" dirty="0">
-                <a:latin typeface="Source Sans Pro" panose="020B0503030403020204" pitchFamily="34" charset="0"/>
-                <a:ea typeface="Source Sans Pro" panose="020B0503030403020204" pitchFamily="34" charset="0"/>
-              </a:rPr>
-              <a:t>Choosing parameters </a:t>
-            </a:r>
-            <a:endParaRPr lang="en-US" sz="2400" dirty="0">
-              <a:latin typeface="Source Sans Pro" panose="020B0503030403020204" pitchFamily="34" charset="0"/>
-              <a:ea typeface="Source Sans Pro" panose="020B0503030403020204" pitchFamily="34" charset="0"/>
-            </a:endParaRPr>
-          </a:p>
-          <a:p>
-            <a:pPr algn="just"/>
-            <a:r>
-              <a:rPr lang="en-US" sz="2400" dirty="0">
-                <a:latin typeface="Source Sans Pro" panose="020B0503030403020204" pitchFamily="34" charset="0"/>
-                <a:ea typeface="Source Sans Pro" panose="020B0503030403020204" pitchFamily="34" charset="0"/>
-              </a:rPr>
-              <a:t>To validate the efficiency in clustering we created a heatmap with a specific scoring logic. We adjusted our DBSCAN </a:t>
-            </a:r>
-            <a:r>
-              <a:rPr lang="en-US" sz="2400" b="1" dirty="0">
-                <a:latin typeface="Source Sans Pro" panose="020B0503030403020204" pitchFamily="34" charset="0"/>
-                <a:ea typeface="Source Sans Pro" panose="020B0503030403020204" pitchFamily="34" charset="0"/>
-              </a:rPr>
-              <a:t>to </a:t>
-            </a:r>
-            <a:r>
-              <a:rPr lang="en-GB" sz="2400" b="1" dirty="0">
-                <a:latin typeface="Source Sans Pro" panose="020B0503030403020204" pitchFamily="34" charset="0"/>
-                <a:ea typeface="Source Sans Pro" panose="020B0503030403020204" pitchFamily="34" charset="0"/>
-              </a:rPr>
-              <a:t>ε = 0.7 and </a:t>
-            </a:r>
-            <a:r>
-              <a:rPr lang="en-GB" sz="2400" b="1" dirty="0" err="1">
-                <a:latin typeface="Source Sans Pro" panose="020B0503030403020204" pitchFamily="34" charset="0"/>
-                <a:ea typeface="Source Sans Pro" panose="020B0503030403020204" pitchFamily="34" charset="0"/>
-              </a:rPr>
-              <a:t>MintPts</a:t>
-            </a:r>
-            <a:r>
-              <a:rPr lang="en-GB" sz="2400" b="1" dirty="0">
-                <a:latin typeface="Source Sans Pro" panose="020B0503030403020204" pitchFamily="34" charset="0"/>
-                <a:ea typeface="Source Sans Pro" panose="020B0503030403020204" pitchFamily="34" charset="0"/>
-              </a:rPr>
-              <a:t> = 4. </a:t>
-            </a:r>
-          </a:p>
-          <a:p>
-            <a:pPr algn="just"/>
-            <a:endParaRPr lang="en-GB" sz="2400" dirty="0">
-              <a:latin typeface="Source Sans Pro" panose="020B0503030403020204" pitchFamily="34" charset="0"/>
-              <a:ea typeface="Source Sans Pro" panose="020B0503030403020204" pitchFamily="34" charset="0"/>
-            </a:endParaRPr>
-          </a:p>
-          <a:p>
-            <a:pPr algn="just"/>
-            <a:endParaRPr lang="en-GB" sz="2400" b="1" dirty="0"/>
-          </a:p>
-          <a:p>
-            <a:pPr algn="just"/>
-            <a:endParaRPr lang="en-GB" sz="2400" b="1" dirty="0">
-              <a:latin typeface="Source Sans Pro" panose="020B0503030403020204" pitchFamily="34" charset="0"/>
-              <a:ea typeface="Source Sans Pro" panose="020B0503030403020204" pitchFamily="34" charset="0"/>
-            </a:endParaRPr>
-          </a:p>
-          <a:p>
-            <a:pPr algn="just"/>
-            <a:endParaRPr lang="en-US" sz="2400" b="1" dirty="0">
-              <a:latin typeface="Source Sans Pro" panose="020B0503030403020204" pitchFamily="34" charset="0"/>
-              <a:ea typeface="Source Sans Pro" panose="020B0503030403020204" pitchFamily="34" charset="0"/>
-            </a:endParaRPr>
-          </a:p>
-          <a:p>
-            <a:pPr algn="just"/>
-            <a:endParaRPr lang="en-US" sz="2400" b="1" noProof="0" dirty="0">
-              <a:latin typeface="Source Sans Pro" panose="020B0503030403020204" pitchFamily="34" charset="0"/>
-              <a:ea typeface="Source Sans Pro" panose="020B0503030403020204" pitchFamily="34" charset="0"/>
-            </a:endParaRPr>
-          </a:p>
-        </p:txBody>
-      </p:sp>
-      <p:pic>
-        <p:nvPicPr>
-          <p:cNvPr id="57" name="Picture 56" descr="A graph with lines and numbers&#10;&#10;AI-generated content may be incorrect.">
-            <a:extLst>
-              <a:ext uri="{FF2B5EF4-FFF2-40B4-BE49-F238E27FC236}">
-                <a16:creationId xmlns:a16="http://schemas.microsoft.com/office/drawing/2014/main" id="{BA45D2D3-0CCB-F156-B9E7-9449A21DFDC2}"/>
               </a:ext>
             </a:extLst>
           </p:cNvPr>
@@ -10509,20 +10404,259 @@
         </p:blipFill>
         <p:spPr>
           <a:xfrm>
-            <a:off x="26843963" y="30952853"/>
-            <a:ext cx="2734251" cy="2050688"/>
+            <a:off x="15839213" y="34379540"/>
+            <a:ext cx="4280873" cy="3210655"/>
           </a:xfrm>
           <a:prstGeom prst="rect">
             <a:avLst/>
           </a:prstGeom>
         </p:spPr>
       </p:pic>
+      <p:sp>
+        <p:nvSpPr>
+          <p:cNvPr id="74" name="Textfeld 48">
+            <a:extLst>
+              <a:ext uri="{FF2B5EF4-FFF2-40B4-BE49-F238E27FC236}">
+                <a16:creationId xmlns:a16="http://schemas.microsoft.com/office/drawing/2014/main" id="{09012934-17D9-9E1F-A0A5-E6B32DB352BC}"/>
+              </a:ext>
+            </a:extLst>
+          </p:cNvPr>
+          <p:cNvSpPr txBox="1"/>
+          <p:nvPr/>
+        </p:nvSpPr>
+        <p:spPr>
+          <a:xfrm>
+            <a:off x="15457632" y="26340900"/>
+            <a:ext cx="8341656" cy="3323987"/>
+          </a:xfrm>
+          <a:prstGeom prst="rect">
+            <a:avLst/>
+          </a:prstGeom>
+          <a:noFill/>
+        </p:spPr>
+        <p:txBody>
+          <a:bodyPr wrap="square" rtlCol="0">
+            <a:spAutoFit/>
+          </a:bodyPr>
+          <a:lstStyle/>
+          <a:p>
+            <a:pPr algn="just"/>
+            <a:r>
+              <a:rPr lang="en-GB" sz="2400" b="1" dirty="0">
+                <a:latin typeface="Source Sans Pro" panose="020B0503030403020204" pitchFamily="34" charset="0"/>
+                <a:ea typeface="Source Sans Pro" panose="020B0503030403020204" pitchFamily="34" charset="0"/>
+              </a:rPr>
+              <a:t>DBSCAN :</a:t>
+            </a:r>
+          </a:p>
+          <a:p>
+            <a:r>
+              <a:rPr lang="en-GB" sz="2400" dirty="0">
+                <a:latin typeface="Source Sans Pro" panose="020B0503030403020204" pitchFamily="34" charset="0"/>
+                <a:ea typeface="Source Sans Pro" panose="020B0503030403020204" pitchFamily="34" charset="0"/>
+              </a:rPr>
+              <a:t>is a clustering algorithm that considers point density and distance.</a:t>
+            </a:r>
+          </a:p>
+          <a:p>
+            <a:pPr marL="342900" indent="-342900">
+              <a:buFont typeface="Arial" panose="020B0604020202020204" pitchFamily="34" charset="0"/>
+              <a:buChar char="•"/>
+            </a:pPr>
+            <a:r>
+              <a:rPr lang="en-GB" sz="2400" b="1" dirty="0">
+                <a:latin typeface="Source Sans Pro" panose="020B0503030403020204" pitchFamily="34" charset="0"/>
+                <a:ea typeface="Source Sans Pro" panose="020B0503030403020204" pitchFamily="34" charset="0"/>
+              </a:rPr>
+              <a:t>ε (epsilon): </a:t>
+            </a:r>
+            <a:r>
+              <a:rPr lang="en-GB" sz="2400" dirty="0">
+                <a:latin typeface="Source Sans Pro" panose="020B0503030403020204" pitchFamily="34" charset="0"/>
+                <a:ea typeface="Source Sans Pro" panose="020B0503030403020204" pitchFamily="34" charset="0"/>
+              </a:rPr>
+              <a:t>The maximum distance between two points to be considered </a:t>
+            </a:r>
+            <a:r>
+              <a:rPr lang="en-GB" sz="2400" dirty="0" err="1">
+                <a:latin typeface="Source Sans Pro" panose="020B0503030403020204" pitchFamily="34" charset="0"/>
+                <a:ea typeface="Source Sans Pro" panose="020B0503030403020204" pitchFamily="34" charset="0"/>
+              </a:rPr>
+              <a:t>neighbors</a:t>
+            </a:r>
+            <a:r>
+              <a:rPr lang="en-GB" sz="2400" dirty="0">
+                <a:latin typeface="Source Sans Pro" panose="020B0503030403020204" pitchFamily="34" charset="0"/>
+                <a:ea typeface="Source Sans Pro" panose="020B0503030403020204" pitchFamily="34" charset="0"/>
+              </a:rPr>
+              <a:t>. </a:t>
+            </a:r>
+          </a:p>
+          <a:p>
+            <a:pPr marL="342900" indent="-342900">
+              <a:buFont typeface="Arial" panose="020B0604020202020204" pitchFamily="34" charset="0"/>
+              <a:buChar char="•"/>
+            </a:pPr>
+            <a:r>
+              <a:rPr lang="en-GB" sz="2400" b="1" dirty="0" err="1">
+                <a:latin typeface="Source Sans Pro" panose="020B0503030403020204" pitchFamily="34" charset="0"/>
+                <a:ea typeface="Source Sans Pro" panose="020B0503030403020204" pitchFamily="34" charset="0"/>
+              </a:rPr>
+              <a:t>MinPts</a:t>
+            </a:r>
+            <a:r>
+              <a:rPr lang="en-GB" sz="2400" b="1" dirty="0">
+                <a:latin typeface="Source Sans Pro" panose="020B0503030403020204" pitchFamily="34" charset="0"/>
+                <a:ea typeface="Source Sans Pro" panose="020B0503030403020204" pitchFamily="34" charset="0"/>
+              </a:rPr>
+              <a:t>: </a:t>
+            </a:r>
+            <a:r>
+              <a:rPr lang="en-GB" sz="2400" dirty="0">
+                <a:latin typeface="Source Sans Pro" panose="020B0503030403020204" pitchFamily="34" charset="0"/>
+                <a:ea typeface="Source Sans Pro" panose="020B0503030403020204" pitchFamily="34" charset="0"/>
+              </a:rPr>
+              <a:t>The minimum number of </a:t>
+            </a:r>
+            <a:r>
+              <a:rPr lang="en-GB" sz="2400" dirty="0" err="1">
+                <a:latin typeface="Source Sans Pro" panose="020B0503030403020204" pitchFamily="34" charset="0"/>
+                <a:ea typeface="Source Sans Pro" panose="020B0503030403020204" pitchFamily="34" charset="0"/>
+              </a:rPr>
+              <a:t>neighbors</a:t>
+            </a:r>
+            <a:r>
+              <a:rPr lang="en-GB" sz="2400" dirty="0">
+                <a:latin typeface="Source Sans Pro" panose="020B0503030403020204" pitchFamily="34" charset="0"/>
+                <a:ea typeface="Source Sans Pro" panose="020B0503030403020204" pitchFamily="34" charset="0"/>
+              </a:rPr>
+              <a:t> (within ε distance) to form a core point, border points are those within ε of a core point.</a:t>
+            </a:r>
+          </a:p>
+          <a:p>
+            <a:endParaRPr lang="en-US" noProof="0" dirty="0"/>
+          </a:p>
+        </p:txBody>
+      </p:sp>
+      <p:sp>
+        <p:nvSpPr>
+          <p:cNvPr id="75" name="Textfeld 48">
+            <a:extLst>
+              <a:ext uri="{FF2B5EF4-FFF2-40B4-BE49-F238E27FC236}">
+                <a16:creationId xmlns:a16="http://schemas.microsoft.com/office/drawing/2014/main" id="{0C9E6692-E493-9100-A3A2-2553EE851C05}"/>
+              </a:ext>
+            </a:extLst>
+          </p:cNvPr>
+          <p:cNvSpPr txBox="1"/>
+          <p:nvPr/>
+        </p:nvSpPr>
+        <p:spPr>
+          <a:xfrm>
+            <a:off x="15469068" y="29287839"/>
+            <a:ext cx="8330220" cy="3416320"/>
+          </a:xfrm>
+          <a:prstGeom prst="rect">
+            <a:avLst/>
+          </a:prstGeom>
+          <a:noFill/>
+        </p:spPr>
+        <p:txBody>
+          <a:bodyPr wrap="square" rtlCol="0">
+            <a:spAutoFit/>
+          </a:bodyPr>
+          <a:lstStyle/>
+          <a:p>
+            <a:pPr algn="just"/>
+            <a:r>
+              <a:rPr lang="en-US" sz="2400" b="1" dirty="0">
+                <a:latin typeface="Source Sans Pro" panose="020B0503030403020204" pitchFamily="34" charset="0"/>
+                <a:ea typeface="Source Sans Pro" panose="020B0503030403020204" pitchFamily="34" charset="0"/>
+              </a:rPr>
+              <a:t>Choosing parameters </a:t>
+            </a:r>
+            <a:endParaRPr lang="en-US" sz="2400" dirty="0">
+              <a:latin typeface="Source Sans Pro" panose="020B0503030403020204" pitchFamily="34" charset="0"/>
+              <a:ea typeface="Source Sans Pro" panose="020B0503030403020204" pitchFamily="34" charset="0"/>
+            </a:endParaRPr>
+          </a:p>
+          <a:p>
+            <a:pPr algn="just"/>
+            <a:r>
+              <a:rPr lang="en-US" sz="2400" dirty="0">
+                <a:latin typeface="Source Sans Pro" panose="020B0503030403020204" pitchFamily="34" charset="0"/>
+                <a:ea typeface="Source Sans Pro" panose="020B0503030403020204" pitchFamily="34" charset="0"/>
+              </a:rPr>
+              <a:t>To validate the efficiency in clustering we created a heatmap with a specific scoring logic. We adjusted our DBSCAN </a:t>
+            </a:r>
+            <a:r>
+              <a:rPr lang="en-US" sz="2400" b="1" dirty="0">
+                <a:latin typeface="Source Sans Pro" panose="020B0503030403020204" pitchFamily="34" charset="0"/>
+                <a:ea typeface="Source Sans Pro" panose="020B0503030403020204" pitchFamily="34" charset="0"/>
+              </a:rPr>
+              <a:t>to </a:t>
+            </a:r>
+            <a:r>
+              <a:rPr lang="en-GB" sz="2400" b="1" dirty="0">
+                <a:latin typeface="Source Sans Pro" panose="020B0503030403020204" pitchFamily="34" charset="0"/>
+                <a:ea typeface="Source Sans Pro" panose="020B0503030403020204" pitchFamily="34" charset="0"/>
+              </a:rPr>
+              <a:t>ε = 0.7 and </a:t>
+            </a:r>
+            <a:r>
+              <a:rPr lang="en-GB" sz="2400" b="1" dirty="0" err="1">
+                <a:latin typeface="Source Sans Pro" panose="020B0503030403020204" pitchFamily="34" charset="0"/>
+                <a:ea typeface="Source Sans Pro" panose="020B0503030403020204" pitchFamily="34" charset="0"/>
+              </a:rPr>
+              <a:t>MintPts</a:t>
+            </a:r>
+            <a:r>
+              <a:rPr lang="en-GB" sz="2400" b="1" dirty="0">
+                <a:latin typeface="Source Sans Pro" panose="020B0503030403020204" pitchFamily="34" charset="0"/>
+                <a:ea typeface="Source Sans Pro" panose="020B0503030403020204" pitchFamily="34" charset="0"/>
+              </a:rPr>
+              <a:t> = 4. </a:t>
+            </a:r>
+          </a:p>
+          <a:p>
+            <a:pPr algn="just"/>
+            <a:endParaRPr lang="en-GB" sz="2400" dirty="0">
+              <a:latin typeface="Source Sans Pro" panose="020B0503030403020204" pitchFamily="34" charset="0"/>
+              <a:ea typeface="Source Sans Pro" panose="020B0503030403020204" pitchFamily="34" charset="0"/>
+            </a:endParaRPr>
+          </a:p>
+          <a:p>
+            <a:pPr algn="just"/>
+            <a:endParaRPr lang="en-GB" sz="2400" b="1" dirty="0"/>
+          </a:p>
+          <a:p>
+            <a:pPr algn="just"/>
+            <a:endParaRPr lang="en-GB" sz="2400" b="1" dirty="0">
+              <a:latin typeface="Source Sans Pro" panose="020B0503030403020204" pitchFamily="34" charset="0"/>
+              <a:ea typeface="Source Sans Pro" panose="020B0503030403020204" pitchFamily="34" charset="0"/>
+            </a:endParaRPr>
+          </a:p>
+          <a:p>
+            <a:pPr algn="just"/>
+            <a:endParaRPr lang="en-US" sz="2400" b="1" dirty="0">
+              <a:latin typeface="Source Sans Pro" panose="020B0503030403020204" pitchFamily="34" charset="0"/>
+              <a:ea typeface="Source Sans Pro" panose="020B0503030403020204" pitchFamily="34" charset="0"/>
+            </a:endParaRPr>
+          </a:p>
+          <a:p>
+            <a:pPr algn="just"/>
+            <a:endParaRPr lang="en-US" sz="2400" b="1" noProof="0" dirty="0">
+              <a:latin typeface="Source Sans Pro" panose="020B0503030403020204" pitchFamily="34" charset="0"/>
+              <a:ea typeface="Source Sans Pro" panose="020B0503030403020204" pitchFamily="34" charset="0"/>
+            </a:endParaRPr>
+          </a:p>
+        </p:txBody>
+      </p:sp>
       <p:pic>
         <p:nvPicPr>
-          <p:cNvPr id="59" name="Picture 58" descr="A graph of a number of lines&#10;&#10;AI-generated content may be incorrect.">
+          <p:cNvPr id="76" name="Picture 75" descr="A graph with lines and numbers&#10;&#10;AI-generated content may be incorrect.">
             <a:extLst>
               <a:ext uri="{FF2B5EF4-FFF2-40B4-BE49-F238E27FC236}">
-                <a16:creationId xmlns:a16="http://schemas.microsoft.com/office/drawing/2014/main" id="{C670D429-FCC7-1BE6-830C-944CA7885502}"/>
+                <a16:creationId xmlns:a16="http://schemas.microsoft.com/office/drawing/2014/main" id="{BA45D2D3-0CCB-F156-B9E7-9449A21DFDC2}"/>
               </a:ext>
             </a:extLst>
           </p:cNvPr>
@@ -10545,8 +10679,8 @@
         </p:blipFill>
         <p:spPr>
           <a:xfrm>
-            <a:off x="20976465" y="30973884"/>
-            <a:ext cx="2711946" cy="2033959"/>
+            <a:off x="26843963" y="30952853"/>
+            <a:ext cx="2734251" cy="2050688"/>
           </a:xfrm>
           <a:prstGeom prst="rect">
             <a:avLst/>
@@ -10555,10 +10689,10 @@
       </p:pic>
       <p:pic>
         <p:nvPicPr>
-          <p:cNvPr id="60" name="Picture 59" descr="A graph of a number of fractions&#10;&#10;AI-generated content may be incorrect.">
+          <p:cNvPr id="77" name="Picture 76" descr="A graph of a number of lines&#10;&#10;AI-generated content may be incorrect.">
             <a:extLst>
               <a:ext uri="{FF2B5EF4-FFF2-40B4-BE49-F238E27FC236}">
-                <a16:creationId xmlns:a16="http://schemas.microsoft.com/office/drawing/2014/main" id="{EE66F933-BDCC-0514-DC0C-7AA0C7AAAC36}"/>
+                <a16:creationId xmlns:a16="http://schemas.microsoft.com/office/drawing/2014/main" id="{C670D429-FCC7-1BE6-830C-944CA7885502}"/>
               </a:ext>
             </a:extLst>
           </p:cNvPr>
@@ -10581,7 +10715,7 @@
         </p:blipFill>
         <p:spPr>
           <a:xfrm>
-            <a:off x="20976465" y="35551084"/>
+            <a:off x="20976465" y="30973884"/>
             <a:ext cx="2711946" cy="2033959"/>
           </a:xfrm>
           <a:prstGeom prst="rect">
@@ -10591,10 +10725,10 @@
       </p:pic>
       <p:pic>
         <p:nvPicPr>
-          <p:cNvPr id="61" name="Picture 60" descr="A graph of a number of people&#10;&#10;AI-generated content may be incorrect.">
+          <p:cNvPr id="78" name="Picture 77" descr="A graph of a number of fractions&#10;&#10;AI-generated content may be incorrect.">
             <a:extLst>
               <a:ext uri="{FF2B5EF4-FFF2-40B4-BE49-F238E27FC236}">
-                <a16:creationId xmlns:a16="http://schemas.microsoft.com/office/drawing/2014/main" id="{8B99C15E-AF69-C01B-6273-40520FCDE5F6}"/>
+                <a16:creationId xmlns:a16="http://schemas.microsoft.com/office/drawing/2014/main" id="{EE66F933-BDCC-0514-DC0C-7AA0C7AAAC36}"/>
               </a:ext>
             </a:extLst>
           </p:cNvPr>
@@ -10617,7 +10751,7 @@
         </p:blipFill>
         <p:spPr>
           <a:xfrm>
-            <a:off x="20976465" y="33228377"/>
+            <a:off x="23893073" y="33228376"/>
             <a:ext cx="2711946" cy="2033959"/>
           </a:xfrm>
           <a:prstGeom prst="rect">
@@ -10627,10 +10761,10 @@
       </p:pic>
       <p:pic>
         <p:nvPicPr>
-          <p:cNvPr id="62" name="Picture 61" descr="A graph with lines and numbers&#10;&#10;AI-generated content may be incorrect.">
+          <p:cNvPr id="79" name="Picture 78" descr="A graph of a number of people&#10;&#10;AI-generated content may be incorrect.">
             <a:extLst>
               <a:ext uri="{FF2B5EF4-FFF2-40B4-BE49-F238E27FC236}">
-                <a16:creationId xmlns:a16="http://schemas.microsoft.com/office/drawing/2014/main" id="{788EBA3F-04C0-8072-0F06-18147B6CBB7C}"/>
+                <a16:creationId xmlns:a16="http://schemas.microsoft.com/office/drawing/2014/main" id="{8B99C15E-AF69-C01B-6273-40520FCDE5F6}"/>
               </a:ext>
             </a:extLst>
           </p:cNvPr>
@@ -10653,6 +10787,42 @@
         </p:blipFill>
         <p:spPr>
           <a:xfrm>
+            <a:off x="20976465" y="33228377"/>
+            <a:ext cx="2711946" cy="2033959"/>
+          </a:xfrm>
+          <a:prstGeom prst="rect">
+            <a:avLst/>
+          </a:prstGeom>
+        </p:spPr>
+      </p:pic>
+      <p:pic>
+        <p:nvPicPr>
+          <p:cNvPr id="82" name="Picture 81" descr="A graph with lines and numbers&#10;&#10;AI-generated content may be incorrect.">
+            <a:extLst>
+              <a:ext uri="{FF2B5EF4-FFF2-40B4-BE49-F238E27FC236}">
+                <a16:creationId xmlns:a16="http://schemas.microsoft.com/office/drawing/2014/main" id="{788EBA3F-04C0-8072-0F06-18147B6CBB7C}"/>
+              </a:ext>
+            </a:extLst>
+          </p:cNvPr>
+          <p:cNvPicPr>
+            <a:picLocks noChangeAspect="1"/>
+          </p:cNvPicPr>
+          <p:nvPr/>
+        </p:nvPicPr>
+        <p:blipFill>
+          <a:blip r:embed="rId30">
+            <a:extLst>
+              <a:ext uri="{28A0092B-C50C-407E-A947-70E740481C1C}">
+                <a14:useLocalDpi xmlns:a14="http://schemas.microsoft.com/office/drawing/2010/main" val="0"/>
+              </a:ext>
+            </a:extLst>
+          </a:blip>
+          <a:stretch>
+            <a:fillRect/>
+          </a:stretch>
+        </p:blipFill>
+        <p:spPr>
+          <a:xfrm>
             <a:off x="23900842" y="30973884"/>
             <a:ext cx="2711946" cy="2033960"/>
           </a:xfrm>
@@ -10663,7 +10833,7 @@
       </p:pic>
       <p:sp>
         <p:nvSpPr>
-          <p:cNvPr id="63" name="TextBox 62">
+          <p:cNvPr id="83" name="TextBox 82">
             <a:extLst>
               <a:ext uri="{FF2B5EF4-FFF2-40B4-BE49-F238E27FC236}">
                 <a16:creationId xmlns:a16="http://schemas.microsoft.com/office/drawing/2014/main" id="{FB6012F1-D660-D8EE-62F5-079445394ECC}"/>
@@ -10675,8 +10845,8 @@
         </p:nvSpPr>
         <p:spPr>
           <a:xfrm>
-            <a:off x="23799972" y="32790300"/>
-            <a:ext cx="5749199" cy="3693319"/>
+            <a:off x="20509335" y="35206051"/>
+            <a:ext cx="8863450" cy="2954655"/>
           </a:xfrm>
           <a:prstGeom prst="rect">
             <a:avLst/>
@@ -10796,7 +10966,7 @@
       </p:sp>
       <p:sp>
         <p:nvSpPr>
-          <p:cNvPr id="64" name="TextBox 63">
+          <p:cNvPr id="84" name="TextBox 83">
             <a:extLst>
               <a:ext uri="{FF2B5EF4-FFF2-40B4-BE49-F238E27FC236}">
                 <a16:creationId xmlns:a16="http://schemas.microsoft.com/office/drawing/2014/main" id="{0692B99A-25D6-876B-977C-49A97151F2D1}"/>
@@ -10887,7 +11057,7 @@
       </p:sp>
       <p:sp>
         <p:nvSpPr>
-          <p:cNvPr id="65" name="Textfeld 42">
+          <p:cNvPr id="85" name="Textfeld 42">
             <a:extLst>
               <a:ext uri="{FF2B5EF4-FFF2-40B4-BE49-F238E27FC236}">
                 <a16:creationId xmlns:a16="http://schemas.microsoft.com/office/drawing/2014/main" id="{51C0C865-513A-31B1-BC04-D65F54F85A14}"/>
@@ -10952,7 +11122,7 @@
       </p:sp>
       <p:sp>
         <p:nvSpPr>
-          <p:cNvPr id="66" name="Textfeld 42">
+          <p:cNvPr id="86" name="Textfeld 42">
             <a:extLst>
               <a:ext uri="{FF2B5EF4-FFF2-40B4-BE49-F238E27FC236}">
                 <a16:creationId xmlns:a16="http://schemas.microsoft.com/office/drawing/2014/main" id="{E7E3BFD5-B88F-923D-A725-BF06D94A593E}"/>
@@ -11011,6 +11181,36 @@
           </a:p>
         </p:txBody>
       </p:sp>
+      <p:pic>
+        <p:nvPicPr>
+          <p:cNvPr id="87" name="Grafik 25">
+            <a:extLst>
+              <a:ext uri="{FF2B5EF4-FFF2-40B4-BE49-F238E27FC236}">
+                <a16:creationId xmlns:a16="http://schemas.microsoft.com/office/drawing/2014/main" id="{FF2B16C0-4D27-B3B0-9EF9-A38D106ADDD4}"/>
+              </a:ext>
+            </a:extLst>
+          </p:cNvPr>
+          <p:cNvPicPr>
+            <a:picLocks noChangeAspect="1"/>
+          </p:cNvPicPr>
+          <p:nvPr/>
+        </p:nvPicPr>
+        <p:blipFill>
+          <a:blip r:embed="rId11"/>
+          <a:stretch>
+            <a:fillRect/>
+          </a:stretch>
+        </p:blipFill>
+        <p:spPr>
+          <a:xfrm>
+            <a:off x="26906569" y="33253913"/>
+            <a:ext cx="1935132" cy="2031324"/>
+          </a:xfrm>
+          <a:prstGeom prst="rect">
+            <a:avLst/>
+          </a:prstGeom>
+        </p:spPr>
+      </p:pic>
     </p:spTree>
     <p:extLst>
       <p:ext uri="{BB962C8B-B14F-4D97-AF65-F5344CB8AC3E}">

</xml_diff>

<commit_message>
Adjusted to bullet points
</commit_message>
<xml_diff>
--- a/RiboZwo.pptx
+++ b/RiboZwo.pptx
@@ -118,7 +118,7 @@
 <file path=ppt/revisionInfo.xml><?xml version="1.0" encoding="utf-8"?>
 <p1510:revInfo xmlns:a="http://schemas.openxmlformats.org/drawingml/2006/main" xmlns:r="http://schemas.openxmlformats.org/officeDocument/2006/relationships" xmlns:p1510="http://schemas.microsoft.com/office/powerpoint/2015/10/main">
   <p1510:revLst>
-    <p1510:client id="{E5A86D5C-552E-4995-AB32-5E49D96B1D3A}" v="33" dt="2025-07-04T15:29:38.462"/>
+    <p1510:client id="{E5A86D5C-552E-4995-AB32-5E49D96B1D3A}" v="36" dt="2025-07-05T12:46:48.731"/>
   </p1510:revLst>
 </p1510:revInfo>
 </file>
@@ -128,7 +128,7 @@
   <pc:docChgLst>
     <pc:chgData name="Cihan Zeyrek" userId="dd9724baaf2e43d1" providerId="LiveId" clId="{E5A86D5C-552E-4995-AB32-5E49D96B1D3A}"/>
     <pc:docChg chg="undo redo custSel delSld modSld">
-      <pc:chgData name="Cihan Zeyrek" userId="dd9724baaf2e43d1" providerId="LiveId" clId="{E5A86D5C-552E-4995-AB32-5E49D96B1D3A}" dt="2025-07-04T15:33:10.495" v="4652" actId="113"/>
+      <pc:chgData name="Cihan Zeyrek" userId="dd9724baaf2e43d1" providerId="LiveId" clId="{E5A86D5C-552E-4995-AB32-5E49D96B1D3A}" dt="2025-07-05T12:48:31.086" v="4725" actId="1076"/>
       <pc:docMkLst>
         <pc:docMk/>
       </pc:docMkLst>
@@ -138,101 +138,13 @@
           <pc:docMk/>
           <pc:sldMk cId="4168340417" sldId="256"/>
         </pc:sldMkLst>
-        <pc:spChg chg="add mod">
-          <ac:chgData name="Cihan Zeyrek" userId="dd9724baaf2e43d1" providerId="LiveId" clId="{E5A86D5C-552E-4995-AB32-5E49D96B1D3A}" dt="2025-07-03T13:41:54.663" v="2908" actId="790"/>
-          <ac:spMkLst>
-            <pc:docMk/>
-            <pc:sldMk cId="4168340417" sldId="256"/>
-            <ac:spMk id="2" creationId="{0D5FB33D-C847-FE6A-05CF-01F05979D75A}"/>
-          </ac:spMkLst>
-        </pc:spChg>
-        <pc:spChg chg="add mod">
-          <ac:chgData name="Cihan Zeyrek" userId="dd9724baaf2e43d1" providerId="LiveId" clId="{E5A86D5C-552E-4995-AB32-5E49D96B1D3A}" dt="2025-07-03T13:41:54.663" v="2908" actId="790"/>
-          <ac:spMkLst>
-            <pc:docMk/>
-            <pc:sldMk cId="4168340417" sldId="256"/>
-            <ac:spMk id="3" creationId="{04624BEE-2D85-D971-6B0E-6AFB63D073B6}"/>
-          </ac:spMkLst>
-        </pc:spChg>
-        <pc:spChg chg="mod">
-          <ac:chgData name="Cihan Zeyrek" userId="dd9724baaf2e43d1" providerId="LiveId" clId="{E5A86D5C-552E-4995-AB32-5E49D96B1D3A}" dt="2025-07-03T13:41:54.663" v="2908" actId="790"/>
-          <ac:spMkLst>
-            <pc:docMk/>
-            <pc:sldMk cId="4168340417" sldId="256"/>
-            <ac:spMk id="4" creationId="{D8639449-219D-AED7-D04A-B775BF5F50B3}"/>
-          </ac:spMkLst>
-        </pc:spChg>
-        <pc:spChg chg="mod">
-          <ac:chgData name="Cihan Zeyrek" userId="dd9724baaf2e43d1" providerId="LiveId" clId="{E5A86D5C-552E-4995-AB32-5E49D96B1D3A}" dt="2025-07-03T13:41:54.663" v="2908" actId="790"/>
-          <ac:spMkLst>
-            <pc:docMk/>
-            <pc:sldMk cId="4168340417" sldId="256"/>
-            <ac:spMk id="5" creationId="{3F162AEF-046C-CB92-39EA-A5D9F1BED53C}"/>
-          </ac:spMkLst>
-        </pc:spChg>
-        <pc:spChg chg="mod">
-          <ac:chgData name="Cihan Zeyrek" userId="dd9724baaf2e43d1" providerId="LiveId" clId="{E5A86D5C-552E-4995-AB32-5E49D96B1D3A}" dt="2025-07-03T13:41:54.663" v="2908" actId="790"/>
-          <ac:spMkLst>
-            <pc:docMk/>
-            <pc:sldMk cId="4168340417" sldId="256"/>
-            <ac:spMk id="6" creationId="{C4639C69-68ED-0C86-8FE4-B1B8B32B2740}"/>
-          </ac:spMkLst>
-        </pc:spChg>
-        <pc:spChg chg="add mod">
-          <ac:chgData name="Cihan Zeyrek" userId="dd9724baaf2e43d1" providerId="LiveId" clId="{E5A86D5C-552E-4995-AB32-5E49D96B1D3A}" dt="2025-07-03T13:41:54.663" v="2908" actId="790"/>
-          <ac:spMkLst>
-            <pc:docMk/>
-            <pc:sldMk cId="4168340417" sldId="256"/>
-            <ac:spMk id="7" creationId="{E825588A-E12C-8099-3FB3-5077EFD79267}"/>
-          </ac:spMkLst>
-        </pc:spChg>
-        <pc:spChg chg="mod">
-          <ac:chgData name="Cihan Zeyrek" userId="dd9724baaf2e43d1" providerId="LiveId" clId="{E5A86D5C-552E-4995-AB32-5E49D96B1D3A}" dt="2025-07-03T13:41:54.663" v="2908" actId="790"/>
-          <ac:spMkLst>
-            <pc:docMk/>
-            <pc:sldMk cId="4168340417" sldId="256"/>
-            <ac:spMk id="11" creationId="{5A24B293-A65B-2C8C-6344-768FE9D9C774}"/>
-          </ac:spMkLst>
-        </pc:spChg>
-        <pc:spChg chg="mod">
-          <ac:chgData name="Cihan Zeyrek" userId="dd9724baaf2e43d1" providerId="LiveId" clId="{E5A86D5C-552E-4995-AB32-5E49D96B1D3A}" dt="2025-07-03T13:41:54.663" v="2908" actId="790"/>
-          <ac:spMkLst>
-            <pc:docMk/>
-            <pc:sldMk cId="4168340417" sldId="256"/>
-            <ac:spMk id="14" creationId="{0A5B7BE7-83E4-B6D7-8980-BFFDA0A4A35E}"/>
-          </ac:spMkLst>
-        </pc:spChg>
-        <pc:spChg chg="mod">
-          <ac:chgData name="Cihan Zeyrek" userId="dd9724baaf2e43d1" providerId="LiveId" clId="{E5A86D5C-552E-4995-AB32-5E49D96B1D3A}" dt="2025-07-03T13:41:54.663" v="2908" actId="790"/>
-          <ac:spMkLst>
-            <pc:docMk/>
-            <pc:sldMk cId="4168340417" sldId="256"/>
-            <ac:spMk id="16" creationId="{79FCF681-1FB2-0C9B-5601-1D3FF2E0617B}"/>
-          </ac:spMkLst>
-        </pc:spChg>
-        <pc:spChg chg="mod">
-          <ac:chgData name="Cihan Zeyrek" userId="dd9724baaf2e43d1" providerId="LiveId" clId="{E5A86D5C-552E-4995-AB32-5E49D96B1D3A}" dt="2025-07-03T13:41:54.663" v="2908" actId="790"/>
-          <ac:spMkLst>
-            <pc:docMk/>
-            <pc:sldMk cId="4168340417" sldId="256"/>
-            <ac:spMk id="17" creationId="{3D4251CA-B37E-2ADC-3EC4-92CDFC656422}"/>
-          </ac:spMkLst>
-        </pc:spChg>
       </pc:sldChg>
       <pc:sldChg chg="addSp delSp modSp mod">
-        <pc:chgData name="Cihan Zeyrek" userId="dd9724baaf2e43d1" providerId="LiveId" clId="{E5A86D5C-552E-4995-AB32-5E49D96B1D3A}" dt="2025-07-04T15:33:10.495" v="4652" actId="113"/>
+        <pc:chgData name="Cihan Zeyrek" userId="dd9724baaf2e43d1" providerId="LiveId" clId="{E5A86D5C-552E-4995-AB32-5E49D96B1D3A}" dt="2025-07-05T12:48:31.086" v="4725" actId="1076"/>
         <pc:sldMkLst>
           <pc:docMk/>
           <pc:sldMk cId="3613911005" sldId="258"/>
         </pc:sldMkLst>
-        <pc:spChg chg="mod">
-          <ac:chgData name="Cihan Zeyrek" userId="dd9724baaf2e43d1" providerId="LiveId" clId="{E5A86D5C-552E-4995-AB32-5E49D96B1D3A}" dt="2025-07-03T13:41:54.663" v="2908" actId="790"/>
-          <ac:spMkLst>
-            <pc:docMk/>
-            <pc:sldMk cId="3613911005" sldId="258"/>
-            <ac:spMk id="2" creationId="{49A02D2B-FEBA-8240-4F80-1023D79A7ABD}"/>
-          </ac:spMkLst>
-        </pc:spChg>
         <pc:spChg chg="mod">
           <ac:chgData name="Cihan Zeyrek" userId="dd9724baaf2e43d1" providerId="LiveId" clId="{E5A86D5C-552E-4995-AB32-5E49D96B1D3A}" dt="2025-07-03T13:41:54.663" v="2908" actId="790"/>
           <ac:spMkLst>
@@ -249,12 +161,28 @@
             <ac:spMk id="5" creationId="{D04637A8-2720-C09A-253F-D30767B31FFF}"/>
           </ac:spMkLst>
         </pc:spChg>
+        <pc:spChg chg="add mod">
+          <ac:chgData name="Cihan Zeyrek" userId="dd9724baaf2e43d1" providerId="LiveId" clId="{E5A86D5C-552E-4995-AB32-5E49D96B1D3A}" dt="2025-07-05T12:48:31.086" v="4725" actId="1076"/>
+          <ac:spMkLst>
+            <pc:docMk/>
+            <pc:sldMk cId="3613911005" sldId="258"/>
+            <ac:spMk id="6" creationId="{61B3F6F8-8981-FA8F-4671-E329864AA8D1}"/>
+          </ac:spMkLst>
+        </pc:spChg>
         <pc:spChg chg="mod">
           <ac:chgData name="Cihan Zeyrek" userId="dd9724baaf2e43d1" providerId="LiveId" clId="{E5A86D5C-552E-4995-AB32-5E49D96B1D3A}" dt="2025-07-04T07:00:05.051" v="4318" actId="20577"/>
           <ac:spMkLst>
             <pc:docMk/>
             <pc:sldMk cId="3613911005" sldId="258"/>
             <ac:spMk id="7" creationId="{04DB3D5B-799E-DEB3-55A1-77E0B672A6B4}"/>
+          </ac:spMkLst>
+        </pc:spChg>
+        <pc:spChg chg="add mod">
+          <ac:chgData name="Cihan Zeyrek" userId="dd9724baaf2e43d1" providerId="LiveId" clId="{E5A86D5C-552E-4995-AB32-5E49D96B1D3A}" dt="2025-07-05T12:46:17.259" v="4656"/>
+          <ac:spMkLst>
+            <pc:docMk/>
+            <pc:sldMk cId="3613911005" sldId="258"/>
+            <ac:spMk id="8" creationId="{2AA4E3EC-2BE2-89BA-4E22-85412F733920}"/>
           </ac:spMkLst>
         </pc:spChg>
         <pc:spChg chg="mod">
@@ -274,7 +202,15 @@
           </ac:spMkLst>
         </pc:spChg>
         <pc:spChg chg="add mod">
-          <ac:chgData name="Cihan Zeyrek" userId="dd9724baaf2e43d1" providerId="LiveId" clId="{E5A86D5C-552E-4995-AB32-5E49D96B1D3A}" dt="2025-07-03T14:15:26.543" v="3686" actId="20577"/>
+          <ac:chgData name="Cihan Zeyrek" userId="dd9724baaf2e43d1" providerId="LiveId" clId="{E5A86D5C-552E-4995-AB32-5E49D96B1D3A}" dt="2025-07-05T12:47:22.564" v="4661" actId="20577"/>
+          <ac:spMkLst>
+            <pc:docMk/>
+            <pc:sldMk cId="3613911005" sldId="258"/>
+            <ac:spMk id="12" creationId="{07BA545E-FE79-BC08-D94C-8D9CD8317AFA}"/>
+          </ac:spMkLst>
+        </pc:spChg>
+        <pc:spChg chg="add del mod">
+          <ac:chgData name="Cihan Zeyrek" userId="dd9724baaf2e43d1" providerId="LiveId" clId="{E5A86D5C-552E-4995-AB32-5E49D96B1D3A}" dt="2025-07-05T12:45:37.480" v="4653" actId="478"/>
           <ac:spMkLst>
             <pc:docMk/>
             <pc:sldMk cId="3613911005" sldId="258"/>
@@ -345,60 +281,28 @@
             <ac:spMk id="23" creationId="{05D3A7DB-93DD-7817-A586-701FA44BDDE8}"/>
           </ac:spMkLst>
         </pc:spChg>
-        <pc:spChg chg="mod">
-          <ac:chgData name="Cihan Zeyrek" userId="dd9724baaf2e43d1" providerId="LiveId" clId="{E5A86D5C-552E-4995-AB32-5E49D96B1D3A}" dt="2025-07-03T13:38:33.064" v="2870" actId="1076"/>
-          <ac:spMkLst>
-            <pc:docMk/>
-            <pc:sldMk cId="3613911005" sldId="258"/>
-            <ac:spMk id="26" creationId="{BE290EAF-1A4B-D335-43DA-78DE46D94BC7}"/>
-          </ac:spMkLst>
-        </pc:spChg>
-        <pc:spChg chg="add mod">
-          <ac:chgData name="Cihan Zeyrek" userId="dd9724baaf2e43d1" providerId="LiveId" clId="{E5A86D5C-552E-4995-AB32-5E49D96B1D3A}" dt="2025-07-04T15:31:27.354" v="4566" actId="1076"/>
+        <pc:spChg chg="add del mod">
+          <ac:chgData name="Cihan Zeyrek" userId="dd9724baaf2e43d1" providerId="LiveId" clId="{E5A86D5C-552E-4995-AB32-5E49D96B1D3A}" dt="2025-07-05T12:46:15.802" v="4655" actId="478"/>
           <ac:spMkLst>
             <pc:docMk/>
             <pc:sldMk cId="3613911005" sldId="258"/>
             <ac:spMk id="36" creationId="{F123235E-33F2-9698-09ED-DD83FD4F8AAD}"/>
           </ac:spMkLst>
         </pc:spChg>
-        <pc:spChg chg="mod">
-          <ac:chgData name="Cihan Zeyrek" userId="dd9724baaf2e43d1" providerId="LiveId" clId="{E5A86D5C-552E-4995-AB32-5E49D96B1D3A}" dt="2025-07-03T13:39:50.039" v="2883" actId="1076"/>
-          <ac:spMkLst>
-            <pc:docMk/>
-            <pc:sldMk cId="3613911005" sldId="258"/>
-            <ac:spMk id="39" creationId="{E6EF7BF0-8EEC-4498-FCA6-9E2123BFB423}"/>
-          </ac:spMkLst>
-        </pc:spChg>
-        <pc:spChg chg="mod">
-          <ac:chgData name="Cihan Zeyrek" userId="dd9724baaf2e43d1" providerId="LiveId" clId="{E5A86D5C-552E-4995-AB32-5E49D96B1D3A}" dt="2025-07-03T13:40:37.904" v="2889" actId="1076"/>
-          <ac:spMkLst>
-            <pc:docMk/>
-            <pc:sldMk cId="3613911005" sldId="258"/>
-            <ac:spMk id="40" creationId="{9E00ACD3-20DA-AFDB-EE91-F0B099D4597C}"/>
-          </ac:spMkLst>
-        </pc:spChg>
         <pc:spChg chg="add mod">
-          <ac:chgData name="Cihan Zeyrek" userId="dd9724baaf2e43d1" providerId="LiveId" clId="{E5A86D5C-552E-4995-AB32-5E49D96B1D3A}" dt="2025-07-04T12:11:35.975" v="4377" actId="1076"/>
+          <ac:chgData name="Cihan Zeyrek" userId="dd9724baaf2e43d1" providerId="LiveId" clId="{E5A86D5C-552E-4995-AB32-5E49D96B1D3A}" dt="2025-07-05T12:46:33.751" v="4658" actId="1076"/>
           <ac:spMkLst>
             <pc:docMk/>
             <pc:sldMk cId="3613911005" sldId="258"/>
             <ac:spMk id="43" creationId="{9C753B82-7F3B-08F2-D5CA-903A2F39B2EF}"/>
           </ac:spMkLst>
         </pc:spChg>
-        <pc:spChg chg="add mod">
-          <ac:chgData name="Cihan Zeyrek" userId="dd9724baaf2e43d1" providerId="LiveId" clId="{E5A86D5C-552E-4995-AB32-5E49D96B1D3A}" dt="2025-07-04T15:33:10.495" v="4652" actId="113"/>
+        <pc:spChg chg="add del mod">
+          <ac:chgData name="Cihan Zeyrek" userId="dd9724baaf2e43d1" providerId="LiveId" clId="{E5A86D5C-552E-4995-AB32-5E49D96B1D3A}" dt="2025-07-05T12:46:37.085" v="4659" actId="478"/>
           <ac:spMkLst>
             <pc:docMk/>
             <pc:sldMk cId="3613911005" sldId="258"/>
             <ac:spMk id="44" creationId="{C41FF133-ADEB-E4F3-48D0-CDE044ACB3E5}"/>
-          </ac:spMkLst>
-        </pc:spChg>
-        <pc:spChg chg="mod">
-          <ac:chgData name="Cihan Zeyrek" userId="dd9724baaf2e43d1" providerId="LiveId" clId="{E5A86D5C-552E-4995-AB32-5E49D96B1D3A}" dt="2025-07-03T13:41:54.663" v="2908" actId="790"/>
-          <ac:spMkLst>
-            <pc:docMk/>
-            <pc:sldMk cId="3613911005" sldId="258"/>
-            <ac:spMk id="45" creationId="{383CE23E-E30E-605A-7CAB-C3F82B7FB91A}"/>
           </ac:spMkLst>
         </pc:spChg>
         <pc:spChg chg="mod">
@@ -407,38 +311,6 @@
             <pc:docMk/>
             <pc:sldMk cId="3613911005" sldId="258"/>
             <ac:spMk id="46" creationId="{09012934-17D9-9E1F-A0A5-E6B32DB352BC}"/>
-          </ac:spMkLst>
-        </pc:spChg>
-        <pc:spChg chg="mod">
-          <ac:chgData name="Cihan Zeyrek" userId="dd9724baaf2e43d1" providerId="LiveId" clId="{E5A86D5C-552E-4995-AB32-5E49D96B1D3A}" dt="2025-07-03T13:41:54.663" v="2908" actId="790"/>
-          <ac:spMkLst>
-            <pc:docMk/>
-            <pc:sldMk cId="3613911005" sldId="258"/>
-            <ac:spMk id="47" creationId="{C8697122-1F57-2A95-C751-74F7E5823F08}"/>
-          </ac:spMkLst>
-        </pc:spChg>
-        <pc:spChg chg="mod">
-          <ac:chgData name="Cihan Zeyrek" userId="dd9724baaf2e43d1" providerId="LiveId" clId="{E5A86D5C-552E-4995-AB32-5E49D96B1D3A}" dt="2025-07-03T13:40:14.839" v="2885" actId="1076"/>
-          <ac:spMkLst>
-            <pc:docMk/>
-            <pc:sldMk cId="3613911005" sldId="258"/>
-            <ac:spMk id="49" creationId="{06A51717-529C-69ED-4034-81B1351AD584}"/>
-          </ac:spMkLst>
-        </pc:spChg>
-        <pc:spChg chg="mod">
-          <ac:chgData name="Cihan Zeyrek" userId="dd9724baaf2e43d1" providerId="LiveId" clId="{E5A86D5C-552E-4995-AB32-5E49D96B1D3A}" dt="2025-07-03T14:14:28.529" v="3680" actId="20577"/>
-          <ac:spMkLst>
-            <pc:docMk/>
-            <pc:sldMk cId="3613911005" sldId="258"/>
-            <ac:spMk id="50" creationId="{71AC231F-D6F1-37AC-E477-4F200AD7EBA5}"/>
-          </ac:spMkLst>
-        </pc:spChg>
-        <pc:spChg chg="mod">
-          <ac:chgData name="Cihan Zeyrek" userId="dd9724baaf2e43d1" providerId="LiveId" clId="{E5A86D5C-552E-4995-AB32-5E49D96B1D3A}" dt="2025-07-03T14:14:20.122" v="3674" actId="20577"/>
-          <ac:spMkLst>
-            <pc:docMk/>
-            <pc:sldMk cId="3613911005" sldId="258"/>
-            <ac:spMk id="51" creationId="{1EFE5839-827F-4EE7-93B1-21F410F3AF68}"/>
           </ac:spMkLst>
         </pc:spChg>
         <pc:spChg chg="mod">
@@ -465,14 +337,6 @@
             <ac:spMk id="73" creationId="{497B7107-C6F9-BC8E-32F9-4EB58EBC3122}"/>
           </ac:spMkLst>
         </pc:spChg>
-        <pc:grpChg chg="mod">
-          <ac:chgData name="Cihan Zeyrek" userId="dd9724baaf2e43d1" providerId="LiveId" clId="{E5A86D5C-552E-4995-AB32-5E49D96B1D3A}" dt="2025-07-03T13:40:34.252" v="2888" actId="1076"/>
-          <ac:grpSpMkLst>
-            <pc:docMk/>
-            <pc:sldMk cId="3613911005" sldId="258"/>
-            <ac:grpSpMk id="42" creationId="{AF808B17-6572-A307-B9E8-253821F89EE7}"/>
-          </ac:grpSpMkLst>
-        </pc:grpChg>
         <pc:grpChg chg="del mod">
           <ac:chgData name="Cihan Zeyrek" userId="dd9724baaf2e43d1" providerId="LiveId" clId="{E5A86D5C-552E-4995-AB32-5E49D96B1D3A}" dt="2025-07-04T07:16:55.680" v="4338" actId="478"/>
           <ac:grpSpMkLst>
@@ -481,14 +345,6 @@
             <ac:grpSpMk id="44" creationId="{40211F4B-E423-2BFB-9135-28A3C8361C2A}"/>
           </ac:grpSpMkLst>
         </pc:grpChg>
-        <pc:graphicFrameChg chg="mod">
-          <ac:chgData name="Cihan Zeyrek" userId="dd9724baaf2e43d1" providerId="LiveId" clId="{E5A86D5C-552E-4995-AB32-5E49D96B1D3A}" dt="2025-07-03T13:40:26.857" v="2887" actId="1076"/>
-          <ac:graphicFrameMkLst>
-            <pc:docMk/>
-            <pc:sldMk cId="3613911005" sldId="258"/>
-            <ac:graphicFrameMk id="48" creationId="{B4582048-10B5-61D2-9583-8E75A86FF2D5}"/>
-          </ac:graphicFrameMkLst>
-        </pc:graphicFrameChg>
         <pc:picChg chg="mod">
           <ac:chgData name="Cihan Zeyrek" userId="dd9724baaf2e43d1" providerId="LiveId" clId="{E5A86D5C-552E-4995-AB32-5E49D96B1D3A}" dt="2025-07-04T07:08:38.727" v="4328" actId="1076"/>
           <ac:picMkLst>
@@ -513,22 +369,6 @@
             <ac:picMk id="38" creationId="{E5FDED8C-E7AC-C058-2B47-E49642388937}"/>
           </ac:picMkLst>
         </pc:picChg>
-        <pc:picChg chg="mod">
-          <ac:chgData name="Cihan Zeyrek" userId="dd9724baaf2e43d1" providerId="LiveId" clId="{E5A86D5C-552E-4995-AB32-5E49D96B1D3A}" dt="2025-07-03T13:40:43.839" v="2891" actId="1076"/>
-          <ac:picMkLst>
-            <pc:docMk/>
-            <pc:sldMk cId="3613911005" sldId="258"/>
-            <ac:picMk id="41" creationId="{085B1AAD-70BC-D43F-DE61-2739306A23EC}"/>
-          </ac:picMkLst>
-        </pc:picChg>
-        <pc:picChg chg="add del mod">
-          <ac:chgData name="Cihan Zeyrek" userId="dd9724baaf2e43d1" providerId="LiveId" clId="{E5A86D5C-552E-4995-AB32-5E49D96B1D3A}" dt="2025-07-03T14:03:55.686" v="3500" actId="478"/>
-          <ac:picMkLst>
-            <pc:docMk/>
-            <pc:sldMk cId="3613911005" sldId="258"/>
-            <ac:picMk id="46" creationId="{0D302B69-227B-F98A-9C17-505C30F9EF34}"/>
-          </ac:picMkLst>
-        </pc:picChg>
         <pc:picChg chg="add del mod">
           <ac:chgData name="Cihan Zeyrek" userId="dd9724baaf2e43d1" providerId="LiveId" clId="{E5A86D5C-552E-4995-AB32-5E49D96B1D3A}" dt="2025-07-04T12:58:45.916" v="4423" actId="478"/>
           <ac:picMkLst>
@@ -537,16 +377,8 @@
             <ac:picMk id="53" creationId="{BAAF9A28-A00D-D8F6-8487-F57CBEA64C0C}"/>
           </ac:picMkLst>
         </pc:picChg>
-        <pc:picChg chg="add del mod">
-          <ac:chgData name="Cihan Zeyrek" userId="dd9724baaf2e43d1" providerId="LiveId" clId="{E5A86D5C-552E-4995-AB32-5E49D96B1D3A}" dt="2025-07-03T14:10:27.546" v="3533" actId="478"/>
-          <ac:picMkLst>
-            <pc:docMk/>
-            <pc:sldMk cId="3613911005" sldId="258"/>
-            <ac:picMk id="55" creationId="{2850C1C9-B223-F7BE-1D76-2515B899DD6B}"/>
-          </ac:picMkLst>
-        </pc:picChg>
         <pc:picChg chg="add mod modCrop">
-          <ac:chgData name="Cihan Zeyrek" userId="dd9724baaf2e43d1" providerId="LiveId" clId="{E5A86D5C-552E-4995-AB32-5E49D96B1D3A}" dt="2025-07-04T12:59:04.179" v="4428" actId="14100"/>
+          <ac:chgData name="Cihan Zeyrek" userId="dd9724baaf2e43d1" providerId="LiveId" clId="{E5A86D5C-552E-4995-AB32-5E49D96B1D3A}" dt="2025-07-05T12:48:19.757" v="4724" actId="1076"/>
           <ac:picMkLst>
             <pc:docMk/>
             <pc:sldMk cId="3613911005" sldId="258"/>
@@ -562,7 +394,7 @@
           </ac:picMkLst>
         </pc:picChg>
         <pc:picChg chg="add mod">
-          <ac:chgData name="Cihan Zeyrek" userId="dd9724baaf2e43d1" providerId="LiveId" clId="{E5A86D5C-552E-4995-AB32-5E49D96B1D3A}" dt="2025-07-04T12:11:32.745" v="4376" actId="1076"/>
+          <ac:chgData name="Cihan Zeyrek" userId="dd9724baaf2e43d1" providerId="LiveId" clId="{E5A86D5C-552E-4995-AB32-5E49D96B1D3A}" dt="2025-07-05T12:46:26.502" v="4657" actId="1076"/>
           <ac:picMkLst>
             <pc:docMk/>
             <pc:sldMk cId="3613911005" sldId="258"/>
@@ -594,7 +426,7 @@
 <file path=ppt/charts/chart1.xml><?xml version="1.0" encoding="utf-8"?>
 <c:chartSpace xmlns:c="http://schemas.openxmlformats.org/drawingml/2006/chart" xmlns:a="http://schemas.openxmlformats.org/drawingml/2006/main" xmlns:r="http://schemas.openxmlformats.org/officeDocument/2006/relationships" xmlns:c16r2="http://schemas.microsoft.com/office/drawing/2015/06/chart">
   <c:date1904 val="0"/>
-  <c:lang val="en-GB"/>
+  <c:lang val="de-DE"/>
   <c:roundedCorners val="0"/>
   <mc:AlternateContent xmlns:mc="http://schemas.openxmlformats.org/markup-compatibility/2006">
     <mc:Choice xmlns:c14="http://schemas.microsoft.com/office/drawing/2007/8/2/chart" Requires="c14">
@@ -1762,7 +1594,7 @@
           <a:p>
             <a:fld id="{B23F8280-8283-495D-A659-9194DB8B63EA}" type="slidenum">
               <a:rPr lang="de-DE" smtClean="0"/>
-              <a:t>‹#›</a:t>
+              <a:t>‹Nr.›</a:t>
             </a:fld>
             <a:endParaRPr lang="de-DE"/>
           </a:p>
@@ -2152,7 +1984,7 @@
           <a:p>
             <a:fld id="{79580C82-F813-4CCE-B4AC-52ACFAE55A43}" type="slidenum">
               <a:rPr lang="de-DE" smtClean="0"/>
-              <a:t>‹#›</a:t>
+              <a:t>‹Nr.›</a:t>
             </a:fld>
             <a:endParaRPr lang="de-DE"/>
           </a:p>
@@ -2322,7 +2154,7 @@
           <a:p>
             <a:fld id="{79580C82-F813-4CCE-B4AC-52ACFAE55A43}" type="slidenum">
               <a:rPr lang="de-DE" smtClean="0"/>
-              <a:t>‹#›</a:t>
+              <a:t>‹Nr.›</a:t>
             </a:fld>
             <a:endParaRPr lang="de-DE"/>
           </a:p>
@@ -2502,7 +2334,7 @@
           <a:p>
             <a:fld id="{79580C82-F813-4CCE-B4AC-52ACFAE55A43}" type="slidenum">
               <a:rPr lang="de-DE" smtClean="0"/>
-              <a:t>‹#›</a:t>
+              <a:t>‹Nr.›</a:t>
             </a:fld>
             <a:endParaRPr lang="de-DE"/>
           </a:p>
@@ -2672,7 +2504,7 @@
           <a:p>
             <a:fld id="{79580C82-F813-4CCE-B4AC-52ACFAE55A43}" type="slidenum">
               <a:rPr lang="de-DE" smtClean="0"/>
-              <a:t>‹#›</a:t>
+              <a:t>‹Nr.›</a:t>
             </a:fld>
             <a:endParaRPr lang="de-DE"/>
           </a:p>
@@ -2918,7 +2750,7 @@
           <a:p>
             <a:fld id="{79580C82-F813-4CCE-B4AC-52ACFAE55A43}" type="slidenum">
               <a:rPr lang="de-DE" smtClean="0"/>
-              <a:t>‹#›</a:t>
+              <a:t>‹Nr.›</a:t>
             </a:fld>
             <a:endParaRPr lang="de-DE"/>
           </a:p>
@@ -3150,7 +2982,7 @@
           <a:p>
             <a:fld id="{79580C82-F813-4CCE-B4AC-52ACFAE55A43}" type="slidenum">
               <a:rPr lang="de-DE" smtClean="0"/>
-              <a:t>‹#›</a:t>
+              <a:t>‹Nr.›</a:t>
             </a:fld>
             <a:endParaRPr lang="de-DE"/>
           </a:p>
@@ -3517,7 +3349,7 @@
           <a:p>
             <a:fld id="{79580C82-F813-4CCE-B4AC-52ACFAE55A43}" type="slidenum">
               <a:rPr lang="de-DE" smtClean="0"/>
-              <a:t>‹#›</a:t>
+              <a:t>‹Nr.›</a:t>
             </a:fld>
             <a:endParaRPr lang="de-DE"/>
           </a:p>
@@ -3635,7 +3467,7 @@
           <a:p>
             <a:fld id="{79580C82-F813-4CCE-B4AC-52ACFAE55A43}" type="slidenum">
               <a:rPr lang="de-DE" smtClean="0"/>
-              <a:t>‹#›</a:t>
+              <a:t>‹Nr.›</a:t>
             </a:fld>
             <a:endParaRPr lang="de-DE"/>
           </a:p>
@@ -3730,7 +3562,7 @@
           <a:p>
             <a:fld id="{79580C82-F813-4CCE-B4AC-52ACFAE55A43}" type="slidenum">
               <a:rPr lang="de-DE" smtClean="0"/>
-              <a:t>‹#›</a:t>
+              <a:t>‹Nr.›</a:t>
             </a:fld>
             <a:endParaRPr lang="de-DE"/>
           </a:p>
@@ -4007,7 +3839,7 @@
           <a:p>
             <a:fld id="{79580C82-F813-4CCE-B4AC-52ACFAE55A43}" type="slidenum">
               <a:rPr lang="de-DE" smtClean="0"/>
-              <a:t>‹#›</a:t>
+              <a:t>‹Nr.›</a:t>
             </a:fld>
             <a:endParaRPr lang="de-DE"/>
           </a:p>
@@ -4264,7 +4096,7 @@
           <a:p>
             <a:fld id="{79580C82-F813-4CCE-B4AC-52ACFAE55A43}" type="slidenum">
               <a:rPr lang="de-DE" smtClean="0"/>
-              <a:t>‹#›</a:t>
+              <a:t>‹Nr.›</a:t>
             </a:fld>
             <a:endParaRPr lang="de-DE"/>
           </a:p>
@@ -4585,7 +4417,7 @@
           <a:p>
             <a:fld id="{79580C82-F813-4CCE-B4AC-52ACFAE55A43}" type="slidenum">
               <a:rPr lang="de-DE" smtClean="0"/>
-              <a:t>‹#›</a:t>
+              <a:t>‹Nr.›</a:t>
             </a:fld>
             <a:endParaRPr lang="de-DE"/>
           </a:p>
@@ -6032,63 +5864,6 @@
       </p:sp>
       <p:sp>
         <p:nvSpPr>
-          <p:cNvPr id="13" name="Textfeld 12">
-            <a:extLst>
-              <a:ext uri="{FF2B5EF4-FFF2-40B4-BE49-F238E27FC236}">
-                <a16:creationId xmlns:a16="http://schemas.microsoft.com/office/drawing/2014/main" id="{B1FDECB6-1FBA-D64A-249B-C2A37669EFAA}"/>
-              </a:ext>
-            </a:extLst>
-          </p:cNvPr>
-          <p:cNvSpPr txBox="1"/>
-          <p:nvPr/>
-        </p:nvSpPr>
-        <p:spPr>
-          <a:xfrm>
-            <a:off x="830996" y="7194777"/>
-            <a:ext cx="6015282" cy="5262979"/>
-          </a:xfrm>
-          <a:prstGeom prst="rect">
-            <a:avLst/>
-          </a:prstGeom>
-          <a:noFill/>
-        </p:spPr>
-        <p:txBody>
-          <a:bodyPr wrap="square" rtlCol="0">
-            <a:spAutoFit/>
-          </a:bodyPr>
-          <a:lstStyle/>
-          <a:p>
-            <a:pPr algn="just"/>
-            <a:r>
-              <a:rPr lang="en-US" sz="2400" noProof="0" dirty="0"/>
-              <a:t>To verify the reproducibility of the triplicates in our dataset, Spearman correlations were calculated between all replicate–fraction combinations. The resulting correlation coefficients (</a:t>
-            </a:r>
-            <a:r>
-              <a:rPr lang="en-US" sz="2400" noProof="0" dirty="0" err="1"/>
-              <a:t>r-values</a:t>
-            </a:r>
-            <a:r>
-              <a:rPr lang="en-US" sz="2400" noProof="0" dirty="0"/>
-              <a:t>) were visualized as two separate heatmaps - one for the RNase treatment (Fig. X on the right) and one for the control condition. </a:t>
-            </a:r>
-            <a:endParaRPr lang="en-US" sz="2400" dirty="0"/>
-          </a:p>
-          <a:p>
-            <a:pPr algn="just"/>
-            <a:r>
-              <a:rPr lang="en-US" sz="2400" noProof="0" dirty="0"/>
-              <a:t>Reproducibility is indicated by high correlations within corresponding fractions across replicates, which should appear as prominent diagonal patterns in 3×3 blocks on the heatmaps. </a:t>
-            </a:r>
-            <a:r>
-              <a:rPr lang="en-US" sz="2400" dirty="0"/>
-              <a:t>This diagonal correlation structure was evident in both treatments.</a:t>
-            </a:r>
-            <a:endParaRPr lang="en-US" sz="2400" noProof="0" dirty="0"/>
-          </a:p>
-        </p:txBody>
-      </p:sp>
-      <p:sp>
-        <p:nvSpPr>
           <p:cNvPr id="56" name="Textfeld 55">
             <a:extLst>
               <a:ext uri="{FF2B5EF4-FFF2-40B4-BE49-F238E27FC236}">
@@ -6346,7 +6121,7 @@
         </p:blipFill>
         <p:spPr>
           <a:xfrm>
-            <a:off x="22074595" y="17620186"/>
+            <a:off x="22332438" y="17610890"/>
             <a:ext cx="6864416" cy="5148312"/>
           </a:xfrm>
           <a:prstGeom prst="rect">
@@ -6354,73 +6129,6 @@
           </a:prstGeom>
         </p:spPr>
       </p:pic>
-      <p:sp>
-        <p:nvSpPr>
-          <p:cNvPr id="36" name="Textfeld 35">
-            <a:extLst>
-              <a:ext uri="{FF2B5EF4-FFF2-40B4-BE49-F238E27FC236}">
-                <a16:creationId xmlns:a16="http://schemas.microsoft.com/office/drawing/2014/main" id="{F123235E-33F2-9698-09ED-DD83FD4F8AAD}"/>
-              </a:ext>
-            </a:extLst>
-          </p:cNvPr>
-          <p:cNvSpPr txBox="1"/>
-          <p:nvPr/>
-        </p:nvSpPr>
-        <p:spPr>
-          <a:xfrm>
-            <a:off x="15525487" y="17351590"/>
-            <a:ext cx="6440919" cy="7109639"/>
-          </a:xfrm>
-          <a:prstGeom prst="rect">
-            <a:avLst/>
-          </a:prstGeom>
-          <a:noFill/>
-        </p:spPr>
-        <p:txBody>
-          <a:bodyPr wrap="square" rtlCol="0">
-            <a:spAutoFit/>
-          </a:bodyPr>
-          <a:lstStyle/>
-          <a:p>
-            <a:pPr algn="just"/>
-            <a:r>
-              <a:rPr lang="de-DE" sz="2400" b="1" dirty="0" err="1"/>
-              <a:t>Comparative</a:t>
-            </a:r>
-            <a:r>
-              <a:rPr lang="de-DE" sz="2400" b="1" dirty="0"/>
-              <a:t> Shift Analysis</a:t>
-            </a:r>
-            <a:endParaRPr lang="en-US" sz="2400" b="1" dirty="0"/>
-          </a:p>
-          <a:p>
-            <a:pPr algn="just"/>
-            <a:r>
-              <a:rPr lang="en-US" sz="2400" dirty="0"/>
-              <a:t>To investigate RNA-binding protein (RBP) activity beyond mitosis, we applied the same shift analysis pipeline to non-synchronized HeLa cells. For each protein, shift distances were calculated using center of mass (</a:t>
-            </a:r>
-            <a:r>
-              <a:rPr lang="en-US" sz="2400" dirty="0" err="1"/>
-              <a:t>CoM</a:t>
-            </a:r>
-            <a:r>
-              <a:rPr lang="en-US" sz="2400" dirty="0"/>
-              <a:t>) values derived from normalized signal distributions across all replicates. Normality was evaluated using the Shapiro–Wilk test, and statistical significance was determined by a one-sided t-test against a defined threshold.</a:t>
-            </a:r>
-          </a:p>
-          <a:p>
-            <a:pPr algn="just"/>
-            <a:r>
-              <a:rPr lang="en-US" sz="2400" dirty="0"/>
-              <a:t>This scatterplot visualizes the resulting shift distances for each protein, comparing mitotic and non-synchronized conditions. Each point represents a protein and reflects its condition-specific RNA dependence. The red dashed identity line marks equal shifts across both cell states. </a:t>
-            </a:r>
-          </a:p>
-          <a:p>
-            <a:pPr algn="just"/>
-            <a:endParaRPr lang="en-US" sz="2400" dirty="0"/>
-          </a:p>
-        </p:txBody>
-      </p:sp>
       <p:sp>
         <p:nvSpPr>
           <p:cNvPr id="43" name="Textfeld 42">
@@ -6435,7 +6143,7 @@
         </p:nvSpPr>
         <p:spPr>
           <a:xfrm>
-            <a:off x="21952883" y="22885382"/>
+            <a:off x="22312747" y="22769077"/>
             <a:ext cx="7107839" cy="1015663"/>
           </a:xfrm>
           <a:prstGeom prst="rect">
@@ -6830,62 +6538,6 @@
               <a:t>.</a:t>
             </a:r>
             <a:endParaRPr lang="en-US" sz="1200" dirty="0"/>
-          </a:p>
-        </p:txBody>
-      </p:sp>
-      <p:sp>
-        <p:nvSpPr>
-          <p:cNvPr id="44" name="Textfeld 43">
-            <a:extLst>
-              <a:ext uri="{FF2B5EF4-FFF2-40B4-BE49-F238E27FC236}">
-                <a16:creationId xmlns:a16="http://schemas.microsoft.com/office/drawing/2014/main" id="{C41FF133-ADEB-E4F3-48D0-CDE044ACB3E5}"/>
-              </a:ext>
-            </a:extLst>
-          </p:cNvPr>
-          <p:cNvSpPr txBox="1"/>
-          <p:nvPr/>
-        </p:nvSpPr>
-        <p:spPr>
-          <a:xfrm>
-            <a:off x="15525487" y="23932563"/>
-            <a:ext cx="14181095" cy="1477328"/>
-          </a:xfrm>
-          <a:prstGeom prst="rect">
-            <a:avLst/>
-          </a:prstGeom>
-          <a:noFill/>
-        </p:spPr>
-        <p:txBody>
-          <a:bodyPr wrap="square" rtlCol="0">
-            <a:spAutoFit/>
-          </a:bodyPr>
-          <a:lstStyle/>
-          <a:p>
-            <a:pPr algn="just"/>
-            <a:r>
-              <a:rPr lang="en-US" sz="2400" dirty="0"/>
-              <a:t>Proteins falling below this line show significant RNA dependency exclusively during mitosis, suggesting that their activity is tightly linked to this specific cellular phase. In total </a:t>
-            </a:r>
-            <a:r>
-              <a:rPr lang="en-US" sz="2400" b="1" dirty="0"/>
-              <a:t>237 of the previous determined RBPs </a:t>
-            </a:r>
-            <a:r>
-              <a:rPr lang="en-US" sz="2400" dirty="0"/>
-              <a:t>fall below this line. One of them is </a:t>
-            </a:r>
-            <a:r>
-              <a:rPr lang="en-US" sz="2400" b="1" dirty="0" err="1"/>
-              <a:t>RiboSix</a:t>
-            </a:r>
-            <a:r>
-              <a:rPr lang="en-US" sz="2400" dirty="0"/>
-              <a:t>, so indeed mitosis appears to be his active season.</a:t>
-            </a:r>
-          </a:p>
-          <a:p>
-            <a:pPr algn="just"/>
-            <a:endParaRPr lang="en-US" dirty="0"/>
           </a:p>
         </p:txBody>
       </p:sp>
@@ -6918,7 +6570,7 @@
         </p:blipFill>
         <p:spPr>
           <a:xfrm>
-            <a:off x="6978285" y="7124435"/>
+            <a:off x="7012343" y="7111806"/>
             <a:ext cx="7762767" cy="4849741"/>
           </a:xfrm>
           <a:prstGeom prst="rect">
@@ -11211,6 +10863,318 @@
           </a:prstGeom>
         </p:spPr>
       </p:pic>
+      <p:sp>
+        <p:nvSpPr>
+          <p:cNvPr id="6" name="Textfeld 5">
+            <a:extLst>
+              <a:ext uri="{FF2B5EF4-FFF2-40B4-BE49-F238E27FC236}">
+                <a16:creationId xmlns:a16="http://schemas.microsoft.com/office/drawing/2014/main" id="{61B3F6F8-8981-FA8F-4671-E329864AA8D1}"/>
+              </a:ext>
+            </a:extLst>
+          </p:cNvPr>
+          <p:cNvSpPr txBox="1"/>
+          <p:nvPr/>
+        </p:nvSpPr>
+        <p:spPr>
+          <a:xfrm>
+            <a:off x="649841" y="7218353"/>
+            <a:ext cx="6487588" cy="5262979"/>
+          </a:xfrm>
+          <a:prstGeom prst="rect">
+            <a:avLst/>
+          </a:prstGeom>
+          <a:noFill/>
+        </p:spPr>
+        <p:txBody>
+          <a:bodyPr wrap="square" rtlCol="0">
+            <a:spAutoFit/>
+          </a:bodyPr>
+          <a:lstStyle/>
+          <a:p>
+            <a:pPr marL="342900" indent="-342900">
+              <a:buFont typeface="Arial" panose="020B0604020202020204" pitchFamily="34" charset="0"/>
+              <a:buChar char="•"/>
+            </a:pPr>
+            <a:r>
+              <a:rPr lang="en-US" sz="2400" dirty="0"/>
+              <a:t>Reproducibility assessed via Spearman correlation between all replicate–fraction combinations</a:t>
+            </a:r>
+          </a:p>
+          <a:p>
+            <a:pPr marL="342900" indent="-342900">
+              <a:buFont typeface="Arial" panose="020B0604020202020204" pitchFamily="34" charset="0"/>
+              <a:buChar char="•"/>
+            </a:pPr>
+            <a:r>
+              <a:rPr lang="en-US" sz="2400" dirty="0"/>
+              <a:t>Analysis performed separately for RNase and control conditions</a:t>
+            </a:r>
+          </a:p>
+          <a:p>
+            <a:pPr marL="342900" indent="-342900">
+              <a:buFont typeface="Arial" panose="020B0604020202020204" pitchFamily="34" charset="0"/>
+              <a:buChar char="•"/>
+            </a:pPr>
+            <a:r>
+              <a:rPr lang="en-US" sz="2400" dirty="0"/>
+              <a:t>Resulting correlation coefficients (r-values) were visualized in heatmap</a:t>
+            </a:r>
+          </a:p>
+          <a:p>
+            <a:pPr marL="342900" indent="-342900">
+              <a:buFont typeface="Arial" panose="020B0604020202020204" pitchFamily="34" charset="0"/>
+              <a:buChar char="•"/>
+            </a:pPr>
+            <a:r>
+              <a:rPr lang="en-US" sz="2400" dirty="0"/>
+              <a:t>High reproducibility indicated by strong correlations between replicates of the same fraction</a:t>
+            </a:r>
+          </a:p>
+          <a:p>
+            <a:pPr marL="342900" indent="-342900">
+              <a:buFont typeface="Arial" panose="020B0604020202020204" pitchFamily="34" charset="0"/>
+              <a:buChar char="•"/>
+            </a:pPr>
+            <a:r>
+              <a:rPr lang="en-US" sz="2400" dirty="0"/>
+              <a:t>Appears on the heatmap as a diagonal patter in 3x3 blocks, evident in both treatments</a:t>
+            </a:r>
+          </a:p>
+          <a:p>
+            <a:pPr marL="342900" indent="-342900">
+              <a:buFont typeface="Arial" panose="020B0604020202020204" pitchFamily="34" charset="0"/>
+              <a:buChar char="•"/>
+            </a:pPr>
+            <a:r>
+              <a:rPr lang="en-US" sz="2400" dirty="0"/>
+              <a:t>So the RBPs are very much real, including </a:t>
+            </a:r>
+            <a:r>
+              <a:rPr lang="en-US" sz="2400" dirty="0" err="1"/>
+              <a:t>RiboSix</a:t>
+            </a:r>
+            <a:endParaRPr lang="en-US" sz="2400" dirty="0"/>
+          </a:p>
+        </p:txBody>
+      </p:sp>
+      <p:sp>
+        <p:nvSpPr>
+          <p:cNvPr id="8" name="Textfeld 7">
+            <a:extLst>
+              <a:ext uri="{FF2B5EF4-FFF2-40B4-BE49-F238E27FC236}">
+                <a16:creationId xmlns:a16="http://schemas.microsoft.com/office/drawing/2014/main" id="{2AA4E3EC-2BE2-89BA-4E22-85412F733920}"/>
+              </a:ext>
+            </a:extLst>
+          </p:cNvPr>
+          <p:cNvSpPr txBox="1"/>
+          <p:nvPr/>
+        </p:nvSpPr>
+        <p:spPr>
+          <a:xfrm>
+            <a:off x="15571016" y="17407315"/>
+            <a:ext cx="6594503" cy="7109639"/>
+          </a:xfrm>
+          <a:prstGeom prst="rect">
+            <a:avLst/>
+          </a:prstGeom>
+          <a:noFill/>
+        </p:spPr>
+        <p:txBody>
+          <a:bodyPr wrap="square" rtlCol="0">
+            <a:spAutoFit/>
+          </a:bodyPr>
+          <a:lstStyle/>
+          <a:p>
+            <a:endParaRPr lang="de-DE" sz="2400" b="1" dirty="0"/>
+          </a:p>
+          <a:p>
+            <a:r>
+              <a:rPr lang="de-DE" sz="2400" b="1" dirty="0" err="1"/>
+              <a:t>Comparative</a:t>
+            </a:r>
+            <a:r>
+              <a:rPr lang="de-DE" sz="2400" b="1" dirty="0"/>
+              <a:t> Shift Analysis</a:t>
+            </a:r>
+            <a:endParaRPr lang="en-US" sz="2400" dirty="0"/>
+          </a:p>
+          <a:p>
+            <a:pPr marL="285750" indent="-285750">
+              <a:buFont typeface="Arial" panose="020B0604020202020204" pitchFamily="34" charset="0"/>
+              <a:buChar char="•"/>
+            </a:pPr>
+            <a:r>
+              <a:rPr lang="en-US" sz="2400" dirty="0"/>
+              <a:t>The same shift analysis pipeline was applied to non-synchronized HeLa cells </a:t>
+            </a:r>
+          </a:p>
+          <a:p>
+            <a:pPr marL="285750" indent="-285750">
+              <a:buFont typeface="Arial" panose="020B0604020202020204" pitchFamily="34" charset="0"/>
+              <a:buChar char="•"/>
+            </a:pPr>
+            <a:r>
+              <a:rPr lang="en-US" sz="2400" dirty="0"/>
+              <a:t>Scatterplot compares shift distances between mitotic and non-synchronized conditions</a:t>
+            </a:r>
+          </a:p>
+          <a:p>
+            <a:pPr marL="285750" indent="-285750">
+              <a:buFont typeface="Arial" panose="020B0604020202020204" pitchFamily="34" charset="0"/>
+              <a:buChar char="•"/>
+            </a:pPr>
+            <a:r>
+              <a:rPr lang="en-US" sz="2400" dirty="0"/>
+              <a:t>Each point = one protein; position reflects condition-specific RNA dependence</a:t>
+            </a:r>
+          </a:p>
+          <a:p>
+            <a:pPr marL="285750" indent="-285750">
+              <a:buFont typeface="Arial" panose="020B0604020202020204" pitchFamily="34" charset="0"/>
+              <a:buChar char="•"/>
+            </a:pPr>
+            <a:r>
+              <a:rPr lang="en-US" sz="2400" dirty="0"/>
+              <a:t>Red dashed identity line represents equal shift in both conditions</a:t>
+            </a:r>
+          </a:p>
+          <a:p>
+            <a:pPr marL="285750" indent="-285750">
+              <a:buFont typeface="Arial" panose="020B0604020202020204" pitchFamily="34" charset="0"/>
+              <a:buChar char="•"/>
+            </a:pPr>
+            <a:r>
+              <a:rPr lang="en-US" sz="2400" dirty="0"/>
+              <a:t>Proteins highlighted in dark red below the identity line show significant RNA dependency exclusively during mitosis</a:t>
+            </a:r>
+          </a:p>
+          <a:p>
+            <a:pPr marL="285750" indent="-285750">
+              <a:buFont typeface="Arial" panose="020B0604020202020204" pitchFamily="34" charset="0"/>
+              <a:buChar char="•"/>
+            </a:pPr>
+            <a:r>
+              <a:rPr lang="en-US" sz="2400" dirty="0"/>
+              <a:t>These proteins likely exhibit mitosis-specific activity, as no significant shift was observed in the non-synchronized condition </a:t>
+            </a:r>
+          </a:p>
+          <a:p>
+            <a:pPr marL="285750" indent="-285750">
+              <a:buFont typeface="Arial" panose="020B0604020202020204" pitchFamily="34" charset="0"/>
+              <a:buChar char="•"/>
+            </a:pPr>
+            <a:endParaRPr lang="en-US" sz="2400" dirty="0"/>
+          </a:p>
+          <a:p>
+            <a:pPr marL="285750" indent="-285750">
+              <a:buFont typeface="Arial" panose="020B0604020202020204" pitchFamily="34" charset="0"/>
+              <a:buChar char="•"/>
+            </a:pPr>
+            <a:endParaRPr lang="en-US" sz="2400" dirty="0"/>
+          </a:p>
+          <a:p>
+            <a:pPr marL="285750" indent="-285750">
+              <a:buFont typeface="Arial" panose="020B0604020202020204" pitchFamily="34" charset="0"/>
+              <a:buChar char="•"/>
+            </a:pPr>
+            <a:endParaRPr lang="en-US" sz="2400" dirty="0"/>
+          </a:p>
+        </p:txBody>
+      </p:sp>
+      <p:sp>
+        <p:nvSpPr>
+          <p:cNvPr id="12" name="Textfeld 11">
+            <a:extLst>
+              <a:ext uri="{FF2B5EF4-FFF2-40B4-BE49-F238E27FC236}">
+                <a16:creationId xmlns:a16="http://schemas.microsoft.com/office/drawing/2014/main" id="{07BA545E-FE79-BC08-D94C-8D9CD8317AFA}"/>
+              </a:ext>
+            </a:extLst>
+          </p:cNvPr>
+          <p:cNvSpPr txBox="1"/>
+          <p:nvPr/>
+        </p:nvSpPr>
+        <p:spPr>
+          <a:xfrm>
+            <a:off x="15698166" y="23600530"/>
+            <a:ext cx="13226290" cy="1200329"/>
+          </a:xfrm>
+          <a:prstGeom prst="rect">
+            <a:avLst/>
+          </a:prstGeom>
+          <a:noFill/>
+        </p:spPr>
+        <p:txBody>
+          <a:bodyPr wrap="square" rtlCol="0">
+            <a:spAutoFit/>
+          </a:bodyPr>
+          <a:lstStyle/>
+          <a:p>
+            <a:pPr marR="0" lvl="0" algn="l" defTabSz="457200" rtl="0" eaLnBrk="1" fontAlgn="auto" latinLnBrk="0" hangingPunct="1">
+              <a:lnSpc>
+                <a:spcPct val="100000"/>
+              </a:lnSpc>
+              <a:spcBef>
+                <a:spcPts val="0"/>
+              </a:spcBef>
+              <a:spcAft>
+                <a:spcPts val="0"/>
+              </a:spcAft>
+              <a:buClrTx/>
+              <a:buSzTx/>
+              <a:tabLst/>
+              <a:defRPr/>
+            </a:pPr>
+            <a:r>
+              <a:rPr kumimoji="0" lang="en-US" sz="2400" b="1" i="0" u="none" strike="noStrike" kern="1200" cap="none" spc="0" normalizeH="0" baseline="0" noProof="0" dirty="0">
+                <a:ln>
+                  <a:noFill/>
+                </a:ln>
+                <a:solidFill>
+                  <a:prstClr val="black"/>
+                </a:solidFill>
+                <a:effectLst/>
+                <a:uLnTx/>
+                <a:uFillTx/>
+                <a:latin typeface="Aptos" panose="02110004020202020204"/>
+                <a:ea typeface="+mn-ea"/>
+                <a:cs typeface="+mn-cs"/>
+              </a:rPr>
+              <a:t>Results</a:t>
+            </a:r>
+          </a:p>
+          <a:p>
+            <a:pPr lvl="0">
+              <a:defRPr/>
+            </a:pPr>
+            <a:r>
+              <a:rPr lang="en-US" sz="2400" dirty="0"/>
+              <a:t>In total, 237 RBPs previously classified as significant fall into the group of only active in mitosis. One of them is </a:t>
+            </a:r>
+            <a:r>
+              <a:rPr lang="en-US" sz="2400" dirty="0" err="1"/>
+              <a:t>RiboSix</a:t>
+            </a:r>
+            <a:r>
+              <a:rPr lang="en-US" sz="2400" dirty="0"/>
+              <a:t>, suggesting that mitosis is his active season in the village of HeLa.</a:t>
+            </a:r>
+            <a:endParaRPr kumimoji="0" lang="en-US" sz="2400" i="0" u="none" strike="noStrike" kern="1200" cap="none" spc="0" normalizeH="0" baseline="0" noProof="0" dirty="0">
+              <a:ln>
+                <a:noFill/>
+              </a:ln>
+              <a:solidFill>
+                <a:prstClr val="black"/>
+              </a:solidFill>
+              <a:effectLst/>
+              <a:uLnTx/>
+              <a:uFillTx/>
+              <a:latin typeface="Aptos" panose="02110004020202020204"/>
+              <a:ea typeface="+mn-ea"/>
+              <a:cs typeface="+mn-cs"/>
+            </a:endParaRPr>
+          </a:p>
+        </p:txBody>
+      </p:sp>
     </p:spTree>
     <p:extLst>
       <p:ext uri="{BB962C8B-B14F-4D97-AF65-F5344CB8AC3E}">

</xml_diff>